<commit_message>
started wire framing. need to do events page and post pages
</commit_message>
<xml_diff>
--- a/Documents/final_project_planning.pptx
+++ b/Documents/final_project_planning.pptx
@@ -10,11 +10,14 @@
     <p:sldId id="258" r:id="rId4"/>
     <p:sldId id="259" r:id="rId5"/>
     <p:sldId id="265" r:id="rId6"/>
-    <p:sldId id="260" r:id="rId7"/>
-    <p:sldId id="266" r:id="rId8"/>
-    <p:sldId id="262" r:id="rId9"/>
-    <p:sldId id="263" r:id="rId10"/>
-    <p:sldId id="264" r:id="rId11"/>
+    <p:sldId id="267" r:id="rId7"/>
+    <p:sldId id="269" r:id="rId8"/>
+    <p:sldId id="268" r:id="rId9"/>
+    <p:sldId id="260" r:id="rId10"/>
+    <p:sldId id="266" r:id="rId11"/>
+    <p:sldId id="262" r:id="rId12"/>
+    <p:sldId id="263" r:id="rId13"/>
+    <p:sldId id="264" r:id="rId14"/>
   </p:sldIdLst>
   <p:sldSz cx="12192000" cy="6858000"/>
   <p:notesSz cx="6858000" cy="9144000"/>
@@ -113,7 +116,62 @@
       </a:defRPr>
     </a:lvl9pPr>
   </p:defaultTextStyle>
+  <p:extLst>
+    <p:ext uri="{EFAFB233-063F-42B5-8137-9DF3F51BA10A}">
+      <p15:sldGuideLst xmlns:p15="http://schemas.microsoft.com/office/powerpoint/2012/main"/>
+    </p:ext>
+  </p:extLst>
 </p:presentation>
+</file>
+
+<file path=ppt/authors.xml><?xml version="1.0" encoding="utf-8"?>
+<p188:authorLst xmlns:a="http://schemas.openxmlformats.org/drawingml/2006/main" xmlns:r="http://schemas.openxmlformats.org/officeDocument/2006/relationships" xmlns:p188="http://schemas.microsoft.com/office/powerpoint/2018/8/main">
+  <p188:author id="{F4528AED-D83D-A577-60C4-88E8BD19D895}" name="Steven Vazquez" initials="SV" userId="b4cc20b1c9d944c8" providerId="Windows Live"/>
+</p188:authorLst>
+</file>
+
+<file path=ppt/comments/modernComment_10C_300D12B5.xml><?xml version="1.0" encoding="utf-8"?>
+<p188:cmLst xmlns:a="http://schemas.openxmlformats.org/drawingml/2006/main" xmlns:r="http://schemas.openxmlformats.org/officeDocument/2006/relationships" xmlns:p188="http://schemas.microsoft.com/office/powerpoint/2018/8/main">
+  <p188:cm id="{A27208A3-052E-4D93-B3CE-9DA13FB086DF}" authorId="{F4528AED-D83D-A577-60C4-88E8BD19D895}" created="2023-11-06T00:46:20.340">
+    <ac:deMkLst xmlns:ac="http://schemas.microsoft.com/office/drawing/2013/main/command">
+      <pc:docMk xmlns:pc="http://schemas.microsoft.com/office/powerpoint/2013/main/command"/>
+      <pc:sldMk xmlns:pc="http://schemas.microsoft.com/office/powerpoint/2013/main/command" cId="806163125" sldId="268"/>
+      <ac:spMk id="20" creationId="{E4D0A74E-41DD-4F73-4EB2-C1D35A4EF610}"/>
+    </ac:deMkLst>
+    <p188:txBody>
+      <a:bodyPr/>
+      <a:lstStyle/>
+      <a:p>
+        <a:r>
+          <a:rPr lang="en-US"/>
+          <a:t>Checkbox for upvote</a:t>
+        </a:r>
+      </a:p>
+    </p188:txBody>
+  </p188:cm>
+</p188:cmLst>
+</file>
+
+<file path=ppt/comments/modernComment_10D_ABB93581.xml><?xml version="1.0" encoding="utf-8"?>
+<p188:cmLst xmlns:a="http://schemas.openxmlformats.org/drawingml/2006/main" xmlns:r="http://schemas.openxmlformats.org/officeDocument/2006/relationships" xmlns:p188="http://schemas.microsoft.com/office/powerpoint/2018/8/main">
+  <p188:cm id="{988A40AE-748D-4412-B4B6-1ADC0EC6942C}" authorId="{F4528AED-D83D-A577-60C4-88E8BD19D895}" created="2023-11-06T00:46:20.340">
+    <ac:deMkLst xmlns:ac="http://schemas.microsoft.com/office/drawing/2013/main/command">
+      <pc:docMk xmlns:pc="http://schemas.microsoft.com/office/powerpoint/2013/main/command"/>
+      <pc:sldMk xmlns:pc="http://schemas.microsoft.com/office/powerpoint/2013/main/command" cId="2881041793" sldId="269"/>
+      <ac:spMk id="20" creationId="{E4D0A74E-41DD-4F73-4EB2-C1D35A4EF610}"/>
+    </ac:deMkLst>
+    <p188:txBody>
+      <a:bodyPr/>
+      <a:lstStyle/>
+      <a:p>
+        <a:r>
+          <a:rPr lang="en-US"/>
+          <a:t>Checkbox for upvote</a:t>
+        </a:r>
+      </a:p>
+    </p188:txBody>
+  </p188:cm>
+</p188:cmLst>
 </file>
 
 <file path=ppt/slideLayouts/slideLayout1.xml><?xml version="1.0" encoding="utf-8"?>
@@ -3520,6 +3578,797 @@
         <p:spPr>
           <a:xfrm>
             <a:off x="275846" y="765589"/>
+            <a:ext cx="11410545" cy="2769284"/>
+          </a:xfrm>
+          <a:prstGeom prst="rect">
+            <a:avLst/>
+          </a:prstGeom>
+          <a:noFill/>
+        </p:spPr>
+        <p:txBody>
+          <a:bodyPr wrap="square" rtlCol="0">
+            <a:spAutoFit/>
+          </a:bodyPr>
+          <a:lstStyle/>
+          <a:p>
+            <a:pPr marL="0" marR="0">
+              <a:lnSpc>
+                <a:spcPct val="107000"/>
+              </a:lnSpc>
+              <a:spcBef>
+                <a:spcPts val="0"/>
+              </a:spcBef>
+              <a:spcAft>
+                <a:spcPts val="800"/>
+              </a:spcAft>
+            </a:pPr>
+            <a:r>
+              <a:rPr lang="en-US" kern="100" dirty="0">
+                <a:latin typeface="Calibri" panose="020F0502020204030204" pitchFamily="34" charset="0"/>
+                <a:ea typeface="Calibri" panose="020F0502020204030204" pitchFamily="34" charset="0"/>
+                <a:cs typeface="Times New Roman" panose="02020603050405020304" pitchFamily="18" charset="0"/>
+              </a:rPr>
+              <a:t>- </a:t>
+            </a:r>
+            <a:r>
+              <a:rPr lang="en-US" sz="1800" kern="100" dirty="0">
+                <a:effectLst/>
+                <a:latin typeface="Calibri" panose="020F0502020204030204" pitchFamily="34" charset="0"/>
+                <a:ea typeface="Calibri" panose="020F0502020204030204" pitchFamily="34" charset="0"/>
+                <a:cs typeface="Times New Roman" panose="02020603050405020304" pitchFamily="18" charset="0"/>
+              </a:rPr>
+              <a:t>Event post should display:</a:t>
+            </a:r>
+          </a:p>
+          <a:p>
+            <a:pPr marL="0" marR="0">
+              <a:lnSpc>
+                <a:spcPct val="107000"/>
+              </a:lnSpc>
+              <a:spcBef>
+                <a:spcPts val="0"/>
+              </a:spcBef>
+              <a:spcAft>
+                <a:spcPts val="800"/>
+              </a:spcAft>
+            </a:pPr>
+            <a:r>
+              <a:rPr lang="en-US" kern="100" dirty="0">
+                <a:latin typeface="Calibri" panose="020F0502020204030204" pitchFamily="34" charset="0"/>
+                <a:ea typeface="Calibri" panose="020F0502020204030204" pitchFamily="34" charset="0"/>
+                <a:cs typeface="Times New Roman" panose="02020603050405020304" pitchFamily="18" charset="0"/>
+              </a:rPr>
+              <a:t>	- event Name </a:t>
+            </a:r>
+          </a:p>
+          <a:p>
+            <a:pPr marL="0" marR="0">
+              <a:lnSpc>
+                <a:spcPct val="107000"/>
+              </a:lnSpc>
+              <a:spcBef>
+                <a:spcPts val="0"/>
+              </a:spcBef>
+              <a:spcAft>
+                <a:spcPts val="800"/>
+              </a:spcAft>
+            </a:pPr>
+            <a:r>
+              <a:rPr lang="en-US" kern="100" dirty="0">
+                <a:latin typeface="Calibri" panose="020F0502020204030204" pitchFamily="34" charset="0"/>
+                <a:ea typeface="Calibri" panose="020F0502020204030204" pitchFamily="34" charset="0"/>
+                <a:cs typeface="Times New Roman" panose="02020603050405020304" pitchFamily="18" charset="0"/>
+              </a:rPr>
+              <a:t>	- event ID</a:t>
+            </a:r>
+          </a:p>
+          <a:p>
+            <a:pPr marL="0" marR="0">
+              <a:lnSpc>
+                <a:spcPct val="107000"/>
+              </a:lnSpc>
+              <a:spcBef>
+                <a:spcPts val="0"/>
+              </a:spcBef>
+              <a:spcAft>
+                <a:spcPts val="800"/>
+              </a:spcAft>
+            </a:pPr>
+            <a:r>
+              <a:rPr lang="en-US" sz="1800" kern="100" dirty="0">
+                <a:effectLst/>
+                <a:latin typeface="Calibri" panose="020F0502020204030204" pitchFamily="34" charset="0"/>
+                <a:ea typeface="Calibri" panose="020F0502020204030204" pitchFamily="34" charset="0"/>
+                <a:cs typeface="Times New Roman" panose="02020603050405020304" pitchFamily="18" charset="0"/>
+              </a:rPr>
+              <a:t>	- location</a:t>
+            </a:r>
+          </a:p>
+          <a:p>
+            <a:pPr marL="0" marR="0">
+              <a:lnSpc>
+                <a:spcPct val="107000"/>
+              </a:lnSpc>
+              <a:spcBef>
+                <a:spcPts val="0"/>
+              </a:spcBef>
+              <a:spcAft>
+                <a:spcPts val="800"/>
+              </a:spcAft>
+            </a:pPr>
+            <a:r>
+              <a:rPr lang="en-US" kern="100" dirty="0">
+                <a:latin typeface="Calibri" panose="020F0502020204030204" pitchFamily="34" charset="0"/>
+                <a:ea typeface="Calibri" panose="020F0502020204030204" pitchFamily="34" charset="0"/>
+                <a:cs typeface="Times New Roman" panose="02020603050405020304" pitchFamily="18" charset="0"/>
+              </a:rPr>
+              <a:t>	- time</a:t>
+            </a:r>
+          </a:p>
+          <a:p>
+            <a:pPr marL="0" marR="0">
+              <a:lnSpc>
+                <a:spcPct val="107000"/>
+              </a:lnSpc>
+              <a:spcBef>
+                <a:spcPts val="0"/>
+              </a:spcBef>
+              <a:spcAft>
+                <a:spcPts val="800"/>
+              </a:spcAft>
+            </a:pPr>
+            <a:r>
+              <a:rPr lang="en-US" sz="1800" kern="100" dirty="0">
+                <a:effectLst/>
+                <a:latin typeface="Calibri" panose="020F0502020204030204" pitchFamily="34" charset="0"/>
+                <a:ea typeface="Calibri" panose="020F0502020204030204" pitchFamily="34" charset="0"/>
+                <a:cs typeface="Times New Roman" panose="02020603050405020304" pitchFamily="18" charset="0"/>
+              </a:rPr>
+              <a:t>	- participants (list </a:t>
+            </a:r>
+            <a:r>
+              <a:rPr lang="en-US" sz="1800" kern="100" dirty="0" err="1">
+                <a:effectLst/>
+                <a:latin typeface="Calibri" panose="020F0502020204030204" pitchFamily="34" charset="0"/>
+                <a:ea typeface="Calibri" panose="020F0502020204030204" pitchFamily="34" charset="0"/>
+                <a:cs typeface="Times New Roman" panose="02020603050405020304" pitchFamily="18" charset="0"/>
+              </a:rPr>
+              <a:t>userId</a:t>
+            </a:r>
+            <a:r>
+              <a:rPr lang="en-US" sz="1800" kern="100" dirty="0">
+                <a:effectLst/>
+                <a:latin typeface="Calibri" panose="020F0502020204030204" pitchFamily="34" charset="0"/>
+                <a:ea typeface="Calibri" panose="020F0502020204030204" pitchFamily="34" charset="0"/>
+                <a:cs typeface="Times New Roman" panose="02020603050405020304" pitchFamily="18" charset="0"/>
+              </a:rPr>
+              <a:t> attending)</a:t>
+            </a:r>
+          </a:p>
+          <a:p>
+            <a:pPr marL="0" marR="0">
+              <a:lnSpc>
+                <a:spcPct val="107000"/>
+              </a:lnSpc>
+              <a:spcBef>
+                <a:spcPts val="0"/>
+              </a:spcBef>
+              <a:spcAft>
+                <a:spcPts val="800"/>
+              </a:spcAft>
+            </a:pPr>
+            <a:r>
+              <a:rPr lang="en-US" kern="100" dirty="0">
+                <a:latin typeface="Calibri" panose="020F0502020204030204" pitchFamily="34" charset="0"/>
+                <a:ea typeface="Calibri" panose="020F0502020204030204" pitchFamily="34" charset="0"/>
+                <a:cs typeface="Times New Roman" panose="02020603050405020304" pitchFamily="18" charset="0"/>
+              </a:rPr>
+              <a:t>	- Attending/ Remove Attending button to add/remove user from participants list</a:t>
+            </a:r>
+            <a:endParaRPr lang="en-US" sz="1800" kern="100" dirty="0">
+              <a:effectLst/>
+              <a:latin typeface="Calibri" panose="020F0502020204030204" pitchFamily="34" charset="0"/>
+              <a:ea typeface="Calibri" panose="020F0502020204030204" pitchFamily="34" charset="0"/>
+              <a:cs typeface="Times New Roman" panose="02020603050405020304" pitchFamily="18" charset="0"/>
+            </a:endParaRPr>
+          </a:p>
+        </p:txBody>
+      </p:sp>
+      <p:sp>
+        <p:nvSpPr>
+          <p:cNvPr id="2" name="TextBox 1">
+            <a:extLst>
+              <a:ext uri="{FF2B5EF4-FFF2-40B4-BE49-F238E27FC236}">
+                <a16:creationId xmlns:a16="http://schemas.microsoft.com/office/drawing/2014/main" id="{CB46AF81-95B8-D80D-804A-CADBD595992E}"/>
+              </a:ext>
+            </a:extLst>
+          </p:cNvPr>
+          <p:cNvSpPr txBox="1"/>
+          <p:nvPr/>
+        </p:nvSpPr>
+        <p:spPr>
+          <a:xfrm>
+            <a:off x="275847" y="161432"/>
+            <a:ext cx="11410545" cy="369332"/>
+          </a:xfrm>
+          <a:prstGeom prst="rect">
+            <a:avLst/>
+          </a:prstGeom>
+          <a:noFill/>
+        </p:spPr>
+        <p:txBody>
+          <a:bodyPr wrap="square" rtlCol="0">
+            <a:spAutoFit/>
+          </a:bodyPr>
+          <a:lstStyle/>
+          <a:p>
+            <a:r>
+              <a:rPr lang="en-US" sz="1800" dirty="0">
+                <a:effectLst/>
+                <a:latin typeface="Calibri" panose="020F0502020204030204" pitchFamily="34" charset="0"/>
+                <a:ea typeface="Calibri" panose="020F0502020204030204" pitchFamily="34" charset="0"/>
+                <a:cs typeface="Times New Roman" panose="02020603050405020304" pitchFamily="18" charset="0"/>
+              </a:rPr>
+              <a:t>Event display area</a:t>
+            </a:r>
+            <a:endParaRPr lang="en-US" dirty="0"/>
+          </a:p>
+        </p:txBody>
+      </p:sp>
+    </p:spTree>
+    <p:extLst>
+      <p:ext uri="{BB962C8B-B14F-4D97-AF65-F5344CB8AC3E}">
+        <p14:creationId xmlns:p14="http://schemas.microsoft.com/office/powerpoint/2010/main" val="3257912736"/>
+      </p:ext>
+    </p:extLst>
+  </p:cSld>
+  <p:clrMapOvr>
+    <a:masterClrMapping/>
+  </p:clrMapOvr>
+</p:sld>
+</file>
+
+<file path=ppt/slides/slide11.xml><?xml version="1.0" encoding="utf-8"?>
+<p:sld xmlns:a="http://schemas.openxmlformats.org/drawingml/2006/main" xmlns:r="http://schemas.openxmlformats.org/officeDocument/2006/relationships" xmlns:p="http://schemas.openxmlformats.org/presentationml/2006/main">
+  <p:cSld>
+    <p:spTree>
+      <p:nvGrpSpPr>
+        <p:cNvPr id="1" name=""/>
+        <p:cNvGrpSpPr/>
+        <p:nvPr/>
+      </p:nvGrpSpPr>
+      <p:grpSpPr>
+        <a:xfrm>
+          <a:off x="0" y="0"/>
+          <a:ext cx="0" cy="0"/>
+          <a:chOff x="0" y="0"/>
+          <a:chExt cx="0" cy="0"/>
+        </a:xfrm>
+      </p:grpSpPr>
+      <p:sp>
+        <p:nvSpPr>
+          <p:cNvPr id="4" name="TextBox 3">
+            <a:extLst>
+              <a:ext uri="{FF2B5EF4-FFF2-40B4-BE49-F238E27FC236}">
+                <a16:creationId xmlns:a16="http://schemas.microsoft.com/office/drawing/2014/main" id="{93042950-E66C-9CF4-A917-488019161FCA}"/>
+              </a:ext>
+            </a:extLst>
+          </p:cNvPr>
+          <p:cNvSpPr txBox="1"/>
+          <p:nvPr/>
+        </p:nvSpPr>
+        <p:spPr>
+          <a:xfrm>
+            <a:off x="275846" y="765589"/>
+            <a:ext cx="11410545" cy="1971374"/>
+          </a:xfrm>
+          <a:prstGeom prst="rect">
+            <a:avLst/>
+          </a:prstGeom>
+          <a:noFill/>
+        </p:spPr>
+        <p:txBody>
+          <a:bodyPr wrap="square" rtlCol="0">
+            <a:spAutoFit/>
+          </a:bodyPr>
+          <a:lstStyle/>
+          <a:p>
+            <a:pPr marL="0" marR="0">
+              <a:lnSpc>
+                <a:spcPct val="107000"/>
+              </a:lnSpc>
+              <a:spcBef>
+                <a:spcPts val="0"/>
+              </a:spcBef>
+              <a:spcAft>
+                <a:spcPts val="800"/>
+              </a:spcAft>
+            </a:pPr>
+            <a:r>
+              <a:rPr lang="en-US" sz="1800" kern="100" dirty="0">
+                <a:effectLst/>
+                <a:latin typeface="Calibri" panose="020F0502020204030204" pitchFamily="34" charset="0"/>
+                <a:ea typeface="Calibri" panose="020F0502020204030204" pitchFamily="34" charset="0"/>
+                <a:cs typeface="Times New Roman" panose="02020603050405020304" pitchFamily="18" charset="0"/>
+              </a:rPr>
+              <a:t>Needs following endpoints:</a:t>
+            </a:r>
+          </a:p>
+          <a:p>
+            <a:pPr marL="0" marR="0">
+              <a:lnSpc>
+                <a:spcPct val="107000"/>
+              </a:lnSpc>
+              <a:spcBef>
+                <a:spcPts val="0"/>
+              </a:spcBef>
+              <a:spcAft>
+                <a:spcPts val="800"/>
+              </a:spcAft>
+            </a:pPr>
+            <a:r>
+              <a:rPr lang="en-US" kern="100" dirty="0">
+                <a:latin typeface="Calibri" panose="020F0502020204030204" pitchFamily="34" charset="0"/>
+                <a:ea typeface="Calibri" panose="020F0502020204030204" pitchFamily="34" charset="0"/>
+                <a:cs typeface="Times New Roman" panose="02020603050405020304" pitchFamily="18" charset="0"/>
+              </a:rPr>
+              <a:t>- GET all users</a:t>
+            </a:r>
+          </a:p>
+          <a:p>
+            <a:pPr marL="0" marR="0">
+              <a:lnSpc>
+                <a:spcPct val="107000"/>
+              </a:lnSpc>
+              <a:spcBef>
+                <a:spcPts val="0"/>
+              </a:spcBef>
+              <a:spcAft>
+                <a:spcPts val="800"/>
+              </a:spcAft>
+            </a:pPr>
+            <a:r>
+              <a:rPr lang="en-US" sz="1800" kern="100" dirty="0">
+                <a:effectLst/>
+                <a:latin typeface="Calibri" panose="020F0502020204030204" pitchFamily="34" charset="0"/>
+                <a:ea typeface="Calibri" panose="020F0502020204030204" pitchFamily="34" charset="0"/>
+                <a:cs typeface="Times New Roman" panose="02020603050405020304" pitchFamily="18" charset="0"/>
+              </a:rPr>
+              <a:t>- GET </a:t>
+            </a:r>
+            <a:r>
+              <a:rPr lang="en-US" sz="1800" kern="100" dirty="0" err="1">
+                <a:effectLst/>
+                <a:latin typeface="Calibri" panose="020F0502020204030204" pitchFamily="34" charset="0"/>
+                <a:ea typeface="Calibri" panose="020F0502020204030204" pitchFamily="34" charset="0"/>
+                <a:cs typeface="Times New Roman" panose="02020603050405020304" pitchFamily="18" charset="0"/>
+              </a:rPr>
+              <a:t>userById</a:t>
+            </a:r>
+            <a:endParaRPr lang="en-US" sz="1800" kern="100" dirty="0">
+              <a:effectLst/>
+              <a:latin typeface="Calibri" panose="020F0502020204030204" pitchFamily="34" charset="0"/>
+              <a:ea typeface="Calibri" panose="020F0502020204030204" pitchFamily="34" charset="0"/>
+              <a:cs typeface="Times New Roman" panose="02020603050405020304" pitchFamily="18" charset="0"/>
+            </a:endParaRPr>
+          </a:p>
+          <a:p>
+            <a:pPr marL="0" marR="0">
+              <a:lnSpc>
+                <a:spcPct val="107000"/>
+              </a:lnSpc>
+              <a:spcBef>
+                <a:spcPts val="0"/>
+              </a:spcBef>
+              <a:spcAft>
+                <a:spcPts val="800"/>
+              </a:spcAft>
+            </a:pPr>
+            <a:r>
+              <a:rPr lang="en-US" kern="100" dirty="0">
+                <a:latin typeface="Calibri" panose="020F0502020204030204" pitchFamily="34" charset="0"/>
+                <a:ea typeface="Calibri" panose="020F0502020204030204" pitchFamily="34" charset="0"/>
+                <a:cs typeface="Times New Roman" panose="02020603050405020304" pitchFamily="18" charset="0"/>
+              </a:rPr>
+              <a:t>- POST </a:t>
+            </a:r>
+            <a:r>
+              <a:rPr lang="en-US" kern="100" dirty="0" err="1">
+                <a:latin typeface="Calibri" panose="020F0502020204030204" pitchFamily="34" charset="0"/>
+                <a:ea typeface="Calibri" panose="020F0502020204030204" pitchFamily="34" charset="0"/>
+                <a:cs typeface="Times New Roman" panose="02020603050405020304" pitchFamily="18" charset="0"/>
+              </a:rPr>
+              <a:t>createUser</a:t>
+            </a:r>
+            <a:endParaRPr lang="en-US" kern="100" dirty="0">
+              <a:latin typeface="Calibri" panose="020F0502020204030204" pitchFamily="34" charset="0"/>
+              <a:ea typeface="Calibri" panose="020F0502020204030204" pitchFamily="34" charset="0"/>
+              <a:cs typeface="Times New Roman" panose="02020603050405020304" pitchFamily="18" charset="0"/>
+            </a:endParaRPr>
+          </a:p>
+          <a:p>
+            <a:pPr marL="0" marR="0">
+              <a:lnSpc>
+                <a:spcPct val="107000"/>
+              </a:lnSpc>
+              <a:spcBef>
+                <a:spcPts val="0"/>
+              </a:spcBef>
+              <a:spcAft>
+                <a:spcPts val="800"/>
+              </a:spcAft>
+            </a:pPr>
+            <a:r>
+              <a:rPr lang="en-US" kern="100" dirty="0">
+                <a:latin typeface="Calibri" panose="020F0502020204030204" pitchFamily="34" charset="0"/>
+                <a:ea typeface="Calibri" panose="020F0502020204030204" pitchFamily="34" charset="0"/>
+                <a:cs typeface="Times New Roman" panose="02020603050405020304" pitchFamily="18" charset="0"/>
+              </a:rPr>
+              <a:t>- REMOVE </a:t>
+            </a:r>
+            <a:r>
+              <a:rPr lang="en-US" kern="100" dirty="0" err="1">
+                <a:latin typeface="Calibri" panose="020F0502020204030204" pitchFamily="34" charset="0"/>
+                <a:ea typeface="Calibri" panose="020F0502020204030204" pitchFamily="34" charset="0"/>
+                <a:cs typeface="Times New Roman" panose="02020603050405020304" pitchFamily="18" charset="0"/>
+              </a:rPr>
+              <a:t>removeUser</a:t>
+            </a:r>
+            <a:endParaRPr lang="en-US" kern="100" dirty="0">
+              <a:latin typeface="Calibri" panose="020F0502020204030204" pitchFamily="34" charset="0"/>
+              <a:ea typeface="Calibri" panose="020F0502020204030204" pitchFamily="34" charset="0"/>
+              <a:cs typeface="Times New Roman" panose="02020603050405020304" pitchFamily="18" charset="0"/>
+            </a:endParaRPr>
+          </a:p>
+        </p:txBody>
+      </p:sp>
+      <p:sp>
+        <p:nvSpPr>
+          <p:cNvPr id="2" name="TextBox 1">
+            <a:extLst>
+              <a:ext uri="{FF2B5EF4-FFF2-40B4-BE49-F238E27FC236}">
+                <a16:creationId xmlns:a16="http://schemas.microsoft.com/office/drawing/2014/main" id="{CB46AF81-95B8-D80D-804A-CADBD595992E}"/>
+              </a:ext>
+            </a:extLst>
+          </p:cNvPr>
+          <p:cNvSpPr txBox="1"/>
+          <p:nvPr/>
+        </p:nvSpPr>
+        <p:spPr>
+          <a:xfrm>
+            <a:off x="275847" y="161432"/>
+            <a:ext cx="11410545" cy="369332"/>
+          </a:xfrm>
+          <a:prstGeom prst="rect">
+            <a:avLst/>
+          </a:prstGeom>
+          <a:noFill/>
+        </p:spPr>
+        <p:txBody>
+          <a:bodyPr wrap="square" rtlCol="0">
+            <a:spAutoFit/>
+          </a:bodyPr>
+          <a:lstStyle/>
+          <a:p>
+            <a:r>
+              <a:rPr lang="en-US" sz="1800" dirty="0">
+                <a:effectLst/>
+                <a:latin typeface="Calibri" panose="020F0502020204030204" pitchFamily="34" charset="0"/>
+                <a:ea typeface="Calibri" panose="020F0502020204030204" pitchFamily="34" charset="0"/>
+                <a:cs typeface="Times New Roman" panose="02020603050405020304" pitchFamily="18" charset="0"/>
+              </a:rPr>
+              <a:t>Users API</a:t>
+            </a:r>
+            <a:endParaRPr lang="en-US" dirty="0"/>
+          </a:p>
+        </p:txBody>
+      </p:sp>
+    </p:spTree>
+    <p:extLst>
+      <p:ext uri="{BB962C8B-B14F-4D97-AF65-F5344CB8AC3E}">
+        <p14:creationId xmlns:p14="http://schemas.microsoft.com/office/powerpoint/2010/main" val="893954284"/>
+      </p:ext>
+    </p:extLst>
+  </p:cSld>
+  <p:clrMapOvr>
+    <a:masterClrMapping/>
+  </p:clrMapOvr>
+</p:sld>
+</file>
+
+<file path=ppt/slides/slide12.xml><?xml version="1.0" encoding="utf-8"?>
+<p:sld xmlns:a="http://schemas.openxmlformats.org/drawingml/2006/main" xmlns:r="http://schemas.openxmlformats.org/officeDocument/2006/relationships" xmlns:p="http://schemas.openxmlformats.org/presentationml/2006/main">
+  <p:cSld>
+    <p:spTree>
+      <p:nvGrpSpPr>
+        <p:cNvPr id="1" name=""/>
+        <p:cNvGrpSpPr/>
+        <p:nvPr/>
+      </p:nvGrpSpPr>
+      <p:grpSpPr>
+        <a:xfrm>
+          <a:off x="0" y="0"/>
+          <a:ext cx="0" cy="0"/>
+          <a:chOff x="0" y="0"/>
+          <a:chExt cx="0" cy="0"/>
+        </a:xfrm>
+      </p:grpSpPr>
+      <p:sp>
+        <p:nvSpPr>
+          <p:cNvPr id="4" name="TextBox 3">
+            <a:extLst>
+              <a:ext uri="{FF2B5EF4-FFF2-40B4-BE49-F238E27FC236}">
+                <a16:creationId xmlns:a16="http://schemas.microsoft.com/office/drawing/2014/main" id="{93042950-E66C-9CF4-A917-488019161FCA}"/>
+              </a:ext>
+            </a:extLst>
+          </p:cNvPr>
+          <p:cNvSpPr txBox="1"/>
+          <p:nvPr/>
+        </p:nvSpPr>
+        <p:spPr>
+          <a:xfrm>
+            <a:off x="275846" y="765589"/>
+            <a:ext cx="11410545" cy="1971374"/>
+          </a:xfrm>
+          <a:prstGeom prst="rect">
+            <a:avLst/>
+          </a:prstGeom>
+          <a:noFill/>
+        </p:spPr>
+        <p:txBody>
+          <a:bodyPr wrap="square" rtlCol="0">
+            <a:spAutoFit/>
+          </a:bodyPr>
+          <a:lstStyle/>
+          <a:p>
+            <a:pPr marL="0" marR="0">
+              <a:lnSpc>
+                <a:spcPct val="107000"/>
+              </a:lnSpc>
+              <a:spcBef>
+                <a:spcPts val="0"/>
+              </a:spcBef>
+              <a:spcAft>
+                <a:spcPts val="800"/>
+              </a:spcAft>
+            </a:pPr>
+            <a:r>
+              <a:rPr lang="en-US" sz="1800" kern="100" dirty="0">
+                <a:effectLst/>
+                <a:latin typeface="Calibri" panose="020F0502020204030204" pitchFamily="34" charset="0"/>
+                <a:ea typeface="Calibri" panose="020F0502020204030204" pitchFamily="34" charset="0"/>
+                <a:cs typeface="Times New Roman" panose="02020603050405020304" pitchFamily="18" charset="0"/>
+              </a:rPr>
+              <a:t>Needs following endpoints:</a:t>
+            </a:r>
+          </a:p>
+          <a:p>
+            <a:pPr marL="0" marR="0">
+              <a:lnSpc>
+                <a:spcPct val="107000"/>
+              </a:lnSpc>
+              <a:spcBef>
+                <a:spcPts val="0"/>
+              </a:spcBef>
+              <a:spcAft>
+                <a:spcPts val="800"/>
+              </a:spcAft>
+            </a:pPr>
+            <a:r>
+              <a:rPr lang="en-US" kern="100" dirty="0">
+                <a:latin typeface="Calibri" panose="020F0502020204030204" pitchFamily="34" charset="0"/>
+                <a:ea typeface="Calibri" panose="020F0502020204030204" pitchFamily="34" charset="0"/>
+                <a:cs typeface="Times New Roman" panose="02020603050405020304" pitchFamily="18" charset="0"/>
+              </a:rPr>
+              <a:t>- GET </a:t>
+            </a:r>
+            <a:r>
+              <a:rPr lang="en-US" kern="100" dirty="0" err="1">
+                <a:latin typeface="Calibri" panose="020F0502020204030204" pitchFamily="34" charset="0"/>
+                <a:ea typeface="Calibri" panose="020F0502020204030204" pitchFamily="34" charset="0"/>
+                <a:cs typeface="Times New Roman" panose="02020603050405020304" pitchFamily="18" charset="0"/>
+              </a:rPr>
+              <a:t>allPosts</a:t>
+            </a:r>
+            <a:endParaRPr lang="en-US" kern="100" dirty="0">
+              <a:latin typeface="Calibri" panose="020F0502020204030204" pitchFamily="34" charset="0"/>
+              <a:ea typeface="Calibri" panose="020F0502020204030204" pitchFamily="34" charset="0"/>
+              <a:cs typeface="Times New Roman" panose="02020603050405020304" pitchFamily="18" charset="0"/>
+            </a:endParaRPr>
+          </a:p>
+          <a:p>
+            <a:pPr marL="0" marR="0">
+              <a:lnSpc>
+                <a:spcPct val="107000"/>
+              </a:lnSpc>
+              <a:spcBef>
+                <a:spcPts val="0"/>
+              </a:spcBef>
+              <a:spcAft>
+                <a:spcPts val="800"/>
+              </a:spcAft>
+            </a:pPr>
+            <a:r>
+              <a:rPr lang="en-US" sz="1800" kern="100" dirty="0">
+                <a:effectLst/>
+                <a:latin typeface="Calibri" panose="020F0502020204030204" pitchFamily="34" charset="0"/>
+                <a:ea typeface="Calibri" panose="020F0502020204030204" pitchFamily="34" charset="0"/>
+                <a:cs typeface="Times New Roman" panose="02020603050405020304" pitchFamily="18" charset="0"/>
+              </a:rPr>
+              <a:t>- GET </a:t>
+            </a:r>
+            <a:r>
+              <a:rPr lang="en-US" sz="1800" kern="100" dirty="0" err="1">
+                <a:effectLst/>
+                <a:latin typeface="Calibri" panose="020F0502020204030204" pitchFamily="34" charset="0"/>
+                <a:ea typeface="Calibri" panose="020F0502020204030204" pitchFamily="34" charset="0"/>
+                <a:cs typeface="Times New Roman" panose="02020603050405020304" pitchFamily="18" charset="0"/>
+              </a:rPr>
+              <a:t>postById</a:t>
+            </a:r>
+            <a:endParaRPr lang="en-US" sz="1800" kern="100" dirty="0">
+              <a:effectLst/>
+              <a:latin typeface="Calibri" panose="020F0502020204030204" pitchFamily="34" charset="0"/>
+              <a:ea typeface="Calibri" panose="020F0502020204030204" pitchFamily="34" charset="0"/>
+              <a:cs typeface="Times New Roman" panose="02020603050405020304" pitchFamily="18" charset="0"/>
+            </a:endParaRPr>
+          </a:p>
+          <a:p>
+            <a:pPr marL="0" marR="0">
+              <a:lnSpc>
+                <a:spcPct val="107000"/>
+              </a:lnSpc>
+              <a:spcBef>
+                <a:spcPts val="0"/>
+              </a:spcBef>
+              <a:spcAft>
+                <a:spcPts val="800"/>
+              </a:spcAft>
+            </a:pPr>
+            <a:r>
+              <a:rPr lang="en-US" kern="100" dirty="0">
+                <a:latin typeface="Calibri" panose="020F0502020204030204" pitchFamily="34" charset="0"/>
+                <a:ea typeface="Calibri" panose="020F0502020204030204" pitchFamily="34" charset="0"/>
+                <a:cs typeface="Times New Roman" panose="02020603050405020304" pitchFamily="18" charset="0"/>
+              </a:rPr>
+              <a:t>- POST </a:t>
+            </a:r>
+            <a:r>
+              <a:rPr lang="en-US" kern="100" dirty="0" err="1">
+                <a:latin typeface="Calibri" panose="020F0502020204030204" pitchFamily="34" charset="0"/>
+                <a:ea typeface="Calibri" panose="020F0502020204030204" pitchFamily="34" charset="0"/>
+                <a:cs typeface="Times New Roman" panose="02020603050405020304" pitchFamily="18" charset="0"/>
+              </a:rPr>
+              <a:t>createPost</a:t>
+            </a:r>
+            <a:endParaRPr lang="en-US" kern="100" dirty="0">
+              <a:latin typeface="Calibri" panose="020F0502020204030204" pitchFamily="34" charset="0"/>
+              <a:ea typeface="Calibri" panose="020F0502020204030204" pitchFamily="34" charset="0"/>
+              <a:cs typeface="Times New Roman" panose="02020603050405020304" pitchFamily="18" charset="0"/>
+            </a:endParaRPr>
+          </a:p>
+          <a:p>
+            <a:pPr marL="0" marR="0">
+              <a:lnSpc>
+                <a:spcPct val="107000"/>
+              </a:lnSpc>
+              <a:spcBef>
+                <a:spcPts val="0"/>
+              </a:spcBef>
+              <a:spcAft>
+                <a:spcPts val="800"/>
+              </a:spcAft>
+            </a:pPr>
+            <a:r>
+              <a:rPr lang="en-US" kern="100" dirty="0">
+                <a:latin typeface="Calibri" panose="020F0502020204030204" pitchFamily="34" charset="0"/>
+                <a:ea typeface="Calibri" panose="020F0502020204030204" pitchFamily="34" charset="0"/>
+                <a:cs typeface="Times New Roman" panose="02020603050405020304" pitchFamily="18" charset="0"/>
+              </a:rPr>
+              <a:t>- DELETE </a:t>
+            </a:r>
+            <a:r>
+              <a:rPr lang="en-US" kern="100" dirty="0" err="1">
+                <a:latin typeface="Calibri" panose="020F0502020204030204" pitchFamily="34" charset="0"/>
+                <a:ea typeface="Calibri" panose="020F0502020204030204" pitchFamily="34" charset="0"/>
+                <a:cs typeface="Times New Roman" panose="02020603050405020304" pitchFamily="18" charset="0"/>
+              </a:rPr>
+              <a:t>removePost</a:t>
+            </a:r>
+            <a:endParaRPr lang="en-US" kern="100" dirty="0">
+              <a:latin typeface="Calibri" panose="020F0502020204030204" pitchFamily="34" charset="0"/>
+              <a:ea typeface="Calibri" panose="020F0502020204030204" pitchFamily="34" charset="0"/>
+              <a:cs typeface="Times New Roman" panose="02020603050405020304" pitchFamily="18" charset="0"/>
+            </a:endParaRPr>
+          </a:p>
+        </p:txBody>
+      </p:sp>
+      <p:sp>
+        <p:nvSpPr>
+          <p:cNvPr id="2" name="TextBox 1">
+            <a:extLst>
+              <a:ext uri="{FF2B5EF4-FFF2-40B4-BE49-F238E27FC236}">
+                <a16:creationId xmlns:a16="http://schemas.microsoft.com/office/drawing/2014/main" id="{CB46AF81-95B8-D80D-804A-CADBD595992E}"/>
+              </a:ext>
+            </a:extLst>
+          </p:cNvPr>
+          <p:cNvSpPr txBox="1"/>
+          <p:nvPr/>
+        </p:nvSpPr>
+        <p:spPr>
+          <a:xfrm>
+            <a:off x="275847" y="161432"/>
+            <a:ext cx="11410545" cy="369332"/>
+          </a:xfrm>
+          <a:prstGeom prst="rect">
+            <a:avLst/>
+          </a:prstGeom>
+          <a:noFill/>
+        </p:spPr>
+        <p:txBody>
+          <a:bodyPr wrap="square" rtlCol="0">
+            <a:spAutoFit/>
+          </a:bodyPr>
+          <a:lstStyle/>
+          <a:p>
+            <a:r>
+              <a:rPr lang="en-US" sz="1800" dirty="0">
+                <a:effectLst/>
+                <a:latin typeface="Calibri" panose="020F0502020204030204" pitchFamily="34" charset="0"/>
+                <a:ea typeface="Calibri" panose="020F0502020204030204" pitchFamily="34" charset="0"/>
+                <a:cs typeface="Times New Roman" panose="02020603050405020304" pitchFamily="18" charset="0"/>
+              </a:rPr>
+              <a:t>Posts API</a:t>
+            </a:r>
+            <a:endParaRPr lang="en-US" dirty="0"/>
+          </a:p>
+        </p:txBody>
+      </p:sp>
+    </p:spTree>
+    <p:extLst>
+      <p:ext uri="{BB962C8B-B14F-4D97-AF65-F5344CB8AC3E}">
+        <p14:creationId xmlns:p14="http://schemas.microsoft.com/office/powerpoint/2010/main" val="2446073456"/>
+      </p:ext>
+    </p:extLst>
+  </p:cSld>
+  <p:clrMapOvr>
+    <a:masterClrMapping/>
+  </p:clrMapOvr>
+</p:sld>
+</file>
+
+<file path=ppt/slides/slide13.xml><?xml version="1.0" encoding="utf-8"?>
+<p:sld xmlns:a="http://schemas.openxmlformats.org/drawingml/2006/main" xmlns:r="http://schemas.openxmlformats.org/officeDocument/2006/relationships" xmlns:p="http://schemas.openxmlformats.org/presentationml/2006/main">
+  <p:cSld>
+    <p:spTree>
+      <p:nvGrpSpPr>
+        <p:cNvPr id="1" name=""/>
+        <p:cNvGrpSpPr/>
+        <p:nvPr/>
+      </p:nvGrpSpPr>
+      <p:grpSpPr>
+        <a:xfrm>
+          <a:off x="0" y="0"/>
+          <a:ext cx="0" cy="0"/>
+          <a:chOff x="0" y="0"/>
+          <a:chExt cx="0" cy="0"/>
+        </a:xfrm>
+      </p:grpSpPr>
+      <p:sp>
+        <p:nvSpPr>
+          <p:cNvPr id="4" name="TextBox 3">
+            <a:extLst>
+              <a:ext uri="{FF2B5EF4-FFF2-40B4-BE49-F238E27FC236}">
+                <a16:creationId xmlns:a16="http://schemas.microsoft.com/office/drawing/2014/main" id="{93042950-E66C-9CF4-A917-488019161FCA}"/>
+              </a:ext>
+            </a:extLst>
+          </p:cNvPr>
+          <p:cNvSpPr txBox="1"/>
+          <p:nvPr/>
+        </p:nvSpPr>
+        <p:spPr>
+          <a:xfrm>
+            <a:off x="275846" y="765589"/>
             <a:ext cx="11410545" cy="1971374"/>
           </a:xfrm>
           <a:prstGeom prst="rect">
@@ -4784,322 +5633,372 @@
       </p:grpSpPr>
       <p:sp>
         <p:nvSpPr>
-          <p:cNvPr id="4" name="TextBox 3">
-            <a:extLst>
-              <a:ext uri="{FF2B5EF4-FFF2-40B4-BE49-F238E27FC236}">
-                <a16:creationId xmlns:a16="http://schemas.microsoft.com/office/drawing/2014/main" id="{93042950-E66C-9CF4-A917-488019161FCA}"/>
-              </a:ext>
-            </a:extLst>
-          </p:cNvPr>
-          <p:cNvSpPr txBox="1"/>
+          <p:cNvPr id="3" name="Rectangle 2">
+            <a:extLst>
+              <a:ext uri="{FF2B5EF4-FFF2-40B4-BE49-F238E27FC236}">
+                <a16:creationId xmlns:a16="http://schemas.microsoft.com/office/drawing/2014/main" id="{09EB6145-F196-BA75-4B3E-EED7851B2ACB}"/>
+              </a:ext>
+            </a:extLst>
+          </p:cNvPr>
+          <p:cNvSpPr/>
           <p:nvPr/>
         </p:nvSpPr>
         <p:spPr>
           <a:xfrm>
-            <a:off x="275846" y="765589"/>
-            <a:ext cx="11410545" cy="3966150"/>
+            <a:off x="242835" y="200967"/>
+            <a:ext cx="11706330" cy="6451042"/>
           </a:xfrm>
           <a:prstGeom prst="rect">
             <a:avLst/>
           </a:prstGeom>
           <a:noFill/>
         </p:spPr>
-        <p:txBody>
-          <a:bodyPr wrap="square" rtlCol="0">
-            <a:spAutoFit/>
-          </a:bodyPr>
-          <a:lstStyle/>
-          <a:p>
-            <a:pPr marL="0" marR="0">
-              <a:lnSpc>
-                <a:spcPct val="107000"/>
-              </a:lnSpc>
-              <a:spcBef>
-                <a:spcPts val="0"/>
-              </a:spcBef>
-              <a:spcAft>
-                <a:spcPts val="800"/>
-              </a:spcAft>
-            </a:pPr>
-            <a:r>
-              <a:rPr lang="en-US" kern="100" dirty="0">
-                <a:latin typeface="Calibri" panose="020F0502020204030204" pitchFamily="34" charset="0"/>
-                <a:ea typeface="Calibri" panose="020F0502020204030204" pitchFamily="34" charset="0"/>
-                <a:cs typeface="Times New Roman" panose="02020603050405020304" pitchFamily="18" charset="0"/>
-              </a:rPr>
-              <a:t>- </a:t>
-            </a:r>
-            <a:r>
-              <a:rPr lang="en-US" sz="1800" kern="100" dirty="0">
-                <a:effectLst/>
-                <a:latin typeface="Calibri" panose="020F0502020204030204" pitchFamily="34" charset="0"/>
-                <a:ea typeface="Calibri" panose="020F0502020204030204" pitchFamily="34" charset="0"/>
-                <a:cs typeface="Times New Roman" panose="02020603050405020304" pitchFamily="18" charset="0"/>
-              </a:rPr>
-              <a:t>There should be some button that navigates user to event creation form or area</a:t>
-            </a:r>
-          </a:p>
-          <a:p>
-            <a:pPr marL="0" marR="0">
-              <a:lnSpc>
-                <a:spcPct val="107000"/>
-              </a:lnSpc>
-              <a:spcBef>
-                <a:spcPts val="0"/>
-              </a:spcBef>
-              <a:spcAft>
-                <a:spcPts val="800"/>
-              </a:spcAft>
-            </a:pPr>
-            <a:r>
-              <a:rPr lang="en-US" kern="100" dirty="0">
-                <a:latin typeface="Calibri" panose="020F0502020204030204" pitchFamily="34" charset="0"/>
-                <a:ea typeface="Calibri" panose="020F0502020204030204" pitchFamily="34" charset="0"/>
-                <a:cs typeface="Times New Roman" panose="02020603050405020304" pitchFamily="18" charset="0"/>
-              </a:rPr>
-              <a:t>	- Event location field should implement search and filter when user attempts entering location</a:t>
-            </a:r>
-            <a:endParaRPr lang="en-US" sz="1800" kern="100" dirty="0">
-              <a:effectLst/>
-              <a:latin typeface="Calibri" panose="020F0502020204030204" pitchFamily="34" charset="0"/>
-              <a:ea typeface="Calibri" panose="020F0502020204030204" pitchFamily="34" charset="0"/>
-              <a:cs typeface="Times New Roman" panose="02020603050405020304" pitchFamily="18" charset="0"/>
-            </a:endParaRPr>
-          </a:p>
-          <a:p>
-            <a:pPr marL="0" marR="0">
-              <a:lnSpc>
-                <a:spcPct val="107000"/>
-              </a:lnSpc>
-              <a:spcBef>
-                <a:spcPts val="0"/>
-              </a:spcBef>
-              <a:spcAft>
-                <a:spcPts val="800"/>
-              </a:spcAft>
-            </a:pPr>
-            <a:r>
-              <a:rPr lang="en-US" sz="1800" kern="100" dirty="0">
-                <a:effectLst/>
-                <a:latin typeface="Calibri" panose="020F0502020204030204" pitchFamily="34" charset="0"/>
-                <a:ea typeface="Calibri" panose="020F0502020204030204" pitchFamily="34" charset="0"/>
-                <a:cs typeface="Times New Roman" panose="02020603050405020304" pitchFamily="18" charset="0"/>
-              </a:rPr>
-              <a:t>	- There should be some button that allows users to post (if user logged in)</a:t>
-            </a:r>
-          </a:p>
-          <a:p>
-            <a:pPr marL="0" marR="0">
-              <a:lnSpc>
-                <a:spcPct val="107000"/>
-              </a:lnSpc>
-              <a:spcBef>
-                <a:spcPts val="0"/>
-              </a:spcBef>
-              <a:spcAft>
-                <a:spcPts val="800"/>
-              </a:spcAft>
-            </a:pPr>
-            <a:r>
-              <a:rPr lang="en-US" sz="1800" kern="100" dirty="0">
-                <a:effectLst/>
-                <a:latin typeface="Calibri" panose="020F0502020204030204" pitchFamily="34" charset="0"/>
-                <a:ea typeface="Calibri" panose="020F0502020204030204" pitchFamily="34" charset="0"/>
-                <a:cs typeface="Times New Roman" panose="02020603050405020304" pitchFamily="18" charset="0"/>
-              </a:rPr>
-              <a:t>- Event data should contain:</a:t>
-            </a:r>
-          </a:p>
-          <a:p>
-            <a:pPr marL="0" marR="0">
-              <a:lnSpc>
-                <a:spcPct val="107000"/>
-              </a:lnSpc>
-              <a:spcBef>
-                <a:spcPts val="0"/>
-              </a:spcBef>
-              <a:spcAft>
-                <a:spcPts val="800"/>
-              </a:spcAft>
-            </a:pPr>
-            <a:r>
-              <a:rPr lang="en-US" kern="100" dirty="0">
-                <a:latin typeface="Calibri" panose="020F0502020204030204" pitchFamily="34" charset="0"/>
-                <a:ea typeface="Calibri" panose="020F0502020204030204" pitchFamily="34" charset="0"/>
-                <a:cs typeface="Times New Roman" panose="02020603050405020304" pitchFamily="18" charset="0"/>
-              </a:rPr>
-              <a:t>	- event Name</a:t>
-            </a:r>
-            <a:endParaRPr lang="en-US" sz="1800" kern="100" dirty="0">
-              <a:effectLst/>
-              <a:latin typeface="Calibri" panose="020F0502020204030204" pitchFamily="34" charset="0"/>
-              <a:ea typeface="Calibri" panose="020F0502020204030204" pitchFamily="34" charset="0"/>
-              <a:cs typeface="Times New Roman" panose="02020603050405020304" pitchFamily="18" charset="0"/>
-            </a:endParaRPr>
-          </a:p>
-          <a:p>
-            <a:pPr marL="0" marR="0">
-              <a:lnSpc>
-                <a:spcPct val="107000"/>
-              </a:lnSpc>
-              <a:spcBef>
-                <a:spcPts val="0"/>
-              </a:spcBef>
-              <a:spcAft>
-                <a:spcPts val="800"/>
-              </a:spcAft>
-            </a:pPr>
-            <a:r>
-              <a:rPr lang="en-US" kern="100" dirty="0">
-                <a:latin typeface="Calibri" panose="020F0502020204030204" pitchFamily="34" charset="0"/>
-                <a:ea typeface="Calibri" panose="020F0502020204030204" pitchFamily="34" charset="0"/>
-                <a:cs typeface="Times New Roman" panose="02020603050405020304" pitchFamily="18" charset="0"/>
-              </a:rPr>
-              <a:t>	- event ID</a:t>
-            </a:r>
-            <a:endParaRPr lang="en-US" sz="1800" kern="100" dirty="0">
-              <a:effectLst/>
-              <a:latin typeface="Calibri" panose="020F0502020204030204" pitchFamily="34" charset="0"/>
-              <a:ea typeface="Calibri" panose="020F0502020204030204" pitchFamily="34" charset="0"/>
-              <a:cs typeface="Times New Roman" panose="02020603050405020304" pitchFamily="18" charset="0"/>
-            </a:endParaRPr>
-          </a:p>
-          <a:p>
-            <a:pPr marL="0" marR="0">
-              <a:lnSpc>
-                <a:spcPct val="107000"/>
-              </a:lnSpc>
-              <a:spcBef>
-                <a:spcPts val="0"/>
-              </a:spcBef>
-              <a:spcAft>
-                <a:spcPts val="800"/>
-              </a:spcAft>
-            </a:pPr>
-            <a:r>
-              <a:rPr lang="en-US" kern="100" dirty="0">
-                <a:latin typeface="Calibri" panose="020F0502020204030204" pitchFamily="34" charset="0"/>
-                <a:ea typeface="Calibri" panose="020F0502020204030204" pitchFamily="34" charset="0"/>
-                <a:cs typeface="Times New Roman" panose="02020603050405020304" pitchFamily="18" charset="0"/>
-              </a:rPr>
-              <a:t>	- </a:t>
-            </a:r>
-            <a:r>
-              <a:rPr lang="en-US" sz="1800" kern="100" dirty="0">
-                <a:effectLst/>
-                <a:latin typeface="Calibri" panose="020F0502020204030204" pitchFamily="34" charset="0"/>
-                <a:ea typeface="Calibri" panose="020F0502020204030204" pitchFamily="34" charset="0"/>
-                <a:cs typeface="Times New Roman" panose="02020603050405020304" pitchFamily="18" charset="0"/>
-              </a:rPr>
-              <a:t>event location</a:t>
-            </a:r>
-          </a:p>
-          <a:p>
-            <a:pPr marL="0" marR="0">
-              <a:lnSpc>
-                <a:spcPct val="107000"/>
-              </a:lnSpc>
-              <a:spcBef>
-                <a:spcPts val="0"/>
-              </a:spcBef>
-              <a:spcAft>
-                <a:spcPts val="800"/>
-              </a:spcAft>
-            </a:pPr>
-            <a:r>
-              <a:rPr lang="en-US" sz="1800" kern="100" dirty="0">
-                <a:effectLst/>
-                <a:latin typeface="Calibri" panose="020F0502020204030204" pitchFamily="34" charset="0"/>
-                <a:ea typeface="Calibri" panose="020F0502020204030204" pitchFamily="34" charset="0"/>
-                <a:cs typeface="Times New Roman" panose="02020603050405020304" pitchFamily="18" charset="0"/>
-              </a:rPr>
-              <a:t>	- event time</a:t>
-            </a:r>
-          </a:p>
-          <a:p>
-            <a:pPr marL="0" marR="0">
-              <a:lnSpc>
-                <a:spcPct val="107000"/>
-              </a:lnSpc>
-              <a:spcBef>
-                <a:spcPts val="0"/>
-              </a:spcBef>
-              <a:spcAft>
-                <a:spcPts val="800"/>
-              </a:spcAft>
-            </a:pPr>
-            <a:r>
-              <a:rPr lang="en-US" kern="100" dirty="0">
-                <a:latin typeface="Calibri" panose="020F0502020204030204" pitchFamily="34" charset="0"/>
-                <a:ea typeface="Calibri" panose="020F0502020204030204" pitchFamily="34" charset="0"/>
-                <a:cs typeface="Times New Roman" panose="02020603050405020304" pitchFamily="18" charset="0"/>
-              </a:rPr>
-              <a:t>	- a</a:t>
-            </a:r>
-            <a:r>
-              <a:rPr lang="en-US" sz="1800" kern="100" dirty="0">
-                <a:effectLst/>
-                <a:latin typeface="Calibri" panose="020F0502020204030204" pitchFamily="34" charset="0"/>
-                <a:ea typeface="Calibri" panose="020F0502020204030204" pitchFamily="34" charset="0"/>
-                <a:cs typeface="Times New Roman" panose="02020603050405020304" pitchFamily="18" charset="0"/>
-              </a:rPr>
-              <a:t>rea to upload banner image</a:t>
-            </a:r>
-          </a:p>
-          <a:p>
-            <a:pPr marL="0" marR="0">
-              <a:lnSpc>
-                <a:spcPct val="107000"/>
-              </a:lnSpc>
-              <a:spcBef>
-                <a:spcPts val="0"/>
-              </a:spcBef>
-              <a:spcAft>
-                <a:spcPts val="800"/>
-              </a:spcAft>
-            </a:pPr>
-            <a:r>
-              <a:rPr lang="en-US" kern="100" dirty="0">
-                <a:latin typeface="Calibri" panose="020F0502020204030204" pitchFamily="34" charset="0"/>
-                <a:ea typeface="Calibri" panose="020F0502020204030204" pitchFamily="34" charset="0"/>
-                <a:cs typeface="Times New Roman" panose="02020603050405020304" pitchFamily="18" charset="0"/>
-              </a:rPr>
-              <a:t>	- </a:t>
-            </a:r>
-            <a:r>
-              <a:rPr lang="en-US" sz="1800" kern="100" dirty="0">
-                <a:effectLst/>
-                <a:latin typeface="Calibri" panose="020F0502020204030204" pitchFamily="34" charset="0"/>
-                <a:ea typeface="Calibri" panose="020F0502020204030204" pitchFamily="34" charset="0"/>
-                <a:cs typeface="Times New Roman" panose="02020603050405020304" pitchFamily="18" charset="0"/>
-              </a:rPr>
-              <a:t>participants list</a:t>
-            </a:r>
-          </a:p>
-        </p:txBody>
-      </p:sp>
-      <p:sp>
-        <p:nvSpPr>
-          <p:cNvPr id="2" name="TextBox 1">
-            <a:extLst>
-              <a:ext uri="{FF2B5EF4-FFF2-40B4-BE49-F238E27FC236}">
-                <a16:creationId xmlns:a16="http://schemas.microsoft.com/office/drawing/2014/main" id="{CB46AF81-95B8-D80D-804A-CADBD595992E}"/>
-              </a:ext>
-            </a:extLst>
-          </p:cNvPr>
-          <p:cNvSpPr txBox="1"/>
+        <p:style>
+          <a:lnRef idx="2">
+            <a:schemeClr val="accent1">
+              <a:shade val="15000"/>
+            </a:schemeClr>
+          </a:lnRef>
+          <a:fillRef idx="1">
+            <a:schemeClr val="accent1"/>
+          </a:fillRef>
+          <a:effectRef idx="0">
+            <a:schemeClr val="accent1"/>
+          </a:effectRef>
+          <a:fontRef idx="minor">
+            <a:schemeClr val="lt1"/>
+          </a:fontRef>
+        </p:style>
+        <p:txBody>
+          <a:bodyPr rtlCol="0" anchor="ctr"/>
+          <a:lstStyle/>
+          <a:p>
+            <a:pPr algn="ctr"/>
+            <a:endParaRPr lang="en-US" dirty="0"/>
+          </a:p>
+        </p:txBody>
+      </p:sp>
+      <p:sp>
+        <p:nvSpPr>
+          <p:cNvPr id="9" name="Rectangle 8">
+            <a:extLst>
+              <a:ext uri="{FF2B5EF4-FFF2-40B4-BE49-F238E27FC236}">
+                <a16:creationId xmlns:a16="http://schemas.microsoft.com/office/drawing/2014/main" id="{F50557A8-8943-F711-C854-1442083C28F3}"/>
+              </a:ext>
+            </a:extLst>
+          </p:cNvPr>
+          <p:cNvSpPr/>
           <p:nvPr/>
         </p:nvSpPr>
         <p:spPr>
           <a:xfrm>
-            <a:off x="275847" y="161432"/>
-            <a:ext cx="11410545" cy="369332"/>
+            <a:off x="2558980" y="1075172"/>
+            <a:ext cx="7074040" cy="2150347"/>
           </a:xfrm>
           <a:prstGeom prst="rect">
             <a:avLst/>
           </a:prstGeom>
           <a:noFill/>
         </p:spPr>
+        <p:style>
+          <a:lnRef idx="2">
+            <a:schemeClr val="accent1">
+              <a:shade val="15000"/>
+            </a:schemeClr>
+          </a:lnRef>
+          <a:fillRef idx="1">
+            <a:schemeClr val="accent1"/>
+          </a:fillRef>
+          <a:effectRef idx="0">
+            <a:schemeClr val="accent1"/>
+          </a:effectRef>
+          <a:fontRef idx="minor">
+            <a:schemeClr val="lt1"/>
+          </a:fontRef>
+        </p:style>
+        <p:txBody>
+          <a:bodyPr rtlCol="0" anchor="ctr"/>
+          <a:lstStyle/>
+          <a:p>
+            <a:pPr algn="ctr"/>
+            <a:endParaRPr lang="en-US" dirty="0"/>
+          </a:p>
+        </p:txBody>
+      </p:sp>
+      <p:sp>
+        <p:nvSpPr>
+          <p:cNvPr id="11" name="Rectangle 10">
+            <a:extLst>
+              <a:ext uri="{FF2B5EF4-FFF2-40B4-BE49-F238E27FC236}">
+                <a16:creationId xmlns:a16="http://schemas.microsoft.com/office/drawing/2014/main" id="{8398570A-12E6-2071-F638-3A35007AEE47}"/>
+              </a:ext>
+            </a:extLst>
+          </p:cNvPr>
+          <p:cNvSpPr/>
+          <p:nvPr/>
+        </p:nvSpPr>
+        <p:spPr>
+          <a:xfrm>
+            <a:off x="2558980" y="3225519"/>
+            <a:ext cx="7074040" cy="2150347"/>
+          </a:xfrm>
+          <a:prstGeom prst="rect">
+            <a:avLst/>
+          </a:prstGeom>
+          <a:noFill/>
+        </p:spPr>
+        <p:style>
+          <a:lnRef idx="2">
+            <a:schemeClr val="accent1">
+              <a:shade val="15000"/>
+            </a:schemeClr>
+          </a:lnRef>
+          <a:fillRef idx="1">
+            <a:schemeClr val="accent1"/>
+          </a:fillRef>
+          <a:effectRef idx="0">
+            <a:schemeClr val="accent1"/>
+          </a:effectRef>
+          <a:fontRef idx="minor">
+            <a:schemeClr val="lt1"/>
+          </a:fontRef>
+        </p:style>
+        <p:txBody>
+          <a:bodyPr rtlCol="0" anchor="ctr"/>
+          <a:lstStyle/>
+          <a:p>
+            <a:pPr algn="ctr"/>
+            <a:endParaRPr lang="en-US" dirty="0"/>
+          </a:p>
+        </p:txBody>
+      </p:sp>
+      <p:sp>
+        <p:nvSpPr>
+          <p:cNvPr id="12" name="Rectangle 11">
+            <a:extLst>
+              <a:ext uri="{FF2B5EF4-FFF2-40B4-BE49-F238E27FC236}">
+                <a16:creationId xmlns:a16="http://schemas.microsoft.com/office/drawing/2014/main" id="{44B90755-68C1-C941-8BE9-5CDDEEAD237C}"/>
+              </a:ext>
+            </a:extLst>
+          </p:cNvPr>
+          <p:cNvSpPr/>
+          <p:nvPr/>
+        </p:nvSpPr>
+        <p:spPr>
+          <a:xfrm>
+            <a:off x="2558980" y="5375866"/>
+            <a:ext cx="7074040" cy="1276143"/>
+          </a:xfrm>
+          <a:prstGeom prst="rect">
+            <a:avLst/>
+          </a:prstGeom>
+          <a:noFill/>
+        </p:spPr>
+        <p:style>
+          <a:lnRef idx="2">
+            <a:schemeClr val="accent1">
+              <a:shade val="15000"/>
+            </a:schemeClr>
+          </a:lnRef>
+          <a:fillRef idx="1">
+            <a:schemeClr val="accent1"/>
+          </a:fillRef>
+          <a:effectRef idx="0">
+            <a:schemeClr val="accent1"/>
+          </a:effectRef>
+          <a:fontRef idx="minor">
+            <a:schemeClr val="lt1"/>
+          </a:fontRef>
+        </p:style>
+        <p:txBody>
+          <a:bodyPr rtlCol="0" anchor="ctr"/>
+          <a:lstStyle/>
+          <a:p>
+            <a:pPr algn="ctr"/>
+            <a:endParaRPr lang="en-US" dirty="0"/>
+          </a:p>
+        </p:txBody>
+      </p:sp>
+      <p:sp>
+        <p:nvSpPr>
+          <p:cNvPr id="14" name="Rectangle: Rounded Corners 13">
+            <a:extLst>
+              <a:ext uri="{FF2B5EF4-FFF2-40B4-BE49-F238E27FC236}">
+                <a16:creationId xmlns:a16="http://schemas.microsoft.com/office/drawing/2014/main" id="{462EB88B-18C0-73B8-1596-E8B79A8C25FF}"/>
+              </a:ext>
+            </a:extLst>
+          </p:cNvPr>
+          <p:cNvSpPr/>
+          <p:nvPr/>
+        </p:nvSpPr>
+        <p:spPr>
+          <a:xfrm>
+            <a:off x="10309607" y="439613"/>
+            <a:ext cx="1497205" cy="357974"/>
+          </a:xfrm>
+          <a:prstGeom prst="roundRect">
+            <a:avLst/>
+          </a:prstGeom>
+        </p:spPr>
+        <p:style>
+          <a:lnRef idx="2">
+            <a:schemeClr val="accent1">
+              <a:shade val="15000"/>
+            </a:schemeClr>
+          </a:lnRef>
+          <a:fillRef idx="1">
+            <a:schemeClr val="accent1"/>
+          </a:fillRef>
+          <a:effectRef idx="0">
+            <a:schemeClr val="accent1"/>
+          </a:effectRef>
+          <a:fontRef idx="minor">
+            <a:schemeClr val="lt1"/>
+          </a:fontRef>
+        </p:style>
+        <p:txBody>
+          <a:bodyPr rtlCol="0" anchor="ctr"/>
+          <a:lstStyle/>
+          <a:p>
+            <a:pPr algn="ctr"/>
+            <a:r>
+              <a:rPr lang="en-US" dirty="0"/>
+              <a:t>Login</a:t>
+            </a:r>
+          </a:p>
+        </p:txBody>
+      </p:sp>
+      <p:sp>
+        <p:nvSpPr>
+          <p:cNvPr id="15" name="Rectangle 14">
+            <a:extLst>
+              <a:ext uri="{FF2B5EF4-FFF2-40B4-BE49-F238E27FC236}">
+                <a16:creationId xmlns:a16="http://schemas.microsoft.com/office/drawing/2014/main" id="{2F28C8CE-0641-4BDC-3993-118AA2F43F1D}"/>
+              </a:ext>
+            </a:extLst>
+          </p:cNvPr>
+          <p:cNvSpPr/>
+          <p:nvPr/>
+        </p:nvSpPr>
+        <p:spPr>
+          <a:xfrm>
+            <a:off x="242835" y="200966"/>
+            <a:ext cx="11706330" cy="874206"/>
+          </a:xfrm>
+          <a:prstGeom prst="rect">
+            <a:avLst/>
+          </a:prstGeom>
+          <a:noFill/>
+        </p:spPr>
+        <p:style>
+          <a:lnRef idx="2">
+            <a:schemeClr val="accent1">
+              <a:shade val="15000"/>
+            </a:schemeClr>
+          </a:lnRef>
+          <a:fillRef idx="1">
+            <a:schemeClr val="accent1"/>
+          </a:fillRef>
+          <a:effectRef idx="0">
+            <a:schemeClr val="accent1"/>
+          </a:effectRef>
+          <a:fontRef idx="minor">
+            <a:schemeClr val="lt1"/>
+          </a:fontRef>
+        </p:style>
+        <p:txBody>
+          <a:bodyPr rtlCol="0" anchor="ctr"/>
+          <a:lstStyle/>
+          <a:p>
+            <a:pPr algn="ctr"/>
+            <a:r>
+              <a:rPr lang="en-US" u="sng" dirty="0">
+                <a:solidFill>
+                  <a:schemeClr val="tx1"/>
+                </a:solidFill>
+              </a:rPr>
+              <a:t>Latest Posts</a:t>
+            </a:r>
+            <a:r>
+              <a:rPr lang="en-US" dirty="0">
+                <a:solidFill>
+                  <a:schemeClr val="tx1"/>
+                </a:solidFill>
+              </a:rPr>
+              <a:t>	Favorite Posts</a:t>
+            </a:r>
+          </a:p>
+        </p:txBody>
+      </p:sp>
+      <p:sp>
+        <p:nvSpPr>
+          <p:cNvPr id="16" name="Action Button: Go Home 15">
+            <a:hlinkClick r:id="" action="ppaction://hlinkshowjump?jump=firstslide" highlightClick="1"/>
+            <a:extLst>
+              <a:ext uri="{FF2B5EF4-FFF2-40B4-BE49-F238E27FC236}">
+                <a16:creationId xmlns:a16="http://schemas.microsoft.com/office/drawing/2014/main" id="{718E4184-CE0E-7E87-B941-B21B6287DC47}"/>
+              </a:ext>
+            </a:extLst>
+          </p:cNvPr>
+          <p:cNvSpPr/>
+          <p:nvPr/>
+        </p:nvSpPr>
+        <p:spPr>
+          <a:xfrm>
+            <a:off x="385188" y="396280"/>
+            <a:ext cx="619648" cy="506187"/>
+          </a:xfrm>
+          <a:prstGeom prst="actionButtonHome">
+            <a:avLst/>
+          </a:prstGeom>
+        </p:spPr>
+        <p:style>
+          <a:lnRef idx="2">
+            <a:schemeClr val="accent1">
+              <a:shade val="15000"/>
+            </a:schemeClr>
+          </a:lnRef>
+          <a:fillRef idx="1">
+            <a:schemeClr val="accent1"/>
+          </a:fillRef>
+          <a:effectRef idx="0">
+            <a:schemeClr val="accent1"/>
+          </a:effectRef>
+          <a:fontRef idx="minor">
+            <a:schemeClr val="lt1"/>
+          </a:fontRef>
+        </p:style>
+        <p:txBody>
+          <a:bodyPr rtlCol="0" anchor="ctr"/>
+          <a:lstStyle/>
+          <a:p>
+            <a:pPr algn="ctr"/>
+            <a:endParaRPr lang="en-US"/>
+          </a:p>
+        </p:txBody>
+      </p:sp>
+      <p:sp>
+        <p:nvSpPr>
+          <p:cNvPr id="17" name="TextBox 16">
+            <a:extLst>
+              <a:ext uri="{FF2B5EF4-FFF2-40B4-BE49-F238E27FC236}">
+                <a16:creationId xmlns:a16="http://schemas.microsoft.com/office/drawing/2014/main" id="{60FBE9E0-78AB-01C4-4EFD-FD36C0881FF1}"/>
+              </a:ext>
+            </a:extLst>
+          </p:cNvPr>
+          <p:cNvSpPr txBox="1"/>
+          <p:nvPr/>
+        </p:nvSpPr>
+        <p:spPr>
+          <a:xfrm>
+            <a:off x="2659463" y="1131618"/>
+            <a:ext cx="6873073" cy="1754326"/>
+          </a:xfrm>
+          <a:prstGeom prst="rect">
+            <a:avLst/>
+          </a:prstGeom>
+          <a:noFill/>
+        </p:spPr>
         <p:txBody>
           <a:bodyPr wrap="square" rtlCol="0">
             <a:spAutoFit/>
@@ -5107,22 +6006,364 @@
           <a:lstStyle/>
           <a:p>
             <a:r>
-              <a:rPr lang="en-US" sz="1800" dirty="0">
-                <a:effectLst/>
-                <a:latin typeface="Calibri" panose="020F0502020204030204" pitchFamily="34" charset="0"/>
-                <a:ea typeface="Calibri" panose="020F0502020204030204" pitchFamily="34" charset="0"/>
-                <a:cs typeface="Times New Roman" panose="02020603050405020304" pitchFamily="18" charset="0"/>
-              </a:rPr>
-              <a:t>Event post area</a:t>
-            </a:r>
+              <a:rPr lang="en-US" dirty="0"/>
+              <a:t>Username: SteveVaz123</a:t>
+            </a:r>
+          </a:p>
+          <a:p>
+            <a:r>
+              <a:rPr lang="en-US" dirty="0" err="1"/>
+              <a:t>UserId</a:t>
+            </a:r>
+            <a:r>
+              <a:rPr lang="en-US" dirty="0"/>
+              <a:t>: 1111-1111-1111-1111</a:t>
+            </a:r>
+          </a:p>
+          <a:p>
+            <a:r>
+              <a:rPr lang="en-US" dirty="0"/>
+              <a:t>Post:</a:t>
+            </a:r>
+          </a:p>
+          <a:p>
             <a:endParaRPr lang="en-US" dirty="0"/>
+          </a:p>
+          <a:p>
+            <a:r>
+              <a:rPr lang="en-US" dirty="0"/>
+              <a:t>This is a user post </a:t>
+            </a:r>
+          </a:p>
+          <a:p>
+            <a:endParaRPr lang="en-US" dirty="0"/>
+          </a:p>
+        </p:txBody>
+      </p:sp>
+      <p:sp>
+        <p:nvSpPr>
+          <p:cNvPr id="18" name="Rectangle 17">
+            <a:extLst>
+              <a:ext uri="{FF2B5EF4-FFF2-40B4-BE49-F238E27FC236}">
+                <a16:creationId xmlns:a16="http://schemas.microsoft.com/office/drawing/2014/main" id="{C12A960D-6241-96E7-3536-4A995046642C}"/>
+              </a:ext>
+            </a:extLst>
+          </p:cNvPr>
+          <p:cNvSpPr/>
+          <p:nvPr/>
+        </p:nvSpPr>
+        <p:spPr>
+          <a:xfrm>
+            <a:off x="2558980" y="2813538"/>
+            <a:ext cx="7074040" cy="411982"/>
+          </a:xfrm>
+          <a:prstGeom prst="rect">
+            <a:avLst/>
+          </a:prstGeom>
+          <a:noFill/>
+          <a:ln>
+            <a:noFill/>
+          </a:ln>
+        </p:spPr>
+        <p:style>
+          <a:lnRef idx="2">
+            <a:schemeClr val="accent1">
+              <a:shade val="15000"/>
+            </a:schemeClr>
+          </a:lnRef>
+          <a:fillRef idx="1">
+            <a:schemeClr val="accent1"/>
+          </a:fillRef>
+          <a:effectRef idx="0">
+            <a:schemeClr val="accent1"/>
+          </a:effectRef>
+          <a:fontRef idx="minor">
+            <a:schemeClr val="lt1"/>
+          </a:fontRef>
+        </p:style>
+        <p:txBody>
+          <a:bodyPr rtlCol="0" anchor="ctr"/>
+          <a:lstStyle/>
+          <a:p>
+            <a:r>
+              <a:rPr lang="en-US" dirty="0">
+                <a:solidFill>
+                  <a:schemeClr val="tx1"/>
+                </a:solidFill>
+              </a:rPr>
+              <a:t>Upvote Count: 4			</a:t>
+            </a:r>
+          </a:p>
+        </p:txBody>
+      </p:sp>
+      <p:sp>
+        <p:nvSpPr>
+          <p:cNvPr id="23" name="Rectangle 22">
+            <a:extLst>
+              <a:ext uri="{FF2B5EF4-FFF2-40B4-BE49-F238E27FC236}">
+                <a16:creationId xmlns:a16="http://schemas.microsoft.com/office/drawing/2014/main" id="{36BB1C4E-DA1B-4A1D-01D1-6D5025F59130}"/>
+              </a:ext>
+            </a:extLst>
+          </p:cNvPr>
+          <p:cNvSpPr/>
+          <p:nvPr/>
+        </p:nvSpPr>
+        <p:spPr>
+          <a:xfrm>
+            <a:off x="2558980" y="3225517"/>
+            <a:ext cx="7074040" cy="2150347"/>
+          </a:xfrm>
+          <a:prstGeom prst="rect">
+            <a:avLst/>
+          </a:prstGeom>
+          <a:noFill/>
+        </p:spPr>
+        <p:style>
+          <a:lnRef idx="2">
+            <a:schemeClr val="accent1">
+              <a:shade val="15000"/>
+            </a:schemeClr>
+          </a:lnRef>
+          <a:fillRef idx="1">
+            <a:schemeClr val="accent1"/>
+          </a:fillRef>
+          <a:effectRef idx="0">
+            <a:schemeClr val="accent1"/>
+          </a:effectRef>
+          <a:fontRef idx="minor">
+            <a:schemeClr val="lt1"/>
+          </a:fontRef>
+        </p:style>
+        <p:txBody>
+          <a:bodyPr rtlCol="0" anchor="ctr"/>
+          <a:lstStyle/>
+          <a:p>
+            <a:pPr algn="ctr"/>
+            <a:endParaRPr lang="en-US" dirty="0"/>
+          </a:p>
+        </p:txBody>
+      </p:sp>
+      <p:sp>
+        <p:nvSpPr>
+          <p:cNvPr id="24" name="TextBox 23">
+            <a:extLst>
+              <a:ext uri="{FF2B5EF4-FFF2-40B4-BE49-F238E27FC236}">
+                <a16:creationId xmlns:a16="http://schemas.microsoft.com/office/drawing/2014/main" id="{D7A3F2E2-8653-F1D4-742A-25A77EF604A9}"/>
+              </a:ext>
+            </a:extLst>
+          </p:cNvPr>
+          <p:cNvSpPr txBox="1"/>
+          <p:nvPr/>
+        </p:nvSpPr>
+        <p:spPr>
+          <a:xfrm>
+            <a:off x="2659463" y="3281963"/>
+            <a:ext cx="6873073" cy="1754326"/>
+          </a:xfrm>
+          <a:prstGeom prst="rect">
+            <a:avLst/>
+          </a:prstGeom>
+          <a:noFill/>
+        </p:spPr>
+        <p:txBody>
+          <a:bodyPr wrap="square" rtlCol="0">
+            <a:spAutoFit/>
+          </a:bodyPr>
+          <a:lstStyle/>
+          <a:p>
+            <a:r>
+              <a:rPr lang="en-US" dirty="0"/>
+              <a:t>Username: JohnDoe123</a:t>
+            </a:r>
+          </a:p>
+          <a:p>
+            <a:r>
+              <a:rPr lang="en-US" dirty="0" err="1"/>
+              <a:t>UserId</a:t>
+            </a:r>
+            <a:r>
+              <a:rPr lang="en-US" dirty="0"/>
+              <a:t>: 2222-2222-2222-2222</a:t>
+            </a:r>
+          </a:p>
+          <a:p>
+            <a:r>
+              <a:rPr lang="en-US" dirty="0"/>
+              <a:t>Post:</a:t>
+            </a:r>
+          </a:p>
+          <a:p>
+            <a:endParaRPr lang="en-US" dirty="0"/>
+          </a:p>
+          <a:p>
+            <a:r>
+              <a:rPr lang="en-US" dirty="0"/>
+              <a:t>This is another user post </a:t>
+            </a:r>
+          </a:p>
+          <a:p>
+            <a:endParaRPr lang="en-US" dirty="0"/>
+          </a:p>
+        </p:txBody>
+      </p:sp>
+      <p:sp>
+        <p:nvSpPr>
+          <p:cNvPr id="28" name="Rectangle: Rounded Corners 27">
+            <a:extLst>
+              <a:ext uri="{FF2B5EF4-FFF2-40B4-BE49-F238E27FC236}">
+                <a16:creationId xmlns:a16="http://schemas.microsoft.com/office/drawing/2014/main" id="{E6782872-2765-53ED-D420-198B741ABA10}"/>
+              </a:ext>
+            </a:extLst>
+          </p:cNvPr>
+          <p:cNvSpPr/>
+          <p:nvPr/>
+        </p:nvSpPr>
+        <p:spPr>
+          <a:xfrm>
+            <a:off x="7409202" y="2869168"/>
+            <a:ext cx="1836011" cy="301527"/>
+          </a:xfrm>
+          <a:prstGeom prst="roundRect">
+            <a:avLst/>
+          </a:prstGeom>
+        </p:spPr>
+        <p:style>
+          <a:lnRef idx="2">
+            <a:schemeClr val="accent1">
+              <a:shade val="15000"/>
+            </a:schemeClr>
+          </a:lnRef>
+          <a:fillRef idx="1">
+            <a:schemeClr val="accent1"/>
+          </a:fillRef>
+          <a:effectRef idx="0">
+            <a:schemeClr val="accent1"/>
+          </a:effectRef>
+          <a:fontRef idx="minor">
+            <a:schemeClr val="lt1"/>
+          </a:fontRef>
+        </p:style>
+        <p:txBody>
+          <a:bodyPr rtlCol="0" anchor="ctr"/>
+          <a:lstStyle/>
+          <a:p>
+            <a:pPr algn="ctr"/>
+            <a:r>
+              <a:rPr lang="en-US" dirty="0"/>
+              <a:t>Word Breakdown</a:t>
+            </a:r>
+          </a:p>
+        </p:txBody>
+      </p:sp>
+      <p:sp>
+        <p:nvSpPr>
+          <p:cNvPr id="29" name="Rectangle 28">
+            <a:extLst>
+              <a:ext uri="{FF2B5EF4-FFF2-40B4-BE49-F238E27FC236}">
+                <a16:creationId xmlns:a16="http://schemas.microsoft.com/office/drawing/2014/main" id="{EB320938-F391-D4EB-A60D-9C7670735F34}"/>
+              </a:ext>
+            </a:extLst>
+          </p:cNvPr>
+          <p:cNvSpPr/>
+          <p:nvPr/>
+        </p:nvSpPr>
+        <p:spPr>
+          <a:xfrm>
+            <a:off x="2558980" y="4963885"/>
+            <a:ext cx="7074040" cy="411982"/>
+          </a:xfrm>
+          <a:prstGeom prst="rect">
+            <a:avLst/>
+          </a:prstGeom>
+          <a:noFill/>
+          <a:ln>
+            <a:noFill/>
+          </a:ln>
+        </p:spPr>
+        <p:style>
+          <a:lnRef idx="2">
+            <a:schemeClr val="accent1">
+              <a:shade val="15000"/>
+            </a:schemeClr>
+          </a:lnRef>
+          <a:fillRef idx="1">
+            <a:schemeClr val="accent1"/>
+          </a:fillRef>
+          <a:effectRef idx="0">
+            <a:schemeClr val="accent1"/>
+          </a:effectRef>
+          <a:fontRef idx="minor">
+            <a:schemeClr val="lt1"/>
+          </a:fontRef>
+        </p:style>
+        <p:txBody>
+          <a:bodyPr rtlCol="0" anchor="ctr"/>
+          <a:lstStyle/>
+          <a:p>
+            <a:r>
+              <a:rPr lang="en-US" dirty="0">
+                <a:solidFill>
+                  <a:schemeClr val="tx1"/>
+                </a:solidFill>
+              </a:rPr>
+              <a:t>Upvote Count: 0			</a:t>
+            </a:r>
+          </a:p>
+        </p:txBody>
+      </p:sp>
+      <p:sp>
+        <p:nvSpPr>
+          <p:cNvPr id="32" name="Rectangle: Rounded Corners 31">
+            <a:extLst>
+              <a:ext uri="{FF2B5EF4-FFF2-40B4-BE49-F238E27FC236}">
+                <a16:creationId xmlns:a16="http://schemas.microsoft.com/office/drawing/2014/main" id="{559543E7-7069-05A5-2916-7B6A46C91618}"/>
+              </a:ext>
+            </a:extLst>
+          </p:cNvPr>
+          <p:cNvSpPr/>
+          <p:nvPr/>
+        </p:nvSpPr>
+        <p:spPr>
+          <a:xfrm>
+            <a:off x="7409202" y="5019515"/>
+            <a:ext cx="1836011" cy="301527"/>
+          </a:xfrm>
+          <a:prstGeom prst="roundRect">
+            <a:avLst/>
+          </a:prstGeom>
+        </p:spPr>
+        <p:style>
+          <a:lnRef idx="2">
+            <a:schemeClr val="accent1">
+              <a:shade val="15000"/>
+            </a:schemeClr>
+          </a:lnRef>
+          <a:fillRef idx="1">
+            <a:schemeClr val="accent1"/>
+          </a:fillRef>
+          <a:effectRef idx="0">
+            <a:schemeClr val="accent1"/>
+          </a:effectRef>
+          <a:fontRef idx="minor">
+            <a:schemeClr val="lt1"/>
+          </a:fontRef>
+        </p:style>
+        <p:txBody>
+          <a:bodyPr rtlCol="0" anchor="ctr"/>
+          <a:lstStyle/>
+          <a:p>
+            <a:pPr algn="ctr"/>
+            <a:r>
+              <a:rPr lang="en-US" dirty="0"/>
+              <a:t>Word Breakdown</a:t>
+            </a:r>
           </a:p>
         </p:txBody>
       </p:sp>
     </p:spTree>
     <p:extLst>
       <p:ext uri="{BB962C8B-B14F-4D97-AF65-F5344CB8AC3E}">
-        <p14:creationId xmlns:p14="http://schemas.microsoft.com/office/powerpoint/2010/main" val="465416167"/>
+        <p14:creationId xmlns:p14="http://schemas.microsoft.com/office/powerpoint/2010/main" val="1230075902"/>
       </p:ext>
     </p:extLst>
   </p:cSld>
@@ -5151,237 +6392,372 @@
       </p:grpSpPr>
       <p:sp>
         <p:nvSpPr>
-          <p:cNvPr id="4" name="TextBox 3">
-            <a:extLst>
-              <a:ext uri="{FF2B5EF4-FFF2-40B4-BE49-F238E27FC236}">
-                <a16:creationId xmlns:a16="http://schemas.microsoft.com/office/drawing/2014/main" id="{93042950-E66C-9CF4-A917-488019161FCA}"/>
-              </a:ext>
-            </a:extLst>
-          </p:cNvPr>
-          <p:cNvSpPr txBox="1"/>
+          <p:cNvPr id="3" name="Rectangle 2">
+            <a:extLst>
+              <a:ext uri="{FF2B5EF4-FFF2-40B4-BE49-F238E27FC236}">
+                <a16:creationId xmlns:a16="http://schemas.microsoft.com/office/drawing/2014/main" id="{09EB6145-F196-BA75-4B3E-EED7851B2ACB}"/>
+              </a:ext>
+            </a:extLst>
+          </p:cNvPr>
+          <p:cNvSpPr/>
           <p:nvPr/>
         </p:nvSpPr>
         <p:spPr>
           <a:xfrm>
-            <a:off x="275846" y="765589"/>
-            <a:ext cx="11410545" cy="2769284"/>
+            <a:off x="242835" y="200967"/>
+            <a:ext cx="11706330" cy="6451042"/>
           </a:xfrm>
           <a:prstGeom prst="rect">
             <a:avLst/>
           </a:prstGeom>
           <a:noFill/>
         </p:spPr>
-        <p:txBody>
-          <a:bodyPr wrap="square" rtlCol="0">
-            <a:spAutoFit/>
-          </a:bodyPr>
-          <a:lstStyle/>
-          <a:p>
-            <a:pPr marL="0" marR="0">
-              <a:lnSpc>
-                <a:spcPct val="107000"/>
-              </a:lnSpc>
-              <a:spcBef>
-                <a:spcPts val="0"/>
-              </a:spcBef>
-              <a:spcAft>
-                <a:spcPts val="800"/>
-              </a:spcAft>
-            </a:pPr>
-            <a:r>
-              <a:rPr lang="en-US" kern="100" dirty="0">
-                <a:latin typeface="Calibri" panose="020F0502020204030204" pitchFamily="34" charset="0"/>
-                <a:ea typeface="Calibri" panose="020F0502020204030204" pitchFamily="34" charset="0"/>
-                <a:cs typeface="Times New Roman" panose="02020603050405020304" pitchFamily="18" charset="0"/>
-              </a:rPr>
-              <a:t>- </a:t>
-            </a:r>
-            <a:r>
-              <a:rPr lang="en-US" sz="1800" kern="100" dirty="0">
-                <a:effectLst/>
-                <a:latin typeface="Calibri" panose="020F0502020204030204" pitchFamily="34" charset="0"/>
-                <a:ea typeface="Calibri" panose="020F0502020204030204" pitchFamily="34" charset="0"/>
-                <a:cs typeface="Times New Roman" panose="02020603050405020304" pitchFamily="18" charset="0"/>
-              </a:rPr>
-              <a:t>Event post should display:</a:t>
-            </a:r>
-          </a:p>
-          <a:p>
-            <a:pPr marL="0" marR="0">
-              <a:lnSpc>
-                <a:spcPct val="107000"/>
-              </a:lnSpc>
-              <a:spcBef>
-                <a:spcPts val="0"/>
-              </a:spcBef>
-              <a:spcAft>
-                <a:spcPts val="800"/>
-              </a:spcAft>
-            </a:pPr>
-            <a:r>
-              <a:rPr lang="en-US" kern="100" dirty="0">
-                <a:latin typeface="Calibri" panose="020F0502020204030204" pitchFamily="34" charset="0"/>
-                <a:ea typeface="Calibri" panose="020F0502020204030204" pitchFamily="34" charset="0"/>
-                <a:cs typeface="Times New Roman" panose="02020603050405020304" pitchFamily="18" charset="0"/>
-              </a:rPr>
-              <a:t>	- event Name </a:t>
-            </a:r>
-          </a:p>
-          <a:p>
-            <a:pPr marL="0" marR="0">
-              <a:lnSpc>
-                <a:spcPct val="107000"/>
-              </a:lnSpc>
-              <a:spcBef>
-                <a:spcPts val="0"/>
-              </a:spcBef>
-              <a:spcAft>
-                <a:spcPts val="800"/>
-              </a:spcAft>
-            </a:pPr>
-            <a:r>
-              <a:rPr lang="en-US" kern="100" dirty="0">
-                <a:latin typeface="Calibri" panose="020F0502020204030204" pitchFamily="34" charset="0"/>
-                <a:ea typeface="Calibri" panose="020F0502020204030204" pitchFamily="34" charset="0"/>
-                <a:cs typeface="Times New Roman" panose="02020603050405020304" pitchFamily="18" charset="0"/>
-              </a:rPr>
-              <a:t>	- event ID</a:t>
-            </a:r>
-          </a:p>
-          <a:p>
-            <a:pPr marL="0" marR="0">
-              <a:lnSpc>
-                <a:spcPct val="107000"/>
-              </a:lnSpc>
-              <a:spcBef>
-                <a:spcPts val="0"/>
-              </a:spcBef>
-              <a:spcAft>
-                <a:spcPts val="800"/>
-              </a:spcAft>
-            </a:pPr>
-            <a:r>
-              <a:rPr lang="en-US" sz="1800" kern="100" dirty="0">
-                <a:effectLst/>
-                <a:latin typeface="Calibri" panose="020F0502020204030204" pitchFamily="34" charset="0"/>
-                <a:ea typeface="Calibri" panose="020F0502020204030204" pitchFamily="34" charset="0"/>
-                <a:cs typeface="Times New Roman" panose="02020603050405020304" pitchFamily="18" charset="0"/>
-              </a:rPr>
-              <a:t>	- location</a:t>
-            </a:r>
-          </a:p>
-          <a:p>
-            <a:pPr marL="0" marR="0">
-              <a:lnSpc>
-                <a:spcPct val="107000"/>
-              </a:lnSpc>
-              <a:spcBef>
-                <a:spcPts val="0"/>
-              </a:spcBef>
-              <a:spcAft>
-                <a:spcPts val="800"/>
-              </a:spcAft>
-            </a:pPr>
-            <a:r>
-              <a:rPr lang="en-US" kern="100" dirty="0">
-                <a:latin typeface="Calibri" panose="020F0502020204030204" pitchFamily="34" charset="0"/>
-                <a:ea typeface="Calibri" panose="020F0502020204030204" pitchFamily="34" charset="0"/>
-                <a:cs typeface="Times New Roman" panose="02020603050405020304" pitchFamily="18" charset="0"/>
-              </a:rPr>
-              <a:t>	- time</a:t>
-            </a:r>
-          </a:p>
-          <a:p>
-            <a:pPr marL="0" marR="0">
-              <a:lnSpc>
-                <a:spcPct val="107000"/>
-              </a:lnSpc>
-              <a:spcBef>
-                <a:spcPts val="0"/>
-              </a:spcBef>
-              <a:spcAft>
-                <a:spcPts val="800"/>
-              </a:spcAft>
-            </a:pPr>
-            <a:r>
-              <a:rPr lang="en-US" sz="1800" kern="100" dirty="0">
-                <a:effectLst/>
-                <a:latin typeface="Calibri" panose="020F0502020204030204" pitchFamily="34" charset="0"/>
-                <a:ea typeface="Calibri" panose="020F0502020204030204" pitchFamily="34" charset="0"/>
-                <a:cs typeface="Times New Roman" panose="02020603050405020304" pitchFamily="18" charset="0"/>
-              </a:rPr>
-              <a:t>	- participants (list </a:t>
-            </a:r>
-            <a:r>
-              <a:rPr lang="en-US" sz="1800" kern="100" dirty="0" err="1">
-                <a:effectLst/>
-                <a:latin typeface="Calibri" panose="020F0502020204030204" pitchFamily="34" charset="0"/>
-                <a:ea typeface="Calibri" panose="020F0502020204030204" pitchFamily="34" charset="0"/>
-                <a:cs typeface="Times New Roman" panose="02020603050405020304" pitchFamily="18" charset="0"/>
-              </a:rPr>
-              <a:t>userId</a:t>
-            </a:r>
-            <a:r>
-              <a:rPr lang="en-US" sz="1800" kern="100" dirty="0">
-                <a:effectLst/>
-                <a:latin typeface="Calibri" panose="020F0502020204030204" pitchFamily="34" charset="0"/>
-                <a:ea typeface="Calibri" panose="020F0502020204030204" pitchFamily="34" charset="0"/>
-                <a:cs typeface="Times New Roman" panose="02020603050405020304" pitchFamily="18" charset="0"/>
-              </a:rPr>
-              <a:t> attending)</a:t>
-            </a:r>
-          </a:p>
-          <a:p>
-            <a:pPr marL="0" marR="0">
-              <a:lnSpc>
-                <a:spcPct val="107000"/>
-              </a:lnSpc>
-              <a:spcBef>
-                <a:spcPts val="0"/>
-              </a:spcBef>
-              <a:spcAft>
-                <a:spcPts val="800"/>
-              </a:spcAft>
-            </a:pPr>
-            <a:r>
-              <a:rPr lang="en-US" kern="100" dirty="0">
-                <a:latin typeface="Calibri" panose="020F0502020204030204" pitchFamily="34" charset="0"/>
-                <a:ea typeface="Calibri" panose="020F0502020204030204" pitchFamily="34" charset="0"/>
-                <a:cs typeface="Times New Roman" panose="02020603050405020304" pitchFamily="18" charset="0"/>
-              </a:rPr>
-              <a:t>	- Attending/ Remove Attending button to add/remove user from participants list</a:t>
-            </a:r>
-            <a:endParaRPr lang="en-US" sz="1800" kern="100" dirty="0">
-              <a:effectLst/>
-              <a:latin typeface="Calibri" panose="020F0502020204030204" pitchFamily="34" charset="0"/>
-              <a:ea typeface="Calibri" panose="020F0502020204030204" pitchFamily="34" charset="0"/>
-              <a:cs typeface="Times New Roman" panose="02020603050405020304" pitchFamily="18" charset="0"/>
-            </a:endParaRPr>
-          </a:p>
-        </p:txBody>
-      </p:sp>
-      <p:sp>
-        <p:nvSpPr>
-          <p:cNvPr id="2" name="TextBox 1">
-            <a:extLst>
-              <a:ext uri="{FF2B5EF4-FFF2-40B4-BE49-F238E27FC236}">
-                <a16:creationId xmlns:a16="http://schemas.microsoft.com/office/drawing/2014/main" id="{CB46AF81-95B8-D80D-804A-CADBD595992E}"/>
-              </a:ext>
-            </a:extLst>
-          </p:cNvPr>
-          <p:cNvSpPr txBox="1"/>
+        <p:style>
+          <a:lnRef idx="2">
+            <a:schemeClr val="accent1">
+              <a:shade val="15000"/>
+            </a:schemeClr>
+          </a:lnRef>
+          <a:fillRef idx="1">
+            <a:schemeClr val="accent1"/>
+          </a:fillRef>
+          <a:effectRef idx="0">
+            <a:schemeClr val="accent1"/>
+          </a:effectRef>
+          <a:fontRef idx="minor">
+            <a:schemeClr val="lt1"/>
+          </a:fontRef>
+        </p:style>
+        <p:txBody>
+          <a:bodyPr rtlCol="0" anchor="ctr"/>
+          <a:lstStyle/>
+          <a:p>
+            <a:pPr algn="ctr"/>
+            <a:endParaRPr lang="en-US" dirty="0"/>
+          </a:p>
+        </p:txBody>
+      </p:sp>
+      <p:sp>
+        <p:nvSpPr>
+          <p:cNvPr id="9" name="Rectangle 8">
+            <a:extLst>
+              <a:ext uri="{FF2B5EF4-FFF2-40B4-BE49-F238E27FC236}">
+                <a16:creationId xmlns:a16="http://schemas.microsoft.com/office/drawing/2014/main" id="{F50557A8-8943-F711-C854-1442083C28F3}"/>
+              </a:ext>
+            </a:extLst>
+          </p:cNvPr>
+          <p:cNvSpPr/>
           <p:nvPr/>
         </p:nvSpPr>
         <p:spPr>
           <a:xfrm>
-            <a:off x="275847" y="161432"/>
-            <a:ext cx="11410545" cy="369332"/>
+            <a:off x="2558980" y="1075172"/>
+            <a:ext cx="7074040" cy="2150347"/>
           </a:xfrm>
           <a:prstGeom prst="rect">
             <a:avLst/>
           </a:prstGeom>
           <a:noFill/>
         </p:spPr>
+        <p:style>
+          <a:lnRef idx="2">
+            <a:schemeClr val="accent1">
+              <a:shade val="15000"/>
+            </a:schemeClr>
+          </a:lnRef>
+          <a:fillRef idx="1">
+            <a:schemeClr val="accent1"/>
+          </a:fillRef>
+          <a:effectRef idx="0">
+            <a:schemeClr val="accent1"/>
+          </a:effectRef>
+          <a:fontRef idx="minor">
+            <a:schemeClr val="lt1"/>
+          </a:fontRef>
+        </p:style>
+        <p:txBody>
+          <a:bodyPr rtlCol="0" anchor="ctr"/>
+          <a:lstStyle/>
+          <a:p>
+            <a:pPr algn="ctr"/>
+            <a:endParaRPr lang="en-US" dirty="0"/>
+          </a:p>
+        </p:txBody>
+      </p:sp>
+      <p:sp>
+        <p:nvSpPr>
+          <p:cNvPr id="11" name="Rectangle 10">
+            <a:extLst>
+              <a:ext uri="{FF2B5EF4-FFF2-40B4-BE49-F238E27FC236}">
+                <a16:creationId xmlns:a16="http://schemas.microsoft.com/office/drawing/2014/main" id="{8398570A-12E6-2071-F638-3A35007AEE47}"/>
+              </a:ext>
+            </a:extLst>
+          </p:cNvPr>
+          <p:cNvSpPr/>
+          <p:nvPr/>
+        </p:nvSpPr>
+        <p:spPr>
+          <a:xfrm>
+            <a:off x="2558980" y="3225519"/>
+            <a:ext cx="7074040" cy="2150347"/>
+          </a:xfrm>
+          <a:prstGeom prst="rect">
+            <a:avLst/>
+          </a:prstGeom>
+          <a:noFill/>
+        </p:spPr>
+        <p:style>
+          <a:lnRef idx="2">
+            <a:schemeClr val="accent1">
+              <a:shade val="15000"/>
+            </a:schemeClr>
+          </a:lnRef>
+          <a:fillRef idx="1">
+            <a:schemeClr val="accent1"/>
+          </a:fillRef>
+          <a:effectRef idx="0">
+            <a:schemeClr val="accent1"/>
+          </a:effectRef>
+          <a:fontRef idx="minor">
+            <a:schemeClr val="lt1"/>
+          </a:fontRef>
+        </p:style>
+        <p:txBody>
+          <a:bodyPr rtlCol="0" anchor="ctr"/>
+          <a:lstStyle/>
+          <a:p>
+            <a:pPr algn="ctr"/>
+            <a:endParaRPr lang="en-US" dirty="0"/>
+          </a:p>
+        </p:txBody>
+      </p:sp>
+      <p:sp>
+        <p:nvSpPr>
+          <p:cNvPr id="12" name="Rectangle 11">
+            <a:extLst>
+              <a:ext uri="{FF2B5EF4-FFF2-40B4-BE49-F238E27FC236}">
+                <a16:creationId xmlns:a16="http://schemas.microsoft.com/office/drawing/2014/main" id="{44B90755-68C1-C941-8BE9-5CDDEEAD237C}"/>
+              </a:ext>
+            </a:extLst>
+          </p:cNvPr>
+          <p:cNvSpPr/>
+          <p:nvPr/>
+        </p:nvSpPr>
+        <p:spPr>
+          <a:xfrm>
+            <a:off x="2558980" y="5375866"/>
+            <a:ext cx="7074040" cy="1276143"/>
+          </a:xfrm>
+          <a:prstGeom prst="rect">
+            <a:avLst/>
+          </a:prstGeom>
+          <a:noFill/>
+        </p:spPr>
+        <p:style>
+          <a:lnRef idx="2">
+            <a:schemeClr val="accent1">
+              <a:shade val="15000"/>
+            </a:schemeClr>
+          </a:lnRef>
+          <a:fillRef idx="1">
+            <a:schemeClr val="accent1"/>
+          </a:fillRef>
+          <a:effectRef idx="0">
+            <a:schemeClr val="accent1"/>
+          </a:effectRef>
+          <a:fontRef idx="minor">
+            <a:schemeClr val="lt1"/>
+          </a:fontRef>
+        </p:style>
+        <p:txBody>
+          <a:bodyPr rtlCol="0" anchor="ctr"/>
+          <a:lstStyle/>
+          <a:p>
+            <a:pPr algn="ctr"/>
+            <a:endParaRPr lang="en-US" dirty="0"/>
+          </a:p>
+        </p:txBody>
+      </p:sp>
+      <p:sp>
+        <p:nvSpPr>
+          <p:cNvPr id="14" name="Rectangle: Rounded Corners 13">
+            <a:extLst>
+              <a:ext uri="{FF2B5EF4-FFF2-40B4-BE49-F238E27FC236}">
+                <a16:creationId xmlns:a16="http://schemas.microsoft.com/office/drawing/2014/main" id="{462EB88B-18C0-73B8-1596-E8B79A8C25FF}"/>
+              </a:ext>
+            </a:extLst>
+          </p:cNvPr>
+          <p:cNvSpPr/>
+          <p:nvPr/>
+        </p:nvSpPr>
+        <p:spPr>
+          <a:xfrm>
+            <a:off x="10309607" y="439613"/>
+            <a:ext cx="1497205" cy="357974"/>
+          </a:xfrm>
+          <a:prstGeom prst="roundRect">
+            <a:avLst/>
+          </a:prstGeom>
+        </p:spPr>
+        <p:style>
+          <a:lnRef idx="2">
+            <a:schemeClr val="accent1">
+              <a:shade val="15000"/>
+            </a:schemeClr>
+          </a:lnRef>
+          <a:fillRef idx="1">
+            <a:schemeClr val="accent1"/>
+          </a:fillRef>
+          <a:effectRef idx="0">
+            <a:schemeClr val="accent1"/>
+          </a:effectRef>
+          <a:fontRef idx="minor">
+            <a:schemeClr val="lt1"/>
+          </a:fontRef>
+        </p:style>
+        <p:txBody>
+          <a:bodyPr rtlCol="0" anchor="ctr"/>
+          <a:lstStyle/>
+          <a:p>
+            <a:pPr algn="ctr"/>
+            <a:r>
+              <a:rPr lang="en-US" dirty="0"/>
+              <a:t>Account Info</a:t>
+            </a:r>
+          </a:p>
+        </p:txBody>
+      </p:sp>
+      <p:sp>
+        <p:nvSpPr>
+          <p:cNvPr id="15" name="Rectangle 14">
+            <a:extLst>
+              <a:ext uri="{FF2B5EF4-FFF2-40B4-BE49-F238E27FC236}">
+                <a16:creationId xmlns:a16="http://schemas.microsoft.com/office/drawing/2014/main" id="{2F28C8CE-0641-4BDC-3993-118AA2F43F1D}"/>
+              </a:ext>
+            </a:extLst>
+          </p:cNvPr>
+          <p:cNvSpPr/>
+          <p:nvPr/>
+        </p:nvSpPr>
+        <p:spPr>
+          <a:xfrm>
+            <a:off x="242835" y="200966"/>
+            <a:ext cx="11706330" cy="874206"/>
+          </a:xfrm>
+          <a:prstGeom prst="rect">
+            <a:avLst/>
+          </a:prstGeom>
+          <a:noFill/>
+        </p:spPr>
+        <p:style>
+          <a:lnRef idx="2">
+            <a:schemeClr val="accent1">
+              <a:shade val="15000"/>
+            </a:schemeClr>
+          </a:lnRef>
+          <a:fillRef idx="1">
+            <a:schemeClr val="accent1"/>
+          </a:fillRef>
+          <a:effectRef idx="0">
+            <a:schemeClr val="accent1"/>
+          </a:effectRef>
+          <a:fontRef idx="minor">
+            <a:schemeClr val="lt1"/>
+          </a:fontRef>
+        </p:style>
+        <p:txBody>
+          <a:bodyPr rtlCol="0" anchor="ctr"/>
+          <a:lstStyle/>
+          <a:p>
+            <a:pPr algn="ctr"/>
+            <a:r>
+              <a:rPr lang="en-US" u="sng" dirty="0">
+                <a:solidFill>
+                  <a:schemeClr val="tx1"/>
+                </a:solidFill>
+              </a:rPr>
+              <a:t>Latest Posts</a:t>
+            </a:r>
+            <a:r>
+              <a:rPr lang="en-US" dirty="0">
+                <a:solidFill>
+                  <a:schemeClr val="tx1"/>
+                </a:solidFill>
+              </a:rPr>
+              <a:t>	Favorite Posts</a:t>
+            </a:r>
+          </a:p>
+        </p:txBody>
+      </p:sp>
+      <p:sp>
+        <p:nvSpPr>
+          <p:cNvPr id="16" name="Action Button: Go Home 15">
+            <a:hlinkClick r:id="" action="ppaction://hlinkshowjump?jump=firstslide" highlightClick="1"/>
+            <a:extLst>
+              <a:ext uri="{FF2B5EF4-FFF2-40B4-BE49-F238E27FC236}">
+                <a16:creationId xmlns:a16="http://schemas.microsoft.com/office/drawing/2014/main" id="{718E4184-CE0E-7E87-B941-B21B6287DC47}"/>
+              </a:ext>
+            </a:extLst>
+          </p:cNvPr>
+          <p:cNvSpPr/>
+          <p:nvPr/>
+        </p:nvSpPr>
+        <p:spPr>
+          <a:xfrm>
+            <a:off x="385188" y="396280"/>
+            <a:ext cx="619648" cy="506187"/>
+          </a:xfrm>
+          <a:prstGeom prst="actionButtonHome">
+            <a:avLst/>
+          </a:prstGeom>
+        </p:spPr>
+        <p:style>
+          <a:lnRef idx="2">
+            <a:schemeClr val="accent1">
+              <a:shade val="15000"/>
+            </a:schemeClr>
+          </a:lnRef>
+          <a:fillRef idx="1">
+            <a:schemeClr val="accent1"/>
+          </a:fillRef>
+          <a:effectRef idx="0">
+            <a:schemeClr val="accent1"/>
+          </a:effectRef>
+          <a:fontRef idx="minor">
+            <a:schemeClr val="lt1"/>
+          </a:fontRef>
+        </p:style>
+        <p:txBody>
+          <a:bodyPr rtlCol="0" anchor="ctr"/>
+          <a:lstStyle/>
+          <a:p>
+            <a:pPr algn="ctr"/>
+            <a:endParaRPr lang="en-US"/>
+          </a:p>
+        </p:txBody>
+      </p:sp>
+      <p:sp>
+        <p:nvSpPr>
+          <p:cNvPr id="17" name="TextBox 16">
+            <a:extLst>
+              <a:ext uri="{FF2B5EF4-FFF2-40B4-BE49-F238E27FC236}">
+                <a16:creationId xmlns:a16="http://schemas.microsoft.com/office/drawing/2014/main" id="{60FBE9E0-78AB-01C4-4EFD-FD36C0881FF1}"/>
+              </a:ext>
+            </a:extLst>
+          </p:cNvPr>
+          <p:cNvSpPr txBox="1"/>
+          <p:nvPr/>
+        </p:nvSpPr>
+        <p:spPr>
+          <a:xfrm>
+            <a:off x="2659463" y="1131618"/>
+            <a:ext cx="6873073" cy="1754326"/>
+          </a:xfrm>
+          <a:prstGeom prst="rect">
+            <a:avLst/>
+          </a:prstGeom>
+          <a:noFill/>
+        </p:spPr>
         <p:txBody>
           <a:bodyPr wrap="square" rtlCol="0">
             <a:spAutoFit/>
@@ -5389,28 +6765,515 @@
           <a:lstStyle/>
           <a:p>
             <a:r>
-              <a:rPr lang="en-US" sz="1800" dirty="0">
-                <a:effectLst/>
-                <a:latin typeface="Calibri" panose="020F0502020204030204" pitchFamily="34" charset="0"/>
-                <a:ea typeface="Calibri" panose="020F0502020204030204" pitchFamily="34" charset="0"/>
-                <a:cs typeface="Times New Roman" panose="02020603050405020304" pitchFamily="18" charset="0"/>
-              </a:rPr>
-              <a:t>Event display area</a:t>
-            </a:r>
+              <a:rPr lang="en-US" dirty="0"/>
+              <a:t>Username: SteveVaz123</a:t>
+            </a:r>
+          </a:p>
+          <a:p>
+            <a:r>
+              <a:rPr lang="en-US" dirty="0" err="1"/>
+              <a:t>UserId</a:t>
+            </a:r>
+            <a:r>
+              <a:rPr lang="en-US" dirty="0"/>
+              <a:t>: 1111-1111-1111-1111</a:t>
+            </a:r>
+          </a:p>
+          <a:p>
+            <a:r>
+              <a:rPr lang="en-US" dirty="0"/>
+              <a:t>Post:</a:t>
+            </a:r>
+          </a:p>
+          <a:p>
             <a:endParaRPr lang="en-US" dirty="0"/>
+          </a:p>
+          <a:p>
+            <a:r>
+              <a:rPr lang="en-US" dirty="0"/>
+              <a:t>This is a user post </a:t>
+            </a:r>
+          </a:p>
+          <a:p>
+            <a:endParaRPr lang="en-US" dirty="0"/>
+          </a:p>
+        </p:txBody>
+      </p:sp>
+      <p:sp>
+        <p:nvSpPr>
+          <p:cNvPr id="18" name="Rectangle 17">
+            <a:extLst>
+              <a:ext uri="{FF2B5EF4-FFF2-40B4-BE49-F238E27FC236}">
+                <a16:creationId xmlns:a16="http://schemas.microsoft.com/office/drawing/2014/main" id="{C12A960D-6241-96E7-3536-4A995046642C}"/>
+              </a:ext>
+            </a:extLst>
+          </p:cNvPr>
+          <p:cNvSpPr/>
+          <p:nvPr/>
+        </p:nvSpPr>
+        <p:spPr>
+          <a:xfrm>
+            <a:off x="2558980" y="2813538"/>
+            <a:ext cx="7074040" cy="411982"/>
+          </a:xfrm>
+          <a:prstGeom prst="rect">
+            <a:avLst/>
+          </a:prstGeom>
+          <a:noFill/>
+          <a:ln>
+            <a:noFill/>
+          </a:ln>
+        </p:spPr>
+        <p:style>
+          <a:lnRef idx="2">
+            <a:schemeClr val="accent1">
+              <a:shade val="15000"/>
+            </a:schemeClr>
+          </a:lnRef>
+          <a:fillRef idx="1">
+            <a:schemeClr val="accent1"/>
+          </a:fillRef>
+          <a:effectRef idx="0">
+            <a:schemeClr val="accent1"/>
+          </a:effectRef>
+          <a:fontRef idx="minor">
+            <a:schemeClr val="lt1"/>
+          </a:fontRef>
+        </p:style>
+        <p:txBody>
+          <a:bodyPr rtlCol="0" anchor="ctr"/>
+          <a:lstStyle/>
+          <a:p>
+            <a:r>
+              <a:rPr lang="en-US" dirty="0">
+                <a:solidFill>
+                  <a:schemeClr val="tx1"/>
+                </a:solidFill>
+              </a:rPr>
+              <a:t>            Upvote | Upvote Count: 4			</a:t>
+            </a:r>
+          </a:p>
+        </p:txBody>
+      </p:sp>
+      <p:sp>
+        <p:nvSpPr>
+          <p:cNvPr id="20" name="Rectangle 19">
+            <a:extLst>
+              <a:ext uri="{FF2B5EF4-FFF2-40B4-BE49-F238E27FC236}">
+                <a16:creationId xmlns:a16="http://schemas.microsoft.com/office/drawing/2014/main" id="{E4D0A74E-41DD-4F73-4EB2-C1D35A4EF610}"/>
+              </a:ext>
+            </a:extLst>
+          </p:cNvPr>
+          <p:cNvSpPr/>
+          <p:nvPr/>
+        </p:nvSpPr>
+        <p:spPr>
+          <a:xfrm>
+            <a:off x="2873829" y="2885944"/>
+            <a:ext cx="311498" cy="249142"/>
+          </a:xfrm>
+          <a:prstGeom prst="rect">
+            <a:avLst/>
+          </a:prstGeom>
+          <a:noFill/>
+        </p:spPr>
+        <p:style>
+          <a:lnRef idx="2">
+            <a:schemeClr val="accent1">
+              <a:shade val="15000"/>
+            </a:schemeClr>
+          </a:lnRef>
+          <a:fillRef idx="1">
+            <a:schemeClr val="accent1"/>
+          </a:fillRef>
+          <a:effectRef idx="0">
+            <a:schemeClr val="accent1"/>
+          </a:effectRef>
+          <a:fontRef idx="minor">
+            <a:schemeClr val="lt1"/>
+          </a:fontRef>
+        </p:style>
+        <p:txBody>
+          <a:bodyPr rtlCol="0" anchor="ctr"/>
+          <a:lstStyle/>
+          <a:p>
+            <a:pPr algn="ctr"/>
+            <a:endParaRPr lang="en-US"/>
+          </a:p>
+        </p:txBody>
+      </p:sp>
+      <p:sp>
+        <p:nvSpPr>
+          <p:cNvPr id="21" name="Multiplication Sign 20">
+            <a:extLst>
+              <a:ext uri="{FF2B5EF4-FFF2-40B4-BE49-F238E27FC236}">
+                <a16:creationId xmlns:a16="http://schemas.microsoft.com/office/drawing/2014/main" id="{B32A877A-63F7-1AD9-6474-C65CD5330C83}"/>
+              </a:ext>
+            </a:extLst>
+          </p:cNvPr>
+          <p:cNvSpPr/>
+          <p:nvPr/>
+        </p:nvSpPr>
+        <p:spPr>
+          <a:xfrm>
+            <a:off x="2881256" y="2885944"/>
+            <a:ext cx="304071" cy="249142"/>
+          </a:xfrm>
+          <a:prstGeom prst="mathMultiply">
+            <a:avLst/>
+          </a:prstGeom>
+        </p:spPr>
+        <p:style>
+          <a:lnRef idx="2">
+            <a:schemeClr val="accent1">
+              <a:shade val="15000"/>
+            </a:schemeClr>
+          </a:lnRef>
+          <a:fillRef idx="1">
+            <a:schemeClr val="accent1"/>
+          </a:fillRef>
+          <a:effectRef idx="0">
+            <a:schemeClr val="accent1"/>
+          </a:effectRef>
+          <a:fontRef idx="minor">
+            <a:schemeClr val="lt1"/>
+          </a:fontRef>
+        </p:style>
+        <p:txBody>
+          <a:bodyPr rtlCol="0" anchor="ctr"/>
+          <a:lstStyle/>
+          <a:p>
+            <a:pPr algn="ctr"/>
+            <a:endParaRPr lang="en-US"/>
+          </a:p>
+        </p:txBody>
+      </p:sp>
+      <p:sp>
+        <p:nvSpPr>
+          <p:cNvPr id="23" name="Rectangle 22">
+            <a:extLst>
+              <a:ext uri="{FF2B5EF4-FFF2-40B4-BE49-F238E27FC236}">
+                <a16:creationId xmlns:a16="http://schemas.microsoft.com/office/drawing/2014/main" id="{36BB1C4E-DA1B-4A1D-01D1-6D5025F59130}"/>
+              </a:ext>
+            </a:extLst>
+          </p:cNvPr>
+          <p:cNvSpPr/>
+          <p:nvPr/>
+        </p:nvSpPr>
+        <p:spPr>
+          <a:xfrm>
+            <a:off x="2558980" y="3225517"/>
+            <a:ext cx="7074040" cy="2150347"/>
+          </a:xfrm>
+          <a:prstGeom prst="rect">
+            <a:avLst/>
+          </a:prstGeom>
+          <a:noFill/>
+        </p:spPr>
+        <p:style>
+          <a:lnRef idx="2">
+            <a:schemeClr val="accent1">
+              <a:shade val="15000"/>
+            </a:schemeClr>
+          </a:lnRef>
+          <a:fillRef idx="1">
+            <a:schemeClr val="accent1"/>
+          </a:fillRef>
+          <a:effectRef idx="0">
+            <a:schemeClr val="accent1"/>
+          </a:effectRef>
+          <a:fontRef idx="minor">
+            <a:schemeClr val="lt1"/>
+          </a:fontRef>
+        </p:style>
+        <p:txBody>
+          <a:bodyPr rtlCol="0" anchor="ctr"/>
+          <a:lstStyle/>
+          <a:p>
+            <a:pPr algn="ctr"/>
+            <a:endParaRPr lang="en-US" dirty="0"/>
+          </a:p>
+        </p:txBody>
+      </p:sp>
+      <p:sp>
+        <p:nvSpPr>
+          <p:cNvPr id="24" name="TextBox 23">
+            <a:extLst>
+              <a:ext uri="{FF2B5EF4-FFF2-40B4-BE49-F238E27FC236}">
+                <a16:creationId xmlns:a16="http://schemas.microsoft.com/office/drawing/2014/main" id="{D7A3F2E2-8653-F1D4-742A-25A77EF604A9}"/>
+              </a:ext>
+            </a:extLst>
+          </p:cNvPr>
+          <p:cNvSpPr txBox="1"/>
+          <p:nvPr/>
+        </p:nvSpPr>
+        <p:spPr>
+          <a:xfrm>
+            <a:off x="2659463" y="3281963"/>
+            <a:ext cx="6873073" cy="1754326"/>
+          </a:xfrm>
+          <a:prstGeom prst="rect">
+            <a:avLst/>
+          </a:prstGeom>
+          <a:noFill/>
+        </p:spPr>
+        <p:txBody>
+          <a:bodyPr wrap="square" rtlCol="0">
+            <a:spAutoFit/>
+          </a:bodyPr>
+          <a:lstStyle/>
+          <a:p>
+            <a:r>
+              <a:rPr lang="en-US" dirty="0"/>
+              <a:t>Username: JohnDoe123</a:t>
+            </a:r>
+          </a:p>
+          <a:p>
+            <a:r>
+              <a:rPr lang="en-US" dirty="0" err="1"/>
+              <a:t>UserId</a:t>
+            </a:r>
+            <a:r>
+              <a:rPr lang="en-US" dirty="0"/>
+              <a:t>: 2222-2222-2222-2222</a:t>
+            </a:r>
+          </a:p>
+          <a:p>
+            <a:r>
+              <a:rPr lang="en-US" dirty="0"/>
+              <a:t>Post:</a:t>
+            </a:r>
+          </a:p>
+          <a:p>
+            <a:endParaRPr lang="en-US" dirty="0"/>
+          </a:p>
+          <a:p>
+            <a:r>
+              <a:rPr lang="en-US" dirty="0"/>
+              <a:t>This is another user post </a:t>
+            </a:r>
+          </a:p>
+          <a:p>
+            <a:endParaRPr lang="en-US" dirty="0"/>
+          </a:p>
+        </p:txBody>
+      </p:sp>
+      <p:sp>
+        <p:nvSpPr>
+          <p:cNvPr id="28" name="Rectangle: Rounded Corners 27">
+            <a:extLst>
+              <a:ext uri="{FF2B5EF4-FFF2-40B4-BE49-F238E27FC236}">
+                <a16:creationId xmlns:a16="http://schemas.microsoft.com/office/drawing/2014/main" id="{E6782872-2765-53ED-D420-198B741ABA10}"/>
+              </a:ext>
+            </a:extLst>
+          </p:cNvPr>
+          <p:cNvSpPr/>
+          <p:nvPr/>
+        </p:nvSpPr>
+        <p:spPr>
+          <a:xfrm>
+            <a:off x="7409202" y="2869168"/>
+            <a:ext cx="1836011" cy="301527"/>
+          </a:xfrm>
+          <a:prstGeom prst="roundRect">
+            <a:avLst/>
+          </a:prstGeom>
+        </p:spPr>
+        <p:style>
+          <a:lnRef idx="2">
+            <a:schemeClr val="accent1">
+              <a:shade val="15000"/>
+            </a:schemeClr>
+          </a:lnRef>
+          <a:fillRef idx="1">
+            <a:schemeClr val="accent1"/>
+          </a:fillRef>
+          <a:effectRef idx="0">
+            <a:schemeClr val="accent1"/>
+          </a:effectRef>
+          <a:fontRef idx="minor">
+            <a:schemeClr val="lt1"/>
+          </a:fontRef>
+        </p:style>
+        <p:txBody>
+          <a:bodyPr rtlCol="0" anchor="ctr"/>
+          <a:lstStyle/>
+          <a:p>
+            <a:pPr algn="ctr"/>
+            <a:r>
+              <a:rPr lang="en-US" dirty="0"/>
+              <a:t>Word Breakdown</a:t>
+            </a:r>
+          </a:p>
+        </p:txBody>
+      </p:sp>
+      <p:sp>
+        <p:nvSpPr>
+          <p:cNvPr id="29" name="Rectangle 28">
+            <a:extLst>
+              <a:ext uri="{FF2B5EF4-FFF2-40B4-BE49-F238E27FC236}">
+                <a16:creationId xmlns:a16="http://schemas.microsoft.com/office/drawing/2014/main" id="{EB320938-F391-D4EB-A60D-9C7670735F34}"/>
+              </a:ext>
+            </a:extLst>
+          </p:cNvPr>
+          <p:cNvSpPr/>
+          <p:nvPr/>
+        </p:nvSpPr>
+        <p:spPr>
+          <a:xfrm>
+            <a:off x="2558980" y="4963885"/>
+            <a:ext cx="7074040" cy="411982"/>
+          </a:xfrm>
+          <a:prstGeom prst="rect">
+            <a:avLst/>
+          </a:prstGeom>
+          <a:noFill/>
+          <a:ln>
+            <a:noFill/>
+          </a:ln>
+        </p:spPr>
+        <p:style>
+          <a:lnRef idx="2">
+            <a:schemeClr val="accent1">
+              <a:shade val="15000"/>
+            </a:schemeClr>
+          </a:lnRef>
+          <a:fillRef idx="1">
+            <a:schemeClr val="accent1"/>
+          </a:fillRef>
+          <a:effectRef idx="0">
+            <a:schemeClr val="accent1"/>
+          </a:effectRef>
+          <a:fontRef idx="minor">
+            <a:schemeClr val="lt1"/>
+          </a:fontRef>
+        </p:style>
+        <p:txBody>
+          <a:bodyPr rtlCol="0" anchor="ctr"/>
+          <a:lstStyle/>
+          <a:p>
+            <a:r>
+              <a:rPr lang="en-US" dirty="0">
+                <a:solidFill>
+                  <a:schemeClr val="tx1"/>
+                </a:solidFill>
+              </a:rPr>
+              <a:t>            Upvote | Upvote Count: 0			</a:t>
+            </a:r>
+          </a:p>
+        </p:txBody>
+      </p:sp>
+      <p:sp>
+        <p:nvSpPr>
+          <p:cNvPr id="30" name="Rectangle 29">
+            <a:extLst>
+              <a:ext uri="{FF2B5EF4-FFF2-40B4-BE49-F238E27FC236}">
+                <a16:creationId xmlns:a16="http://schemas.microsoft.com/office/drawing/2014/main" id="{C6FC024A-899A-7E32-C4C1-5A9CA31F12D6}"/>
+              </a:ext>
+            </a:extLst>
+          </p:cNvPr>
+          <p:cNvSpPr/>
+          <p:nvPr/>
+        </p:nvSpPr>
+        <p:spPr>
+          <a:xfrm>
+            <a:off x="2873829" y="5036291"/>
+            <a:ext cx="311498" cy="249142"/>
+          </a:xfrm>
+          <a:prstGeom prst="rect">
+            <a:avLst/>
+          </a:prstGeom>
+          <a:noFill/>
+        </p:spPr>
+        <p:style>
+          <a:lnRef idx="2">
+            <a:schemeClr val="accent1">
+              <a:shade val="15000"/>
+            </a:schemeClr>
+          </a:lnRef>
+          <a:fillRef idx="1">
+            <a:schemeClr val="accent1"/>
+          </a:fillRef>
+          <a:effectRef idx="0">
+            <a:schemeClr val="accent1"/>
+          </a:effectRef>
+          <a:fontRef idx="minor">
+            <a:schemeClr val="lt1"/>
+          </a:fontRef>
+        </p:style>
+        <p:txBody>
+          <a:bodyPr rtlCol="0" anchor="ctr"/>
+          <a:lstStyle/>
+          <a:p>
+            <a:pPr algn="ctr"/>
+            <a:endParaRPr lang="en-US"/>
+          </a:p>
+        </p:txBody>
+      </p:sp>
+      <p:sp>
+        <p:nvSpPr>
+          <p:cNvPr id="32" name="Rectangle: Rounded Corners 31">
+            <a:extLst>
+              <a:ext uri="{FF2B5EF4-FFF2-40B4-BE49-F238E27FC236}">
+                <a16:creationId xmlns:a16="http://schemas.microsoft.com/office/drawing/2014/main" id="{559543E7-7069-05A5-2916-7B6A46C91618}"/>
+              </a:ext>
+            </a:extLst>
+          </p:cNvPr>
+          <p:cNvSpPr/>
+          <p:nvPr/>
+        </p:nvSpPr>
+        <p:spPr>
+          <a:xfrm>
+            <a:off x="7409202" y="5019515"/>
+            <a:ext cx="1836011" cy="301527"/>
+          </a:xfrm>
+          <a:prstGeom prst="roundRect">
+            <a:avLst/>
+          </a:prstGeom>
+        </p:spPr>
+        <p:style>
+          <a:lnRef idx="2">
+            <a:schemeClr val="accent1">
+              <a:shade val="15000"/>
+            </a:schemeClr>
+          </a:lnRef>
+          <a:fillRef idx="1">
+            <a:schemeClr val="accent1"/>
+          </a:fillRef>
+          <a:effectRef idx="0">
+            <a:schemeClr val="accent1"/>
+          </a:effectRef>
+          <a:fontRef idx="minor">
+            <a:schemeClr val="lt1"/>
+          </a:fontRef>
+        </p:style>
+        <p:txBody>
+          <a:bodyPr rtlCol="0" anchor="ctr"/>
+          <a:lstStyle/>
+          <a:p>
+            <a:pPr algn="ctr"/>
+            <a:r>
+              <a:rPr lang="en-US" dirty="0"/>
+              <a:t>Word Breakdown</a:t>
+            </a:r>
           </a:p>
         </p:txBody>
       </p:sp>
     </p:spTree>
     <p:extLst>
       <p:ext uri="{BB962C8B-B14F-4D97-AF65-F5344CB8AC3E}">
-        <p14:creationId xmlns:p14="http://schemas.microsoft.com/office/powerpoint/2010/main" val="3257912736"/>
+        <p14:creationId xmlns:p14="http://schemas.microsoft.com/office/powerpoint/2010/main" val="2881041793"/>
       </p:ext>
     </p:extLst>
   </p:cSld>
   <p:clrMapOvr>
     <a:masterClrMapping/>
   </p:clrMapOvr>
+  <p:extLst>
+    <p:ext uri="{6950BFC3-D8DA-4A85-94F7-54DA5524770B}">
+      <p188:commentRel xmlns:p188="http://schemas.microsoft.com/office/powerpoint/2018/8/main" r:id="rId2"/>
+    </p:ext>
+  </p:extLst>
 </p:sld>
 </file>
 
@@ -5433,203 +7296,174 @@
       </p:grpSpPr>
       <p:sp>
         <p:nvSpPr>
-          <p:cNvPr id="4" name="TextBox 3">
-            <a:extLst>
-              <a:ext uri="{FF2B5EF4-FFF2-40B4-BE49-F238E27FC236}">
-                <a16:creationId xmlns:a16="http://schemas.microsoft.com/office/drawing/2014/main" id="{93042950-E66C-9CF4-A917-488019161FCA}"/>
-              </a:ext>
-            </a:extLst>
-          </p:cNvPr>
-          <p:cNvSpPr txBox="1"/>
+          <p:cNvPr id="3" name="Rectangle 2">
+            <a:extLst>
+              <a:ext uri="{FF2B5EF4-FFF2-40B4-BE49-F238E27FC236}">
+                <a16:creationId xmlns:a16="http://schemas.microsoft.com/office/drawing/2014/main" id="{09EB6145-F196-BA75-4B3E-EED7851B2ACB}"/>
+              </a:ext>
+            </a:extLst>
+          </p:cNvPr>
+          <p:cNvSpPr/>
           <p:nvPr/>
         </p:nvSpPr>
         <p:spPr>
           <a:xfrm>
-            <a:off x="275846" y="765589"/>
-            <a:ext cx="11410545" cy="1971374"/>
+            <a:off x="242835" y="200967"/>
+            <a:ext cx="11706330" cy="6451042"/>
           </a:xfrm>
           <a:prstGeom prst="rect">
             <a:avLst/>
           </a:prstGeom>
           <a:noFill/>
         </p:spPr>
-        <p:txBody>
-          <a:bodyPr wrap="square" rtlCol="0">
-            <a:spAutoFit/>
-          </a:bodyPr>
-          <a:lstStyle/>
-          <a:p>
-            <a:pPr marL="0" marR="0">
-              <a:lnSpc>
-                <a:spcPct val="107000"/>
-              </a:lnSpc>
-              <a:spcBef>
-                <a:spcPts val="0"/>
-              </a:spcBef>
-              <a:spcAft>
-                <a:spcPts val="800"/>
-              </a:spcAft>
-            </a:pPr>
-            <a:r>
-              <a:rPr lang="en-US" sz="1800" kern="100" dirty="0">
-                <a:effectLst/>
-                <a:latin typeface="Calibri" panose="020F0502020204030204" pitchFamily="34" charset="0"/>
-                <a:ea typeface="Calibri" panose="020F0502020204030204" pitchFamily="34" charset="0"/>
-                <a:cs typeface="Times New Roman" panose="02020603050405020304" pitchFamily="18" charset="0"/>
-              </a:rPr>
-              <a:t>Needs following endpoints:</a:t>
-            </a:r>
-          </a:p>
-          <a:p>
-            <a:pPr marL="0" marR="0">
-              <a:lnSpc>
-                <a:spcPct val="107000"/>
-              </a:lnSpc>
-              <a:spcBef>
-                <a:spcPts val="0"/>
-              </a:spcBef>
-              <a:spcAft>
-                <a:spcPts val="800"/>
-              </a:spcAft>
-            </a:pPr>
-            <a:r>
-              <a:rPr lang="en-US" kern="100" dirty="0">
-                <a:latin typeface="Calibri" panose="020F0502020204030204" pitchFamily="34" charset="0"/>
-                <a:ea typeface="Calibri" panose="020F0502020204030204" pitchFamily="34" charset="0"/>
-                <a:cs typeface="Times New Roman" panose="02020603050405020304" pitchFamily="18" charset="0"/>
-              </a:rPr>
-              <a:t>- GET all users</a:t>
-            </a:r>
-          </a:p>
-          <a:p>
-            <a:pPr marL="0" marR="0">
-              <a:lnSpc>
-                <a:spcPct val="107000"/>
-              </a:lnSpc>
-              <a:spcBef>
-                <a:spcPts val="0"/>
-              </a:spcBef>
-              <a:spcAft>
-                <a:spcPts val="800"/>
-              </a:spcAft>
-            </a:pPr>
-            <a:r>
-              <a:rPr lang="en-US" sz="1800" kern="100" dirty="0">
-                <a:effectLst/>
-                <a:latin typeface="Calibri" panose="020F0502020204030204" pitchFamily="34" charset="0"/>
-                <a:ea typeface="Calibri" panose="020F0502020204030204" pitchFamily="34" charset="0"/>
-                <a:cs typeface="Times New Roman" panose="02020603050405020304" pitchFamily="18" charset="0"/>
-              </a:rPr>
-              <a:t>- GET </a:t>
-            </a:r>
-            <a:r>
-              <a:rPr lang="en-US" sz="1800" kern="100" dirty="0" err="1">
-                <a:effectLst/>
-                <a:latin typeface="Calibri" panose="020F0502020204030204" pitchFamily="34" charset="0"/>
-                <a:ea typeface="Calibri" panose="020F0502020204030204" pitchFamily="34" charset="0"/>
-                <a:cs typeface="Times New Roman" panose="02020603050405020304" pitchFamily="18" charset="0"/>
-              </a:rPr>
-              <a:t>userById</a:t>
-            </a:r>
-            <a:endParaRPr lang="en-US" sz="1800" kern="100" dirty="0">
-              <a:effectLst/>
-              <a:latin typeface="Calibri" panose="020F0502020204030204" pitchFamily="34" charset="0"/>
-              <a:ea typeface="Calibri" panose="020F0502020204030204" pitchFamily="34" charset="0"/>
-              <a:cs typeface="Times New Roman" panose="02020603050405020304" pitchFamily="18" charset="0"/>
-            </a:endParaRPr>
-          </a:p>
-          <a:p>
-            <a:pPr marL="0" marR="0">
-              <a:lnSpc>
-                <a:spcPct val="107000"/>
-              </a:lnSpc>
-              <a:spcBef>
-                <a:spcPts val="0"/>
-              </a:spcBef>
-              <a:spcAft>
-                <a:spcPts val="800"/>
-              </a:spcAft>
-            </a:pPr>
-            <a:r>
-              <a:rPr lang="en-US" kern="100" dirty="0">
-                <a:latin typeface="Calibri" panose="020F0502020204030204" pitchFamily="34" charset="0"/>
-                <a:ea typeface="Calibri" panose="020F0502020204030204" pitchFamily="34" charset="0"/>
-                <a:cs typeface="Times New Roman" panose="02020603050405020304" pitchFamily="18" charset="0"/>
-              </a:rPr>
-              <a:t>- POST </a:t>
-            </a:r>
-            <a:r>
-              <a:rPr lang="en-US" kern="100" dirty="0" err="1">
-                <a:latin typeface="Calibri" panose="020F0502020204030204" pitchFamily="34" charset="0"/>
-                <a:ea typeface="Calibri" panose="020F0502020204030204" pitchFamily="34" charset="0"/>
-                <a:cs typeface="Times New Roman" panose="02020603050405020304" pitchFamily="18" charset="0"/>
-              </a:rPr>
-              <a:t>createUser</a:t>
-            </a:r>
-            <a:endParaRPr lang="en-US" kern="100" dirty="0">
-              <a:latin typeface="Calibri" panose="020F0502020204030204" pitchFamily="34" charset="0"/>
-              <a:ea typeface="Calibri" panose="020F0502020204030204" pitchFamily="34" charset="0"/>
-              <a:cs typeface="Times New Roman" panose="02020603050405020304" pitchFamily="18" charset="0"/>
-            </a:endParaRPr>
-          </a:p>
-          <a:p>
-            <a:pPr marL="0" marR="0">
-              <a:lnSpc>
-                <a:spcPct val="107000"/>
-              </a:lnSpc>
-              <a:spcBef>
-                <a:spcPts val="0"/>
-              </a:spcBef>
-              <a:spcAft>
-                <a:spcPts val="800"/>
-              </a:spcAft>
-            </a:pPr>
-            <a:r>
-              <a:rPr lang="en-US" kern="100" dirty="0">
-                <a:latin typeface="Calibri" panose="020F0502020204030204" pitchFamily="34" charset="0"/>
-                <a:ea typeface="Calibri" panose="020F0502020204030204" pitchFamily="34" charset="0"/>
-                <a:cs typeface="Times New Roman" panose="02020603050405020304" pitchFamily="18" charset="0"/>
-              </a:rPr>
-              <a:t>- REMOVE </a:t>
-            </a:r>
-            <a:r>
-              <a:rPr lang="en-US" kern="100" dirty="0" err="1">
-                <a:latin typeface="Calibri" panose="020F0502020204030204" pitchFamily="34" charset="0"/>
-                <a:ea typeface="Calibri" panose="020F0502020204030204" pitchFamily="34" charset="0"/>
-                <a:cs typeface="Times New Roman" panose="02020603050405020304" pitchFamily="18" charset="0"/>
-              </a:rPr>
-              <a:t>removeUser</a:t>
-            </a:r>
-            <a:endParaRPr lang="en-US" kern="100" dirty="0">
-              <a:latin typeface="Calibri" panose="020F0502020204030204" pitchFamily="34" charset="0"/>
-              <a:ea typeface="Calibri" panose="020F0502020204030204" pitchFamily="34" charset="0"/>
-              <a:cs typeface="Times New Roman" panose="02020603050405020304" pitchFamily="18" charset="0"/>
-            </a:endParaRPr>
-          </a:p>
-        </p:txBody>
-      </p:sp>
-      <p:sp>
-        <p:nvSpPr>
-          <p:cNvPr id="2" name="TextBox 1">
-            <a:extLst>
-              <a:ext uri="{FF2B5EF4-FFF2-40B4-BE49-F238E27FC236}">
-                <a16:creationId xmlns:a16="http://schemas.microsoft.com/office/drawing/2014/main" id="{CB46AF81-95B8-D80D-804A-CADBD595992E}"/>
-              </a:ext>
-            </a:extLst>
-          </p:cNvPr>
-          <p:cNvSpPr txBox="1"/>
+        <p:style>
+          <a:lnRef idx="2">
+            <a:schemeClr val="accent1">
+              <a:shade val="15000"/>
+            </a:schemeClr>
+          </a:lnRef>
+          <a:fillRef idx="1">
+            <a:schemeClr val="accent1"/>
+          </a:fillRef>
+          <a:effectRef idx="0">
+            <a:schemeClr val="accent1"/>
+          </a:effectRef>
+          <a:fontRef idx="minor">
+            <a:schemeClr val="lt1"/>
+          </a:fontRef>
+        </p:style>
+        <p:txBody>
+          <a:bodyPr rtlCol="0" anchor="ctr"/>
+          <a:lstStyle/>
+          <a:p>
+            <a:pPr algn="ctr"/>
+            <a:endParaRPr lang="en-US" dirty="0"/>
+          </a:p>
+        </p:txBody>
+      </p:sp>
+      <p:sp>
+        <p:nvSpPr>
+          <p:cNvPr id="9" name="Rectangle 8">
+            <a:extLst>
+              <a:ext uri="{FF2B5EF4-FFF2-40B4-BE49-F238E27FC236}">
+                <a16:creationId xmlns:a16="http://schemas.microsoft.com/office/drawing/2014/main" id="{F50557A8-8943-F711-C854-1442083C28F3}"/>
+              </a:ext>
+            </a:extLst>
+          </p:cNvPr>
+          <p:cNvSpPr/>
           <p:nvPr/>
         </p:nvSpPr>
         <p:spPr>
           <a:xfrm>
-            <a:off x="275847" y="161432"/>
-            <a:ext cx="11410545" cy="369332"/>
+            <a:off x="2558980" y="1075172"/>
+            <a:ext cx="7074040" cy="5576837"/>
           </a:xfrm>
           <a:prstGeom prst="rect">
             <a:avLst/>
           </a:prstGeom>
           <a:noFill/>
         </p:spPr>
+        <p:style>
+          <a:lnRef idx="2">
+            <a:schemeClr val="accent1">
+              <a:shade val="15000"/>
+            </a:schemeClr>
+          </a:lnRef>
+          <a:fillRef idx="1">
+            <a:schemeClr val="accent1"/>
+          </a:fillRef>
+          <a:effectRef idx="0">
+            <a:schemeClr val="accent1"/>
+          </a:effectRef>
+          <a:fontRef idx="minor">
+            <a:schemeClr val="lt1"/>
+          </a:fontRef>
+        </p:style>
+        <p:txBody>
+          <a:bodyPr rtlCol="0" anchor="ctr"/>
+          <a:lstStyle/>
+          <a:p>
+            <a:pPr algn="ctr"/>
+            <a:endParaRPr lang="en-US" dirty="0"/>
+          </a:p>
+        </p:txBody>
+      </p:sp>
+      <p:sp>
+        <p:nvSpPr>
+          <p:cNvPr id="15" name="Rectangle 14">
+            <a:extLst>
+              <a:ext uri="{FF2B5EF4-FFF2-40B4-BE49-F238E27FC236}">
+                <a16:creationId xmlns:a16="http://schemas.microsoft.com/office/drawing/2014/main" id="{2F28C8CE-0641-4BDC-3993-118AA2F43F1D}"/>
+              </a:ext>
+            </a:extLst>
+          </p:cNvPr>
+          <p:cNvSpPr/>
+          <p:nvPr/>
+        </p:nvSpPr>
+        <p:spPr>
+          <a:xfrm>
+            <a:off x="242835" y="200966"/>
+            <a:ext cx="11706330" cy="874206"/>
+          </a:xfrm>
+          <a:prstGeom prst="rect">
+            <a:avLst/>
+          </a:prstGeom>
+          <a:noFill/>
+        </p:spPr>
+        <p:style>
+          <a:lnRef idx="2">
+            <a:schemeClr val="accent1">
+              <a:shade val="15000"/>
+            </a:schemeClr>
+          </a:lnRef>
+          <a:fillRef idx="1">
+            <a:schemeClr val="accent1"/>
+          </a:fillRef>
+          <a:effectRef idx="0">
+            <a:schemeClr val="accent1"/>
+          </a:effectRef>
+          <a:fontRef idx="minor">
+            <a:schemeClr val="lt1"/>
+          </a:fontRef>
+        </p:style>
+        <p:txBody>
+          <a:bodyPr rtlCol="0" anchor="ctr"/>
+          <a:lstStyle/>
+          <a:p>
+            <a:pPr algn="ctr"/>
+            <a:r>
+              <a:rPr lang="en-US" dirty="0">
+                <a:solidFill>
+                  <a:schemeClr val="tx1"/>
+                </a:solidFill>
+              </a:rPr>
+              <a:t>Word Breakdown</a:t>
+            </a:r>
+          </a:p>
+        </p:txBody>
+      </p:sp>
+      <p:sp>
+        <p:nvSpPr>
+          <p:cNvPr id="17" name="TextBox 16">
+            <a:extLst>
+              <a:ext uri="{FF2B5EF4-FFF2-40B4-BE49-F238E27FC236}">
+                <a16:creationId xmlns:a16="http://schemas.microsoft.com/office/drawing/2014/main" id="{60FBE9E0-78AB-01C4-4EFD-FD36C0881FF1}"/>
+              </a:ext>
+            </a:extLst>
+          </p:cNvPr>
+          <p:cNvSpPr txBox="1"/>
+          <p:nvPr/>
+        </p:nvSpPr>
+        <p:spPr>
+          <a:xfrm>
+            <a:off x="2659463" y="1131618"/>
+            <a:ext cx="6873073" cy="3139321"/>
+          </a:xfrm>
+          <a:prstGeom prst="rect">
+            <a:avLst/>
+          </a:prstGeom>
+          <a:noFill/>
+        </p:spPr>
         <p:txBody>
           <a:bodyPr wrap="square" rtlCol="0">
             <a:spAutoFit/>
@@ -5637,28 +7471,141 @@
           <a:lstStyle/>
           <a:p>
             <a:r>
-              <a:rPr lang="en-US" sz="1800" dirty="0">
-                <a:effectLst/>
-                <a:latin typeface="Calibri" panose="020F0502020204030204" pitchFamily="34" charset="0"/>
-                <a:ea typeface="Calibri" panose="020F0502020204030204" pitchFamily="34" charset="0"/>
-                <a:cs typeface="Times New Roman" panose="02020603050405020304" pitchFamily="18" charset="0"/>
-              </a:rPr>
-              <a:t>Users API</a:t>
-            </a:r>
+              <a:rPr lang="en-US" dirty="0"/>
+              <a:t>Username: SteveVaz123</a:t>
+            </a:r>
+          </a:p>
+          <a:p>
+            <a:r>
+              <a:rPr lang="en-US" dirty="0" err="1"/>
+              <a:t>UserId</a:t>
+            </a:r>
+            <a:r>
+              <a:rPr lang="en-US" dirty="0"/>
+              <a:t>: 1111-1111-1111-1111</a:t>
+            </a:r>
+          </a:p>
+          <a:p>
+            <a:r>
+              <a:rPr lang="en-US" dirty="0"/>
+              <a:t>Post Name:</a:t>
+            </a:r>
+          </a:p>
+          <a:p>
+            <a:r>
+              <a:rPr lang="en-US" dirty="0"/>
+              <a:t>Post Id:</a:t>
+            </a:r>
+          </a:p>
+          <a:p>
+            <a:pPr algn="ctr"/>
+            <a:r>
+              <a:rPr lang="en-US" u="sng" dirty="0"/>
+              <a:t>Word : Count</a:t>
+            </a:r>
+          </a:p>
+          <a:p>
+            <a:pPr algn="ctr"/>
+            <a:r>
+              <a:rPr lang="en-US" dirty="0"/>
+              <a:t>this    :    1</a:t>
+            </a:r>
+          </a:p>
+          <a:p>
+            <a:pPr algn="ctr"/>
+            <a:r>
+              <a:rPr lang="en-US" dirty="0"/>
+              <a:t>is       :    1 </a:t>
+            </a:r>
+          </a:p>
+          <a:p>
+            <a:pPr algn="ctr"/>
+            <a:r>
+              <a:rPr lang="en-US" dirty="0"/>
+              <a:t>a        :    1</a:t>
+            </a:r>
+          </a:p>
+          <a:p>
+            <a:pPr algn="ctr"/>
+            <a:r>
+              <a:rPr lang="en-US" dirty="0"/>
+              <a:t>user   :    1</a:t>
+            </a:r>
+          </a:p>
+          <a:p>
+            <a:pPr algn="ctr"/>
+            <a:r>
+              <a:rPr lang="en-US" dirty="0"/>
+              <a:t>post   :    1</a:t>
+            </a:r>
+          </a:p>
+          <a:p>
             <a:endParaRPr lang="en-US" dirty="0"/>
+          </a:p>
+        </p:txBody>
+      </p:sp>
+      <p:sp>
+        <p:nvSpPr>
+          <p:cNvPr id="2" name="Action Button: Go Home 1">
+            <a:hlinkClick r:id="" action="ppaction://hlinkshowjump?jump=firstslide" highlightClick="1"/>
+            <a:extLst>
+              <a:ext uri="{FF2B5EF4-FFF2-40B4-BE49-F238E27FC236}">
+                <a16:creationId xmlns:a16="http://schemas.microsoft.com/office/drawing/2014/main" id="{5A70DF2C-21CE-AF3F-F5A7-6BCEC5F648EA}"/>
+              </a:ext>
+            </a:extLst>
+          </p:cNvPr>
+          <p:cNvSpPr/>
+          <p:nvPr/>
+        </p:nvSpPr>
+        <p:spPr>
+          <a:xfrm>
+            <a:off x="385188" y="396280"/>
+            <a:ext cx="619648" cy="506187"/>
+          </a:xfrm>
+          <a:prstGeom prst="actionButtonHome">
+            <a:avLst/>
+          </a:prstGeom>
+        </p:spPr>
+        <p:style>
+          <a:lnRef idx="2">
+            <a:schemeClr val="accent1">
+              <a:shade val="15000"/>
+            </a:schemeClr>
+          </a:lnRef>
+          <a:fillRef idx="1">
+            <a:schemeClr val="accent1"/>
+          </a:fillRef>
+          <a:effectRef idx="0">
+            <a:schemeClr val="accent1"/>
+          </a:effectRef>
+          <a:fontRef idx="minor">
+            <a:schemeClr val="lt1"/>
+          </a:fontRef>
+        </p:style>
+        <p:txBody>
+          <a:bodyPr rtlCol="0" anchor="ctr"/>
+          <a:lstStyle/>
+          <a:p>
+            <a:pPr algn="ctr"/>
+            <a:endParaRPr lang="en-US"/>
           </a:p>
         </p:txBody>
       </p:sp>
     </p:spTree>
     <p:extLst>
       <p:ext uri="{BB962C8B-B14F-4D97-AF65-F5344CB8AC3E}">
-        <p14:creationId xmlns:p14="http://schemas.microsoft.com/office/powerpoint/2010/main" val="893954284"/>
+        <p14:creationId xmlns:p14="http://schemas.microsoft.com/office/powerpoint/2010/main" val="806163125"/>
       </p:ext>
     </p:extLst>
   </p:cSld>
   <p:clrMapOvr>
     <a:masterClrMapping/>
   </p:clrMapOvr>
+  <p:extLst>
+    <p:ext uri="{6950BFC3-D8DA-4A85-94F7-54DA5524770B}">
+      <p188:commentRel xmlns:p188="http://schemas.microsoft.com/office/powerpoint/2018/8/main" r:id="rId2"/>
+    </p:ext>
+  </p:extLst>
 </p:sld>
 </file>
 
@@ -5694,7 +7641,7 @@
         <p:spPr>
           <a:xfrm>
             <a:off x="275846" y="765589"/>
-            <a:ext cx="11410545" cy="1971374"/>
+            <a:ext cx="11410545" cy="3966150"/>
           </a:xfrm>
           <a:prstGeom prst="rect">
             <a:avLst/>
@@ -5719,13 +7666,21 @@
               </a:spcAft>
             </a:pPr>
             <a:r>
+              <a:rPr lang="en-US" kern="100" dirty="0">
+                <a:latin typeface="Calibri" panose="020F0502020204030204" pitchFamily="34" charset="0"/>
+                <a:ea typeface="Calibri" panose="020F0502020204030204" pitchFamily="34" charset="0"/>
+                <a:cs typeface="Times New Roman" panose="02020603050405020304" pitchFamily="18" charset="0"/>
+              </a:rPr>
+              <a:t>- </a:t>
+            </a:r>
+            <a:r>
               <a:rPr lang="en-US" sz="1800" kern="100" dirty="0">
                 <a:effectLst/>
                 <a:latin typeface="Calibri" panose="020F0502020204030204" pitchFamily="34" charset="0"/>
                 <a:ea typeface="Calibri" panose="020F0502020204030204" pitchFamily="34" charset="0"/>
                 <a:cs typeface="Times New Roman" panose="02020603050405020304" pitchFamily="18" charset="0"/>
               </a:rPr>
-              <a:t>Needs following endpoints:</a:t>
+              <a:t>There should be some button that navigates user to event creation form or area</a:t>
             </a:r>
           </a:p>
           <a:p>
@@ -5746,17 +7701,10 @@
                 <a:ea typeface="Calibri" panose="020F0502020204030204" pitchFamily="34" charset="0"/>
                 <a:cs typeface="Times New Roman" panose="02020603050405020304" pitchFamily="18" charset="0"/>
               </a:rPr>
-              <a:t>- GET </a:t>
-            </a:r>
-            <a:r>
-              <a:rPr lang="en-US" kern="100" dirty="0" err="1">
-                <a:latin typeface="Calibri" panose="020F0502020204030204" pitchFamily="34" charset="0"/>
-                <a:ea typeface="Calibri" panose="020F0502020204030204" pitchFamily="34" charset="0"/>
-                <a:cs typeface="Times New Roman" panose="02020603050405020304" pitchFamily="18" charset="0"/>
-              </a:rPr>
-              <a:t>allPosts</a:t>
-            </a:r>
-            <a:endParaRPr lang="en-US" kern="100" dirty="0">
+              <a:t>	- Event location field should implement search and filter when user attempts entering location</a:t>
+            </a:r>
+            <a:endParaRPr lang="en-US" sz="1800" kern="100" dirty="0">
+              <a:effectLst/>
               <a:latin typeface="Calibri" panose="020F0502020204030204" pitchFamily="34" charset="0"/>
               <a:ea typeface="Calibri" panose="020F0502020204030204" pitchFamily="34" charset="0"/>
               <a:cs typeface="Times New Roman" panose="02020603050405020304" pitchFamily="18" charset="0"/>
@@ -5781,23 +7729,8 @@
                 <a:ea typeface="Calibri" panose="020F0502020204030204" pitchFamily="34" charset="0"/>
                 <a:cs typeface="Times New Roman" panose="02020603050405020304" pitchFamily="18" charset="0"/>
               </a:rPr>
-              <a:t>- GET </a:t>
-            </a:r>
-            <a:r>
-              <a:rPr lang="en-US" sz="1800" kern="100" dirty="0" err="1">
-                <a:effectLst/>
-                <a:latin typeface="Calibri" panose="020F0502020204030204" pitchFamily="34" charset="0"/>
-                <a:ea typeface="Calibri" panose="020F0502020204030204" pitchFamily="34" charset="0"/>
-                <a:cs typeface="Times New Roman" panose="02020603050405020304" pitchFamily="18" charset="0"/>
-              </a:rPr>
-              <a:t>postById</a:t>
-            </a:r>
-            <a:endParaRPr lang="en-US" sz="1800" kern="100" dirty="0">
-              <a:effectLst/>
-              <a:latin typeface="Calibri" panose="020F0502020204030204" pitchFamily="34" charset="0"/>
-              <a:ea typeface="Calibri" panose="020F0502020204030204" pitchFamily="34" charset="0"/>
-              <a:cs typeface="Times New Roman" panose="02020603050405020304" pitchFamily="18" charset="0"/>
-            </a:endParaRPr>
+              <a:t>	- There should be some button that allows users to post (if user logged in)</a:t>
+            </a:r>
           </a:p>
           <a:p>
             <a:pPr marL="0" marR="0">
@@ -5812,26 +7745,14 @@
               </a:spcAft>
             </a:pPr>
             <a:r>
-              <a:rPr lang="en-US" kern="100" dirty="0">
-                <a:latin typeface="Calibri" panose="020F0502020204030204" pitchFamily="34" charset="0"/>
-                <a:ea typeface="Calibri" panose="020F0502020204030204" pitchFamily="34" charset="0"/>
-                <a:cs typeface="Times New Roman" panose="02020603050405020304" pitchFamily="18" charset="0"/>
-              </a:rPr>
-              <a:t>- POST </a:t>
-            </a:r>
-            <a:r>
-              <a:rPr lang="en-US" kern="100" dirty="0" err="1">
-                <a:latin typeface="Calibri" panose="020F0502020204030204" pitchFamily="34" charset="0"/>
-                <a:ea typeface="Calibri" panose="020F0502020204030204" pitchFamily="34" charset="0"/>
-                <a:cs typeface="Times New Roman" panose="02020603050405020304" pitchFamily="18" charset="0"/>
-              </a:rPr>
-              <a:t>createPost</a:t>
-            </a:r>
-            <a:endParaRPr lang="en-US" kern="100" dirty="0">
-              <a:latin typeface="Calibri" panose="020F0502020204030204" pitchFamily="34" charset="0"/>
-              <a:ea typeface="Calibri" panose="020F0502020204030204" pitchFamily="34" charset="0"/>
-              <a:cs typeface="Times New Roman" panose="02020603050405020304" pitchFamily="18" charset="0"/>
-            </a:endParaRPr>
+              <a:rPr lang="en-US" sz="1800" kern="100" dirty="0">
+                <a:effectLst/>
+                <a:latin typeface="Calibri" panose="020F0502020204030204" pitchFamily="34" charset="0"/>
+                <a:ea typeface="Calibri" panose="020F0502020204030204" pitchFamily="34" charset="0"/>
+                <a:cs typeface="Times New Roman" panose="02020603050405020304" pitchFamily="18" charset="0"/>
+              </a:rPr>
+              <a:t>- Event data should contain:</a:t>
+            </a:r>
           </a:p>
           <a:p>
             <a:pPr marL="0" marR="0">
@@ -5851,21 +7772,153 @@
                 <a:ea typeface="Calibri" panose="020F0502020204030204" pitchFamily="34" charset="0"/>
                 <a:cs typeface="Times New Roman" panose="02020603050405020304" pitchFamily="18" charset="0"/>
               </a:rPr>
-              <a:t>- DELETE </a:t>
-            </a:r>
-            <a:r>
-              <a:rPr lang="en-US" kern="100" dirty="0" err="1">
-                <a:latin typeface="Calibri" panose="020F0502020204030204" pitchFamily="34" charset="0"/>
-                <a:ea typeface="Calibri" panose="020F0502020204030204" pitchFamily="34" charset="0"/>
-                <a:cs typeface="Times New Roman" panose="02020603050405020304" pitchFamily="18" charset="0"/>
-              </a:rPr>
-              <a:t>removePost</a:t>
-            </a:r>
-            <a:endParaRPr lang="en-US" kern="100" dirty="0">
+              <a:t>	- event Name</a:t>
+            </a:r>
+            <a:endParaRPr lang="en-US" sz="1800" kern="100" dirty="0">
+              <a:effectLst/>
               <a:latin typeface="Calibri" panose="020F0502020204030204" pitchFamily="34" charset="0"/>
               <a:ea typeface="Calibri" panose="020F0502020204030204" pitchFamily="34" charset="0"/>
               <a:cs typeface="Times New Roman" panose="02020603050405020304" pitchFamily="18" charset="0"/>
             </a:endParaRPr>
+          </a:p>
+          <a:p>
+            <a:pPr marL="0" marR="0">
+              <a:lnSpc>
+                <a:spcPct val="107000"/>
+              </a:lnSpc>
+              <a:spcBef>
+                <a:spcPts val="0"/>
+              </a:spcBef>
+              <a:spcAft>
+                <a:spcPts val="800"/>
+              </a:spcAft>
+            </a:pPr>
+            <a:r>
+              <a:rPr lang="en-US" kern="100" dirty="0">
+                <a:latin typeface="Calibri" panose="020F0502020204030204" pitchFamily="34" charset="0"/>
+                <a:ea typeface="Calibri" panose="020F0502020204030204" pitchFamily="34" charset="0"/>
+                <a:cs typeface="Times New Roman" panose="02020603050405020304" pitchFamily="18" charset="0"/>
+              </a:rPr>
+              <a:t>	- event ID</a:t>
+            </a:r>
+            <a:endParaRPr lang="en-US" sz="1800" kern="100" dirty="0">
+              <a:effectLst/>
+              <a:latin typeface="Calibri" panose="020F0502020204030204" pitchFamily="34" charset="0"/>
+              <a:ea typeface="Calibri" panose="020F0502020204030204" pitchFamily="34" charset="0"/>
+              <a:cs typeface="Times New Roman" panose="02020603050405020304" pitchFamily="18" charset="0"/>
+            </a:endParaRPr>
+          </a:p>
+          <a:p>
+            <a:pPr marL="0" marR="0">
+              <a:lnSpc>
+                <a:spcPct val="107000"/>
+              </a:lnSpc>
+              <a:spcBef>
+                <a:spcPts val="0"/>
+              </a:spcBef>
+              <a:spcAft>
+                <a:spcPts val="800"/>
+              </a:spcAft>
+            </a:pPr>
+            <a:r>
+              <a:rPr lang="en-US" kern="100" dirty="0">
+                <a:latin typeface="Calibri" panose="020F0502020204030204" pitchFamily="34" charset="0"/>
+                <a:ea typeface="Calibri" panose="020F0502020204030204" pitchFamily="34" charset="0"/>
+                <a:cs typeface="Times New Roman" panose="02020603050405020304" pitchFamily="18" charset="0"/>
+              </a:rPr>
+              <a:t>	- </a:t>
+            </a:r>
+            <a:r>
+              <a:rPr lang="en-US" sz="1800" kern="100" dirty="0">
+                <a:effectLst/>
+                <a:latin typeface="Calibri" panose="020F0502020204030204" pitchFamily="34" charset="0"/>
+                <a:ea typeface="Calibri" panose="020F0502020204030204" pitchFamily="34" charset="0"/>
+                <a:cs typeface="Times New Roman" panose="02020603050405020304" pitchFamily="18" charset="0"/>
+              </a:rPr>
+              <a:t>event location</a:t>
+            </a:r>
+          </a:p>
+          <a:p>
+            <a:pPr marL="0" marR="0">
+              <a:lnSpc>
+                <a:spcPct val="107000"/>
+              </a:lnSpc>
+              <a:spcBef>
+                <a:spcPts val="0"/>
+              </a:spcBef>
+              <a:spcAft>
+                <a:spcPts val="800"/>
+              </a:spcAft>
+            </a:pPr>
+            <a:r>
+              <a:rPr lang="en-US" sz="1800" kern="100" dirty="0">
+                <a:effectLst/>
+                <a:latin typeface="Calibri" panose="020F0502020204030204" pitchFamily="34" charset="0"/>
+                <a:ea typeface="Calibri" panose="020F0502020204030204" pitchFamily="34" charset="0"/>
+                <a:cs typeface="Times New Roman" panose="02020603050405020304" pitchFamily="18" charset="0"/>
+              </a:rPr>
+              <a:t>	- event time</a:t>
+            </a:r>
+          </a:p>
+          <a:p>
+            <a:pPr marL="0" marR="0">
+              <a:lnSpc>
+                <a:spcPct val="107000"/>
+              </a:lnSpc>
+              <a:spcBef>
+                <a:spcPts val="0"/>
+              </a:spcBef>
+              <a:spcAft>
+                <a:spcPts val="800"/>
+              </a:spcAft>
+            </a:pPr>
+            <a:r>
+              <a:rPr lang="en-US" kern="100" dirty="0">
+                <a:latin typeface="Calibri" panose="020F0502020204030204" pitchFamily="34" charset="0"/>
+                <a:ea typeface="Calibri" panose="020F0502020204030204" pitchFamily="34" charset="0"/>
+                <a:cs typeface="Times New Roman" panose="02020603050405020304" pitchFamily="18" charset="0"/>
+              </a:rPr>
+              <a:t>	- a</a:t>
+            </a:r>
+            <a:r>
+              <a:rPr lang="en-US" sz="1800" kern="100" dirty="0">
+                <a:effectLst/>
+                <a:latin typeface="Calibri" panose="020F0502020204030204" pitchFamily="34" charset="0"/>
+                <a:ea typeface="Calibri" panose="020F0502020204030204" pitchFamily="34" charset="0"/>
+                <a:cs typeface="Times New Roman" panose="02020603050405020304" pitchFamily="18" charset="0"/>
+              </a:rPr>
+              <a:t>rea to upload banner image</a:t>
+            </a:r>
+          </a:p>
+          <a:p>
+            <a:pPr marL="0" marR="0">
+              <a:lnSpc>
+                <a:spcPct val="107000"/>
+              </a:lnSpc>
+              <a:spcBef>
+                <a:spcPts val="0"/>
+              </a:spcBef>
+              <a:spcAft>
+                <a:spcPts val="800"/>
+              </a:spcAft>
+            </a:pPr>
+            <a:r>
+              <a:rPr lang="en-US" kern="100" dirty="0">
+                <a:latin typeface="Calibri" panose="020F0502020204030204" pitchFamily="34" charset="0"/>
+                <a:ea typeface="Calibri" panose="020F0502020204030204" pitchFamily="34" charset="0"/>
+                <a:cs typeface="Times New Roman" panose="02020603050405020304" pitchFamily="18" charset="0"/>
+              </a:rPr>
+              <a:t>	- </a:t>
+            </a:r>
+            <a:r>
+              <a:rPr lang="en-US" sz="1800" kern="100" dirty="0">
+                <a:effectLst/>
+                <a:latin typeface="Calibri" panose="020F0502020204030204" pitchFamily="34" charset="0"/>
+                <a:ea typeface="Calibri" panose="020F0502020204030204" pitchFamily="34" charset="0"/>
+                <a:cs typeface="Times New Roman" panose="02020603050405020304" pitchFamily="18" charset="0"/>
+              </a:rPr>
+              <a:t>participants list</a:t>
+            </a:r>
           </a:p>
         </p:txBody>
       </p:sp>
@@ -5904,7 +7957,7 @@
                 <a:ea typeface="Calibri" panose="020F0502020204030204" pitchFamily="34" charset="0"/>
                 <a:cs typeface="Times New Roman" panose="02020603050405020304" pitchFamily="18" charset="0"/>
               </a:rPr>
-              <a:t>Posts API</a:t>
+              <a:t>Event post area</a:t>
             </a:r>
             <a:endParaRPr lang="en-US" dirty="0"/>
           </a:p>
@@ -5913,7 +7966,7 @@
     </p:spTree>
     <p:extLst>
       <p:ext uri="{BB962C8B-B14F-4D97-AF65-F5344CB8AC3E}">
-        <p14:creationId xmlns:p14="http://schemas.microsoft.com/office/powerpoint/2010/main" val="2446073456"/>
+        <p14:creationId xmlns:p14="http://schemas.microsoft.com/office/powerpoint/2010/main" val="465416167"/>
       </p:ext>
     </p:extLst>
   </p:cSld>

</xml_diff>

<commit_message>
finished breaking up the project into the tasks I think make sense to complete it
</commit_message>
<xml_diff>
--- a/Documents/final_project_planning.pptx
+++ b/Documents/final_project_planning.pptx
@@ -7,17 +7,19 @@
   <p:sldIdLst>
     <p:sldId id="256" r:id="rId2"/>
     <p:sldId id="257" r:id="rId3"/>
-    <p:sldId id="258" r:id="rId4"/>
-    <p:sldId id="259" r:id="rId5"/>
-    <p:sldId id="265" r:id="rId6"/>
-    <p:sldId id="267" r:id="rId7"/>
-    <p:sldId id="269" r:id="rId8"/>
-    <p:sldId id="268" r:id="rId9"/>
-    <p:sldId id="260" r:id="rId10"/>
-    <p:sldId id="266" r:id="rId11"/>
-    <p:sldId id="262" r:id="rId12"/>
-    <p:sldId id="263" r:id="rId13"/>
-    <p:sldId id="264" r:id="rId14"/>
+    <p:sldId id="267" r:id="rId4"/>
+    <p:sldId id="258" r:id="rId5"/>
+    <p:sldId id="259" r:id="rId6"/>
+    <p:sldId id="265" r:id="rId7"/>
+    <p:sldId id="271" r:id="rId8"/>
+    <p:sldId id="269" r:id="rId9"/>
+    <p:sldId id="268" r:id="rId10"/>
+    <p:sldId id="260" r:id="rId11"/>
+    <p:sldId id="266" r:id="rId12"/>
+    <p:sldId id="262" r:id="rId13"/>
+    <p:sldId id="263" r:id="rId14"/>
+    <p:sldId id="264" r:id="rId15"/>
+    <p:sldId id="270" r:id="rId16"/>
   </p:sldIdLst>
   <p:sldSz cx="12192000" cy="6858000"/>
   <p:notesSz cx="6858000" cy="9144000"/>
@@ -321,7 +323,7 @@
           <a:p>
             <a:fld id="{9F87B9EB-8124-4FED-A4DC-BE4B0CC78498}" type="datetimeFigureOut">
               <a:rPr lang="en-US" smtClean="0"/>
-              <a:t>11/5/2023</a:t>
+              <a:t>11/6/2023</a:t>
             </a:fld>
             <a:endParaRPr lang="en-US"/>
           </a:p>
@@ -519,7 +521,7 @@
           <a:p>
             <a:fld id="{9F87B9EB-8124-4FED-A4DC-BE4B0CC78498}" type="datetimeFigureOut">
               <a:rPr lang="en-US" smtClean="0"/>
-              <a:t>11/5/2023</a:t>
+              <a:t>11/6/2023</a:t>
             </a:fld>
             <a:endParaRPr lang="en-US"/>
           </a:p>
@@ -727,7 +729,7 @@
           <a:p>
             <a:fld id="{9F87B9EB-8124-4FED-A4DC-BE4B0CC78498}" type="datetimeFigureOut">
               <a:rPr lang="en-US" smtClean="0"/>
-              <a:t>11/5/2023</a:t>
+              <a:t>11/6/2023</a:t>
             </a:fld>
             <a:endParaRPr lang="en-US"/>
           </a:p>
@@ -925,7 +927,7 @@
           <a:p>
             <a:fld id="{9F87B9EB-8124-4FED-A4DC-BE4B0CC78498}" type="datetimeFigureOut">
               <a:rPr lang="en-US" smtClean="0"/>
-              <a:t>11/5/2023</a:t>
+              <a:t>11/6/2023</a:t>
             </a:fld>
             <a:endParaRPr lang="en-US"/>
           </a:p>
@@ -1200,7 +1202,7 @@
           <a:p>
             <a:fld id="{9F87B9EB-8124-4FED-A4DC-BE4B0CC78498}" type="datetimeFigureOut">
               <a:rPr lang="en-US" smtClean="0"/>
-              <a:t>11/5/2023</a:t>
+              <a:t>11/6/2023</a:t>
             </a:fld>
             <a:endParaRPr lang="en-US"/>
           </a:p>
@@ -1465,7 +1467,7 @@
           <a:p>
             <a:fld id="{9F87B9EB-8124-4FED-A4DC-BE4B0CC78498}" type="datetimeFigureOut">
               <a:rPr lang="en-US" smtClean="0"/>
-              <a:t>11/5/2023</a:t>
+              <a:t>11/6/2023</a:t>
             </a:fld>
             <a:endParaRPr lang="en-US"/>
           </a:p>
@@ -1877,7 +1879,7 @@
           <a:p>
             <a:fld id="{9F87B9EB-8124-4FED-A4DC-BE4B0CC78498}" type="datetimeFigureOut">
               <a:rPr lang="en-US" smtClean="0"/>
-              <a:t>11/5/2023</a:t>
+              <a:t>11/6/2023</a:t>
             </a:fld>
             <a:endParaRPr lang="en-US"/>
           </a:p>
@@ -2018,7 +2020,7 @@
           <a:p>
             <a:fld id="{9F87B9EB-8124-4FED-A4DC-BE4B0CC78498}" type="datetimeFigureOut">
               <a:rPr lang="en-US" smtClean="0"/>
-              <a:t>11/5/2023</a:t>
+              <a:t>11/6/2023</a:t>
             </a:fld>
             <a:endParaRPr lang="en-US"/>
           </a:p>
@@ -2131,7 +2133,7 @@
           <a:p>
             <a:fld id="{9F87B9EB-8124-4FED-A4DC-BE4B0CC78498}" type="datetimeFigureOut">
               <a:rPr lang="en-US" smtClean="0"/>
-              <a:t>11/5/2023</a:t>
+              <a:t>11/6/2023</a:t>
             </a:fld>
             <a:endParaRPr lang="en-US"/>
           </a:p>
@@ -2442,7 +2444,7 @@
           <a:p>
             <a:fld id="{9F87B9EB-8124-4FED-A4DC-BE4B0CC78498}" type="datetimeFigureOut">
               <a:rPr lang="en-US" smtClean="0"/>
-              <a:t>11/5/2023</a:t>
+              <a:t>11/6/2023</a:t>
             </a:fld>
             <a:endParaRPr lang="en-US"/>
           </a:p>
@@ -2730,7 +2732,7 @@
           <a:p>
             <a:fld id="{9F87B9EB-8124-4FED-A4DC-BE4B0CC78498}" type="datetimeFigureOut">
               <a:rPr lang="en-US" smtClean="0"/>
-              <a:t>11/5/2023</a:t>
+              <a:t>11/6/2023</a:t>
             </a:fld>
             <a:endParaRPr lang="en-US"/>
           </a:p>
@@ -2971,7 +2973,7 @@
           <a:p>
             <a:fld id="{9F87B9EB-8124-4FED-A4DC-BE4B0CC78498}" type="datetimeFigureOut">
               <a:rPr lang="en-US" smtClean="0"/>
-              <a:t>11/5/2023</a:t>
+              <a:t>11/6/2023</a:t>
             </a:fld>
             <a:endParaRPr lang="en-US"/>
           </a:p>
@@ -3578,7 +3580,7 @@
         <p:spPr>
           <a:xfrm>
             <a:off x="275846" y="765589"/>
-            <a:ext cx="11410545" cy="2769284"/>
+            <a:ext cx="11410545" cy="3966150"/>
           </a:xfrm>
           <a:prstGeom prst="rect">
             <a:avLst/>
@@ -3617,7 +3619,7 @@
                 <a:ea typeface="Calibri" panose="020F0502020204030204" pitchFamily="34" charset="0"/>
                 <a:cs typeface="Times New Roman" panose="02020603050405020304" pitchFamily="18" charset="0"/>
               </a:rPr>
-              <a:t>Event post should display:</a:t>
+              <a:t>There should be some button that navigates user to event creation form or area</a:t>
             </a:r>
           </a:p>
           <a:p>
@@ -3638,8 +3640,14 @@
                 <a:ea typeface="Calibri" panose="020F0502020204030204" pitchFamily="34" charset="0"/>
                 <a:cs typeface="Times New Roman" panose="02020603050405020304" pitchFamily="18" charset="0"/>
               </a:rPr>
-              <a:t>	- event Name </a:t>
-            </a:r>
+              <a:t>	- Event location field should implement search and filter when user attempts entering location</a:t>
+            </a:r>
+            <a:endParaRPr lang="en-US" sz="1800" kern="100" dirty="0">
+              <a:effectLst/>
+              <a:latin typeface="Calibri" panose="020F0502020204030204" pitchFamily="34" charset="0"/>
+              <a:ea typeface="Calibri" panose="020F0502020204030204" pitchFamily="34" charset="0"/>
+              <a:cs typeface="Times New Roman" panose="02020603050405020304" pitchFamily="18" charset="0"/>
+            </a:endParaRPr>
           </a:p>
           <a:p>
             <a:pPr marL="0" marR="0">
@@ -3654,12 +3662,13 @@
               </a:spcAft>
             </a:pPr>
             <a:r>
-              <a:rPr lang="en-US" kern="100" dirty="0">
-                <a:latin typeface="Calibri" panose="020F0502020204030204" pitchFamily="34" charset="0"/>
-                <a:ea typeface="Calibri" panose="020F0502020204030204" pitchFamily="34" charset="0"/>
-                <a:cs typeface="Times New Roman" panose="02020603050405020304" pitchFamily="18" charset="0"/>
-              </a:rPr>
-              <a:t>	- event ID</a:t>
+              <a:rPr lang="en-US" sz="1800" kern="100" dirty="0">
+                <a:effectLst/>
+                <a:latin typeface="Calibri" panose="020F0502020204030204" pitchFamily="34" charset="0"/>
+                <a:ea typeface="Calibri" panose="020F0502020204030204" pitchFamily="34" charset="0"/>
+                <a:cs typeface="Times New Roman" panose="02020603050405020304" pitchFamily="18" charset="0"/>
+              </a:rPr>
+              <a:t>	- There should be some button that allows users to post (if user logged in)</a:t>
             </a:r>
           </a:p>
           <a:p>
@@ -3681,7 +3690,7 @@
                 <a:ea typeface="Calibri" panose="020F0502020204030204" pitchFamily="34" charset="0"/>
                 <a:cs typeface="Times New Roman" panose="02020603050405020304" pitchFamily="18" charset="0"/>
               </a:rPr>
-              <a:t>	- location</a:t>
+              <a:t>- Event data should contain:</a:t>
             </a:r>
           </a:p>
           <a:p>
@@ -3702,8 +3711,14 @@
                 <a:ea typeface="Calibri" panose="020F0502020204030204" pitchFamily="34" charset="0"/>
                 <a:cs typeface="Times New Roman" panose="02020603050405020304" pitchFamily="18" charset="0"/>
               </a:rPr>
-              <a:t>	- time</a:t>
-            </a:r>
+              <a:t>	- event Name</a:t>
+            </a:r>
+            <a:endParaRPr lang="en-US" sz="1800" kern="100" dirty="0">
+              <a:effectLst/>
+              <a:latin typeface="Calibri" panose="020F0502020204030204" pitchFamily="34" charset="0"/>
+              <a:ea typeface="Calibri" panose="020F0502020204030204" pitchFamily="34" charset="0"/>
+              <a:cs typeface="Times New Roman" panose="02020603050405020304" pitchFamily="18" charset="0"/>
+            </a:endParaRPr>
           </a:p>
           <a:p>
             <a:pPr marL="0" marR="0">
@@ -3718,32 +3733,19 @@
               </a:spcAft>
             </a:pPr>
             <a:r>
-              <a:rPr lang="en-US" sz="1800" kern="100" dirty="0">
-                <a:effectLst/>
-                <a:latin typeface="Calibri" panose="020F0502020204030204" pitchFamily="34" charset="0"/>
-                <a:ea typeface="Calibri" panose="020F0502020204030204" pitchFamily="34" charset="0"/>
-                <a:cs typeface="Times New Roman" panose="02020603050405020304" pitchFamily="18" charset="0"/>
-              </a:rPr>
-              <a:t>	- participants (list </a:t>
-            </a:r>
-            <a:r>
-              <a:rPr lang="en-US" sz="1800" kern="100" dirty="0" err="1">
-                <a:effectLst/>
-                <a:latin typeface="Calibri" panose="020F0502020204030204" pitchFamily="34" charset="0"/>
-                <a:ea typeface="Calibri" panose="020F0502020204030204" pitchFamily="34" charset="0"/>
-                <a:cs typeface="Times New Roman" panose="02020603050405020304" pitchFamily="18" charset="0"/>
-              </a:rPr>
-              <a:t>userId</a:t>
-            </a:r>
-            <a:r>
-              <a:rPr lang="en-US" sz="1800" kern="100" dirty="0">
-                <a:effectLst/>
-                <a:latin typeface="Calibri" panose="020F0502020204030204" pitchFamily="34" charset="0"/>
-                <a:ea typeface="Calibri" panose="020F0502020204030204" pitchFamily="34" charset="0"/>
-                <a:cs typeface="Times New Roman" panose="02020603050405020304" pitchFamily="18" charset="0"/>
-              </a:rPr>
-              <a:t> attending)</a:t>
-            </a:r>
+              <a:rPr lang="en-US" kern="100" dirty="0">
+                <a:latin typeface="Calibri" panose="020F0502020204030204" pitchFamily="34" charset="0"/>
+                <a:ea typeface="Calibri" panose="020F0502020204030204" pitchFamily="34" charset="0"/>
+                <a:cs typeface="Times New Roman" panose="02020603050405020304" pitchFamily="18" charset="0"/>
+              </a:rPr>
+              <a:t>	- event ID</a:t>
+            </a:r>
+            <a:endParaRPr lang="en-US" sz="1800" kern="100" dirty="0">
+              <a:effectLst/>
+              <a:latin typeface="Calibri" panose="020F0502020204030204" pitchFamily="34" charset="0"/>
+              <a:ea typeface="Calibri" panose="020F0502020204030204" pitchFamily="34" charset="0"/>
+              <a:cs typeface="Times New Roman" panose="02020603050405020304" pitchFamily="18" charset="0"/>
+            </a:endParaRPr>
           </a:p>
           <a:p>
             <a:pPr marL="0" marR="0">
@@ -3763,14 +3765,99 @@
                 <a:ea typeface="Calibri" panose="020F0502020204030204" pitchFamily="34" charset="0"/>
                 <a:cs typeface="Times New Roman" panose="02020603050405020304" pitchFamily="18" charset="0"/>
               </a:rPr>
-              <a:t>	- Attending/ Remove Attending button to add/remove user from participants list</a:t>
-            </a:r>
-            <a:endParaRPr lang="en-US" sz="1800" kern="100" dirty="0">
-              <a:effectLst/>
-              <a:latin typeface="Calibri" panose="020F0502020204030204" pitchFamily="34" charset="0"/>
-              <a:ea typeface="Calibri" panose="020F0502020204030204" pitchFamily="34" charset="0"/>
-              <a:cs typeface="Times New Roman" panose="02020603050405020304" pitchFamily="18" charset="0"/>
-            </a:endParaRPr>
+              <a:t>	- </a:t>
+            </a:r>
+            <a:r>
+              <a:rPr lang="en-US" sz="1800" kern="100" dirty="0">
+                <a:effectLst/>
+                <a:latin typeface="Calibri" panose="020F0502020204030204" pitchFamily="34" charset="0"/>
+                <a:ea typeface="Calibri" panose="020F0502020204030204" pitchFamily="34" charset="0"/>
+                <a:cs typeface="Times New Roman" panose="02020603050405020304" pitchFamily="18" charset="0"/>
+              </a:rPr>
+              <a:t>event location</a:t>
+            </a:r>
+          </a:p>
+          <a:p>
+            <a:pPr marL="0" marR="0">
+              <a:lnSpc>
+                <a:spcPct val="107000"/>
+              </a:lnSpc>
+              <a:spcBef>
+                <a:spcPts val="0"/>
+              </a:spcBef>
+              <a:spcAft>
+                <a:spcPts val="800"/>
+              </a:spcAft>
+            </a:pPr>
+            <a:r>
+              <a:rPr lang="en-US" sz="1800" kern="100" dirty="0">
+                <a:effectLst/>
+                <a:latin typeface="Calibri" panose="020F0502020204030204" pitchFamily="34" charset="0"/>
+                <a:ea typeface="Calibri" panose="020F0502020204030204" pitchFamily="34" charset="0"/>
+                <a:cs typeface="Times New Roman" panose="02020603050405020304" pitchFamily="18" charset="0"/>
+              </a:rPr>
+              <a:t>	- event time</a:t>
+            </a:r>
+          </a:p>
+          <a:p>
+            <a:pPr marL="0" marR="0">
+              <a:lnSpc>
+                <a:spcPct val="107000"/>
+              </a:lnSpc>
+              <a:spcBef>
+                <a:spcPts val="0"/>
+              </a:spcBef>
+              <a:spcAft>
+                <a:spcPts val="800"/>
+              </a:spcAft>
+            </a:pPr>
+            <a:r>
+              <a:rPr lang="en-US" kern="100" dirty="0">
+                <a:latin typeface="Calibri" panose="020F0502020204030204" pitchFamily="34" charset="0"/>
+                <a:ea typeface="Calibri" panose="020F0502020204030204" pitchFamily="34" charset="0"/>
+                <a:cs typeface="Times New Roman" panose="02020603050405020304" pitchFamily="18" charset="0"/>
+              </a:rPr>
+              <a:t>	- a</a:t>
+            </a:r>
+            <a:r>
+              <a:rPr lang="en-US" sz="1800" kern="100" dirty="0">
+                <a:effectLst/>
+                <a:latin typeface="Calibri" panose="020F0502020204030204" pitchFamily="34" charset="0"/>
+                <a:ea typeface="Calibri" panose="020F0502020204030204" pitchFamily="34" charset="0"/>
+                <a:cs typeface="Times New Roman" panose="02020603050405020304" pitchFamily="18" charset="0"/>
+              </a:rPr>
+              <a:t>rea to upload banner image</a:t>
+            </a:r>
+          </a:p>
+          <a:p>
+            <a:pPr marL="0" marR="0">
+              <a:lnSpc>
+                <a:spcPct val="107000"/>
+              </a:lnSpc>
+              <a:spcBef>
+                <a:spcPts val="0"/>
+              </a:spcBef>
+              <a:spcAft>
+                <a:spcPts val="800"/>
+              </a:spcAft>
+            </a:pPr>
+            <a:r>
+              <a:rPr lang="en-US" kern="100" dirty="0">
+                <a:latin typeface="Calibri" panose="020F0502020204030204" pitchFamily="34" charset="0"/>
+                <a:ea typeface="Calibri" panose="020F0502020204030204" pitchFamily="34" charset="0"/>
+                <a:cs typeface="Times New Roman" panose="02020603050405020304" pitchFamily="18" charset="0"/>
+              </a:rPr>
+              <a:t>	- </a:t>
+            </a:r>
+            <a:r>
+              <a:rPr lang="en-US" sz="1800" kern="100" dirty="0">
+                <a:effectLst/>
+                <a:latin typeface="Calibri" panose="020F0502020204030204" pitchFamily="34" charset="0"/>
+                <a:ea typeface="Calibri" panose="020F0502020204030204" pitchFamily="34" charset="0"/>
+                <a:cs typeface="Times New Roman" panose="02020603050405020304" pitchFamily="18" charset="0"/>
+              </a:rPr>
+              <a:t>participants list</a:t>
+            </a:r>
           </a:p>
         </p:txBody>
       </p:sp>
@@ -3809,7 +3896,7 @@
                 <a:ea typeface="Calibri" panose="020F0502020204030204" pitchFamily="34" charset="0"/>
                 <a:cs typeface="Times New Roman" panose="02020603050405020304" pitchFamily="18" charset="0"/>
               </a:rPr>
-              <a:t>Event display area</a:t>
+              <a:t>Event post area</a:t>
             </a:r>
             <a:endParaRPr lang="en-US" dirty="0"/>
           </a:p>
@@ -3818,7 +3905,7 @@
     </p:spTree>
     <p:extLst>
       <p:ext uri="{BB962C8B-B14F-4D97-AF65-F5344CB8AC3E}">
-        <p14:creationId xmlns:p14="http://schemas.microsoft.com/office/powerpoint/2010/main" val="3257912736"/>
+        <p14:creationId xmlns:p14="http://schemas.microsoft.com/office/powerpoint/2010/main" val="465416167"/>
       </p:ext>
     </p:extLst>
   </p:cSld>
@@ -3860,7 +3947,7 @@
         <p:spPr>
           <a:xfrm>
             <a:off x="275846" y="765589"/>
-            <a:ext cx="11410545" cy="1971374"/>
+            <a:ext cx="11410545" cy="2769284"/>
           </a:xfrm>
           <a:prstGeom prst="rect">
             <a:avLst/>
@@ -3885,13 +3972,21 @@
               </a:spcAft>
             </a:pPr>
             <a:r>
+              <a:rPr lang="en-US" kern="100" dirty="0">
+                <a:latin typeface="Calibri" panose="020F0502020204030204" pitchFamily="34" charset="0"/>
+                <a:ea typeface="Calibri" panose="020F0502020204030204" pitchFamily="34" charset="0"/>
+                <a:cs typeface="Times New Roman" panose="02020603050405020304" pitchFamily="18" charset="0"/>
+              </a:rPr>
+              <a:t>- </a:t>
+            </a:r>
+            <a:r>
               <a:rPr lang="en-US" sz="1800" kern="100" dirty="0">
                 <a:effectLst/>
                 <a:latin typeface="Calibri" panose="020F0502020204030204" pitchFamily="34" charset="0"/>
                 <a:ea typeface="Calibri" panose="020F0502020204030204" pitchFamily="34" charset="0"/>
                 <a:cs typeface="Times New Roman" panose="02020603050405020304" pitchFamily="18" charset="0"/>
               </a:rPr>
-              <a:t>Needs following endpoints:</a:t>
+              <a:t>Event post should display:</a:t>
             </a:r>
           </a:p>
           <a:p>
@@ -3912,7 +4007,7 @@
                 <a:ea typeface="Calibri" panose="020F0502020204030204" pitchFamily="34" charset="0"/>
                 <a:cs typeface="Times New Roman" panose="02020603050405020304" pitchFamily="18" charset="0"/>
               </a:rPr>
-              <a:t>- GET all users</a:t>
+              <a:t>	- event Name </a:t>
             </a:r>
           </a:p>
           <a:p>
@@ -3928,29 +4023,13 @@
               </a:spcAft>
             </a:pPr>
             <a:r>
-              <a:rPr lang="en-US" sz="1800" kern="100" dirty="0">
-                <a:effectLst/>
-                <a:latin typeface="Calibri" panose="020F0502020204030204" pitchFamily="34" charset="0"/>
-                <a:ea typeface="Calibri" panose="020F0502020204030204" pitchFamily="34" charset="0"/>
-                <a:cs typeface="Times New Roman" panose="02020603050405020304" pitchFamily="18" charset="0"/>
-              </a:rPr>
-              <a:t>- GET </a:t>
-            </a:r>
-            <a:r>
-              <a:rPr lang="en-US" sz="1800" kern="100" dirty="0" err="1">
-                <a:effectLst/>
-                <a:latin typeface="Calibri" panose="020F0502020204030204" pitchFamily="34" charset="0"/>
-                <a:ea typeface="Calibri" panose="020F0502020204030204" pitchFamily="34" charset="0"/>
-                <a:cs typeface="Times New Roman" panose="02020603050405020304" pitchFamily="18" charset="0"/>
-              </a:rPr>
-              <a:t>userById</a:t>
-            </a:r>
-            <a:endParaRPr lang="en-US" sz="1800" kern="100" dirty="0">
-              <a:effectLst/>
-              <a:latin typeface="Calibri" panose="020F0502020204030204" pitchFamily="34" charset="0"/>
-              <a:ea typeface="Calibri" panose="020F0502020204030204" pitchFamily="34" charset="0"/>
-              <a:cs typeface="Times New Roman" panose="02020603050405020304" pitchFamily="18" charset="0"/>
-            </a:endParaRPr>
+              <a:rPr lang="en-US" kern="100" dirty="0">
+                <a:latin typeface="Calibri" panose="020F0502020204030204" pitchFamily="34" charset="0"/>
+                <a:ea typeface="Calibri" panose="020F0502020204030204" pitchFamily="34" charset="0"/>
+                <a:cs typeface="Times New Roman" panose="02020603050405020304" pitchFamily="18" charset="0"/>
+              </a:rPr>
+              <a:t>	- event ID</a:t>
+            </a:r>
           </a:p>
           <a:p>
             <a:pPr marL="0" marR="0">
@@ -3965,26 +4044,14 @@
               </a:spcAft>
             </a:pPr>
             <a:r>
-              <a:rPr lang="en-US" kern="100" dirty="0">
-                <a:latin typeface="Calibri" panose="020F0502020204030204" pitchFamily="34" charset="0"/>
-                <a:ea typeface="Calibri" panose="020F0502020204030204" pitchFamily="34" charset="0"/>
-                <a:cs typeface="Times New Roman" panose="02020603050405020304" pitchFamily="18" charset="0"/>
-              </a:rPr>
-              <a:t>- POST </a:t>
-            </a:r>
-            <a:r>
-              <a:rPr lang="en-US" kern="100" dirty="0" err="1">
-                <a:latin typeface="Calibri" panose="020F0502020204030204" pitchFamily="34" charset="0"/>
-                <a:ea typeface="Calibri" panose="020F0502020204030204" pitchFamily="34" charset="0"/>
-                <a:cs typeface="Times New Roman" panose="02020603050405020304" pitchFamily="18" charset="0"/>
-              </a:rPr>
-              <a:t>createUser</a:t>
-            </a:r>
-            <a:endParaRPr lang="en-US" kern="100" dirty="0">
-              <a:latin typeface="Calibri" panose="020F0502020204030204" pitchFamily="34" charset="0"/>
-              <a:ea typeface="Calibri" panose="020F0502020204030204" pitchFamily="34" charset="0"/>
-              <a:cs typeface="Times New Roman" panose="02020603050405020304" pitchFamily="18" charset="0"/>
-            </a:endParaRPr>
+              <a:rPr lang="en-US" sz="1800" kern="100" dirty="0">
+                <a:effectLst/>
+                <a:latin typeface="Calibri" panose="020F0502020204030204" pitchFamily="34" charset="0"/>
+                <a:ea typeface="Calibri" panose="020F0502020204030204" pitchFamily="34" charset="0"/>
+                <a:cs typeface="Times New Roman" panose="02020603050405020304" pitchFamily="18" charset="0"/>
+              </a:rPr>
+              <a:t>	- location</a:t>
+            </a:r>
           </a:p>
           <a:p>
             <a:pPr marL="0" marR="0">
@@ -4004,17 +4071,71 @@
                 <a:ea typeface="Calibri" panose="020F0502020204030204" pitchFamily="34" charset="0"/>
                 <a:cs typeface="Times New Roman" panose="02020603050405020304" pitchFamily="18" charset="0"/>
               </a:rPr>
-              <a:t>- REMOVE </a:t>
-            </a:r>
-            <a:r>
-              <a:rPr lang="en-US" kern="100" dirty="0" err="1">
-                <a:latin typeface="Calibri" panose="020F0502020204030204" pitchFamily="34" charset="0"/>
-                <a:ea typeface="Calibri" panose="020F0502020204030204" pitchFamily="34" charset="0"/>
-                <a:cs typeface="Times New Roman" panose="02020603050405020304" pitchFamily="18" charset="0"/>
-              </a:rPr>
-              <a:t>removeUser</a:t>
-            </a:r>
-            <a:endParaRPr lang="en-US" kern="100" dirty="0">
+              <a:t>	- time</a:t>
+            </a:r>
+          </a:p>
+          <a:p>
+            <a:pPr marL="0" marR="0">
+              <a:lnSpc>
+                <a:spcPct val="107000"/>
+              </a:lnSpc>
+              <a:spcBef>
+                <a:spcPts val="0"/>
+              </a:spcBef>
+              <a:spcAft>
+                <a:spcPts val="800"/>
+              </a:spcAft>
+            </a:pPr>
+            <a:r>
+              <a:rPr lang="en-US" sz="1800" kern="100" dirty="0">
+                <a:effectLst/>
+                <a:latin typeface="Calibri" panose="020F0502020204030204" pitchFamily="34" charset="0"/>
+                <a:ea typeface="Calibri" panose="020F0502020204030204" pitchFamily="34" charset="0"/>
+                <a:cs typeface="Times New Roman" panose="02020603050405020304" pitchFamily="18" charset="0"/>
+              </a:rPr>
+              <a:t>	- participants (list </a:t>
+            </a:r>
+            <a:r>
+              <a:rPr lang="en-US" sz="1800" kern="100" dirty="0" err="1">
+                <a:effectLst/>
+                <a:latin typeface="Calibri" panose="020F0502020204030204" pitchFamily="34" charset="0"/>
+                <a:ea typeface="Calibri" panose="020F0502020204030204" pitchFamily="34" charset="0"/>
+                <a:cs typeface="Times New Roman" panose="02020603050405020304" pitchFamily="18" charset="0"/>
+              </a:rPr>
+              <a:t>userId</a:t>
+            </a:r>
+            <a:r>
+              <a:rPr lang="en-US" sz="1800" kern="100" dirty="0">
+                <a:effectLst/>
+                <a:latin typeface="Calibri" panose="020F0502020204030204" pitchFamily="34" charset="0"/>
+                <a:ea typeface="Calibri" panose="020F0502020204030204" pitchFamily="34" charset="0"/>
+                <a:cs typeface="Times New Roman" panose="02020603050405020304" pitchFamily="18" charset="0"/>
+              </a:rPr>
+              <a:t> attending)</a:t>
+            </a:r>
+          </a:p>
+          <a:p>
+            <a:pPr marL="0" marR="0">
+              <a:lnSpc>
+                <a:spcPct val="107000"/>
+              </a:lnSpc>
+              <a:spcBef>
+                <a:spcPts val="0"/>
+              </a:spcBef>
+              <a:spcAft>
+                <a:spcPts val="800"/>
+              </a:spcAft>
+            </a:pPr>
+            <a:r>
+              <a:rPr lang="en-US" kern="100" dirty="0">
+                <a:latin typeface="Calibri" panose="020F0502020204030204" pitchFamily="34" charset="0"/>
+                <a:ea typeface="Calibri" panose="020F0502020204030204" pitchFamily="34" charset="0"/>
+                <a:cs typeface="Times New Roman" panose="02020603050405020304" pitchFamily="18" charset="0"/>
+              </a:rPr>
+              <a:t>	- Attending/ Remove Attending button to add/remove user from participants list</a:t>
+            </a:r>
+            <a:endParaRPr lang="en-US" sz="1800" kern="100" dirty="0">
+              <a:effectLst/>
               <a:latin typeface="Calibri" panose="020F0502020204030204" pitchFamily="34" charset="0"/>
               <a:ea typeface="Calibri" panose="020F0502020204030204" pitchFamily="34" charset="0"/>
               <a:cs typeface="Times New Roman" panose="02020603050405020304" pitchFamily="18" charset="0"/>
@@ -4057,7 +4178,7 @@
                 <a:ea typeface="Calibri" panose="020F0502020204030204" pitchFamily="34" charset="0"/>
                 <a:cs typeface="Times New Roman" panose="02020603050405020304" pitchFamily="18" charset="0"/>
               </a:rPr>
-              <a:t>Users API</a:t>
+              <a:t>Event display area</a:t>
             </a:r>
             <a:endParaRPr lang="en-US" dirty="0"/>
           </a:p>
@@ -4066,7 +4187,7 @@
     </p:spTree>
     <p:extLst>
       <p:ext uri="{BB962C8B-B14F-4D97-AF65-F5344CB8AC3E}">
-        <p14:creationId xmlns:p14="http://schemas.microsoft.com/office/powerpoint/2010/main" val="893954284"/>
+        <p14:creationId xmlns:p14="http://schemas.microsoft.com/office/powerpoint/2010/main" val="3257912736"/>
       </p:ext>
     </p:extLst>
   </p:cSld>
@@ -4160,21 +4281,8 @@
                 <a:ea typeface="Calibri" panose="020F0502020204030204" pitchFamily="34" charset="0"/>
                 <a:cs typeface="Times New Roman" panose="02020603050405020304" pitchFamily="18" charset="0"/>
               </a:rPr>
-              <a:t>- GET </a:t>
-            </a:r>
-            <a:r>
-              <a:rPr lang="en-US" kern="100" dirty="0" err="1">
-                <a:latin typeface="Calibri" panose="020F0502020204030204" pitchFamily="34" charset="0"/>
-                <a:ea typeface="Calibri" panose="020F0502020204030204" pitchFamily="34" charset="0"/>
-                <a:cs typeface="Times New Roman" panose="02020603050405020304" pitchFamily="18" charset="0"/>
-              </a:rPr>
-              <a:t>allPosts</a:t>
-            </a:r>
-            <a:endParaRPr lang="en-US" kern="100" dirty="0">
-              <a:latin typeface="Calibri" panose="020F0502020204030204" pitchFamily="34" charset="0"/>
-              <a:ea typeface="Calibri" panose="020F0502020204030204" pitchFamily="34" charset="0"/>
-              <a:cs typeface="Times New Roman" panose="02020603050405020304" pitchFamily="18" charset="0"/>
-            </a:endParaRPr>
+              <a:t>- GET all users</a:t>
+            </a:r>
           </a:p>
           <a:p>
             <a:pPr marL="0" marR="0">
@@ -4204,7 +4312,7 @@
                 <a:ea typeface="Calibri" panose="020F0502020204030204" pitchFamily="34" charset="0"/>
                 <a:cs typeface="Times New Roman" panose="02020603050405020304" pitchFamily="18" charset="0"/>
               </a:rPr>
-              <a:t>postById</a:t>
+              <a:t>userById</a:t>
             </a:r>
             <a:endParaRPr lang="en-US" sz="1800" kern="100" dirty="0">
               <a:effectLst/>
@@ -4239,7 +4347,7 @@
                 <a:ea typeface="Calibri" panose="020F0502020204030204" pitchFamily="34" charset="0"/>
                 <a:cs typeface="Times New Roman" panose="02020603050405020304" pitchFamily="18" charset="0"/>
               </a:rPr>
-              <a:t>createPost</a:t>
+              <a:t>createUser</a:t>
             </a:r>
             <a:endParaRPr lang="en-US" kern="100" dirty="0">
               <a:latin typeface="Calibri" panose="020F0502020204030204" pitchFamily="34" charset="0"/>
@@ -4265,7 +4373,7 @@
                 <a:ea typeface="Calibri" panose="020F0502020204030204" pitchFamily="34" charset="0"/>
                 <a:cs typeface="Times New Roman" panose="02020603050405020304" pitchFamily="18" charset="0"/>
               </a:rPr>
-              <a:t>- DELETE </a:t>
+              <a:t>- REMOVE </a:t>
             </a:r>
             <a:r>
               <a:rPr lang="en-US" kern="100" dirty="0" err="1">
@@ -4273,7 +4381,7 @@
                 <a:ea typeface="Calibri" panose="020F0502020204030204" pitchFamily="34" charset="0"/>
                 <a:cs typeface="Times New Roman" panose="02020603050405020304" pitchFamily="18" charset="0"/>
               </a:rPr>
-              <a:t>removePost</a:t>
+              <a:t>removeUser</a:t>
             </a:r>
             <a:endParaRPr lang="en-US" kern="100" dirty="0">
               <a:latin typeface="Calibri" panose="020F0502020204030204" pitchFamily="34" charset="0"/>
@@ -4318,7 +4426,7 @@
                 <a:ea typeface="Calibri" panose="020F0502020204030204" pitchFamily="34" charset="0"/>
                 <a:cs typeface="Times New Roman" panose="02020603050405020304" pitchFamily="18" charset="0"/>
               </a:rPr>
-              <a:t>Posts API</a:t>
+              <a:t>Users API</a:t>
             </a:r>
             <a:endParaRPr lang="en-US" dirty="0"/>
           </a:p>
@@ -4327,7 +4435,7 @@
     </p:spTree>
     <p:extLst>
       <p:ext uri="{BB962C8B-B14F-4D97-AF65-F5344CB8AC3E}">
-        <p14:creationId xmlns:p14="http://schemas.microsoft.com/office/powerpoint/2010/main" val="2446073456"/>
+        <p14:creationId xmlns:p14="http://schemas.microsoft.com/office/powerpoint/2010/main" val="893954284"/>
       </p:ext>
     </p:extLst>
   </p:cSld>
@@ -4429,7 +4537,7 @@
                 <a:ea typeface="Calibri" panose="020F0502020204030204" pitchFamily="34" charset="0"/>
                 <a:cs typeface="Times New Roman" panose="02020603050405020304" pitchFamily="18" charset="0"/>
               </a:rPr>
-              <a:t>allEvents</a:t>
+              <a:t>allPosts</a:t>
             </a:r>
             <a:endParaRPr lang="en-US" kern="100" dirty="0">
               <a:latin typeface="Calibri" panose="020F0502020204030204" pitchFamily="34" charset="0"/>
@@ -4450,7 +4558,8 @@
               </a:spcAft>
             </a:pPr>
             <a:r>
-              <a:rPr lang="en-US" kern="100" dirty="0">
+              <a:rPr lang="en-US" sz="1800" kern="100" dirty="0">
+                <a:effectLst/>
                 <a:latin typeface="Calibri" panose="020F0502020204030204" pitchFamily="34" charset="0"/>
                 <a:ea typeface="Calibri" panose="020F0502020204030204" pitchFamily="34" charset="0"/>
                 <a:cs typeface="Times New Roman" panose="02020603050405020304" pitchFamily="18" charset="0"/>
@@ -4458,14 +4567,16 @@
               <a:t>- GET </a:t>
             </a:r>
             <a:r>
-              <a:rPr lang="en-US" kern="100" dirty="0" err="1">
-                <a:latin typeface="Calibri" panose="020F0502020204030204" pitchFamily="34" charset="0"/>
-                <a:ea typeface="Calibri" panose="020F0502020204030204" pitchFamily="34" charset="0"/>
-                <a:cs typeface="Times New Roman" panose="02020603050405020304" pitchFamily="18" charset="0"/>
-              </a:rPr>
-              <a:t>eventById</a:t>
-            </a:r>
-            <a:endParaRPr lang="en-US" kern="100" dirty="0">
+              <a:rPr lang="en-US" sz="1800" kern="100" dirty="0" err="1">
+                <a:effectLst/>
+                <a:latin typeface="Calibri" panose="020F0502020204030204" pitchFamily="34" charset="0"/>
+                <a:ea typeface="Calibri" panose="020F0502020204030204" pitchFamily="34" charset="0"/>
+                <a:cs typeface="Times New Roman" panose="02020603050405020304" pitchFamily="18" charset="0"/>
+              </a:rPr>
+              <a:t>postById</a:t>
+            </a:r>
+            <a:endParaRPr lang="en-US" sz="1800" kern="100" dirty="0">
+              <a:effectLst/>
               <a:latin typeface="Calibri" panose="020F0502020204030204" pitchFamily="34" charset="0"/>
               <a:ea typeface="Calibri" panose="020F0502020204030204" pitchFamily="34" charset="0"/>
               <a:cs typeface="Times New Roman" panose="02020603050405020304" pitchFamily="18" charset="0"/>
@@ -4497,7 +4608,7 @@
                 <a:ea typeface="Calibri" panose="020F0502020204030204" pitchFamily="34" charset="0"/>
                 <a:cs typeface="Times New Roman" panose="02020603050405020304" pitchFamily="18" charset="0"/>
               </a:rPr>
-              <a:t>createEvent</a:t>
+              <a:t>createPost</a:t>
             </a:r>
             <a:endParaRPr lang="en-US" kern="100" dirty="0">
               <a:latin typeface="Calibri" panose="020F0502020204030204" pitchFamily="34" charset="0"/>
@@ -4531,7 +4642,7 @@
                 <a:ea typeface="Calibri" panose="020F0502020204030204" pitchFamily="34" charset="0"/>
                 <a:cs typeface="Times New Roman" panose="02020603050405020304" pitchFamily="18" charset="0"/>
               </a:rPr>
-              <a:t>removeEvent</a:t>
+              <a:t>removePost</a:t>
             </a:r>
             <a:endParaRPr lang="en-US" kern="100" dirty="0">
               <a:latin typeface="Calibri" panose="020F0502020204030204" pitchFamily="34" charset="0"/>
@@ -4570,6 +4681,264 @@
           <a:lstStyle/>
           <a:p>
             <a:r>
+              <a:rPr lang="en-US" sz="1800" dirty="0">
+                <a:effectLst/>
+                <a:latin typeface="Calibri" panose="020F0502020204030204" pitchFamily="34" charset="0"/>
+                <a:ea typeface="Calibri" panose="020F0502020204030204" pitchFamily="34" charset="0"/>
+                <a:cs typeface="Times New Roman" panose="02020603050405020304" pitchFamily="18" charset="0"/>
+              </a:rPr>
+              <a:t>Posts API</a:t>
+            </a:r>
+            <a:endParaRPr lang="en-US" dirty="0"/>
+          </a:p>
+        </p:txBody>
+      </p:sp>
+    </p:spTree>
+    <p:extLst>
+      <p:ext uri="{BB962C8B-B14F-4D97-AF65-F5344CB8AC3E}">
+        <p14:creationId xmlns:p14="http://schemas.microsoft.com/office/powerpoint/2010/main" val="2446073456"/>
+      </p:ext>
+    </p:extLst>
+  </p:cSld>
+  <p:clrMapOvr>
+    <a:masterClrMapping/>
+  </p:clrMapOvr>
+</p:sld>
+</file>
+
+<file path=ppt/slides/slide14.xml><?xml version="1.0" encoding="utf-8"?>
+<p:sld xmlns:a="http://schemas.openxmlformats.org/drawingml/2006/main" xmlns:r="http://schemas.openxmlformats.org/officeDocument/2006/relationships" xmlns:p="http://schemas.openxmlformats.org/presentationml/2006/main">
+  <p:cSld>
+    <p:spTree>
+      <p:nvGrpSpPr>
+        <p:cNvPr id="1" name=""/>
+        <p:cNvGrpSpPr/>
+        <p:nvPr/>
+      </p:nvGrpSpPr>
+      <p:grpSpPr>
+        <a:xfrm>
+          <a:off x="0" y="0"/>
+          <a:ext cx="0" cy="0"/>
+          <a:chOff x="0" y="0"/>
+          <a:chExt cx="0" cy="0"/>
+        </a:xfrm>
+      </p:grpSpPr>
+      <p:sp>
+        <p:nvSpPr>
+          <p:cNvPr id="4" name="TextBox 3">
+            <a:extLst>
+              <a:ext uri="{FF2B5EF4-FFF2-40B4-BE49-F238E27FC236}">
+                <a16:creationId xmlns:a16="http://schemas.microsoft.com/office/drawing/2014/main" id="{93042950-E66C-9CF4-A917-488019161FCA}"/>
+              </a:ext>
+            </a:extLst>
+          </p:cNvPr>
+          <p:cNvSpPr txBox="1"/>
+          <p:nvPr/>
+        </p:nvSpPr>
+        <p:spPr>
+          <a:xfrm>
+            <a:off x="275846" y="765589"/>
+            <a:ext cx="11410545" cy="1971374"/>
+          </a:xfrm>
+          <a:prstGeom prst="rect">
+            <a:avLst/>
+          </a:prstGeom>
+          <a:noFill/>
+        </p:spPr>
+        <p:txBody>
+          <a:bodyPr wrap="square" rtlCol="0">
+            <a:spAutoFit/>
+          </a:bodyPr>
+          <a:lstStyle/>
+          <a:p>
+            <a:pPr marL="0" marR="0">
+              <a:lnSpc>
+                <a:spcPct val="107000"/>
+              </a:lnSpc>
+              <a:spcBef>
+                <a:spcPts val="0"/>
+              </a:spcBef>
+              <a:spcAft>
+                <a:spcPts val="800"/>
+              </a:spcAft>
+            </a:pPr>
+            <a:r>
+              <a:rPr lang="en-US" sz="1800" kern="100" dirty="0">
+                <a:effectLst/>
+                <a:latin typeface="Calibri" panose="020F0502020204030204" pitchFamily="34" charset="0"/>
+                <a:ea typeface="Calibri" panose="020F0502020204030204" pitchFamily="34" charset="0"/>
+                <a:cs typeface="Times New Roman" panose="02020603050405020304" pitchFamily="18" charset="0"/>
+              </a:rPr>
+              <a:t>Needs following endpoints:</a:t>
+            </a:r>
+          </a:p>
+          <a:p>
+            <a:pPr marL="0" marR="0">
+              <a:lnSpc>
+                <a:spcPct val="107000"/>
+              </a:lnSpc>
+              <a:spcBef>
+                <a:spcPts val="0"/>
+              </a:spcBef>
+              <a:spcAft>
+                <a:spcPts val="800"/>
+              </a:spcAft>
+            </a:pPr>
+            <a:r>
+              <a:rPr lang="en-US" kern="100" dirty="0">
+                <a:latin typeface="Calibri" panose="020F0502020204030204" pitchFamily="34" charset="0"/>
+                <a:ea typeface="Calibri" panose="020F0502020204030204" pitchFamily="34" charset="0"/>
+                <a:cs typeface="Times New Roman" panose="02020603050405020304" pitchFamily="18" charset="0"/>
+              </a:rPr>
+              <a:t>- GET </a:t>
+            </a:r>
+            <a:r>
+              <a:rPr lang="en-US" kern="100" dirty="0" err="1">
+                <a:latin typeface="Calibri" panose="020F0502020204030204" pitchFamily="34" charset="0"/>
+                <a:ea typeface="Calibri" panose="020F0502020204030204" pitchFamily="34" charset="0"/>
+                <a:cs typeface="Times New Roman" panose="02020603050405020304" pitchFamily="18" charset="0"/>
+              </a:rPr>
+              <a:t>allEvents</a:t>
+            </a:r>
+            <a:endParaRPr lang="en-US" kern="100" dirty="0">
+              <a:latin typeface="Calibri" panose="020F0502020204030204" pitchFamily="34" charset="0"/>
+              <a:ea typeface="Calibri" panose="020F0502020204030204" pitchFamily="34" charset="0"/>
+              <a:cs typeface="Times New Roman" panose="02020603050405020304" pitchFamily="18" charset="0"/>
+            </a:endParaRPr>
+          </a:p>
+          <a:p>
+            <a:pPr marL="0" marR="0">
+              <a:lnSpc>
+                <a:spcPct val="107000"/>
+              </a:lnSpc>
+              <a:spcBef>
+                <a:spcPts val="0"/>
+              </a:spcBef>
+              <a:spcAft>
+                <a:spcPts val="800"/>
+              </a:spcAft>
+            </a:pPr>
+            <a:r>
+              <a:rPr lang="en-US" kern="100" dirty="0">
+                <a:latin typeface="Calibri" panose="020F0502020204030204" pitchFamily="34" charset="0"/>
+                <a:ea typeface="Calibri" panose="020F0502020204030204" pitchFamily="34" charset="0"/>
+                <a:cs typeface="Times New Roman" panose="02020603050405020304" pitchFamily="18" charset="0"/>
+              </a:rPr>
+              <a:t>- GET </a:t>
+            </a:r>
+            <a:r>
+              <a:rPr lang="en-US" kern="100" dirty="0" err="1">
+                <a:latin typeface="Calibri" panose="020F0502020204030204" pitchFamily="34" charset="0"/>
+                <a:ea typeface="Calibri" panose="020F0502020204030204" pitchFamily="34" charset="0"/>
+                <a:cs typeface="Times New Roman" panose="02020603050405020304" pitchFamily="18" charset="0"/>
+              </a:rPr>
+              <a:t>eventById</a:t>
+            </a:r>
+            <a:endParaRPr lang="en-US" kern="100" dirty="0">
+              <a:latin typeface="Calibri" panose="020F0502020204030204" pitchFamily="34" charset="0"/>
+              <a:ea typeface="Calibri" panose="020F0502020204030204" pitchFamily="34" charset="0"/>
+              <a:cs typeface="Times New Roman" panose="02020603050405020304" pitchFamily="18" charset="0"/>
+            </a:endParaRPr>
+          </a:p>
+          <a:p>
+            <a:pPr marL="0" marR="0">
+              <a:lnSpc>
+                <a:spcPct val="107000"/>
+              </a:lnSpc>
+              <a:spcBef>
+                <a:spcPts val="0"/>
+              </a:spcBef>
+              <a:spcAft>
+                <a:spcPts val="800"/>
+              </a:spcAft>
+            </a:pPr>
+            <a:r>
+              <a:rPr lang="en-US" kern="100" dirty="0">
+                <a:latin typeface="Calibri" panose="020F0502020204030204" pitchFamily="34" charset="0"/>
+                <a:ea typeface="Calibri" panose="020F0502020204030204" pitchFamily="34" charset="0"/>
+                <a:cs typeface="Times New Roman" panose="02020603050405020304" pitchFamily="18" charset="0"/>
+              </a:rPr>
+              <a:t>- POST </a:t>
+            </a:r>
+            <a:r>
+              <a:rPr lang="en-US" kern="100" dirty="0" err="1">
+                <a:latin typeface="Calibri" panose="020F0502020204030204" pitchFamily="34" charset="0"/>
+                <a:ea typeface="Calibri" panose="020F0502020204030204" pitchFamily="34" charset="0"/>
+                <a:cs typeface="Times New Roman" panose="02020603050405020304" pitchFamily="18" charset="0"/>
+              </a:rPr>
+              <a:t>createEvent</a:t>
+            </a:r>
+            <a:endParaRPr lang="en-US" kern="100" dirty="0">
+              <a:latin typeface="Calibri" panose="020F0502020204030204" pitchFamily="34" charset="0"/>
+              <a:ea typeface="Calibri" panose="020F0502020204030204" pitchFamily="34" charset="0"/>
+              <a:cs typeface="Times New Roman" panose="02020603050405020304" pitchFamily="18" charset="0"/>
+            </a:endParaRPr>
+          </a:p>
+          <a:p>
+            <a:pPr marL="0" marR="0">
+              <a:lnSpc>
+                <a:spcPct val="107000"/>
+              </a:lnSpc>
+              <a:spcBef>
+                <a:spcPts val="0"/>
+              </a:spcBef>
+              <a:spcAft>
+                <a:spcPts val="800"/>
+              </a:spcAft>
+            </a:pPr>
+            <a:r>
+              <a:rPr lang="en-US" kern="100" dirty="0">
+                <a:latin typeface="Calibri" panose="020F0502020204030204" pitchFamily="34" charset="0"/>
+                <a:ea typeface="Calibri" panose="020F0502020204030204" pitchFamily="34" charset="0"/>
+                <a:cs typeface="Times New Roman" panose="02020603050405020304" pitchFamily="18" charset="0"/>
+              </a:rPr>
+              <a:t>- DELETE </a:t>
+            </a:r>
+            <a:r>
+              <a:rPr lang="en-US" kern="100" dirty="0" err="1">
+                <a:latin typeface="Calibri" panose="020F0502020204030204" pitchFamily="34" charset="0"/>
+                <a:ea typeface="Calibri" panose="020F0502020204030204" pitchFamily="34" charset="0"/>
+                <a:cs typeface="Times New Roman" panose="02020603050405020304" pitchFamily="18" charset="0"/>
+              </a:rPr>
+              <a:t>removeEvent</a:t>
+            </a:r>
+            <a:endParaRPr lang="en-US" kern="100" dirty="0">
+              <a:latin typeface="Calibri" panose="020F0502020204030204" pitchFamily="34" charset="0"/>
+              <a:ea typeface="Calibri" panose="020F0502020204030204" pitchFamily="34" charset="0"/>
+              <a:cs typeface="Times New Roman" panose="02020603050405020304" pitchFamily="18" charset="0"/>
+            </a:endParaRPr>
+          </a:p>
+        </p:txBody>
+      </p:sp>
+      <p:sp>
+        <p:nvSpPr>
+          <p:cNvPr id="2" name="TextBox 1">
+            <a:extLst>
+              <a:ext uri="{FF2B5EF4-FFF2-40B4-BE49-F238E27FC236}">
+                <a16:creationId xmlns:a16="http://schemas.microsoft.com/office/drawing/2014/main" id="{CB46AF81-95B8-D80D-804A-CADBD595992E}"/>
+              </a:ext>
+            </a:extLst>
+          </p:cNvPr>
+          <p:cNvSpPr txBox="1"/>
+          <p:nvPr/>
+        </p:nvSpPr>
+        <p:spPr>
+          <a:xfrm>
+            <a:off x="275847" y="161432"/>
+            <a:ext cx="11410545" cy="369332"/>
+          </a:xfrm>
+          <a:prstGeom prst="rect">
+            <a:avLst/>
+          </a:prstGeom>
+          <a:noFill/>
+        </p:spPr>
+        <p:txBody>
+          <a:bodyPr wrap="square" rtlCol="0">
+            <a:spAutoFit/>
+          </a:bodyPr>
+          <a:lstStyle/>
+          <a:p>
+            <a:r>
               <a:rPr lang="en-US" dirty="0">
                 <a:latin typeface="Calibri" panose="020F0502020204030204" pitchFamily="34" charset="0"/>
                 <a:ea typeface="Calibri" panose="020F0502020204030204" pitchFamily="34" charset="0"/>
@@ -4594,6 +4963,36 @@
     <p:extLst>
       <p:ext uri="{BB962C8B-B14F-4D97-AF65-F5344CB8AC3E}">
         <p14:creationId xmlns:p14="http://schemas.microsoft.com/office/powerpoint/2010/main" val="3719750704"/>
+      </p:ext>
+    </p:extLst>
+  </p:cSld>
+  <p:clrMapOvr>
+    <a:masterClrMapping/>
+  </p:clrMapOvr>
+</p:sld>
+</file>
+
+<file path=ppt/slides/slide15.xml><?xml version="1.0" encoding="utf-8"?>
+<p:sld xmlns:a="http://schemas.openxmlformats.org/drawingml/2006/main" xmlns:r="http://schemas.openxmlformats.org/officeDocument/2006/relationships" xmlns:p="http://schemas.openxmlformats.org/presentationml/2006/main">
+  <p:cSld>
+    <p:spTree>
+      <p:nvGrpSpPr>
+        <p:cNvPr id="1" name=""/>
+        <p:cNvGrpSpPr/>
+        <p:nvPr/>
+      </p:nvGrpSpPr>
+      <p:grpSpPr>
+        <a:xfrm>
+          <a:off x="0" y="0"/>
+          <a:ext cx="0" cy="0"/>
+          <a:chOff x="0" y="0"/>
+          <a:chExt cx="0" cy="0"/>
+        </a:xfrm>
+      </p:grpSpPr>
+    </p:spTree>
+    <p:extLst>
+      <p:ext uri="{BB962C8B-B14F-4D97-AF65-F5344CB8AC3E}">
+        <p14:creationId xmlns:p14="http://schemas.microsoft.com/office/powerpoint/2010/main" val="3550599178"/>
       </p:ext>
     </p:extLst>
   </p:cSld>
@@ -4635,7 +5034,7 @@
         <p:spPr>
           <a:xfrm>
             <a:off x="275846" y="765589"/>
-            <a:ext cx="11410545" cy="1572418"/>
+            <a:ext cx="11410545" cy="774507"/>
           </a:xfrm>
           <a:prstGeom prst="rect">
             <a:avLst/>
@@ -4666,7 +5065,7 @@
                 <a:ea typeface="Calibri" panose="020F0502020204030204" pitchFamily="34" charset="0"/>
                 <a:cs typeface="Times New Roman" panose="02020603050405020304" pitchFamily="18" charset="0"/>
               </a:rPr>
-              <a:t>- Displays latest posts by day</a:t>
+              <a:t>- Display navigation to events creation/display page</a:t>
             </a:r>
           </a:p>
           <a:p>
@@ -4687,61 +5086,30 @@
                 <a:ea typeface="Calibri" panose="020F0502020204030204" pitchFamily="34" charset="0"/>
                 <a:cs typeface="Times New Roman" panose="02020603050405020304" pitchFamily="18" charset="0"/>
               </a:rPr>
-              <a:t>-</a:t>
-            </a:r>
-            <a:r>
-              <a:rPr lang="en-US" sz="1800" kern="100" dirty="0">
-                <a:effectLst/>
-                <a:latin typeface="Calibri" panose="020F0502020204030204" pitchFamily="34" charset="0"/>
-                <a:ea typeface="Calibri" panose="020F0502020204030204" pitchFamily="34" charset="0"/>
-                <a:cs typeface="Times New Roman" panose="02020603050405020304" pitchFamily="18" charset="0"/>
-              </a:rPr>
-              <a:t> Display favorite posts by day</a:t>
-            </a:r>
-          </a:p>
-          <a:p>
-            <a:pPr marL="0" marR="0">
-              <a:lnSpc>
-                <a:spcPct val="107000"/>
-              </a:lnSpc>
-              <a:spcBef>
-                <a:spcPts val="0"/>
-              </a:spcBef>
-              <a:spcAft>
-                <a:spcPts val="800"/>
-              </a:spcAft>
-            </a:pPr>
-            <a:r>
-              <a:rPr lang="en-US" sz="1800" kern="100" dirty="0">
-                <a:effectLst/>
-                <a:latin typeface="Calibri" panose="020F0502020204030204" pitchFamily="34" charset="0"/>
-                <a:ea typeface="Calibri" panose="020F0502020204030204" pitchFamily="34" charset="0"/>
-                <a:cs typeface="Times New Roman" panose="02020603050405020304" pitchFamily="18" charset="0"/>
-              </a:rPr>
-              <a:t>- Displays toggle button to switch between latest posts and favorite posts</a:t>
-            </a:r>
-          </a:p>
-          <a:p>
-            <a:pPr marL="0" marR="0">
-              <a:lnSpc>
-                <a:spcPct val="107000"/>
-              </a:lnSpc>
-              <a:spcBef>
-                <a:spcPts val="0"/>
-              </a:spcBef>
-              <a:spcAft>
-                <a:spcPts val="800"/>
-              </a:spcAft>
-            </a:pPr>
-            <a:r>
-              <a:rPr lang="en-US" sz="1800" kern="100" dirty="0">
-                <a:effectLst/>
-                <a:latin typeface="Calibri" panose="020F0502020204030204" pitchFamily="34" charset="0"/>
-                <a:ea typeface="Calibri" panose="020F0502020204030204" pitchFamily="34" charset="0"/>
-                <a:cs typeface="Times New Roman" panose="02020603050405020304" pitchFamily="18" charset="0"/>
-              </a:rPr>
-              <a:t>- Display navigation to events creation/display page</a:t>
-            </a:r>
+              <a:t>- </a:t>
+            </a:r>
+            <a:r>
+              <a:rPr lang="en-US" kern="100" dirty="0" err="1">
+                <a:latin typeface="Calibri" panose="020F0502020204030204" pitchFamily="34" charset="0"/>
+                <a:ea typeface="Calibri" panose="020F0502020204030204" pitchFamily="34" charset="0"/>
+                <a:cs typeface="Times New Roman" panose="02020603050405020304" pitchFamily="18" charset="0"/>
+              </a:rPr>
+              <a:t>Dislpay</a:t>
+            </a:r>
+            <a:r>
+              <a:rPr lang="en-US" kern="100" dirty="0">
+                <a:latin typeface="Calibri" panose="020F0502020204030204" pitchFamily="34" charset="0"/>
+                <a:ea typeface="Calibri" panose="020F0502020204030204" pitchFamily="34" charset="0"/>
+                <a:cs typeface="Times New Roman" panose="02020603050405020304" pitchFamily="18" charset="0"/>
+              </a:rPr>
+              <a:t> navigation to posts creation/display page</a:t>
+            </a:r>
+            <a:endParaRPr lang="en-US" sz="1800" kern="100" dirty="0">
+              <a:effectLst/>
+              <a:latin typeface="Calibri" panose="020F0502020204030204" pitchFamily="34" charset="0"/>
+              <a:ea typeface="Calibri" panose="020F0502020204030204" pitchFamily="34" charset="0"/>
+              <a:cs typeface="Times New Roman" panose="02020603050405020304" pitchFamily="18" charset="0"/>
+            </a:endParaRPr>
           </a:p>
         </p:txBody>
       </p:sp>
@@ -4812,143 +5180,270 @@
       </p:grpSpPr>
       <p:sp>
         <p:nvSpPr>
-          <p:cNvPr id="4" name="TextBox 3">
-            <a:extLst>
-              <a:ext uri="{FF2B5EF4-FFF2-40B4-BE49-F238E27FC236}">
-                <a16:creationId xmlns:a16="http://schemas.microsoft.com/office/drawing/2014/main" id="{93042950-E66C-9CF4-A917-488019161FCA}"/>
-              </a:ext>
-            </a:extLst>
-          </p:cNvPr>
-          <p:cNvSpPr txBox="1"/>
+          <p:cNvPr id="3" name="Rectangle 2">
+            <a:extLst>
+              <a:ext uri="{FF2B5EF4-FFF2-40B4-BE49-F238E27FC236}">
+                <a16:creationId xmlns:a16="http://schemas.microsoft.com/office/drawing/2014/main" id="{09EB6145-F196-BA75-4B3E-EED7851B2ACB}"/>
+              </a:ext>
+            </a:extLst>
+          </p:cNvPr>
+          <p:cNvSpPr/>
           <p:nvPr/>
         </p:nvSpPr>
         <p:spPr>
           <a:xfrm>
-            <a:off x="275846" y="765589"/>
-            <a:ext cx="11410545" cy="1572418"/>
+            <a:off x="242835" y="200967"/>
+            <a:ext cx="11706330" cy="6451042"/>
           </a:xfrm>
           <a:prstGeom prst="rect">
             <a:avLst/>
           </a:prstGeom>
           <a:noFill/>
         </p:spPr>
-        <p:txBody>
-          <a:bodyPr wrap="square" rtlCol="0">
-            <a:spAutoFit/>
-          </a:bodyPr>
-          <a:lstStyle/>
-          <a:p>
-            <a:pPr marL="0" marR="0">
-              <a:lnSpc>
-                <a:spcPct val="107000"/>
-              </a:lnSpc>
-              <a:spcBef>
-                <a:spcPts val="0"/>
-              </a:spcBef>
-              <a:spcAft>
-                <a:spcPts val="800"/>
-              </a:spcAft>
-            </a:pPr>
-            <a:r>
-              <a:rPr lang="en-US" sz="1800" kern="100" dirty="0">
-                <a:effectLst/>
-                <a:latin typeface="Calibri" panose="020F0502020204030204" pitchFamily="34" charset="0"/>
-                <a:ea typeface="Calibri" panose="020F0502020204030204" pitchFamily="34" charset="0"/>
-                <a:cs typeface="Times New Roman" panose="02020603050405020304" pitchFamily="18" charset="0"/>
-              </a:rPr>
-              <a:t>- Button should provide way to allow the user to login using valid credentials</a:t>
-            </a:r>
-          </a:p>
-          <a:p>
-            <a:pPr marL="0" marR="0">
-              <a:lnSpc>
-                <a:spcPct val="107000"/>
-              </a:lnSpc>
-              <a:spcBef>
-                <a:spcPts val="0"/>
-              </a:spcBef>
-              <a:spcAft>
-                <a:spcPts val="800"/>
-              </a:spcAft>
-            </a:pPr>
-            <a:r>
-              <a:rPr lang="en-US" sz="1800" kern="100" dirty="0">
-                <a:effectLst/>
-                <a:latin typeface="Calibri" panose="020F0502020204030204" pitchFamily="34" charset="0"/>
-                <a:ea typeface="Calibri" panose="020F0502020204030204" pitchFamily="34" charset="0"/>
-                <a:cs typeface="Times New Roman" panose="02020603050405020304" pitchFamily="18" charset="0"/>
-              </a:rPr>
-              <a:t>- Button should provide way to allow the user to create account</a:t>
-            </a:r>
-          </a:p>
-          <a:p>
-            <a:pPr marL="0" marR="0">
-              <a:lnSpc>
-                <a:spcPct val="107000"/>
-              </a:lnSpc>
-              <a:spcBef>
-                <a:spcPts val="0"/>
-              </a:spcBef>
-              <a:spcAft>
-                <a:spcPts val="800"/>
-              </a:spcAft>
-            </a:pPr>
-            <a:r>
-              <a:rPr lang="en-US" sz="1800" kern="100" dirty="0">
-                <a:effectLst/>
-                <a:latin typeface="Calibri" panose="020F0502020204030204" pitchFamily="34" charset="0"/>
-                <a:ea typeface="Calibri" panose="020F0502020204030204" pitchFamily="34" charset="0"/>
-                <a:cs typeface="Times New Roman" panose="02020603050405020304" pitchFamily="18" charset="0"/>
-              </a:rPr>
-              <a:t>- Button text should switch to “Account” or be hidden if user notify user is logged in</a:t>
-            </a:r>
-          </a:p>
-          <a:p>
-            <a:pPr marL="0" marR="0">
-              <a:lnSpc>
-                <a:spcPct val="107000"/>
-              </a:lnSpc>
-              <a:spcBef>
-                <a:spcPts val="0"/>
-              </a:spcBef>
-              <a:spcAft>
-                <a:spcPts val="800"/>
-              </a:spcAft>
-            </a:pPr>
-            <a:r>
-              <a:rPr lang="en-US" sz="1800" kern="100" dirty="0">
-                <a:effectLst/>
-                <a:latin typeface="Calibri" panose="020F0502020204030204" pitchFamily="34" charset="0"/>
-                <a:ea typeface="Calibri" panose="020F0502020204030204" pitchFamily="34" charset="0"/>
-                <a:cs typeface="Times New Roman" panose="02020603050405020304" pitchFamily="18" charset="0"/>
-              </a:rPr>
-              <a:t>- Button should navigate to account details page if logged in (no requirement if time allows)</a:t>
-            </a:r>
-          </a:p>
-        </p:txBody>
-      </p:sp>
-      <p:sp>
-        <p:nvSpPr>
-          <p:cNvPr id="2" name="TextBox 1">
-            <a:extLst>
-              <a:ext uri="{FF2B5EF4-FFF2-40B4-BE49-F238E27FC236}">
-                <a16:creationId xmlns:a16="http://schemas.microsoft.com/office/drawing/2014/main" id="{CB46AF81-95B8-D80D-804A-CADBD595992E}"/>
-              </a:ext>
-            </a:extLst>
-          </p:cNvPr>
-          <p:cNvSpPr txBox="1"/>
+        <p:style>
+          <a:lnRef idx="2">
+            <a:schemeClr val="accent1">
+              <a:shade val="15000"/>
+            </a:schemeClr>
+          </a:lnRef>
+          <a:fillRef idx="1">
+            <a:schemeClr val="accent1"/>
+          </a:fillRef>
+          <a:effectRef idx="0">
+            <a:schemeClr val="accent1"/>
+          </a:effectRef>
+          <a:fontRef idx="minor">
+            <a:schemeClr val="lt1"/>
+          </a:fontRef>
+        </p:style>
+        <p:txBody>
+          <a:bodyPr rtlCol="0" anchor="ctr"/>
+          <a:lstStyle/>
+          <a:p>
+            <a:pPr algn="ctr"/>
+            <a:endParaRPr lang="en-US" dirty="0"/>
+          </a:p>
+        </p:txBody>
+      </p:sp>
+      <p:sp>
+        <p:nvSpPr>
+          <p:cNvPr id="9" name="Rectangle 8">
+            <a:extLst>
+              <a:ext uri="{FF2B5EF4-FFF2-40B4-BE49-F238E27FC236}">
+                <a16:creationId xmlns:a16="http://schemas.microsoft.com/office/drawing/2014/main" id="{F50557A8-8943-F711-C854-1442083C28F3}"/>
+              </a:ext>
+            </a:extLst>
+          </p:cNvPr>
+          <p:cNvSpPr/>
           <p:nvPr/>
         </p:nvSpPr>
         <p:spPr>
           <a:xfrm>
-            <a:off x="275847" y="161432"/>
-            <a:ext cx="11410545" cy="369332"/>
+            <a:off x="242835" y="3233057"/>
+            <a:ext cx="11706330" cy="3418952"/>
           </a:xfrm>
           <a:prstGeom prst="rect">
             <a:avLst/>
           </a:prstGeom>
           <a:noFill/>
         </p:spPr>
+        <p:style>
+          <a:lnRef idx="2">
+            <a:schemeClr val="accent1">
+              <a:shade val="15000"/>
+            </a:schemeClr>
+          </a:lnRef>
+          <a:fillRef idx="1">
+            <a:schemeClr val="accent1"/>
+          </a:fillRef>
+          <a:effectRef idx="0">
+            <a:schemeClr val="accent1"/>
+          </a:effectRef>
+          <a:fontRef idx="minor">
+            <a:schemeClr val="lt1"/>
+          </a:fontRef>
+        </p:style>
+        <p:txBody>
+          <a:bodyPr rtlCol="0" anchor="ctr"/>
+          <a:lstStyle/>
+          <a:p>
+            <a:pPr algn="ctr"/>
+            <a:endParaRPr lang="en-US" dirty="0"/>
+          </a:p>
+        </p:txBody>
+      </p:sp>
+      <p:sp>
+        <p:nvSpPr>
+          <p:cNvPr id="14" name="Rectangle: Rounded Corners 13">
+            <a:extLst>
+              <a:ext uri="{FF2B5EF4-FFF2-40B4-BE49-F238E27FC236}">
+                <a16:creationId xmlns:a16="http://schemas.microsoft.com/office/drawing/2014/main" id="{462EB88B-18C0-73B8-1596-E8B79A8C25FF}"/>
+              </a:ext>
+            </a:extLst>
+          </p:cNvPr>
+          <p:cNvSpPr/>
+          <p:nvPr/>
+        </p:nvSpPr>
+        <p:spPr>
+          <a:xfrm>
+            <a:off x="10009415" y="439613"/>
+            <a:ext cx="1797398" cy="462854"/>
+          </a:xfrm>
+          <a:prstGeom prst="roundRect">
+            <a:avLst/>
+          </a:prstGeom>
+        </p:spPr>
+        <p:style>
+          <a:lnRef idx="2">
+            <a:schemeClr val="accent1">
+              <a:shade val="15000"/>
+            </a:schemeClr>
+          </a:lnRef>
+          <a:fillRef idx="1">
+            <a:schemeClr val="accent1"/>
+          </a:fillRef>
+          <a:effectRef idx="0">
+            <a:schemeClr val="accent1"/>
+          </a:effectRef>
+          <a:fontRef idx="minor">
+            <a:schemeClr val="lt1"/>
+          </a:fontRef>
+        </p:style>
+        <p:txBody>
+          <a:bodyPr rtlCol="0" anchor="ctr"/>
+          <a:lstStyle/>
+          <a:p>
+            <a:pPr algn="ctr"/>
+            <a:r>
+              <a:rPr lang="en-US" dirty="0"/>
+              <a:t>Login/Sign Up</a:t>
+            </a:r>
+          </a:p>
+        </p:txBody>
+      </p:sp>
+      <p:sp>
+        <p:nvSpPr>
+          <p:cNvPr id="15" name="Rectangle 14">
+            <a:extLst>
+              <a:ext uri="{FF2B5EF4-FFF2-40B4-BE49-F238E27FC236}">
+                <a16:creationId xmlns:a16="http://schemas.microsoft.com/office/drawing/2014/main" id="{2F28C8CE-0641-4BDC-3993-118AA2F43F1D}"/>
+              </a:ext>
+            </a:extLst>
+          </p:cNvPr>
+          <p:cNvSpPr/>
+          <p:nvPr/>
+        </p:nvSpPr>
+        <p:spPr>
+          <a:xfrm>
+            <a:off x="242835" y="200966"/>
+            <a:ext cx="11706330" cy="874206"/>
+          </a:xfrm>
+          <a:prstGeom prst="rect">
+            <a:avLst/>
+          </a:prstGeom>
+          <a:noFill/>
+        </p:spPr>
+        <p:style>
+          <a:lnRef idx="2">
+            <a:schemeClr val="accent1">
+              <a:shade val="15000"/>
+            </a:schemeClr>
+          </a:lnRef>
+          <a:fillRef idx="1">
+            <a:schemeClr val="accent1"/>
+          </a:fillRef>
+          <a:effectRef idx="0">
+            <a:schemeClr val="accent1"/>
+          </a:effectRef>
+          <a:fontRef idx="minor">
+            <a:schemeClr val="lt1"/>
+          </a:fontRef>
+        </p:style>
+        <p:txBody>
+          <a:bodyPr rtlCol="0" anchor="ctr"/>
+          <a:lstStyle/>
+          <a:p>
+            <a:pPr algn="ctr"/>
+            <a:r>
+              <a:rPr lang="en-US" dirty="0">
+                <a:solidFill>
+                  <a:schemeClr val="tx1"/>
+                </a:solidFill>
+              </a:rPr>
+              <a:t>Latest Posts	Favorite Posts	Events</a:t>
+            </a:r>
+          </a:p>
+        </p:txBody>
+      </p:sp>
+      <p:sp>
+        <p:nvSpPr>
+          <p:cNvPr id="16" name="Action Button: Go Home 15">
+            <a:hlinkClick r:id="" action="ppaction://hlinkshowjump?jump=firstslide" highlightClick="1"/>
+            <a:extLst>
+              <a:ext uri="{FF2B5EF4-FFF2-40B4-BE49-F238E27FC236}">
+                <a16:creationId xmlns:a16="http://schemas.microsoft.com/office/drawing/2014/main" id="{718E4184-CE0E-7E87-B941-B21B6287DC47}"/>
+              </a:ext>
+            </a:extLst>
+          </p:cNvPr>
+          <p:cNvSpPr/>
+          <p:nvPr/>
+        </p:nvSpPr>
+        <p:spPr>
+          <a:xfrm>
+            <a:off x="385188" y="396280"/>
+            <a:ext cx="619648" cy="506187"/>
+          </a:xfrm>
+          <a:prstGeom prst="actionButtonHome">
+            <a:avLst/>
+          </a:prstGeom>
+        </p:spPr>
+        <p:style>
+          <a:lnRef idx="2">
+            <a:schemeClr val="accent1">
+              <a:shade val="15000"/>
+            </a:schemeClr>
+          </a:lnRef>
+          <a:fillRef idx="1">
+            <a:schemeClr val="accent1"/>
+          </a:fillRef>
+          <a:effectRef idx="0">
+            <a:schemeClr val="accent1"/>
+          </a:effectRef>
+          <a:fontRef idx="minor">
+            <a:schemeClr val="lt1"/>
+          </a:fontRef>
+        </p:style>
+        <p:txBody>
+          <a:bodyPr rtlCol="0" anchor="ctr"/>
+          <a:lstStyle/>
+          <a:p>
+            <a:pPr algn="ctr"/>
+            <a:endParaRPr lang="en-US"/>
+          </a:p>
+        </p:txBody>
+      </p:sp>
+      <p:sp>
+        <p:nvSpPr>
+          <p:cNvPr id="17" name="TextBox 16">
+            <a:extLst>
+              <a:ext uri="{FF2B5EF4-FFF2-40B4-BE49-F238E27FC236}">
+                <a16:creationId xmlns:a16="http://schemas.microsoft.com/office/drawing/2014/main" id="{60FBE9E0-78AB-01C4-4EFD-FD36C0881FF1}"/>
+              </a:ext>
+            </a:extLst>
+          </p:cNvPr>
+          <p:cNvSpPr txBox="1"/>
+          <p:nvPr/>
+        </p:nvSpPr>
+        <p:spPr>
+          <a:xfrm>
+            <a:off x="242835" y="3233057"/>
+            <a:ext cx="11706330" cy="646331"/>
+          </a:xfrm>
+          <a:prstGeom prst="rect">
+            <a:avLst/>
+          </a:prstGeom>
+          <a:noFill/>
+        </p:spPr>
         <p:txBody>
           <a:bodyPr wrap="square" rtlCol="0">
             <a:spAutoFit/>
@@ -4956,22 +5451,77 @@
           <a:lstStyle/>
           <a:p>
             <a:r>
-              <a:rPr lang="en-US" sz="1800" dirty="0">
-                <a:effectLst/>
-                <a:latin typeface="Calibri" panose="020F0502020204030204" pitchFamily="34" charset="0"/>
-                <a:ea typeface="Calibri" panose="020F0502020204030204" pitchFamily="34" charset="0"/>
-                <a:cs typeface="Times New Roman" panose="02020603050405020304" pitchFamily="18" charset="0"/>
-              </a:rPr>
-              <a:t>Login/Sign-up/Account button</a:t>
-            </a:r>
-            <a:endParaRPr lang="en-US" dirty="0"/>
+              <a:rPr lang="en-US" dirty="0"/>
+              <a:t>Welcome to our site! We invite you immerse yourself in the thoughtful pieces curated by artists of all kinds. If you’d like to share your thoughts on pieces you like, share your own pieces, or create open-mic events, please register. </a:t>
+            </a:r>
+          </a:p>
+        </p:txBody>
+      </p:sp>
+      <p:sp>
+        <p:nvSpPr>
+          <p:cNvPr id="2" name="Rectangle 1">
+            <a:extLst>
+              <a:ext uri="{FF2B5EF4-FFF2-40B4-BE49-F238E27FC236}">
+                <a16:creationId xmlns:a16="http://schemas.microsoft.com/office/drawing/2014/main" id="{B11F849D-9552-DFED-72F9-34FE3B79CAA2}"/>
+              </a:ext>
+            </a:extLst>
+          </p:cNvPr>
+          <p:cNvSpPr/>
+          <p:nvPr/>
+        </p:nvSpPr>
+        <p:spPr>
+          <a:xfrm>
+            <a:off x="385187" y="1270484"/>
+            <a:ext cx="11421625" cy="1789867"/>
+          </a:xfrm>
+          <a:prstGeom prst="rect">
+            <a:avLst/>
+          </a:prstGeom>
+          <a:solidFill>
+            <a:schemeClr val="accent6">
+              <a:lumMod val="40000"/>
+              <a:lumOff val="60000"/>
+            </a:schemeClr>
+          </a:solidFill>
+          <a:ln>
+            <a:solidFill>
+              <a:schemeClr val="accent6">
+                <a:lumMod val="60000"/>
+                <a:lumOff val="40000"/>
+              </a:schemeClr>
+            </a:solidFill>
+          </a:ln>
+        </p:spPr>
+        <p:style>
+          <a:lnRef idx="2">
+            <a:schemeClr val="accent6"/>
+          </a:lnRef>
+          <a:fillRef idx="1">
+            <a:schemeClr val="lt1"/>
+          </a:fillRef>
+          <a:effectRef idx="0">
+            <a:schemeClr val="accent6"/>
+          </a:effectRef>
+          <a:fontRef idx="minor">
+            <a:schemeClr val="dk1"/>
+          </a:fontRef>
+        </p:style>
+        <p:txBody>
+          <a:bodyPr rtlCol="0" anchor="ctr"/>
+          <a:lstStyle/>
+          <a:p>
+            <a:pPr algn="ctr"/>
+            <a:r>
+              <a:rPr lang="en-US" dirty="0"/>
+              <a:t>A Banner Image</a:t>
+            </a:r>
           </a:p>
         </p:txBody>
       </p:sp>
     </p:spTree>
     <p:extLst>
       <p:ext uri="{BB962C8B-B14F-4D97-AF65-F5344CB8AC3E}">
-        <p14:creationId xmlns:p14="http://schemas.microsoft.com/office/powerpoint/2010/main" val="1013733592"/>
+        <p14:creationId xmlns:p14="http://schemas.microsoft.com/office/powerpoint/2010/main" val="1230075902"/>
       </p:ext>
     </p:extLst>
   </p:cSld>
@@ -5013,7 +5563,7 @@
         <p:spPr>
           <a:xfrm>
             <a:off x="275846" y="765589"/>
-            <a:ext cx="11410545" cy="2370329"/>
+            <a:ext cx="11410545" cy="1572418"/>
           </a:xfrm>
           <a:prstGeom prst="rect">
             <a:avLst/>
@@ -5044,7 +5594,7 @@
                 <a:ea typeface="Calibri" panose="020F0502020204030204" pitchFamily="34" charset="0"/>
                 <a:cs typeface="Times New Roman" panose="02020603050405020304" pitchFamily="18" charset="0"/>
               </a:rPr>
-              <a:t>- There should be some button that enables/creates a section or page that allows the user to post textual-content. </a:t>
+              <a:t>- Button should provide way to allow the user to login using valid credentials</a:t>
             </a:r>
           </a:p>
           <a:p>
@@ -5066,7 +5616,7 @@
                 <a:ea typeface="Calibri" panose="020F0502020204030204" pitchFamily="34" charset="0"/>
                 <a:cs typeface="Times New Roman" panose="02020603050405020304" pitchFamily="18" charset="0"/>
               </a:rPr>
-              <a:t>- Post should contain:</a:t>
+              <a:t>- Button should provide way to allow the user to create account</a:t>
             </a:r>
           </a:p>
           <a:p>
@@ -5082,21 +5632,13 @@
               </a:spcAft>
             </a:pPr>
             <a:r>
-              <a:rPr lang="en-US" kern="100" dirty="0">
-                <a:latin typeface="Calibri" panose="020F0502020204030204" pitchFamily="34" charset="0"/>
-                <a:ea typeface="Calibri" panose="020F0502020204030204" pitchFamily="34" charset="0"/>
-                <a:cs typeface="Times New Roman" panose="02020603050405020304" pitchFamily="18" charset="0"/>
-              </a:rPr>
-              <a:t>	- </a:t>
-            </a:r>
-            <a:r>
               <a:rPr lang="en-US" sz="1800" kern="100" dirty="0">
                 <a:effectLst/>
                 <a:latin typeface="Calibri" panose="020F0502020204030204" pitchFamily="34" charset="0"/>
                 <a:ea typeface="Calibri" panose="020F0502020204030204" pitchFamily="34" charset="0"/>
                 <a:cs typeface="Times New Roman" panose="02020603050405020304" pitchFamily="18" charset="0"/>
               </a:rPr>
-              <a:t>content</a:t>
+              <a:t>- Button text should switch to “Account” or be hidden if user notify user is logged in</a:t>
             </a:r>
           </a:p>
           <a:p>
@@ -5118,97 +5660,8 @@
                 <a:ea typeface="Calibri" panose="020F0502020204030204" pitchFamily="34" charset="0"/>
                 <a:cs typeface="Times New Roman" panose="02020603050405020304" pitchFamily="18" charset="0"/>
               </a:rPr>
-              <a:t>	- username</a:t>
-            </a:r>
-          </a:p>
-          <a:p>
-            <a:pPr marL="0" marR="0">
-              <a:lnSpc>
-                <a:spcPct val="107000"/>
-              </a:lnSpc>
-              <a:spcBef>
-                <a:spcPts val="0"/>
-              </a:spcBef>
-              <a:spcAft>
-                <a:spcPts val="800"/>
-              </a:spcAft>
-            </a:pPr>
-            <a:r>
-              <a:rPr lang="en-US" sz="1800" kern="100" dirty="0">
-                <a:effectLst/>
-                <a:latin typeface="Calibri" panose="020F0502020204030204" pitchFamily="34" charset="0"/>
-                <a:ea typeface="Calibri" panose="020F0502020204030204" pitchFamily="34" charset="0"/>
-                <a:cs typeface="Times New Roman" panose="02020603050405020304" pitchFamily="18" charset="0"/>
-              </a:rPr>
-              <a:t>	- </a:t>
-            </a:r>
-            <a:r>
-              <a:rPr lang="en-US" sz="1800" kern="100" dirty="0" err="1">
-                <a:effectLst/>
-                <a:latin typeface="Calibri" panose="020F0502020204030204" pitchFamily="34" charset="0"/>
-                <a:ea typeface="Calibri" panose="020F0502020204030204" pitchFamily="34" charset="0"/>
-                <a:cs typeface="Times New Roman" panose="02020603050405020304" pitchFamily="18" charset="0"/>
-              </a:rPr>
-              <a:t>userId</a:t>
-            </a:r>
-            <a:endParaRPr lang="en-US" kern="100" dirty="0">
-              <a:latin typeface="Calibri" panose="020F0502020204030204" pitchFamily="34" charset="0"/>
-              <a:ea typeface="Calibri" panose="020F0502020204030204" pitchFamily="34" charset="0"/>
-              <a:cs typeface="Times New Roman" panose="02020603050405020304" pitchFamily="18" charset="0"/>
-            </a:endParaRPr>
-          </a:p>
-          <a:p>
-            <a:pPr marL="0" marR="0">
-              <a:lnSpc>
-                <a:spcPct val="107000"/>
-              </a:lnSpc>
-              <a:spcBef>
-                <a:spcPts val="0"/>
-              </a:spcBef>
-              <a:spcAft>
-                <a:spcPts val="800"/>
-              </a:spcAft>
-            </a:pPr>
-            <a:r>
-              <a:rPr lang="en-US" kern="100" dirty="0">
-                <a:latin typeface="Calibri" panose="020F0502020204030204" pitchFamily="34" charset="0"/>
-                <a:ea typeface="Calibri" panose="020F0502020204030204" pitchFamily="34" charset="0"/>
-                <a:cs typeface="Times New Roman" panose="02020603050405020304" pitchFamily="18" charset="0"/>
-              </a:rPr>
-              <a:t>	-</a:t>
-            </a:r>
-            <a:r>
-              <a:rPr lang="en-US" sz="1800" kern="100" dirty="0">
-                <a:effectLst/>
-                <a:latin typeface="Calibri" panose="020F0502020204030204" pitchFamily="34" charset="0"/>
-                <a:ea typeface="Calibri" panose="020F0502020204030204" pitchFamily="34" charset="0"/>
-                <a:cs typeface="Times New Roman" panose="02020603050405020304" pitchFamily="18" charset="0"/>
-              </a:rPr>
-              <a:t> upvote list (list of </a:t>
-            </a:r>
-            <a:r>
-              <a:rPr lang="en-US" sz="1800" kern="100" dirty="0" err="1">
-                <a:effectLst/>
-                <a:latin typeface="Calibri" panose="020F0502020204030204" pitchFamily="34" charset="0"/>
-                <a:ea typeface="Calibri" panose="020F0502020204030204" pitchFamily="34" charset="0"/>
-                <a:cs typeface="Times New Roman" panose="02020603050405020304" pitchFamily="18" charset="0"/>
-              </a:rPr>
-              <a:t>userId</a:t>
-            </a:r>
-            <a:r>
-              <a:rPr lang="en-US" sz="1800" kern="100" dirty="0">
-                <a:effectLst/>
-                <a:latin typeface="Calibri" panose="020F0502020204030204" pitchFamily="34" charset="0"/>
-                <a:ea typeface="Calibri" panose="020F0502020204030204" pitchFamily="34" charset="0"/>
-                <a:cs typeface="Times New Roman" panose="02020603050405020304" pitchFamily="18" charset="0"/>
-              </a:rPr>
-              <a:t> that upvoted)</a:t>
-            </a:r>
-            <a:endParaRPr lang="en-US" kern="100" dirty="0">
-              <a:latin typeface="Calibri" panose="020F0502020204030204" pitchFamily="34" charset="0"/>
-              <a:ea typeface="Calibri" panose="020F0502020204030204" pitchFamily="34" charset="0"/>
-              <a:cs typeface="Times New Roman" panose="02020603050405020304" pitchFamily="18" charset="0"/>
-            </a:endParaRPr>
+              <a:t>- Button should navigate to account details page if logged in (no requirement if time allows)</a:t>
+            </a:r>
           </a:p>
         </p:txBody>
       </p:sp>
@@ -5247,7 +5700,7 @@
                 <a:ea typeface="Calibri" panose="020F0502020204030204" pitchFamily="34" charset="0"/>
                 <a:cs typeface="Times New Roman" panose="02020603050405020304" pitchFamily="18" charset="0"/>
               </a:rPr>
-              <a:t>User post creation</a:t>
+              <a:t>Login/Sign-up/Account button</a:t>
             </a:r>
             <a:endParaRPr lang="en-US" dirty="0"/>
           </a:p>
@@ -5256,7 +5709,7 @@
     </p:spTree>
     <p:extLst>
       <p:ext uri="{BB962C8B-B14F-4D97-AF65-F5344CB8AC3E}">
-        <p14:creationId xmlns:p14="http://schemas.microsoft.com/office/powerpoint/2010/main" val="2540500196"/>
+        <p14:creationId xmlns:p14="http://schemas.microsoft.com/office/powerpoint/2010/main" val="1013733592"/>
       </p:ext>
     </p:extLst>
   </p:cSld>
@@ -5298,7 +5751,7 @@
         <p:spPr>
           <a:xfrm>
             <a:off x="275846" y="765589"/>
-            <a:ext cx="11410545" cy="3863558"/>
+            <a:ext cx="11410545" cy="2370329"/>
           </a:xfrm>
           <a:prstGeom prst="rect">
             <a:avLst/>
@@ -5329,7 +5782,7 @@
                 <a:ea typeface="Calibri" panose="020F0502020204030204" pitchFamily="34" charset="0"/>
                 <a:cs typeface="Times New Roman" panose="02020603050405020304" pitchFamily="18" charset="0"/>
               </a:rPr>
-              <a:t>- User post should display </a:t>
+              <a:t>- There should be some button that enables/creates a section or page that allows the user to post textual-content. </a:t>
             </a:r>
           </a:p>
           <a:p>
@@ -5351,7 +5804,7 @@
                 <a:ea typeface="Calibri" panose="020F0502020204030204" pitchFamily="34" charset="0"/>
                 <a:cs typeface="Times New Roman" panose="02020603050405020304" pitchFamily="18" charset="0"/>
               </a:rPr>
-              <a:t>	- username</a:t>
+              <a:t>- Post should contain:</a:t>
             </a:r>
           </a:p>
           <a:p>
@@ -5367,29 +5820,22 @@
               </a:spcAft>
             </a:pPr>
             <a:r>
+              <a:rPr lang="en-US" kern="100" dirty="0">
+                <a:latin typeface="Calibri" panose="020F0502020204030204" pitchFamily="34" charset="0"/>
+                <a:ea typeface="Calibri" panose="020F0502020204030204" pitchFamily="34" charset="0"/>
+                <a:cs typeface="Times New Roman" panose="02020603050405020304" pitchFamily="18" charset="0"/>
+              </a:rPr>
+              <a:t>	- </a:t>
+            </a:r>
+            <a:r>
               <a:rPr lang="en-US" sz="1800" kern="100" dirty="0">
                 <a:effectLst/>
                 <a:latin typeface="Calibri" panose="020F0502020204030204" pitchFamily="34" charset="0"/>
                 <a:ea typeface="Calibri" panose="020F0502020204030204" pitchFamily="34" charset="0"/>
                 <a:cs typeface="Times New Roman" panose="02020603050405020304" pitchFamily="18" charset="0"/>
               </a:rPr>
-              <a:t>	- </a:t>
-            </a:r>
-            <a:r>
-              <a:rPr lang="en-US" sz="1800" kern="100" dirty="0" err="1">
-                <a:effectLst/>
-                <a:latin typeface="Calibri" panose="020F0502020204030204" pitchFamily="34" charset="0"/>
-                <a:ea typeface="Calibri" panose="020F0502020204030204" pitchFamily="34" charset="0"/>
-                <a:cs typeface="Times New Roman" panose="02020603050405020304" pitchFamily="18" charset="0"/>
-              </a:rPr>
-              <a:t>userId</a:t>
-            </a:r>
-            <a:endParaRPr lang="en-US" sz="1800" kern="100" dirty="0">
-              <a:effectLst/>
-              <a:latin typeface="Calibri" panose="020F0502020204030204" pitchFamily="34" charset="0"/>
-              <a:ea typeface="Calibri" panose="020F0502020204030204" pitchFamily="34" charset="0"/>
-              <a:cs typeface="Times New Roman" panose="02020603050405020304" pitchFamily="18" charset="0"/>
-            </a:endParaRPr>
+              <a:t>content</a:t>
+            </a:r>
           </a:p>
           <a:p>
             <a:pPr marL="0" marR="0">
@@ -5404,21 +5850,13 @@
               </a:spcAft>
             </a:pPr>
             <a:r>
-              <a:rPr lang="en-US" kern="100" dirty="0">
-                <a:latin typeface="Calibri" panose="020F0502020204030204" pitchFamily="34" charset="0"/>
-                <a:ea typeface="Calibri" panose="020F0502020204030204" pitchFamily="34" charset="0"/>
-                <a:cs typeface="Times New Roman" panose="02020603050405020304" pitchFamily="18" charset="0"/>
-              </a:rPr>
-              <a:t>	- </a:t>
-            </a:r>
-            <a:r>
               <a:rPr lang="en-US" sz="1800" kern="100" dirty="0">
                 <a:effectLst/>
                 <a:latin typeface="Calibri" panose="020F0502020204030204" pitchFamily="34" charset="0"/>
                 <a:ea typeface="Calibri" panose="020F0502020204030204" pitchFamily="34" charset="0"/>
                 <a:cs typeface="Times New Roman" panose="02020603050405020304" pitchFamily="18" charset="0"/>
               </a:rPr>
-              <a:t>content</a:t>
+              <a:t>	- username</a:t>
             </a:r>
           </a:p>
           <a:p>
@@ -5434,22 +5872,28 @@
               </a:spcAft>
             </a:pPr>
             <a:r>
-              <a:rPr lang="en-US" kern="100" dirty="0">
-                <a:latin typeface="Calibri" panose="020F0502020204030204" pitchFamily="34" charset="0"/>
-                <a:ea typeface="Calibri" panose="020F0502020204030204" pitchFamily="34" charset="0"/>
-                <a:cs typeface="Times New Roman" panose="02020603050405020304" pitchFamily="18" charset="0"/>
-              </a:rPr>
-              <a:t>	-</a:t>
-            </a:r>
-            <a:r>
               <a:rPr lang="en-US" sz="1800" kern="100" dirty="0">
                 <a:effectLst/>
                 <a:latin typeface="Calibri" panose="020F0502020204030204" pitchFamily="34" charset="0"/>
                 <a:ea typeface="Calibri" panose="020F0502020204030204" pitchFamily="34" charset="0"/>
                 <a:cs typeface="Times New Roman" panose="02020603050405020304" pitchFamily="18" charset="0"/>
               </a:rPr>
-              <a:t> count of upvotes for given post</a:t>
-            </a:r>
+              <a:t>	- </a:t>
+            </a:r>
+            <a:r>
+              <a:rPr lang="en-US" sz="1800" kern="100" dirty="0" err="1">
+                <a:effectLst/>
+                <a:latin typeface="Calibri" panose="020F0502020204030204" pitchFamily="34" charset="0"/>
+                <a:ea typeface="Calibri" panose="020F0502020204030204" pitchFamily="34" charset="0"/>
+                <a:cs typeface="Times New Roman" panose="02020603050405020304" pitchFamily="18" charset="0"/>
+              </a:rPr>
+              <a:t>userId</a:t>
+            </a:r>
+            <a:endParaRPr lang="en-US" kern="100" dirty="0">
+              <a:latin typeface="Calibri" panose="020F0502020204030204" pitchFamily="34" charset="0"/>
+              <a:ea typeface="Calibri" panose="020F0502020204030204" pitchFamily="34" charset="0"/>
+              <a:cs typeface="Times New Roman" panose="02020603050405020304" pitchFamily="18" charset="0"/>
+            </a:endParaRPr>
           </a:p>
           <a:p>
             <a:pPr marL="0" marR="0">
@@ -5478,21 +5922,17 @@
                 <a:ea typeface="Calibri" panose="020F0502020204030204" pitchFamily="34" charset="0"/>
                 <a:cs typeface="Times New Roman" panose="02020603050405020304" pitchFamily="18" charset="0"/>
               </a:rPr>
-              <a:t> upvote button</a:t>
-            </a:r>
-          </a:p>
-          <a:p>
-            <a:pPr marL="0" marR="0">
-              <a:lnSpc>
-                <a:spcPct val="107000"/>
-              </a:lnSpc>
-              <a:spcBef>
-                <a:spcPts val="0"/>
-              </a:spcBef>
-              <a:spcAft>
-                <a:spcPts val="800"/>
-              </a:spcAft>
-            </a:pPr>
+              <a:t> upvote list (list of </a:t>
+            </a:r>
+            <a:r>
+              <a:rPr lang="en-US" sz="1800" kern="100" dirty="0" err="1">
+                <a:effectLst/>
+                <a:latin typeface="Calibri" panose="020F0502020204030204" pitchFamily="34" charset="0"/>
+                <a:ea typeface="Calibri" panose="020F0502020204030204" pitchFamily="34" charset="0"/>
+                <a:cs typeface="Times New Roman" panose="02020603050405020304" pitchFamily="18" charset="0"/>
+              </a:rPr>
+              <a:t>userId</a:t>
+            </a:r>
             <a:r>
               <a:rPr lang="en-US" sz="1800" kern="100" dirty="0">
                 <a:effectLst/>
@@ -5500,58 +5940,8 @@
                 <a:ea typeface="Calibri" panose="020F0502020204030204" pitchFamily="34" charset="0"/>
                 <a:cs typeface="Times New Roman" panose="02020603050405020304" pitchFamily="18" charset="0"/>
               </a:rPr>
-              <a:t>	- analysis of posts (Word frequency breakdown)</a:t>
-            </a:r>
-          </a:p>
-          <a:p>
-            <a:pPr marL="0" marR="0">
-              <a:lnSpc>
-                <a:spcPct val="107000"/>
-              </a:lnSpc>
-              <a:spcBef>
-                <a:spcPts val="0"/>
-              </a:spcBef>
-              <a:spcAft>
-                <a:spcPts val="800"/>
-              </a:spcAft>
-            </a:pPr>
-            <a:r>
-              <a:rPr lang="en-US" kern="100" dirty="0">
-                <a:latin typeface="Calibri" panose="020F0502020204030204" pitchFamily="34" charset="0"/>
-                <a:ea typeface="Calibri" panose="020F0502020204030204" pitchFamily="34" charset="0"/>
-                <a:cs typeface="Times New Roman" panose="02020603050405020304" pitchFamily="18" charset="0"/>
-              </a:rPr>
-              <a:t>		- Minimally a display that lists a map of each word in user content to number of occurrences, but if time allows, perhaps create some data visuals (</a:t>
-            </a:r>
-            <a:r>
-              <a:rPr lang="en-US" kern="100" dirty="0" err="1">
-                <a:latin typeface="Calibri" panose="020F0502020204030204" pitchFamily="34" charset="0"/>
-                <a:ea typeface="Calibri" panose="020F0502020204030204" pitchFamily="34" charset="0"/>
-                <a:cs typeface="Times New Roman" panose="02020603050405020304" pitchFamily="18" charset="0"/>
-              </a:rPr>
-              <a:t>bargraph</a:t>
-            </a:r>
-            <a:r>
-              <a:rPr lang="en-US" kern="100" dirty="0">
-                <a:latin typeface="Calibri" panose="020F0502020204030204" pitchFamily="34" charset="0"/>
-                <a:ea typeface="Calibri" panose="020F0502020204030204" pitchFamily="34" charset="0"/>
-                <a:cs typeface="Times New Roman" panose="02020603050405020304" pitchFamily="18" charset="0"/>
-              </a:rPr>
-              <a:t>?)</a:t>
-            </a:r>
-          </a:p>
-          <a:p>
-            <a:pPr marL="0" marR="0">
-              <a:lnSpc>
-                <a:spcPct val="107000"/>
-              </a:lnSpc>
-              <a:spcBef>
-                <a:spcPts val="0"/>
-              </a:spcBef>
-              <a:spcAft>
-                <a:spcPts val="800"/>
-              </a:spcAft>
-            </a:pPr>
+              <a:t> that upvoted)</a:t>
+            </a:r>
             <a:endParaRPr lang="en-US" kern="100" dirty="0">
               <a:latin typeface="Calibri" panose="020F0502020204030204" pitchFamily="34" charset="0"/>
               <a:ea typeface="Calibri" panose="020F0502020204030204" pitchFamily="34" charset="0"/>
@@ -5595,7 +5985,7 @@
                 <a:ea typeface="Calibri" panose="020F0502020204030204" pitchFamily="34" charset="0"/>
                 <a:cs typeface="Times New Roman" panose="02020603050405020304" pitchFamily="18" charset="0"/>
               </a:rPr>
-              <a:t>User post display</a:t>
+              <a:t>User post creation</a:t>
             </a:r>
             <a:endParaRPr lang="en-US" dirty="0"/>
           </a:p>
@@ -5604,7 +5994,7 @@
     </p:spTree>
     <p:extLst>
       <p:ext uri="{BB962C8B-B14F-4D97-AF65-F5344CB8AC3E}">
-        <p14:creationId xmlns:p14="http://schemas.microsoft.com/office/powerpoint/2010/main" val="3911164142"/>
+        <p14:creationId xmlns:p14="http://schemas.microsoft.com/office/powerpoint/2010/main" val="2540500196"/>
       </p:ext>
     </p:extLst>
   </p:cSld>
@@ -5633,6 +6023,354 @@
       </p:grpSpPr>
       <p:sp>
         <p:nvSpPr>
+          <p:cNvPr id="4" name="TextBox 3">
+            <a:extLst>
+              <a:ext uri="{FF2B5EF4-FFF2-40B4-BE49-F238E27FC236}">
+                <a16:creationId xmlns:a16="http://schemas.microsoft.com/office/drawing/2014/main" id="{93042950-E66C-9CF4-A917-488019161FCA}"/>
+              </a:ext>
+            </a:extLst>
+          </p:cNvPr>
+          <p:cNvSpPr txBox="1"/>
+          <p:nvPr/>
+        </p:nvSpPr>
+        <p:spPr>
+          <a:xfrm>
+            <a:off x="275846" y="765589"/>
+            <a:ext cx="11410545" cy="3863558"/>
+          </a:xfrm>
+          <a:prstGeom prst="rect">
+            <a:avLst/>
+          </a:prstGeom>
+          <a:noFill/>
+        </p:spPr>
+        <p:txBody>
+          <a:bodyPr wrap="square" rtlCol="0">
+            <a:spAutoFit/>
+          </a:bodyPr>
+          <a:lstStyle/>
+          <a:p>
+            <a:pPr marL="0" marR="0">
+              <a:lnSpc>
+                <a:spcPct val="107000"/>
+              </a:lnSpc>
+              <a:spcBef>
+                <a:spcPts val="0"/>
+              </a:spcBef>
+              <a:spcAft>
+                <a:spcPts val="800"/>
+              </a:spcAft>
+            </a:pPr>
+            <a:r>
+              <a:rPr lang="en-US" sz="1800" kern="100" dirty="0">
+                <a:effectLst/>
+                <a:latin typeface="Calibri" panose="020F0502020204030204" pitchFamily="34" charset="0"/>
+                <a:ea typeface="Calibri" panose="020F0502020204030204" pitchFamily="34" charset="0"/>
+                <a:cs typeface="Times New Roman" panose="02020603050405020304" pitchFamily="18" charset="0"/>
+              </a:rPr>
+              <a:t>- User post should display </a:t>
+            </a:r>
+          </a:p>
+          <a:p>
+            <a:pPr marL="0" marR="0">
+              <a:lnSpc>
+                <a:spcPct val="107000"/>
+              </a:lnSpc>
+              <a:spcBef>
+                <a:spcPts val="0"/>
+              </a:spcBef>
+              <a:spcAft>
+                <a:spcPts val="800"/>
+              </a:spcAft>
+            </a:pPr>
+            <a:r>
+              <a:rPr lang="en-US" sz="1800" kern="100" dirty="0">
+                <a:effectLst/>
+                <a:latin typeface="Calibri" panose="020F0502020204030204" pitchFamily="34" charset="0"/>
+                <a:ea typeface="Calibri" panose="020F0502020204030204" pitchFamily="34" charset="0"/>
+                <a:cs typeface="Times New Roman" panose="02020603050405020304" pitchFamily="18" charset="0"/>
+              </a:rPr>
+              <a:t>	- username</a:t>
+            </a:r>
+          </a:p>
+          <a:p>
+            <a:pPr marL="0" marR="0">
+              <a:lnSpc>
+                <a:spcPct val="107000"/>
+              </a:lnSpc>
+              <a:spcBef>
+                <a:spcPts val="0"/>
+              </a:spcBef>
+              <a:spcAft>
+                <a:spcPts val="800"/>
+              </a:spcAft>
+            </a:pPr>
+            <a:r>
+              <a:rPr lang="en-US" sz="1800" kern="100" dirty="0">
+                <a:effectLst/>
+                <a:latin typeface="Calibri" panose="020F0502020204030204" pitchFamily="34" charset="0"/>
+                <a:ea typeface="Calibri" panose="020F0502020204030204" pitchFamily="34" charset="0"/>
+                <a:cs typeface="Times New Roman" panose="02020603050405020304" pitchFamily="18" charset="0"/>
+              </a:rPr>
+              <a:t>	- </a:t>
+            </a:r>
+            <a:r>
+              <a:rPr lang="en-US" sz="1800" kern="100" dirty="0" err="1">
+                <a:effectLst/>
+                <a:latin typeface="Calibri" panose="020F0502020204030204" pitchFamily="34" charset="0"/>
+                <a:ea typeface="Calibri" panose="020F0502020204030204" pitchFamily="34" charset="0"/>
+                <a:cs typeface="Times New Roman" panose="02020603050405020304" pitchFamily="18" charset="0"/>
+              </a:rPr>
+              <a:t>userId</a:t>
+            </a:r>
+            <a:endParaRPr lang="en-US" sz="1800" kern="100" dirty="0">
+              <a:effectLst/>
+              <a:latin typeface="Calibri" panose="020F0502020204030204" pitchFamily="34" charset="0"/>
+              <a:ea typeface="Calibri" panose="020F0502020204030204" pitchFamily="34" charset="0"/>
+              <a:cs typeface="Times New Roman" panose="02020603050405020304" pitchFamily="18" charset="0"/>
+            </a:endParaRPr>
+          </a:p>
+          <a:p>
+            <a:pPr marL="0" marR="0">
+              <a:lnSpc>
+                <a:spcPct val="107000"/>
+              </a:lnSpc>
+              <a:spcBef>
+                <a:spcPts val="0"/>
+              </a:spcBef>
+              <a:spcAft>
+                <a:spcPts val="800"/>
+              </a:spcAft>
+            </a:pPr>
+            <a:r>
+              <a:rPr lang="en-US" kern="100" dirty="0">
+                <a:latin typeface="Calibri" panose="020F0502020204030204" pitchFamily="34" charset="0"/>
+                <a:ea typeface="Calibri" panose="020F0502020204030204" pitchFamily="34" charset="0"/>
+                <a:cs typeface="Times New Roman" panose="02020603050405020304" pitchFamily="18" charset="0"/>
+              </a:rPr>
+              <a:t>	- </a:t>
+            </a:r>
+            <a:r>
+              <a:rPr lang="en-US" sz="1800" kern="100" dirty="0">
+                <a:effectLst/>
+                <a:latin typeface="Calibri" panose="020F0502020204030204" pitchFamily="34" charset="0"/>
+                <a:ea typeface="Calibri" panose="020F0502020204030204" pitchFamily="34" charset="0"/>
+                <a:cs typeface="Times New Roman" panose="02020603050405020304" pitchFamily="18" charset="0"/>
+              </a:rPr>
+              <a:t>content</a:t>
+            </a:r>
+          </a:p>
+          <a:p>
+            <a:pPr marL="0" marR="0">
+              <a:lnSpc>
+                <a:spcPct val="107000"/>
+              </a:lnSpc>
+              <a:spcBef>
+                <a:spcPts val="0"/>
+              </a:spcBef>
+              <a:spcAft>
+                <a:spcPts val="800"/>
+              </a:spcAft>
+            </a:pPr>
+            <a:r>
+              <a:rPr lang="en-US" kern="100" dirty="0">
+                <a:latin typeface="Calibri" panose="020F0502020204030204" pitchFamily="34" charset="0"/>
+                <a:ea typeface="Calibri" panose="020F0502020204030204" pitchFamily="34" charset="0"/>
+                <a:cs typeface="Times New Roman" panose="02020603050405020304" pitchFamily="18" charset="0"/>
+              </a:rPr>
+              <a:t>	-</a:t>
+            </a:r>
+            <a:r>
+              <a:rPr lang="en-US" sz="1800" kern="100" dirty="0">
+                <a:effectLst/>
+                <a:latin typeface="Calibri" panose="020F0502020204030204" pitchFamily="34" charset="0"/>
+                <a:ea typeface="Calibri" panose="020F0502020204030204" pitchFamily="34" charset="0"/>
+                <a:cs typeface="Times New Roman" panose="02020603050405020304" pitchFamily="18" charset="0"/>
+              </a:rPr>
+              <a:t> count of upvotes for given post</a:t>
+            </a:r>
+          </a:p>
+          <a:p>
+            <a:pPr marL="0" marR="0">
+              <a:lnSpc>
+                <a:spcPct val="107000"/>
+              </a:lnSpc>
+              <a:spcBef>
+                <a:spcPts val="0"/>
+              </a:spcBef>
+              <a:spcAft>
+                <a:spcPts val="800"/>
+              </a:spcAft>
+            </a:pPr>
+            <a:r>
+              <a:rPr lang="en-US" kern="100" dirty="0">
+                <a:latin typeface="Calibri" panose="020F0502020204030204" pitchFamily="34" charset="0"/>
+                <a:ea typeface="Calibri" panose="020F0502020204030204" pitchFamily="34" charset="0"/>
+                <a:cs typeface="Times New Roman" panose="02020603050405020304" pitchFamily="18" charset="0"/>
+              </a:rPr>
+              <a:t>	-</a:t>
+            </a:r>
+            <a:r>
+              <a:rPr lang="en-US" sz="1800" kern="100" dirty="0">
+                <a:effectLst/>
+                <a:latin typeface="Calibri" panose="020F0502020204030204" pitchFamily="34" charset="0"/>
+                <a:ea typeface="Calibri" panose="020F0502020204030204" pitchFamily="34" charset="0"/>
+                <a:cs typeface="Times New Roman" panose="02020603050405020304" pitchFamily="18" charset="0"/>
+              </a:rPr>
+              <a:t> upvote button</a:t>
+            </a:r>
+          </a:p>
+          <a:p>
+            <a:pPr marL="0" marR="0">
+              <a:lnSpc>
+                <a:spcPct val="107000"/>
+              </a:lnSpc>
+              <a:spcBef>
+                <a:spcPts val="0"/>
+              </a:spcBef>
+              <a:spcAft>
+                <a:spcPts val="800"/>
+              </a:spcAft>
+            </a:pPr>
+            <a:r>
+              <a:rPr lang="en-US" sz="1800" kern="100" dirty="0">
+                <a:effectLst/>
+                <a:latin typeface="Calibri" panose="020F0502020204030204" pitchFamily="34" charset="0"/>
+                <a:ea typeface="Calibri" panose="020F0502020204030204" pitchFamily="34" charset="0"/>
+                <a:cs typeface="Times New Roman" panose="02020603050405020304" pitchFamily="18" charset="0"/>
+              </a:rPr>
+              <a:t>	- analysis of posts (Word frequency breakdown)</a:t>
+            </a:r>
+          </a:p>
+          <a:p>
+            <a:pPr marL="0" marR="0">
+              <a:lnSpc>
+                <a:spcPct val="107000"/>
+              </a:lnSpc>
+              <a:spcBef>
+                <a:spcPts val="0"/>
+              </a:spcBef>
+              <a:spcAft>
+                <a:spcPts val="800"/>
+              </a:spcAft>
+            </a:pPr>
+            <a:r>
+              <a:rPr lang="en-US" kern="100" dirty="0">
+                <a:latin typeface="Calibri" panose="020F0502020204030204" pitchFamily="34" charset="0"/>
+                <a:ea typeface="Calibri" panose="020F0502020204030204" pitchFamily="34" charset="0"/>
+                <a:cs typeface="Times New Roman" panose="02020603050405020304" pitchFamily="18" charset="0"/>
+              </a:rPr>
+              <a:t>		- Minimally a display that lists a map of each word in user content to number of occurrences, but if time allows, perhaps create some data visuals (</a:t>
+            </a:r>
+            <a:r>
+              <a:rPr lang="en-US" kern="100" dirty="0" err="1">
+                <a:latin typeface="Calibri" panose="020F0502020204030204" pitchFamily="34" charset="0"/>
+                <a:ea typeface="Calibri" panose="020F0502020204030204" pitchFamily="34" charset="0"/>
+                <a:cs typeface="Times New Roman" panose="02020603050405020304" pitchFamily="18" charset="0"/>
+              </a:rPr>
+              <a:t>bargraph</a:t>
+            </a:r>
+            <a:r>
+              <a:rPr lang="en-US" kern="100" dirty="0">
+                <a:latin typeface="Calibri" panose="020F0502020204030204" pitchFamily="34" charset="0"/>
+                <a:ea typeface="Calibri" panose="020F0502020204030204" pitchFamily="34" charset="0"/>
+                <a:cs typeface="Times New Roman" panose="02020603050405020304" pitchFamily="18" charset="0"/>
+              </a:rPr>
+              <a:t>?)</a:t>
+            </a:r>
+          </a:p>
+          <a:p>
+            <a:pPr marL="0" marR="0">
+              <a:lnSpc>
+                <a:spcPct val="107000"/>
+              </a:lnSpc>
+              <a:spcBef>
+                <a:spcPts val="0"/>
+              </a:spcBef>
+              <a:spcAft>
+                <a:spcPts val="800"/>
+              </a:spcAft>
+            </a:pPr>
+            <a:endParaRPr lang="en-US" kern="100" dirty="0">
+              <a:latin typeface="Calibri" panose="020F0502020204030204" pitchFamily="34" charset="0"/>
+              <a:ea typeface="Calibri" panose="020F0502020204030204" pitchFamily="34" charset="0"/>
+              <a:cs typeface="Times New Roman" panose="02020603050405020304" pitchFamily="18" charset="0"/>
+            </a:endParaRPr>
+          </a:p>
+        </p:txBody>
+      </p:sp>
+      <p:sp>
+        <p:nvSpPr>
+          <p:cNvPr id="2" name="TextBox 1">
+            <a:extLst>
+              <a:ext uri="{FF2B5EF4-FFF2-40B4-BE49-F238E27FC236}">
+                <a16:creationId xmlns:a16="http://schemas.microsoft.com/office/drawing/2014/main" id="{CB46AF81-95B8-D80D-804A-CADBD595992E}"/>
+              </a:ext>
+            </a:extLst>
+          </p:cNvPr>
+          <p:cNvSpPr txBox="1"/>
+          <p:nvPr/>
+        </p:nvSpPr>
+        <p:spPr>
+          <a:xfrm>
+            <a:off x="275847" y="161432"/>
+            <a:ext cx="11410545" cy="369332"/>
+          </a:xfrm>
+          <a:prstGeom prst="rect">
+            <a:avLst/>
+          </a:prstGeom>
+          <a:noFill/>
+        </p:spPr>
+        <p:txBody>
+          <a:bodyPr wrap="square" rtlCol="0">
+            <a:spAutoFit/>
+          </a:bodyPr>
+          <a:lstStyle/>
+          <a:p>
+            <a:r>
+              <a:rPr lang="en-US" sz="1800" dirty="0">
+                <a:effectLst/>
+                <a:latin typeface="Calibri" panose="020F0502020204030204" pitchFamily="34" charset="0"/>
+                <a:ea typeface="Calibri" panose="020F0502020204030204" pitchFamily="34" charset="0"/>
+                <a:cs typeface="Times New Roman" panose="02020603050405020304" pitchFamily="18" charset="0"/>
+              </a:rPr>
+              <a:t>User post display</a:t>
+            </a:r>
+            <a:endParaRPr lang="en-US" dirty="0"/>
+          </a:p>
+        </p:txBody>
+      </p:sp>
+    </p:spTree>
+    <p:extLst>
+      <p:ext uri="{BB962C8B-B14F-4D97-AF65-F5344CB8AC3E}">
+        <p14:creationId xmlns:p14="http://schemas.microsoft.com/office/powerpoint/2010/main" val="3911164142"/>
+      </p:ext>
+    </p:extLst>
+  </p:cSld>
+  <p:clrMapOvr>
+    <a:masterClrMapping/>
+  </p:clrMapOvr>
+</p:sld>
+</file>
+
+<file path=ppt/slides/slide7.xml><?xml version="1.0" encoding="utf-8"?>
+<p:sld xmlns:a="http://schemas.openxmlformats.org/drawingml/2006/main" xmlns:r="http://schemas.openxmlformats.org/officeDocument/2006/relationships" xmlns:p="http://schemas.openxmlformats.org/presentationml/2006/main">
+  <p:cSld>
+    <p:spTree>
+      <p:nvGrpSpPr>
+        <p:cNvPr id="1" name=""/>
+        <p:cNvGrpSpPr/>
+        <p:nvPr/>
+      </p:nvGrpSpPr>
+      <p:grpSpPr>
+        <a:xfrm>
+          <a:off x="0" y="0"/>
+          <a:ext cx="0" cy="0"/>
+          <a:chOff x="0" y="0"/>
+          <a:chExt cx="0" cy="0"/>
+        </a:xfrm>
+      </p:grpSpPr>
+      <p:sp>
+        <p:nvSpPr>
           <p:cNvPr id="3" name="Rectangle 2">
             <a:extLst>
               <a:ext uri="{FF2B5EF4-FFF2-40B4-BE49-F238E27FC236}">
@@ -5821,55 +6559,6 @@
       </p:sp>
       <p:sp>
         <p:nvSpPr>
-          <p:cNvPr id="14" name="Rectangle: Rounded Corners 13">
-            <a:extLst>
-              <a:ext uri="{FF2B5EF4-FFF2-40B4-BE49-F238E27FC236}">
-                <a16:creationId xmlns:a16="http://schemas.microsoft.com/office/drawing/2014/main" id="{462EB88B-18C0-73B8-1596-E8B79A8C25FF}"/>
-              </a:ext>
-            </a:extLst>
-          </p:cNvPr>
-          <p:cNvSpPr/>
-          <p:nvPr/>
-        </p:nvSpPr>
-        <p:spPr>
-          <a:xfrm>
-            <a:off x="10309607" y="439613"/>
-            <a:ext cx="1497205" cy="357974"/>
-          </a:xfrm>
-          <a:prstGeom prst="roundRect">
-            <a:avLst/>
-          </a:prstGeom>
-        </p:spPr>
-        <p:style>
-          <a:lnRef idx="2">
-            <a:schemeClr val="accent1">
-              <a:shade val="15000"/>
-            </a:schemeClr>
-          </a:lnRef>
-          <a:fillRef idx="1">
-            <a:schemeClr val="accent1"/>
-          </a:fillRef>
-          <a:effectRef idx="0">
-            <a:schemeClr val="accent1"/>
-          </a:effectRef>
-          <a:fontRef idx="minor">
-            <a:schemeClr val="lt1"/>
-          </a:fontRef>
-        </p:style>
-        <p:txBody>
-          <a:bodyPr rtlCol="0" anchor="ctr"/>
-          <a:lstStyle/>
-          <a:p>
-            <a:pPr algn="ctr"/>
-            <a:r>
-              <a:rPr lang="en-US" dirty="0"/>
-              <a:t>Login</a:t>
-            </a:r>
-          </a:p>
-        </p:txBody>
-      </p:sp>
-      <p:sp>
-        <p:nvSpPr>
           <p:cNvPr id="15" name="Rectangle 14">
             <a:extLst>
               <a:ext uri="{FF2B5EF4-FFF2-40B4-BE49-F238E27FC236}">
@@ -5992,7 +6681,7 @@
         <p:spPr>
           <a:xfrm>
             <a:off x="2659463" y="1131618"/>
-            <a:ext cx="6873073" cy="1754326"/>
+            <a:ext cx="6873073" cy="2031325"/>
           </a:xfrm>
           <a:prstGeom prst="rect">
             <a:avLst/>
@@ -6018,6 +6707,12 @@
             <a:r>
               <a:rPr lang="en-US" dirty="0"/>
               <a:t>: 1111-1111-1111-1111</a:t>
+            </a:r>
+          </a:p>
+          <a:p>
+            <a:r>
+              <a:rPr lang="en-US" dirty="0"/>
+              <a:t>Datetime: 11-03-2023 10:30PM</a:t>
             </a:r>
           </a:p>
           <a:p>
@@ -6158,7 +6853,7 @@
         <p:spPr>
           <a:xfrm>
             <a:off x="2659463" y="3281963"/>
-            <a:ext cx="6873073" cy="1754326"/>
+            <a:ext cx="6873073" cy="2031325"/>
           </a:xfrm>
           <a:prstGeom prst="rect">
             <a:avLst/>
@@ -6184,6 +6879,12 @@
             <a:r>
               <a:rPr lang="en-US" dirty="0"/>
               <a:t>: 2222-2222-2222-2222</a:t>
+            </a:r>
+          </a:p>
+          <a:p>
+            <a:r>
+              <a:rPr lang="en-US" dirty="0"/>
+              <a:t>Datetime: 11-03-2023 10:30PM</a:t>
             </a:r>
           </a:p>
           <a:p>
@@ -6360,10 +7061,59 @@
           </a:p>
         </p:txBody>
       </p:sp>
+      <p:sp>
+        <p:nvSpPr>
+          <p:cNvPr id="2" name="Rectangle: Rounded Corners 1">
+            <a:extLst>
+              <a:ext uri="{FF2B5EF4-FFF2-40B4-BE49-F238E27FC236}">
+                <a16:creationId xmlns:a16="http://schemas.microsoft.com/office/drawing/2014/main" id="{657CB5EA-E53C-7B6D-B5DB-16035518F694}"/>
+              </a:ext>
+            </a:extLst>
+          </p:cNvPr>
+          <p:cNvSpPr/>
+          <p:nvPr/>
+        </p:nvSpPr>
+        <p:spPr>
+          <a:xfrm>
+            <a:off x="10009415" y="439613"/>
+            <a:ext cx="1797398" cy="462854"/>
+          </a:xfrm>
+          <a:prstGeom prst="roundRect">
+            <a:avLst/>
+          </a:prstGeom>
+        </p:spPr>
+        <p:style>
+          <a:lnRef idx="2">
+            <a:schemeClr val="accent1">
+              <a:shade val="15000"/>
+            </a:schemeClr>
+          </a:lnRef>
+          <a:fillRef idx="1">
+            <a:schemeClr val="accent1"/>
+          </a:fillRef>
+          <a:effectRef idx="0">
+            <a:schemeClr val="accent1"/>
+          </a:effectRef>
+          <a:fontRef idx="minor">
+            <a:schemeClr val="lt1"/>
+          </a:fontRef>
+        </p:style>
+        <p:txBody>
+          <a:bodyPr rtlCol="0" anchor="ctr"/>
+          <a:lstStyle/>
+          <a:p>
+            <a:pPr algn="ctr"/>
+            <a:r>
+              <a:rPr lang="en-US" dirty="0"/>
+              <a:t>Login/Sign Up</a:t>
+            </a:r>
+          </a:p>
+        </p:txBody>
+      </p:sp>
     </p:spTree>
     <p:extLst>
       <p:ext uri="{BB962C8B-B14F-4D97-AF65-F5344CB8AC3E}">
-        <p14:creationId xmlns:p14="http://schemas.microsoft.com/office/powerpoint/2010/main" val="1230075902"/>
+        <p14:creationId xmlns:p14="http://schemas.microsoft.com/office/powerpoint/2010/main" val="2390560905"/>
       </p:ext>
     </p:extLst>
   </p:cSld>
@@ -6373,7 +7123,7 @@
 </p:sld>
 </file>
 
-<file path=ppt/slides/slide7.xml><?xml version="1.0" encoding="utf-8"?>
+<file path=ppt/slides/slide8.xml><?xml version="1.0" encoding="utf-8"?>
 <p:sld xmlns:a="http://schemas.openxmlformats.org/drawingml/2006/main" xmlns:r="http://schemas.openxmlformats.org/officeDocument/2006/relationships" xmlns:p="http://schemas.openxmlformats.org/presentationml/2006/main">
   <p:cSld>
     <p:spTree>
@@ -6580,55 +7330,6 @@
       </p:sp>
       <p:sp>
         <p:nvSpPr>
-          <p:cNvPr id="14" name="Rectangle: Rounded Corners 13">
-            <a:extLst>
-              <a:ext uri="{FF2B5EF4-FFF2-40B4-BE49-F238E27FC236}">
-                <a16:creationId xmlns:a16="http://schemas.microsoft.com/office/drawing/2014/main" id="{462EB88B-18C0-73B8-1596-E8B79A8C25FF}"/>
-              </a:ext>
-            </a:extLst>
-          </p:cNvPr>
-          <p:cNvSpPr/>
-          <p:nvPr/>
-        </p:nvSpPr>
-        <p:spPr>
-          <a:xfrm>
-            <a:off x="10309607" y="439613"/>
-            <a:ext cx="1497205" cy="357974"/>
-          </a:xfrm>
-          <a:prstGeom prst="roundRect">
-            <a:avLst/>
-          </a:prstGeom>
-        </p:spPr>
-        <p:style>
-          <a:lnRef idx="2">
-            <a:schemeClr val="accent1">
-              <a:shade val="15000"/>
-            </a:schemeClr>
-          </a:lnRef>
-          <a:fillRef idx="1">
-            <a:schemeClr val="accent1"/>
-          </a:fillRef>
-          <a:effectRef idx="0">
-            <a:schemeClr val="accent1"/>
-          </a:effectRef>
-          <a:fontRef idx="minor">
-            <a:schemeClr val="lt1"/>
-          </a:fontRef>
-        </p:style>
-        <p:txBody>
-          <a:bodyPr rtlCol="0" anchor="ctr"/>
-          <a:lstStyle/>
-          <a:p>
-            <a:pPr algn="ctr"/>
-            <a:r>
-              <a:rPr lang="en-US" dirty="0"/>
-              <a:t>Account Info</a:t>
-            </a:r>
-          </a:p>
-        </p:txBody>
-      </p:sp>
-      <p:sp>
-        <p:nvSpPr>
           <p:cNvPr id="15" name="Rectangle 14">
             <a:extLst>
               <a:ext uri="{FF2B5EF4-FFF2-40B4-BE49-F238E27FC236}">
@@ -6684,7 +7385,7 @@
                   <a:schemeClr val="tx1"/>
                 </a:solidFill>
               </a:rPr>
-              <a:t>	Favorite Posts</a:t>
+              <a:t>	Favorite Posts	Events</a:t>
             </a:r>
           </a:p>
         </p:txBody>
@@ -6751,7 +7452,7 @@
         <p:spPr>
           <a:xfrm>
             <a:off x="2659463" y="1131618"/>
-            <a:ext cx="6873073" cy="1754326"/>
+            <a:ext cx="6873073" cy="2031325"/>
           </a:xfrm>
           <a:prstGeom prst="rect">
             <a:avLst/>
@@ -6777,6 +7478,12 @@
             <a:r>
               <a:rPr lang="en-US" dirty="0"/>
               <a:t>: 1111-1111-1111-1111</a:t>
+            </a:r>
+          </a:p>
+          <a:p>
+            <a:r>
+              <a:rPr lang="en-US" dirty="0"/>
+              <a:t>Datetime: 11-03-2023 10:30PM</a:t>
             </a:r>
           </a:p>
           <a:p>
@@ -7010,7 +7717,7 @@
         <p:spPr>
           <a:xfrm>
             <a:off x="2659463" y="3281963"/>
-            <a:ext cx="6873073" cy="1754326"/>
+            <a:ext cx="6873073" cy="2031325"/>
           </a:xfrm>
           <a:prstGeom prst="rect">
             <a:avLst/>
@@ -7036,6 +7743,12 @@
             <a:r>
               <a:rPr lang="en-US" dirty="0"/>
               <a:t>: 2222-2222-2222-2222</a:t>
+            </a:r>
+          </a:p>
+          <a:p>
+            <a:r>
+              <a:rPr lang="en-US" dirty="0"/>
+              <a:t>Datetime: 11-03-2023 10:30PM</a:t>
             </a:r>
           </a:p>
           <a:p>
@@ -7259,47 +7972,12 @@
           </a:p>
         </p:txBody>
       </p:sp>
-    </p:spTree>
-    <p:extLst>
-      <p:ext uri="{BB962C8B-B14F-4D97-AF65-F5344CB8AC3E}">
-        <p14:creationId xmlns:p14="http://schemas.microsoft.com/office/powerpoint/2010/main" val="2881041793"/>
-      </p:ext>
-    </p:extLst>
-  </p:cSld>
-  <p:clrMapOvr>
-    <a:masterClrMapping/>
-  </p:clrMapOvr>
-  <p:extLst>
-    <p:ext uri="{6950BFC3-D8DA-4A85-94F7-54DA5524770B}">
-      <p188:commentRel xmlns:p188="http://schemas.microsoft.com/office/powerpoint/2018/8/main" r:id="rId2"/>
-    </p:ext>
-  </p:extLst>
-</p:sld>
-</file>
-
-<file path=ppt/slides/slide8.xml><?xml version="1.0" encoding="utf-8"?>
-<p:sld xmlns:a="http://schemas.openxmlformats.org/drawingml/2006/main" xmlns:r="http://schemas.openxmlformats.org/officeDocument/2006/relationships" xmlns:p="http://schemas.openxmlformats.org/presentationml/2006/main">
-  <p:cSld>
-    <p:spTree>
-      <p:nvGrpSpPr>
-        <p:cNvPr id="1" name=""/>
-        <p:cNvGrpSpPr/>
-        <p:nvPr/>
-      </p:nvGrpSpPr>
-      <p:grpSpPr>
-        <a:xfrm>
-          <a:off x="0" y="0"/>
-          <a:ext cx="0" cy="0"/>
-          <a:chOff x="0" y="0"/>
-          <a:chExt cx="0" cy="0"/>
-        </a:xfrm>
-      </p:grpSpPr>
-      <p:sp>
-        <p:nvSpPr>
-          <p:cNvPr id="3" name="Rectangle 2">
-            <a:extLst>
-              <a:ext uri="{FF2B5EF4-FFF2-40B4-BE49-F238E27FC236}">
-                <a16:creationId xmlns:a16="http://schemas.microsoft.com/office/drawing/2014/main" id="{09EB6145-F196-BA75-4B3E-EED7851B2ACB}"/>
+      <p:sp>
+        <p:nvSpPr>
+          <p:cNvPr id="2" name="Rectangle: Rounded Corners 1">
+            <a:extLst>
+              <a:ext uri="{FF2B5EF4-FFF2-40B4-BE49-F238E27FC236}">
+                <a16:creationId xmlns:a16="http://schemas.microsoft.com/office/drawing/2014/main" id="{A218763C-8561-7967-EDA7-C0C3213CA3F1}"/>
               </a:ext>
             </a:extLst>
           </p:cNvPr>
@@ -7308,261 +7986,10 @@
         </p:nvSpPr>
         <p:spPr>
           <a:xfrm>
-            <a:off x="242835" y="200967"/>
-            <a:ext cx="11706330" cy="6451042"/>
+            <a:off x="10009415" y="439613"/>
+            <a:ext cx="1797398" cy="462854"/>
           </a:xfrm>
-          <a:prstGeom prst="rect">
-            <a:avLst/>
-          </a:prstGeom>
-          <a:noFill/>
-        </p:spPr>
-        <p:style>
-          <a:lnRef idx="2">
-            <a:schemeClr val="accent1">
-              <a:shade val="15000"/>
-            </a:schemeClr>
-          </a:lnRef>
-          <a:fillRef idx="1">
-            <a:schemeClr val="accent1"/>
-          </a:fillRef>
-          <a:effectRef idx="0">
-            <a:schemeClr val="accent1"/>
-          </a:effectRef>
-          <a:fontRef idx="minor">
-            <a:schemeClr val="lt1"/>
-          </a:fontRef>
-        </p:style>
-        <p:txBody>
-          <a:bodyPr rtlCol="0" anchor="ctr"/>
-          <a:lstStyle/>
-          <a:p>
-            <a:pPr algn="ctr"/>
-            <a:endParaRPr lang="en-US" dirty="0"/>
-          </a:p>
-        </p:txBody>
-      </p:sp>
-      <p:sp>
-        <p:nvSpPr>
-          <p:cNvPr id="9" name="Rectangle 8">
-            <a:extLst>
-              <a:ext uri="{FF2B5EF4-FFF2-40B4-BE49-F238E27FC236}">
-                <a16:creationId xmlns:a16="http://schemas.microsoft.com/office/drawing/2014/main" id="{F50557A8-8943-F711-C854-1442083C28F3}"/>
-              </a:ext>
-            </a:extLst>
-          </p:cNvPr>
-          <p:cNvSpPr/>
-          <p:nvPr/>
-        </p:nvSpPr>
-        <p:spPr>
-          <a:xfrm>
-            <a:off x="2558980" y="1075172"/>
-            <a:ext cx="7074040" cy="5576837"/>
-          </a:xfrm>
-          <a:prstGeom prst="rect">
-            <a:avLst/>
-          </a:prstGeom>
-          <a:noFill/>
-        </p:spPr>
-        <p:style>
-          <a:lnRef idx="2">
-            <a:schemeClr val="accent1">
-              <a:shade val="15000"/>
-            </a:schemeClr>
-          </a:lnRef>
-          <a:fillRef idx="1">
-            <a:schemeClr val="accent1"/>
-          </a:fillRef>
-          <a:effectRef idx="0">
-            <a:schemeClr val="accent1"/>
-          </a:effectRef>
-          <a:fontRef idx="minor">
-            <a:schemeClr val="lt1"/>
-          </a:fontRef>
-        </p:style>
-        <p:txBody>
-          <a:bodyPr rtlCol="0" anchor="ctr"/>
-          <a:lstStyle/>
-          <a:p>
-            <a:pPr algn="ctr"/>
-            <a:endParaRPr lang="en-US" dirty="0"/>
-          </a:p>
-        </p:txBody>
-      </p:sp>
-      <p:sp>
-        <p:nvSpPr>
-          <p:cNvPr id="15" name="Rectangle 14">
-            <a:extLst>
-              <a:ext uri="{FF2B5EF4-FFF2-40B4-BE49-F238E27FC236}">
-                <a16:creationId xmlns:a16="http://schemas.microsoft.com/office/drawing/2014/main" id="{2F28C8CE-0641-4BDC-3993-118AA2F43F1D}"/>
-              </a:ext>
-            </a:extLst>
-          </p:cNvPr>
-          <p:cNvSpPr/>
-          <p:nvPr/>
-        </p:nvSpPr>
-        <p:spPr>
-          <a:xfrm>
-            <a:off x="242835" y="200966"/>
-            <a:ext cx="11706330" cy="874206"/>
-          </a:xfrm>
-          <a:prstGeom prst="rect">
-            <a:avLst/>
-          </a:prstGeom>
-          <a:noFill/>
-        </p:spPr>
-        <p:style>
-          <a:lnRef idx="2">
-            <a:schemeClr val="accent1">
-              <a:shade val="15000"/>
-            </a:schemeClr>
-          </a:lnRef>
-          <a:fillRef idx="1">
-            <a:schemeClr val="accent1"/>
-          </a:fillRef>
-          <a:effectRef idx="0">
-            <a:schemeClr val="accent1"/>
-          </a:effectRef>
-          <a:fontRef idx="minor">
-            <a:schemeClr val="lt1"/>
-          </a:fontRef>
-        </p:style>
-        <p:txBody>
-          <a:bodyPr rtlCol="0" anchor="ctr"/>
-          <a:lstStyle/>
-          <a:p>
-            <a:pPr algn="ctr"/>
-            <a:r>
-              <a:rPr lang="en-US" dirty="0">
-                <a:solidFill>
-                  <a:schemeClr val="tx1"/>
-                </a:solidFill>
-              </a:rPr>
-              <a:t>Word Breakdown</a:t>
-            </a:r>
-          </a:p>
-        </p:txBody>
-      </p:sp>
-      <p:sp>
-        <p:nvSpPr>
-          <p:cNvPr id="17" name="TextBox 16">
-            <a:extLst>
-              <a:ext uri="{FF2B5EF4-FFF2-40B4-BE49-F238E27FC236}">
-                <a16:creationId xmlns:a16="http://schemas.microsoft.com/office/drawing/2014/main" id="{60FBE9E0-78AB-01C4-4EFD-FD36C0881FF1}"/>
-              </a:ext>
-            </a:extLst>
-          </p:cNvPr>
-          <p:cNvSpPr txBox="1"/>
-          <p:nvPr/>
-        </p:nvSpPr>
-        <p:spPr>
-          <a:xfrm>
-            <a:off x="2659463" y="1131618"/>
-            <a:ext cx="6873073" cy="3139321"/>
-          </a:xfrm>
-          <a:prstGeom prst="rect">
-            <a:avLst/>
-          </a:prstGeom>
-          <a:noFill/>
-        </p:spPr>
-        <p:txBody>
-          <a:bodyPr wrap="square" rtlCol="0">
-            <a:spAutoFit/>
-          </a:bodyPr>
-          <a:lstStyle/>
-          <a:p>
-            <a:r>
-              <a:rPr lang="en-US" dirty="0"/>
-              <a:t>Username: SteveVaz123</a:t>
-            </a:r>
-          </a:p>
-          <a:p>
-            <a:r>
-              <a:rPr lang="en-US" dirty="0" err="1"/>
-              <a:t>UserId</a:t>
-            </a:r>
-            <a:r>
-              <a:rPr lang="en-US" dirty="0"/>
-              <a:t>: 1111-1111-1111-1111</a:t>
-            </a:r>
-          </a:p>
-          <a:p>
-            <a:r>
-              <a:rPr lang="en-US" dirty="0"/>
-              <a:t>Post Name:</a:t>
-            </a:r>
-          </a:p>
-          <a:p>
-            <a:r>
-              <a:rPr lang="en-US" dirty="0"/>
-              <a:t>Post Id:</a:t>
-            </a:r>
-          </a:p>
-          <a:p>
-            <a:pPr algn="ctr"/>
-            <a:r>
-              <a:rPr lang="en-US" u="sng" dirty="0"/>
-              <a:t>Word : Count</a:t>
-            </a:r>
-          </a:p>
-          <a:p>
-            <a:pPr algn="ctr"/>
-            <a:r>
-              <a:rPr lang="en-US" dirty="0"/>
-              <a:t>this    :    1</a:t>
-            </a:r>
-          </a:p>
-          <a:p>
-            <a:pPr algn="ctr"/>
-            <a:r>
-              <a:rPr lang="en-US" dirty="0"/>
-              <a:t>is       :    1 </a:t>
-            </a:r>
-          </a:p>
-          <a:p>
-            <a:pPr algn="ctr"/>
-            <a:r>
-              <a:rPr lang="en-US" dirty="0"/>
-              <a:t>a        :    1</a:t>
-            </a:r>
-          </a:p>
-          <a:p>
-            <a:pPr algn="ctr"/>
-            <a:r>
-              <a:rPr lang="en-US" dirty="0"/>
-              <a:t>user   :    1</a:t>
-            </a:r>
-          </a:p>
-          <a:p>
-            <a:pPr algn="ctr"/>
-            <a:r>
-              <a:rPr lang="en-US" dirty="0"/>
-              <a:t>post   :    1</a:t>
-            </a:r>
-          </a:p>
-          <a:p>
-            <a:endParaRPr lang="en-US" dirty="0"/>
-          </a:p>
-        </p:txBody>
-      </p:sp>
-      <p:sp>
-        <p:nvSpPr>
-          <p:cNvPr id="2" name="Action Button: Go Home 1">
-            <a:hlinkClick r:id="" action="ppaction://hlinkshowjump?jump=firstslide" highlightClick="1"/>
-            <a:extLst>
-              <a:ext uri="{FF2B5EF4-FFF2-40B4-BE49-F238E27FC236}">
-                <a16:creationId xmlns:a16="http://schemas.microsoft.com/office/drawing/2014/main" id="{5A70DF2C-21CE-AF3F-F5A7-6BCEC5F648EA}"/>
-              </a:ext>
-            </a:extLst>
-          </p:cNvPr>
-          <p:cNvSpPr/>
-          <p:nvPr/>
-        </p:nvSpPr>
-        <p:spPr>
-          <a:xfrm>
-            <a:off x="385188" y="396280"/>
-            <a:ext cx="619648" cy="506187"/>
-          </a:xfrm>
-          <a:prstGeom prst="actionButtonHome">
+          <a:prstGeom prst="roundRect">
             <a:avLst/>
           </a:prstGeom>
         </p:spPr>
@@ -7587,14 +8014,17 @@
           <a:lstStyle/>
           <a:p>
             <a:pPr algn="ctr"/>
-            <a:endParaRPr lang="en-US"/>
+            <a:r>
+              <a:rPr lang="en-US" dirty="0"/>
+              <a:t>Account</a:t>
+            </a:r>
           </a:p>
         </p:txBody>
       </p:sp>
     </p:spTree>
     <p:extLst>
       <p:ext uri="{BB962C8B-B14F-4D97-AF65-F5344CB8AC3E}">
-        <p14:creationId xmlns:p14="http://schemas.microsoft.com/office/powerpoint/2010/main" val="806163125"/>
+        <p14:creationId xmlns:p14="http://schemas.microsoft.com/office/powerpoint/2010/main" val="2881041793"/>
       </p:ext>
     </p:extLst>
   </p:cSld>
@@ -7628,322 +8058,174 @@
       </p:grpSpPr>
       <p:sp>
         <p:nvSpPr>
-          <p:cNvPr id="4" name="TextBox 3">
-            <a:extLst>
-              <a:ext uri="{FF2B5EF4-FFF2-40B4-BE49-F238E27FC236}">
-                <a16:creationId xmlns:a16="http://schemas.microsoft.com/office/drawing/2014/main" id="{93042950-E66C-9CF4-A917-488019161FCA}"/>
-              </a:ext>
-            </a:extLst>
-          </p:cNvPr>
-          <p:cNvSpPr txBox="1"/>
+          <p:cNvPr id="3" name="Rectangle 2">
+            <a:extLst>
+              <a:ext uri="{FF2B5EF4-FFF2-40B4-BE49-F238E27FC236}">
+                <a16:creationId xmlns:a16="http://schemas.microsoft.com/office/drawing/2014/main" id="{09EB6145-F196-BA75-4B3E-EED7851B2ACB}"/>
+              </a:ext>
+            </a:extLst>
+          </p:cNvPr>
+          <p:cNvSpPr/>
           <p:nvPr/>
         </p:nvSpPr>
         <p:spPr>
           <a:xfrm>
-            <a:off x="275846" y="765589"/>
-            <a:ext cx="11410545" cy="3966150"/>
+            <a:off x="242835" y="200967"/>
+            <a:ext cx="11706330" cy="6451042"/>
           </a:xfrm>
           <a:prstGeom prst="rect">
             <a:avLst/>
           </a:prstGeom>
           <a:noFill/>
         </p:spPr>
-        <p:txBody>
-          <a:bodyPr wrap="square" rtlCol="0">
-            <a:spAutoFit/>
-          </a:bodyPr>
-          <a:lstStyle/>
-          <a:p>
-            <a:pPr marL="0" marR="0">
-              <a:lnSpc>
-                <a:spcPct val="107000"/>
-              </a:lnSpc>
-              <a:spcBef>
-                <a:spcPts val="0"/>
-              </a:spcBef>
-              <a:spcAft>
-                <a:spcPts val="800"/>
-              </a:spcAft>
-            </a:pPr>
-            <a:r>
-              <a:rPr lang="en-US" kern="100" dirty="0">
-                <a:latin typeface="Calibri" panose="020F0502020204030204" pitchFamily="34" charset="0"/>
-                <a:ea typeface="Calibri" panose="020F0502020204030204" pitchFamily="34" charset="0"/>
-                <a:cs typeface="Times New Roman" panose="02020603050405020304" pitchFamily="18" charset="0"/>
-              </a:rPr>
-              <a:t>- </a:t>
-            </a:r>
-            <a:r>
-              <a:rPr lang="en-US" sz="1800" kern="100" dirty="0">
-                <a:effectLst/>
-                <a:latin typeface="Calibri" panose="020F0502020204030204" pitchFamily="34" charset="0"/>
-                <a:ea typeface="Calibri" panose="020F0502020204030204" pitchFamily="34" charset="0"/>
-                <a:cs typeface="Times New Roman" panose="02020603050405020304" pitchFamily="18" charset="0"/>
-              </a:rPr>
-              <a:t>There should be some button that navigates user to event creation form or area</a:t>
-            </a:r>
-          </a:p>
-          <a:p>
-            <a:pPr marL="0" marR="0">
-              <a:lnSpc>
-                <a:spcPct val="107000"/>
-              </a:lnSpc>
-              <a:spcBef>
-                <a:spcPts val="0"/>
-              </a:spcBef>
-              <a:spcAft>
-                <a:spcPts val="800"/>
-              </a:spcAft>
-            </a:pPr>
-            <a:r>
-              <a:rPr lang="en-US" kern="100" dirty="0">
-                <a:latin typeface="Calibri" panose="020F0502020204030204" pitchFamily="34" charset="0"/>
-                <a:ea typeface="Calibri" panose="020F0502020204030204" pitchFamily="34" charset="0"/>
-                <a:cs typeface="Times New Roman" panose="02020603050405020304" pitchFamily="18" charset="0"/>
-              </a:rPr>
-              <a:t>	- Event location field should implement search and filter when user attempts entering location</a:t>
-            </a:r>
-            <a:endParaRPr lang="en-US" sz="1800" kern="100" dirty="0">
-              <a:effectLst/>
-              <a:latin typeface="Calibri" panose="020F0502020204030204" pitchFamily="34" charset="0"/>
-              <a:ea typeface="Calibri" panose="020F0502020204030204" pitchFamily="34" charset="0"/>
-              <a:cs typeface="Times New Roman" panose="02020603050405020304" pitchFamily="18" charset="0"/>
-            </a:endParaRPr>
-          </a:p>
-          <a:p>
-            <a:pPr marL="0" marR="0">
-              <a:lnSpc>
-                <a:spcPct val="107000"/>
-              </a:lnSpc>
-              <a:spcBef>
-                <a:spcPts val="0"/>
-              </a:spcBef>
-              <a:spcAft>
-                <a:spcPts val="800"/>
-              </a:spcAft>
-            </a:pPr>
-            <a:r>
-              <a:rPr lang="en-US" sz="1800" kern="100" dirty="0">
-                <a:effectLst/>
-                <a:latin typeface="Calibri" panose="020F0502020204030204" pitchFamily="34" charset="0"/>
-                <a:ea typeface="Calibri" panose="020F0502020204030204" pitchFamily="34" charset="0"/>
-                <a:cs typeface="Times New Roman" panose="02020603050405020304" pitchFamily="18" charset="0"/>
-              </a:rPr>
-              <a:t>	- There should be some button that allows users to post (if user logged in)</a:t>
-            </a:r>
-          </a:p>
-          <a:p>
-            <a:pPr marL="0" marR="0">
-              <a:lnSpc>
-                <a:spcPct val="107000"/>
-              </a:lnSpc>
-              <a:spcBef>
-                <a:spcPts val="0"/>
-              </a:spcBef>
-              <a:spcAft>
-                <a:spcPts val="800"/>
-              </a:spcAft>
-            </a:pPr>
-            <a:r>
-              <a:rPr lang="en-US" sz="1800" kern="100" dirty="0">
-                <a:effectLst/>
-                <a:latin typeface="Calibri" panose="020F0502020204030204" pitchFamily="34" charset="0"/>
-                <a:ea typeface="Calibri" panose="020F0502020204030204" pitchFamily="34" charset="0"/>
-                <a:cs typeface="Times New Roman" panose="02020603050405020304" pitchFamily="18" charset="0"/>
-              </a:rPr>
-              <a:t>- Event data should contain:</a:t>
-            </a:r>
-          </a:p>
-          <a:p>
-            <a:pPr marL="0" marR="0">
-              <a:lnSpc>
-                <a:spcPct val="107000"/>
-              </a:lnSpc>
-              <a:spcBef>
-                <a:spcPts val="0"/>
-              </a:spcBef>
-              <a:spcAft>
-                <a:spcPts val="800"/>
-              </a:spcAft>
-            </a:pPr>
-            <a:r>
-              <a:rPr lang="en-US" kern="100" dirty="0">
-                <a:latin typeface="Calibri" panose="020F0502020204030204" pitchFamily="34" charset="0"/>
-                <a:ea typeface="Calibri" panose="020F0502020204030204" pitchFamily="34" charset="0"/>
-                <a:cs typeface="Times New Roman" panose="02020603050405020304" pitchFamily="18" charset="0"/>
-              </a:rPr>
-              <a:t>	- event Name</a:t>
-            </a:r>
-            <a:endParaRPr lang="en-US" sz="1800" kern="100" dirty="0">
-              <a:effectLst/>
-              <a:latin typeface="Calibri" panose="020F0502020204030204" pitchFamily="34" charset="0"/>
-              <a:ea typeface="Calibri" panose="020F0502020204030204" pitchFamily="34" charset="0"/>
-              <a:cs typeface="Times New Roman" panose="02020603050405020304" pitchFamily="18" charset="0"/>
-            </a:endParaRPr>
-          </a:p>
-          <a:p>
-            <a:pPr marL="0" marR="0">
-              <a:lnSpc>
-                <a:spcPct val="107000"/>
-              </a:lnSpc>
-              <a:spcBef>
-                <a:spcPts val="0"/>
-              </a:spcBef>
-              <a:spcAft>
-                <a:spcPts val="800"/>
-              </a:spcAft>
-            </a:pPr>
-            <a:r>
-              <a:rPr lang="en-US" kern="100" dirty="0">
-                <a:latin typeface="Calibri" panose="020F0502020204030204" pitchFamily="34" charset="0"/>
-                <a:ea typeface="Calibri" panose="020F0502020204030204" pitchFamily="34" charset="0"/>
-                <a:cs typeface="Times New Roman" panose="02020603050405020304" pitchFamily="18" charset="0"/>
-              </a:rPr>
-              <a:t>	- event ID</a:t>
-            </a:r>
-            <a:endParaRPr lang="en-US" sz="1800" kern="100" dirty="0">
-              <a:effectLst/>
-              <a:latin typeface="Calibri" panose="020F0502020204030204" pitchFamily="34" charset="0"/>
-              <a:ea typeface="Calibri" panose="020F0502020204030204" pitchFamily="34" charset="0"/>
-              <a:cs typeface="Times New Roman" panose="02020603050405020304" pitchFamily="18" charset="0"/>
-            </a:endParaRPr>
-          </a:p>
-          <a:p>
-            <a:pPr marL="0" marR="0">
-              <a:lnSpc>
-                <a:spcPct val="107000"/>
-              </a:lnSpc>
-              <a:spcBef>
-                <a:spcPts val="0"/>
-              </a:spcBef>
-              <a:spcAft>
-                <a:spcPts val="800"/>
-              </a:spcAft>
-            </a:pPr>
-            <a:r>
-              <a:rPr lang="en-US" kern="100" dirty="0">
-                <a:latin typeface="Calibri" panose="020F0502020204030204" pitchFamily="34" charset="0"/>
-                <a:ea typeface="Calibri" panose="020F0502020204030204" pitchFamily="34" charset="0"/>
-                <a:cs typeface="Times New Roman" panose="02020603050405020304" pitchFamily="18" charset="0"/>
-              </a:rPr>
-              <a:t>	- </a:t>
-            </a:r>
-            <a:r>
-              <a:rPr lang="en-US" sz="1800" kern="100" dirty="0">
-                <a:effectLst/>
-                <a:latin typeface="Calibri" panose="020F0502020204030204" pitchFamily="34" charset="0"/>
-                <a:ea typeface="Calibri" panose="020F0502020204030204" pitchFamily="34" charset="0"/>
-                <a:cs typeface="Times New Roman" panose="02020603050405020304" pitchFamily="18" charset="0"/>
-              </a:rPr>
-              <a:t>event location</a:t>
-            </a:r>
-          </a:p>
-          <a:p>
-            <a:pPr marL="0" marR="0">
-              <a:lnSpc>
-                <a:spcPct val="107000"/>
-              </a:lnSpc>
-              <a:spcBef>
-                <a:spcPts val="0"/>
-              </a:spcBef>
-              <a:spcAft>
-                <a:spcPts val="800"/>
-              </a:spcAft>
-            </a:pPr>
-            <a:r>
-              <a:rPr lang="en-US" sz="1800" kern="100" dirty="0">
-                <a:effectLst/>
-                <a:latin typeface="Calibri" panose="020F0502020204030204" pitchFamily="34" charset="0"/>
-                <a:ea typeface="Calibri" panose="020F0502020204030204" pitchFamily="34" charset="0"/>
-                <a:cs typeface="Times New Roman" panose="02020603050405020304" pitchFamily="18" charset="0"/>
-              </a:rPr>
-              <a:t>	- event time</a:t>
-            </a:r>
-          </a:p>
-          <a:p>
-            <a:pPr marL="0" marR="0">
-              <a:lnSpc>
-                <a:spcPct val="107000"/>
-              </a:lnSpc>
-              <a:spcBef>
-                <a:spcPts val="0"/>
-              </a:spcBef>
-              <a:spcAft>
-                <a:spcPts val="800"/>
-              </a:spcAft>
-            </a:pPr>
-            <a:r>
-              <a:rPr lang="en-US" kern="100" dirty="0">
-                <a:latin typeface="Calibri" panose="020F0502020204030204" pitchFamily="34" charset="0"/>
-                <a:ea typeface="Calibri" panose="020F0502020204030204" pitchFamily="34" charset="0"/>
-                <a:cs typeface="Times New Roman" panose="02020603050405020304" pitchFamily="18" charset="0"/>
-              </a:rPr>
-              <a:t>	- a</a:t>
-            </a:r>
-            <a:r>
-              <a:rPr lang="en-US" sz="1800" kern="100" dirty="0">
-                <a:effectLst/>
-                <a:latin typeface="Calibri" panose="020F0502020204030204" pitchFamily="34" charset="0"/>
-                <a:ea typeface="Calibri" panose="020F0502020204030204" pitchFamily="34" charset="0"/>
-                <a:cs typeface="Times New Roman" panose="02020603050405020304" pitchFamily="18" charset="0"/>
-              </a:rPr>
-              <a:t>rea to upload banner image</a:t>
-            </a:r>
-          </a:p>
-          <a:p>
-            <a:pPr marL="0" marR="0">
-              <a:lnSpc>
-                <a:spcPct val="107000"/>
-              </a:lnSpc>
-              <a:spcBef>
-                <a:spcPts val="0"/>
-              </a:spcBef>
-              <a:spcAft>
-                <a:spcPts val="800"/>
-              </a:spcAft>
-            </a:pPr>
-            <a:r>
-              <a:rPr lang="en-US" kern="100" dirty="0">
-                <a:latin typeface="Calibri" panose="020F0502020204030204" pitchFamily="34" charset="0"/>
-                <a:ea typeface="Calibri" panose="020F0502020204030204" pitchFamily="34" charset="0"/>
-                <a:cs typeface="Times New Roman" panose="02020603050405020304" pitchFamily="18" charset="0"/>
-              </a:rPr>
-              <a:t>	- </a:t>
-            </a:r>
-            <a:r>
-              <a:rPr lang="en-US" sz="1800" kern="100" dirty="0">
-                <a:effectLst/>
-                <a:latin typeface="Calibri" panose="020F0502020204030204" pitchFamily="34" charset="0"/>
-                <a:ea typeface="Calibri" panose="020F0502020204030204" pitchFamily="34" charset="0"/>
-                <a:cs typeface="Times New Roman" panose="02020603050405020304" pitchFamily="18" charset="0"/>
-              </a:rPr>
-              <a:t>participants list</a:t>
-            </a:r>
-          </a:p>
-        </p:txBody>
-      </p:sp>
-      <p:sp>
-        <p:nvSpPr>
-          <p:cNvPr id="2" name="TextBox 1">
-            <a:extLst>
-              <a:ext uri="{FF2B5EF4-FFF2-40B4-BE49-F238E27FC236}">
-                <a16:creationId xmlns:a16="http://schemas.microsoft.com/office/drawing/2014/main" id="{CB46AF81-95B8-D80D-804A-CADBD595992E}"/>
-              </a:ext>
-            </a:extLst>
-          </p:cNvPr>
-          <p:cNvSpPr txBox="1"/>
+        <p:style>
+          <a:lnRef idx="2">
+            <a:schemeClr val="accent1">
+              <a:shade val="15000"/>
+            </a:schemeClr>
+          </a:lnRef>
+          <a:fillRef idx="1">
+            <a:schemeClr val="accent1"/>
+          </a:fillRef>
+          <a:effectRef idx="0">
+            <a:schemeClr val="accent1"/>
+          </a:effectRef>
+          <a:fontRef idx="minor">
+            <a:schemeClr val="lt1"/>
+          </a:fontRef>
+        </p:style>
+        <p:txBody>
+          <a:bodyPr rtlCol="0" anchor="ctr"/>
+          <a:lstStyle/>
+          <a:p>
+            <a:pPr algn="ctr"/>
+            <a:endParaRPr lang="en-US" dirty="0"/>
+          </a:p>
+        </p:txBody>
+      </p:sp>
+      <p:sp>
+        <p:nvSpPr>
+          <p:cNvPr id="9" name="Rectangle 8">
+            <a:extLst>
+              <a:ext uri="{FF2B5EF4-FFF2-40B4-BE49-F238E27FC236}">
+                <a16:creationId xmlns:a16="http://schemas.microsoft.com/office/drawing/2014/main" id="{F50557A8-8943-F711-C854-1442083C28F3}"/>
+              </a:ext>
+            </a:extLst>
+          </p:cNvPr>
+          <p:cNvSpPr/>
           <p:nvPr/>
         </p:nvSpPr>
         <p:spPr>
           <a:xfrm>
-            <a:off x="275847" y="161432"/>
-            <a:ext cx="11410545" cy="369332"/>
+            <a:off x="2558980" y="1075172"/>
+            <a:ext cx="7074040" cy="5576837"/>
           </a:xfrm>
           <a:prstGeom prst="rect">
             <a:avLst/>
           </a:prstGeom>
           <a:noFill/>
         </p:spPr>
+        <p:style>
+          <a:lnRef idx="2">
+            <a:schemeClr val="accent1">
+              <a:shade val="15000"/>
+            </a:schemeClr>
+          </a:lnRef>
+          <a:fillRef idx="1">
+            <a:schemeClr val="accent1"/>
+          </a:fillRef>
+          <a:effectRef idx="0">
+            <a:schemeClr val="accent1"/>
+          </a:effectRef>
+          <a:fontRef idx="minor">
+            <a:schemeClr val="lt1"/>
+          </a:fontRef>
+        </p:style>
+        <p:txBody>
+          <a:bodyPr rtlCol="0" anchor="ctr"/>
+          <a:lstStyle/>
+          <a:p>
+            <a:pPr algn="ctr"/>
+            <a:endParaRPr lang="en-US" dirty="0"/>
+          </a:p>
+        </p:txBody>
+      </p:sp>
+      <p:sp>
+        <p:nvSpPr>
+          <p:cNvPr id="15" name="Rectangle 14">
+            <a:extLst>
+              <a:ext uri="{FF2B5EF4-FFF2-40B4-BE49-F238E27FC236}">
+                <a16:creationId xmlns:a16="http://schemas.microsoft.com/office/drawing/2014/main" id="{2F28C8CE-0641-4BDC-3993-118AA2F43F1D}"/>
+              </a:ext>
+            </a:extLst>
+          </p:cNvPr>
+          <p:cNvSpPr/>
+          <p:nvPr/>
+        </p:nvSpPr>
+        <p:spPr>
+          <a:xfrm>
+            <a:off x="242835" y="200966"/>
+            <a:ext cx="11706330" cy="874206"/>
+          </a:xfrm>
+          <a:prstGeom prst="rect">
+            <a:avLst/>
+          </a:prstGeom>
+          <a:noFill/>
+        </p:spPr>
+        <p:style>
+          <a:lnRef idx="2">
+            <a:schemeClr val="accent1">
+              <a:shade val="15000"/>
+            </a:schemeClr>
+          </a:lnRef>
+          <a:fillRef idx="1">
+            <a:schemeClr val="accent1"/>
+          </a:fillRef>
+          <a:effectRef idx="0">
+            <a:schemeClr val="accent1"/>
+          </a:effectRef>
+          <a:fontRef idx="minor">
+            <a:schemeClr val="lt1"/>
+          </a:fontRef>
+        </p:style>
+        <p:txBody>
+          <a:bodyPr rtlCol="0" anchor="ctr"/>
+          <a:lstStyle/>
+          <a:p>
+            <a:pPr algn="ctr"/>
+            <a:r>
+              <a:rPr lang="en-US" dirty="0">
+                <a:solidFill>
+                  <a:schemeClr val="tx1"/>
+                </a:solidFill>
+              </a:rPr>
+              <a:t>Word Breakdown</a:t>
+            </a:r>
+          </a:p>
+        </p:txBody>
+      </p:sp>
+      <p:sp>
+        <p:nvSpPr>
+          <p:cNvPr id="17" name="TextBox 16">
+            <a:extLst>
+              <a:ext uri="{FF2B5EF4-FFF2-40B4-BE49-F238E27FC236}">
+                <a16:creationId xmlns:a16="http://schemas.microsoft.com/office/drawing/2014/main" id="{60FBE9E0-78AB-01C4-4EFD-FD36C0881FF1}"/>
+              </a:ext>
+            </a:extLst>
+          </p:cNvPr>
+          <p:cNvSpPr txBox="1"/>
+          <p:nvPr/>
+        </p:nvSpPr>
+        <p:spPr>
+          <a:xfrm>
+            <a:off x="2659463" y="1131618"/>
+            <a:ext cx="6873073" cy="3139321"/>
+          </a:xfrm>
+          <a:prstGeom prst="rect">
+            <a:avLst/>
+          </a:prstGeom>
+          <a:noFill/>
+        </p:spPr>
         <p:txBody>
           <a:bodyPr wrap="square" rtlCol="0">
             <a:spAutoFit/>
@@ -7951,28 +8233,236 @@
           <a:lstStyle/>
           <a:p>
             <a:r>
-              <a:rPr lang="en-US" sz="1800" dirty="0">
-                <a:effectLst/>
-                <a:latin typeface="Calibri" panose="020F0502020204030204" pitchFamily="34" charset="0"/>
-                <a:ea typeface="Calibri" panose="020F0502020204030204" pitchFamily="34" charset="0"/>
-                <a:cs typeface="Times New Roman" panose="02020603050405020304" pitchFamily="18" charset="0"/>
-              </a:rPr>
-              <a:t>Event post area</a:t>
-            </a:r>
+              <a:rPr lang="en-US" dirty="0"/>
+              <a:t>Username: SteveVaz123</a:t>
+            </a:r>
+          </a:p>
+          <a:p>
+            <a:r>
+              <a:rPr lang="en-US" dirty="0" err="1"/>
+              <a:t>UserId</a:t>
+            </a:r>
+            <a:r>
+              <a:rPr lang="en-US" dirty="0"/>
+              <a:t>: 1111-1111-1111-1111</a:t>
+            </a:r>
+          </a:p>
+          <a:p>
+            <a:r>
+              <a:rPr lang="en-US" dirty="0"/>
+              <a:t>Post Name:</a:t>
+            </a:r>
+          </a:p>
+          <a:p>
+            <a:r>
+              <a:rPr lang="en-US" dirty="0"/>
+              <a:t>Post Id:</a:t>
+            </a:r>
+          </a:p>
+          <a:p>
+            <a:pPr algn="ctr"/>
+            <a:r>
+              <a:rPr lang="en-US" u="sng" dirty="0"/>
+              <a:t>Word : Count</a:t>
+            </a:r>
+          </a:p>
+          <a:p>
+            <a:pPr algn="ctr"/>
+            <a:r>
+              <a:rPr lang="en-US" dirty="0"/>
+              <a:t>this    :    1</a:t>
+            </a:r>
+          </a:p>
+          <a:p>
+            <a:pPr algn="ctr"/>
+            <a:r>
+              <a:rPr lang="en-US" dirty="0"/>
+              <a:t>is       :    1 </a:t>
+            </a:r>
+          </a:p>
+          <a:p>
+            <a:pPr algn="ctr"/>
+            <a:r>
+              <a:rPr lang="en-US" dirty="0"/>
+              <a:t>a        :    1</a:t>
+            </a:r>
+          </a:p>
+          <a:p>
+            <a:pPr algn="ctr"/>
+            <a:r>
+              <a:rPr lang="en-US" dirty="0"/>
+              <a:t>user   :    1</a:t>
+            </a:r>
+          </a:p>
+          <a:p>
+            <a:pPr algn="ctr"/>
+            <a:r>
+              <a:rPr lang="en-US" dirty="0"/>
+              <a:t>post   :    1</a:t>
+            </a:r>
+          </a:p>
+          <a:p>
             <a:endParaRPr lang="en-US" dirty="0"/>
+          </a:p>
+        </p:txBody>
+      </p:sp>
+      <p:sp>
+        <p:nvSpPr>
+          <p:cNvPr id="2" name="Action Button: Go Home 1">
+            <a:hlinkClick r:id="" action="ppaction://hlinkshowjump?jump=firstslide" highlightClick="1"/>
+            <a:extLst>
+              <a:ext uri="{FF2B5EF4-FFF2-40B4-BE49-F238E27FC236}">
+                <a16:creationId xmlns:a16="http://schemas.microsoft.com/office/drawing/2014/main" id="{5A70DF2C-21CE-AF3F-F5A7-6BCEC5F648EA}"/>
+              </a:ext>
+            </a:extLst>
+          </p:cNvPr>
+          <p:cNvSpPr/>
+          <p:nvPr/>
+        </p:nvSpPr>
+        <p:spPr>
+          <a:xfrm>
+            <a:off x="385188" y="396280"/>
+            <a:ext cx="619648" cy="506187"/>
+          </a:xfrm>
+          <a:prstGeom prst="actionButtonHome">
+            <a:avLst/>
+          </a:prstGeom>
+        </p:spPr>
+        <p:style>
+          <a:lnRef idx="2">
+            <a:schemeClr val="accent1">
+              <a:shade val="15000"/>
+            </a:schemeClr>
+          </a:lnRef>
+          <a:fillRef idx="1">
+            <a:schemeClr val="accent1"/>
+          </a:fillRef>
+          <a:effectRef idx="0">
+            <a:schemeClr val="accent1"/>
+          </a:effectRef>
+          <a:fontRef idx="minor">
+            <a:schemeClr val="lt1"/>
+          </a:fontRef>
+        </p:style>
+        <p:txBody>
+          <a:bodyPr rtlCol="0" anchor="ctr"/>
+          <a:lstStyle/>
+          <a:p>
+            <a:pPr algn="ctr"/>
+            <a:endParaRPr lang="en-US"/>
+          </a:p>
+        </p:txBody>
+      </p:sp>
+      <p:sp>
+        <p:nvSpPr>
+          <p:cNvPr id="4" name="Oval 3">
+            <a:extLst>
+              <a:ext uri="{FF2B5EF4-FFF2-40B4-BE49-F238E27FC236}">
+                <a16:creationId xmlns:a16="http://schemas.microsoft.com/office/drawing/2014/main" id="{143D602F-C88F-69CA-5765-38DA1F9FFFA2}"/>
+              </a:ext>
+            </a:extLst>
+          </p:cNvPr>
+          <p:cNvSpPr/>
+          <p:nvPr/>
+        </p:nvSpPr>
+        <p:spPr>
+          <a:xfrm>
+            <a:off x="11081762" y="425168"/>
+            <a:ext cx="619648" cy="506187"/>
+          </a:xfrm>
+          <a:prstGeom prst="ellipse">
+            <a:avLst/>
+          </a:prstGeom>
+        </p:spPr>
+        <p:style>
+          <a:lnRef idx="2">
+            <a:schemeClr val="accent1">
+              <a:shade val="15000"/>
+            </a:schemeClr>
+          </a:lnRef>
+          <a:fillRef idx="1">
+            <a:schemeClr val="accent1"/>
+          </a:fillRef>
+          <a:effectRef idx="0">
+            <a:schemeClr val="accent1"/>
+          </a:effectRef>
+          <a:fontRef idx="minor">
+            <a:schemeClr val="lt1"/>
+          </a:fontRef>
+        </p:style>
+        <p:txBody>
+          <a:bodyPr rtlCol="0" anchor="ctr"/>
+          <a:lstStyle/>
+          <a:p>
+            <a:pPr algn="ctr"/>
+            <a:endParaRPr lang="en-US"/>
+          </a:p>
+        </p:txBody>
+      </p:sp>
+      <p:sp>
+        <p:nvSpPr>
+          <p:cNvPr id="5" name="Arrow: Right 4">
+            <a:extLst>
+              <a:ext uri="{FF2B5EF4-FFF2-40B4-BE49-F238E27FC236}">
+                <a16:creationId xmlns:a16="http://schemas.microsoft.com/office/drawing/2014/main" id="{1926BFAA-CAE0-E35A-3FC3-D5C7E7F5C670}"/>
+              </a:ext>
+            </a:extLst>
+          </p:cNvPr>
+          <p:cNvSpPr/>
+          <p:nvPr/>
+        </p:nvSpPr>
+        <p:spPr>
+          <a:xfrm rot="10800000">
+            <a:off x="11135588" y="490667"/>
+            <a:ext cx="430336" cy="375185"/>
+          </a:xfrm>
+          <a:prstGeom prst="rightArrow">
+            <a:avLst/>
+          </a:prstGeom>
+          <a:solidFill>
+            <a:schemeClr val="accent4"/>
+          </a:solidFill>
+        </p:spPr>
+        <p:style>
+          <a:lnRef idx="2">
+            <a:schemeClr val="accent1">
+              <a:shade val="15000"/>
+            </a:schemeClr>
+          </a:lnRef>
+          <a:fillRef idx="1">
+            <a:schemeClr val="accent1"/>
+          </a:fillRef>
+          <a:effectRef idx="0">
+            <a:schemeClr val="accent1"/>
+          </a:effectRef>
+          <a:fontRef idx="minor">
+            <a:schemeClr val="lt1"/>
+          </a:fontRef>
+        </p:style>
+        <p:txBody>
+          <a:bodyPr rtlCol="0" anchor="ctr"/>
+          <a:lstStyle/>
+          <a:p>
+            <a:pPr algn="ctr"/>
+            <a:endParaRPr lang="en-US"/>
           </a:p>
         </p:txBody>
       </p:sp>
     </p:spTree>
     <p:extLst>
       <p:ext uri="{BB962C8B-B14F-4D97-AF65-F5344CB8AC3E}">
-        <p14:creationId xmlns:p14="http://schemas.microsoft.com/office/powerpoint/2010/main" val="465416167"/>
+        <p14:creationId xmlns:p14="http://schemas.microsoft.com/office/powerpoint/2010/main" val="806163125"/>
       </p:ext>
     </p:extLst>
   </p:cSld>
   <p:clrMapOvr>
     <a:masterClrMapping/>
   </p:clrMapOvr>
+  <p:extLst>
+    <p:ext uri="{6950BFC3-D8DA-4A85-94F7-54DA5524770B}">
+      <p188:commentRel xmlns:p188="http://schemas.microsoft.com/office/powerpoint/2018/8/main" r:id="rId2"/>
+    </p:ext>
+  </p:extLst>
 </p:sld>
 </file>
 

</xml_diff>

<commit_message>
finished wireframing. need to tag and go over with team
</commit_message>
<xml_diff>
--- a/Documents/final_project_planning.pptx
+++ b/Documents/final_project_planning.pptx
@@ -4,6 +4,9 @@
   <p:sldMasterIdLst>
     <p:sldMasterId id="2147483648" r:id="rId1"/>
   </p:sldMasterIdLst>
+  <p:notesMasterIdLst>
+    <p:notesMasterId r:id="rId18"/>
+  </p:notesMasterIdLst>
   <p:sldIdLst>
     <p:sldId id="256" r:id="rId2"/>
     <p:sldId id="257" r:id="rId3"/>
@@ -11,15 +14,16 @@
     <p:sldId id="258" r:id="rId5"/>
     <p:sldId id="259" r:id="rId6"/>
     <p:sldId id="265" r:id="rId7"/>
-    <p:sldId id="271" r:id="rId8"/>
-    <p:sldId id="269" r:id="rId9"/>
+    <p:sldId id="269" r:id="rId8"/>
+    <p:sldId id="272" r:id="rId9"/>
     <p:sldId id="268" r:id="rId10"/>
     <p:sldId id="260" r:id="rId11"/>
     <p:sldId id="266" r:id="rId12"/>
-    <p:sldId id="262" r:id="rId13"/>
-    <p:sldId id="263" r:id="rId14"/>
-    <p:sldId id="264" r:id="rId15"/>
-    <p:sldId id="270" r:id="rId16"/>
+    <p:sldId id="271" r:id="rId13"/>
+    <p:sldId id="262" r:id="rId14"/>
+    <p:sldId id="263" r:id="rId15"/>
+    <p:sldId id="264" r:id="rId16"/>
+    <p:sldId id="270" r:id="rId17"/>
   </p:sldIdLst>
   <p:sldSz cx="12192000" cy="6858000"/>
   <p:notesSz cx="6858000" cy="9144000"/>
@@ -176,6 +180,483 @@
 </p188:cmLst>
 </file>
 
+<file path=ppt/comments/modernComment_10F_F2187B98.xml><?xml version="1.0" encoding="utf-8"?>
+<p188:cmLst xmlns:a="http://schemas.openxmlformats.org/drawingml/2006/main" xmlns:r="http://schemas.openxmlformats.org/officeDocument/2006/relationships" xmlns:p188="http://schemas.microsoft.com/office/powerpoint/2018/8/main">
+  <p188:cm id="{540FE95C-81B8-4F36-9CE1-F5F6877508D2}" authorId="{F4528AED-D83D-A577-60C4-88E8BD19D895}" created="2023-11-06T00:46:20.340">
+    <ac:deMkLst xmlns:ac="http://schemas.microsoft.com/office/drawing/2013/main/command">
+      <pc:docMk xmlns:pc="http://schemas.microsoft.com/office/powerpoint/2013/main/command"/>
+      <pc:sldMk xmlns:pc="http://schemas.microsoft.com/office/powerpoint/2013/main/command" cId="4061690776" sldId="271"/>
+      <ac:spMk id="20" creationId="{E4D0A74E-41DD-4F73-4EB2-C1D35A4EF610}"/>
+    </ac:deMkLst>
+    <p188:txBody>
+      <a:bodyPr/>
+      <a:lstStyle/>
+      <a:p>
+        <a:r>
+          <a:rPr lang="en-US"/>
+          <a:t>Checkbox for upvote</a:t>
+        </a:r>
+      </a:p>
+    </p188:txBody>
+  </p188:cm>
+</p188:cmLst>
+</file>
+
+<file path=ppt/comments/modernComment_110_5154CF44.xml><?xml version="1.0" encoding="utf-8"?>
+<p188:cmLst xmlns:a="http://schemas.openxmlformats.org/drawingml/2006/main" xmlns:r="http://schemas.openxmlformats.org/officeDocument/2006/relationships" xmlns:p188="http://schemas.microsoft.com/office/powerpoint/2018/8/main">
+  <p188:cm id="{D1637B8D-E257-4F14-AA70-911057B39533}" authorId="{F4528AED-D83D-A577-60C4-88E8BD19D895}" created="2023-11-06T00:46:20.340">
+    <ac:deMkLst xmlns:ac="http://schemas.microsoft.com/office/drawing/2013/main/command">
+      <pc:docMk xmlns:pc="http://schemas.microsoft.com/office/powerpoint/2013/main/command"/>
+      <pc:sldMk xmlns:pc="http://schemas.microsoft.com/office/powerpoint/2013/main/command" cId="1364512580" sldId="272"/>
+      <ac:spMk id="20" creationId="{E4D0A74E-41DD-4F73-4EB2-C1D35A4EF610}"/>
+    </ac:deMkLst>
+    <p188:txBody>
+      <a:bodyPr/>
+      <a:lstStyle/>
+      <a:p>
+        <a:r>
+          <a:rPr lang="en-US"/>
+          <a:t>Checkbox for upvote</a:t>
+        </a:r>
+      </a:p>
+    </p188:txBody>
+  </p188:cm>
+</p188:cmLst>
+</file>
+
+<file path=ppt/notesMasters/notesMaster1.xml><?xml version="1.0" encoding="utf-8"?>
+<p:notesMaster xmlns:a="http://schemas.openxmlformats.org/drawingml/2006/main" xmlns:r="http://schemas.openxmlformats.org/officeDocument/2006/relationships" xmlns:p="http://schemas.openxmlformats.org/presentationml/2006/main">
+  <p:cSld>
+    <p:bg>
+      <p:bgRef idx="1001">
+        <a:schemeClr val="bg1"/>
+      </p:bgRef>
+    </p:bg>
+    <p:spTree>
+      <p:nvGrpSpPr>
+        <p:cNvPr id="1" name=""/>
+        <p:cNvGrpSpPr/>
+        <p:nvPr/>
+      </p:nvGrpSpPr>
+      <p:grpSpPr>
+        <a:xfrm>
+          <a:off x="0" y="0"/>
+          <a:ext cx="0" cy="0"/>
+          <a:chOff x="0" y="0"/>
+          <a:chExt cx="0" cy="0"/>
+        </a:xfrm>
+      </p:grpSpPr>
+      <p:sp>
+        <p:nvSpPr>
+          <p:cNvPr id="2" name="Header Placeholder 1"/>
+          <p:cNvSpPr>
+            <a:spLocks noGrp="1"/>
+          </p:cNvSpPr>
+          <p:nvPr>
+            <p:ph type="hdr" sz="quarter"/>
+          </p:nvPr>
+        </p:nvSpPr>
+        <p:spPr>
+          <a:xfrm>
+            <a:off x="0" y="0"/>
+            <a:ext cx="2971800" cy="458788"/>
+          </a:xfrm>
+          <a:prstGeom prst="rect">
+            <a:avLst/>
+          </a:prstGeom>
+        </p:spPr>
+        <p:txBody>
+          <a:bodyPr vert="horz" lIns="91440" tIns="45720" rIns="91440" bIns="45720" rtlCol="0"/>
+          <a:lstStyle>
+            <a:lvl1pPr algn="l">
+              <a:defRPr sz="1200"/>
+            </a:lvl1pPr>
+          </a:lstStyle>
+          <a:p>
+            <a:endParaRPr lang="en-US"/>
+          </a:p>
+        </p:txBody>
+      </p:sp>
+      <p:sp>
+        <p:nvSpPr>
+          <p:cNvPr id="3" name="Date Placeholder 2"/>
+          <p:cNvSpPr>
+            <a:spLocks noGrp="1"/>
+          </p:cNvSpPr>
+          <p:nvPr>
+            <p:ph type="dt" idx="1"/>
+          </p:nvPr>
+        </p:nvSpPr>
+        <p:spPr>
+          <a:xfrm>
+            <a:off x="3884613" y="0"/>
+            <a:ext cx="2971800" cy="458788"/>
+          </a:xfrm>
+          <a:prstGeom prst="rect">
+            <a:avLst/>
+          </a:prstGeom>
+        </p:spPr>
+        <p:txBody>
+          <a:bodyPr vert="horz" lIns="91440" tIns="45720" rIns="91440" bIns="45720" rtlCol="0"/>
+          <a:lstStyle>
+            <a:lvl1pPr algn="r">
+              <a:defRPr sz="1200"/>
+            </a:lvl1pPr>
+          </a:lstStyle>
+          <a:p>
+            <a:fld id="{149ECEB6-B347-42A2-AFA6-6834FA678A79}" type="datetimeFigureOut">
+              <a:rPr lang="en-US" smtClean="0"/>
+              <a:t>11/7/2023</a:t>
+            </a:fld>
+            <a:endParaRPr lang="en-US"/>
+          </a:p>
+        </p:txBody>
+      </p:sp>
+      <p:sp>
+        <p:nvSpPr>
+          <p:cNvPr id="4" name="Slide Image Placeholder 3"/>
+          <p:cNvSpPr>
+            <a:spLocks noGrp="1" noRot="1" noChangeAspect="1"/>
+          </p:cNvSpPr>
+          <p:nvPr>
+            <p:ph type="sldImg" idx="2"/>
+          </p:nvPr>
+        </p:nvSpPr>
+        <p:spPr>
+          <a:xfrm>
+            <a:off x="685800" y="1143000"/>
+            <a:ext cx="5486400" cy="3086100"/>
+          </a:xfrm>
+          <a:prstGeom prst="rect">
+            <a:avLst/>
+          </a:prstGeom>
+          <a:noFill/>
+          <a:ln w="12700">
+            <a:solidFill>
+              <a:prstClr val="black"/>
+            </a:solidFill>
+          </a:ln>
+        </p:spPr>
+        <p:txBody>
+          <a:bodyPr vert="horz" lIns="91440" tIns="45720" rIns="91440" bIns="45720" rtlCol="0" anchor="ctr"/>
+          <a:lstStyle/>
+          <a:p>
+            <a:endParaRPr lang="en-US"/>
+          </a:p>
+        </p:txBody>
+      </p:sp>
+      <p:sp>
+        <p:nvSpPr>
+          <p:cNvPr id="5" name="Notes Placeholder 4"/>
+          <p:cNvSpPr>
+            <a:spLocks noGrp="1"/>
+          </p:cNvSpPr>
+          <p:nvPr>
+            <p:ph type="body" sz="quarter" idx="3"/>
+          </p:nvPr>
+        </p:nvSpPr>
+        <p:spPr>
+          <a:xfrm>
+            <a:off x="685800" y="4400550"/>
+            <a:ext cx="5486400" cy="3600450"/>
+          </a:xfrm>
+          <a:prstGeom prst="rect">
+            <a:avLst/>
+          </a:prstGeom>
+        </p:spPr>
+        <p:txBody>
+          <a:bodyPr vert="horz" lIns="91440" tIns="45720" rIns="91440" bIns="45720" rtlCol="0"/>
+          <a:lstStyle/>
+          <a:p>
+            <a:pPr lvl="0"/>
+            <a:r>
+              <a:rPr lang="en-US"/>
+              <a:t>Click to edit Master text styles</a:t>
+            </a:r>
+          </a:p>
+          <a:p>
+            <a:pPr lvl="1"/>
+            <a:r>
+              <a:rPr lang="en-US"/>
+              <a:t>Second level</a:t>
+            </a:r>
+          </a:p>
+          <a:p>
+            <a:pPr lvl="2"/>
+            <a:r>
+              <a:rPr lang="en-US"/>
+              <a:t>Third level</a:t>
+            </a:r>
+          </a:p>
+          <a:p>
+            <a:pPr lvl="3"/>
+            <a:r>
+              <a:rPr lang="en-US"/>
+              <a:t>Fourth level</a:t>
+            </a:r>
+          </a:p>
+          <a:p>
+            <a:pPr lvl="4"/>
+            <a:r>
+              <a:rPr lang="en-US"/>
+              <a:t>Fifth level</a:t>
+            </a:r>
+          </a:p>
+        </p:txBody>
+      </p:sp>
+      <p:sp>
+        <p:nvSpPr>
+          <p:cNvPr id="6" name="Footer Placeholder 5"/>
+          <p:cNvSpPr>
+            <a:spLocks noGrp="1"/>
+          </p:cNvSpPr>
+          <p:nvPr>
+            <p:ph type="ftr" sz="quarter" idx="4"/>
+          </p:nvPr>
+        </p:nvSpPr>
+        <p:spPr>
+          <a:xfrm>
+            <a:off x="0" y="8685213"/>
+            <a:ext cx="2971800" cy="458787"/>
+          </a:xfrm>
+          <a:prstGeom prst="rect">
+            <a:avLst/>
+          </a:prstGeom>
+        </p:spPr>
+        <p:txBody>
+          <a:bodyPr vert="horz" lIns="91440" tIns="45720" rIns="91440" bIns="45720" rtlCol="0" anchor="b"/>
+          <a:lstStyle>
+            <a:lvl1pPr algn="l">
+              <a:defRPr sz="1200"/>
+            </a:lvl1pPr>
+          </a:lstStyle>
+          <a:p>
+            <a:endParaRPr lang="en-US"/>
+          </a:p>
+        </p:txBody>
+      </p:sp>
+      <p:sp>
+        <p:nvSpPr>
+          <p:cNvPr id="7" name="Slide Number Placeholder 6"/>
+          <p:cNvSpPr>
+            <a:spLocks noGrp="1"/>
+          </p:cNvSpPr>
+          <p:nvPr>
+            <p:ph type="sldNum" sz="quarter" idx="5"/>
+          </p:nvPr>
+        </p:nvSpPr>
+        <p:spPr>
+          <a:xfrm>
+            <a:off x="3884613" y="8685213"/>
+            <a:ext cx="2971800" cy="458787"/>
+          </a:xfrm>
+          <a:prstGeom prst="rect">
+            <a:avLst/>
+          </a:prstGeom>
+        </p:spPr>
+        <p:txBody>
+          <a:bodyPr vert="horz" lIns="91440" tIns="45720" rIns="91440" bIns="45720" rtlCol="0" anchor="b"/>
+          <a:lstStyle>
+            <a:lvl1pPr algn="r">
+              <a:defRPr sz="1200"/>
+            </a:lvl1pPr>
+          </a:lstStyle>
+          <a:p>
+            <a:fld id="{B06FDED3-7E68-48B3-9B1F-6E05180F61D0}" type="slidenum">
+              <a:rPr lang="en-US" smtClean="0"/>
+              <a:t>‹#›</a:t>
+            </a:fld>
+            <a:endParaRPr lang="en-US"/>
+          </a:p>
+        </p:txBody>
+      </p:sp>
+    </p:spTree>
+    <p:extLst>
+      <p:ext uri="{BB962C8B-B14F-4D97-AF65-F5344CB8AC3E}">
+        <p14:creationId xmlns:p14="http://schemas.microsoft.com/office/powerpoint/2010/main" val="1031549862"/>
+      </p:ext>
+    </p:extLst>
+  </p:cSld>
+  <p:clrMap bg1="lt1" tx1="dk1" bg2="lt2" tx2="dk2" accent1="accent1" accent2="accent2" accent3="accent3" accent4="accent4" accent5="accent5" accent6="accent6" hlink="hlink" folHlink="folHlink"/>
+  <p:notesStyle>
+    <a:lvl1pPr marL="0" algn="l" defTabSz="914400" rtl="0" eaLnBrk="1" latinLnBrk="0" hangingPunct="1">
+      <a:defRPr sz="1200" kern="1200">
+        <a:solidFill>
+          <a:schemeClr val="tx1"/>
+        </a:solidFill>
+        <a:latin typeface="+mn-lt"/>
+        <a:ea typeface="+mn-ea"/>
+        <a:cs typeface="+mn-cs"/>
+      </a:defRPr>
+    </a:lvl1pPr>
+    <a:lvl2pPr marL="457200" algn="l" defTabSz="914400" rtl="0" eaLnBrk="1" latinLnBrk="0" hangingPunct="1">
+      <a:defRPr sz="1200" kern="1200">
+        <a:solidFill>
+          <a:schemeClr val="tx1"/>
+        </a:solidFill>
+        <a:latin typeface="+mn-lt"/>
+        <a:ea typeface="+mn-ea"/>
+        <a:cs typeface="+mn-cs"/>
+      </a:defRPr>
+    </a:lvl2pPr>
+    <a:lvl3pPr marL="914400" algn="l" defTabSz="914400" rtl="0" eaLnBrk="1" latinLnBrk="0" hangingPunct="1">
+      <a:defRPr sz="1200" kern="1200">
+        <a:solidFill>
+          <a:schemeClr val="tx1"/>
+        </a:solidFill>
+        <a:latin typeface="+mn-lt"/>
+        <a:ea typeface="+mn-ea"/>
+        <a:cs typeface="+mn-cs"/>
+      </a:defRPr>
+    </a:lvl3pPr>
+    <a:lvl4pPr marL="1371600" algn="l" defTabSz="914400" rtl="0" eaLnBrk="1" latinLnBrk="0" hangingPunct="1">
+      <a:defRPr sz="1200" kern="1200">
+        <a:solidFill>
+          <a:schemeClr val="tx1"/>
+        </a:solidFill>
+        <a:latin typeface="+mn-lt"/>
+        <a:ea typeface="+mn-ea"/>
+        <a:cs typeface="+mn-cs"/>
+      </a:defRPr>
+    </a:lvl4pPr>
+    <a:lvl5pPr marL="1828800" algn="l" defTabSz="914400" rtl="0" eaLnBrk="1" latinLnBrk="0" hangingPunct="1">
+      <a:defRPr sz="1200" kern="1200">
+        <a:solidFill>
+          <a:schemeClr val="tx1"/>
+        </a:solidFill>
+        <a:latin typeface="+mn-lt"/>
+        <a:ea typeface="+mn-ea"/>
+        <a:cs typeface="+mn-cs"/>
+      </a:defRPr>
+    </a:lvl5pPr>
+    <a:lvl6pPr marL="2286000" algn="l" defTabSz="914400" rtl="0" eaLnBrk="1" latinLnBrk="0" hangingPunct="1">
+      <a:defRPr sz="1200" kern="1200">
+        <a:solidFill>
+          <a:schemeClr val="tx1"/>
+        </a:solidFill>
+        <a:latin typeface="+mn-lt"/>
+        <a:ea typeface="+mn-ea"/>
+        <a:cs typeface="+mn-cs"/>
+      </a:defRPr>
+    </a:lvl6pPr>
+    <a:lvl7pPr marL="2743200" algn="l" defTabSz="914400" rtl="0" eaLnBrk="1" latinLnBrk="0" hangingPunct="1">
+      <a:defRPr sz="1200" kern="1200">
+        <a:solidFill>
+          <a:schemeClr val="tx1"/>
+        </a:solidFill>
+        <a:latin typeface="+mn-lt"/>
+        <a:ea typeface="+mn-ea"/>
+        <a:cs typeface="+mn-cs"/>
+      </a:defRPr>
+    </a:lvl7pPr>
+    <a:lvl8pPr marL="3200400" algn="l" defTabSz="914400" rtl="0" eaLnBrk="1" latinLnBrk="0" hangingPunct="1">
+      <a:defRPr sz="1200" kern="1200">
+        <a:solidFill>
+          <a:schemeClr val="tx1"/>
+        </a:solidFill>
+        <a:latin typeface="+mn-lt"/>
+        <a:ea typeface="+mn-ea"/>
+        <a:cs typeface="+mn-cs"/>
+      </a:defRPr>
+    </a:lvl8pPr>
+    <a:lvl9pPr marL="3657600" algn="l" defTabSz="914400" rtl="0" eaLnBrk="1" latinLnBrk="0" hangingPunct="1">
+      <a:defRPr sz="1200" kern="1200">
+        <a:solidFill>
+          <a:schemeClr val="tx1"/>
+        </a:solidFill>
+        <a:latin typeface="+mn-lt"/>
+        <a:ea typeface="+mn-ea"/>
+        <a:cs typeface="+mn-cs"/>
+      </a:defRPr>
+    </a:lvl9pPr>
+  </p:notesStyle>
+</p:notesMaster>
+</file>
+
+<file path=ppt/notesSlides/notesSlide1.xml><?xml version="1.0" encoding="utf-8"?>
+<p:notes xmlns:a="http://schemas.openxmlformats.org/drawingml/2006/main" xmlns:r="http://schemas.openxmlformats.org/officeDocument/2006/relationships" xmlns:p="http://schemas.openxmlformats.org/presentationml/2006/main">
+  <p:cSld>
+    <p:spTree>
+      <p:nvGrpSpPr>
+        <p:cNvPr id="1" name=""/>
+        <p:cNvGrpSpPr/>
+        <p:nvPr/>
+      </p:nvGrpSpPr>
+      <p:grpSpPr>
+        <a:xfrm>
+          <a:off x="0" y="0"/>
+          <a:ext cx="0" cy="0"/>
+          <a:chOff x="0" y="0"/>
+          <a:chExt cx="0" cy="0"/>
+        </a:xfrm>
+      </p:grpSpPr>
+      <p:sp>
+        <p:nvSpPr>
+          <p:cNvPr id="2" name="Slide Image Placeholder 1"/>
+          <p:cNvSpPr>
+            <a:spLocks noGrp="1" noRot="1" noChangeAspect="1"/>
+          </p:cNvSpPr>
+          <p:nvPr>
+            <p:ph type="sldImg"/>
+          </p:nvPr>
+        </p:nvSpPr>
+        <p:spPr/>
+      </p:sp>
+      <p:sp>
+        <p:nvSpPr>
+          <p:cNvPr id="3" name="Notes Placeholder 2"/>
+          <p:cNvSpPr>
+            <a:spLocks noGrp="1"/>
+          </p:cNvSpPr>
+          <p:nvPr>
+            <p:ph type="body" idx="1"/>
+          </p:nvPr>
+        </p:nvSpPr>
+        <p:spPr/>
+        <p:txBody>
+          <a:bodyPr/>
+          <a:lstStyle/>
+          <a:p>
+            <a:endParaRPr lang="en-US" dirty="0"/>
+          </a:p>
+        </p:txBody>
+      </p:sp>
+      <p:sp>
+        <p:nvSpPr>
+          <p:cNvPr id="4" name="Slide Number Placeholder 3"/>
+          <p:cNvSpPr>
+            <a:spLocks noGrp="1"/>
+          </p:cNvSpPr>
+          <p:nvPr>
+            <p:ph type="sldNum" sz="quarter" idx="5"/>
+          </p:nvPr>
+        </p:nvSpPr>
+        <p:spPr/>
+        <p:txBody>
+          <a:bodyPr/>
+          <a:lstStyle/>
+          <a:p>
+            <a:fld id="{B06FDED3-7E68-48B3-9B1F-6E05180F61D0}" type="slidenum">
+              <a:rPr lang="en-US" smtClean="0"/>
+              <a:t>3</a:t>
+            </a:fld>
+            <a:endParaRPr lang="en-US"/>
+          </a:p>
+        </p:txBody>
+      </p:sp>
+    </p:spTree>
+    <p:extLst>
+      <p:ext uri="{BB962C8B-B14F-4D97-AF65-F5344CB8AC3E}">
+        <p14:creationId xmlns:p14="http://schemas.microsoft.com/office/powerpoint/2010/main" val="1263218398"/>
+      </p:ext>
+    </p:extLst>
+  </p:cSld>
+  <p:clrMapOvr>
+    <a:masterClrMapping/>
+  </p:clrMapOvr>
+</p:notes>
+</file>
+
 <file path=ppt/slideLayouts/slideLayout1.xml><?xml version="1.0" encoding="utf-8"?>
 <p:sldLayout xmlns:a="http://schemas.openxmlformats.org/drawingml/2006/main" xmlns:r="http://schemas.openxmlformats.org/officeDocument/2006/relationships" xmlns:p="http://schemas.openxmlformats.org/presentationml/2006/main" type="title" preserve="1">
   <p:cSld name="Title Slide">
@@ -323,7 +804,7 @@
           <a:p>
             <a:fld id="{9F87B9EB-8124-4FED-A4DC-BE4B0CC78498}" type="datetimeFigureOut">
               <a:rPr lang="en-US" smtClean="0"/>
-              <a:t>11/6/2023</a:t>
+              <a:t>11/7/2023</a:t>
             </a:fld>
             <a:endParaRPr lang="en-US"/>
           </a:p>
@@ -521,7 +1002,7 @@
           <a:p>
             <a:fld id="{9F87B9EB-8124-4FED-A4DC-BE4B0CC78498}" type="datetimeFigureOut">
               <a:rPr lang="en-US" smtClean="0"/>
-              <a:t>11/6/2023</a:t>
+              <a:t>11/7/2023</a:t>
             </a:fld>
             <a:endParaRPr lang="en-US"/>
           </a:p>
@@ -729,7 +1210,7 @@
           <a:p>
             <a:fld id="{9F87B9EB-8124-4FED-A4DC-BE4B0CC78498}" type="datetimeFigureOut">
               <a:rPr lang="en-US" smtClean="0"/>
-              <a:t>11/6/2023</a:t>
+              <a:t>11/7/2023</a:t>
             </a:fld>
             <a:endParaRPr lang="en-US"/>
           </a:p>
@@ -927,7 +1408,7 @@
           <a:p>
             <a:fld id="{9F87B9EB-8124-4FED-A4DC-BE4B0CC78498}" type="datetimeFigureOut">
               <a:rPr lang="en-US" smtClean="0"/>
-              <a:t>11/6/2023</a:t>
+              <a:t>11/7/2023</a:t>
             </a:fld>
             <a:endParaRPr lang="en-US"/>
           </a:p>
@@ -1202,7 +1683,7 @@
           <a:p>
             <a:fld id="{9F87B9EB-8124-4FED-A4DC-BE4B0CC78498}" type="datetimeFigureOut">
               <a:rPr lang="en-US" smtClean="0"/>
-              <a:t>11/6/2023</a:t>
+              <a:t>11/7/2023</a:t>
             </a:fld>
             <a:endParaRPr lang="en-US"/>
           </a:p>
@@ -1467,7 +1948,7 @@
           <a:p>
             <a:fld id="{9F87B9EB-8124-4FED-A4DC-BE4B0CC78498}" type="datetimeFigureOut">
               <a:rPr lang="en-US" smtClean="0"/>
-              <a:t>11/6/2023</a:t>
+              <a:t>11/7/2023</a:t>
             </a:fld>
             <a:endParaRPr lang="en-US"/>
           </a:p>
@@ -1879,7 +2360,7 @@
           <a:p>
             <a:fld id="{9F87B9EB-8124-4FED-A4DC-BE4B0CC78498}" type="datetimeFigureOut">
               <a:rPr lang="en-US" smtClean="0"/>
-              <a:t>11/6/2023</a:t>
+              <a:t>11/7/2023</a:t>
             </a:fld>
             <a:endParaRPr lang="en-US"/>
           </a:p>
@@ -2020,7 +2501,7 @@
           <a:p>
             <a:fld id="{9F87B9EB-8124-4FED-A4DC-BE4B0CC78498}" type="datetimeFigureOut">
               <a:rPr lang="en-US" smtClean="0"/>
-              <a:t>11/6/2023</a:t>
+              <a:t>11/7/2023</a:t>
             </a:fld>
             <a:endParaRPr lang="en-US"/>
           </a:p>
@@ -2133,7 +2614,7 @@
           <a:p>
             <a:fld id="{9F87B9EB-8124-4FED-A4DC-BE4B0CC78498}" type="datetimeFigureOut">
               <a:rPr lang="en-US" smtClean="0"/>
-              <a:t>11/6/2023</a:t>
+              <a:t>11/7/2023</a:t>
             </a:fld>
             <a:endParaRPr lang="en-US"/>
           </a:p>
@@ -2444,7 +2925,7 @@
           <a:p>
             <a:fld id="{9F87B9EB-8124-4FED-A4DC-BE4B0CC78498}" type="datetimeFigureOut">
               <a:rPr lang="en-US" smtClean="0"/>
-              <a:t>11/6/2023</a:t>
+              <a:t>11/7/2023</a:t>
             </a:fld>
             <a:endParaRPr lang="en-US"/>
           </a:p>
@@ -2732,7 +3213,7 @@
           <a:p>
             <a:fld id="{9F87B9EB-8124-4FED-A4DC-BE4B0CC78498}" type="datetimeFigureOut">
               <a:rPr lang="en-US" smtClean="0"/>
-              <a:t>11/6/2023</a:t>
+              <a:t>11/7/2023</a:t>
             </a:fld>
             <a:endParaRPr lang="en-US"/>
           </a:p>
@@ -2973,7 +3454,7 @@
           <a:p>
             <a:fld id="{9F87B9EB-8124-4FED-A4DC-BE4B0CC78498}" type="datetimeFigureOut">
               <a:rPr lang="en-US" smtClean="0"/>
-              <a:t>11/6/2023</a:t>
+              <a:t>11/7/2023</a:t>
             </a:fld>
             <a:endParaRPr lang="en-US"/>
           </a:p>
@@ -4216,203 +4697,323 @@
       </p:grpSpPr>
       <p:sp>
         <p:nvSpPr>
-          <p:cNvPr id="4" name="TextBox 3">
-            <a:extLst>
-              <a:ext uri="{FF2B5EF4-FFF2-40B4-BE49-F238E27FC236}">
-                <a16:creationId xmlns:a16="http://schemas.microsoft.com/office/drawing/2014/main" id="{93042950-E66C-9CF4-A917-488019161FCA}"/>
-              </a:ext>
-            </a:extLst>
-          </p:cNvPr>
-          <p:cNvSpPr txBox="1"/>
+          <p:cNvPr id="3" name="Rectangle 2">
+            <a:extLst>
+              <a:ext uri="{FF2B5EF4-FFF2-40B4-BE49-F238E27FC236}">
+                <a16:creationId xmlns:a16="http://schemas.microsoft.com/office/drawing/2014/main" id="{09EB6145-F196-BA75-4B3E-EED7851B2ACB}"/>
+              </a:ext>
+            </a:extLst>
+          </p:cNvPr>
+          <p:cNvSpPr/>
           <p:nvPr/>
         </p:nvSpPr>
         <p:spPr>
           <a:xfrm>
-            <a:off x="275846" y="765589"/>
-            <a:ext cx="11410545" cy="1971374"/>
+            <a:off x="242835" y="200967"/>
+            <a:ext cx="11706330" cy="6451042"/>
           </a:xfrm>
           <a:prstGeom prst="rect">
             <a:avLst/>
           </a:prstGeom>
           <a:noFill/>
         </p:spPr>
-        <p:txBody>
-          <a:bodyPr wrap="square" rtlCol="0">
-            <a:spAutoFit/>
-          </a:bodyPr>
-          <a:lstStyle/>
-          <a:p>
-            <a:pPr marL="0" marR="0">
-              <a:lnSpc>
-                <a:spcPct val="107000"/>
-              </a:lnSpc>
-              <a:spcBef>
-                <a:spcPts val="0"/>
-              </a:spcBef>
-              <a:spcAft>
-                <a:spcPts val="800"/>
-              </a:spcAft>
-            </a:pPr>
-            <a:r>
-              <a:rPr lang="en-US" sz="1800" kern="100" dirty="0">
-                <a:effectLst/>
-                <a:latin typeface="Calibri" panose="020F0502020204030204" pitchFamily="34" charset="0"/>
-                <a:ea typeface="Calibri" panose="020F0502020204030204" pitchFamily="34" charset="0"/>
-                <a:cs typeface="Times New Roman" panose="02020603050405020304" pitchFamily="18" charset="0"/>
-              </a:rPr>
-              <a:t>Needs following endpoints:</a:t>
-            </a:r>
-          </a:p>
-          <a:p>
-            <a:pPr marL="0" marR="0">
-              <a:lnSpc>
-                <a:spcPct val="107000"/>
-              </a:lnSpc>
-              <a:spcBef>
-                <a:spcPts val="0"/>
-              </a:spcBef>
-              <a:spcAft>
-                <a:spcPts val="800"/>
-              </a:spcAft>
-            </a:pPr>
-            <a:r>
-              <a:rPr lang="en-US" kern="100" dirty="0">
-                <a:latin typeface="Calibri" panose="020F0502020204030204" pitchFamily="34" charset="0"/>
-                <a:ea typeface="Calibri" panose="020F0502020204030204" pitchFamily="34" charset="0"/>
-                <a:cs typeface="Times New Roman" panose="02020603050405020304" pitchFamily="18" charset="0"/>
-              </a:rPr>
-              <a:t>- GET all users</a:t>
-            </a:r>
-          </a:p>
-          <a:p>
-            <a:pPr marL="0" marR="0">
-              <a:lnSpc>
-                <a:spcPct val="107000"/>
-              </a:lnSpc>
-              <a:spcBef>
-                <a:spcPts val="0"/>
-              </a:spcBef>
-              <a:spcAft>
-                <a:spcPts val="800"/>
-              </a:spcAft>
-            </a:pPr>
-            <a:r>
-              <a:rPr lang="en-US" sz="1800" kern="100" dirty="0">
-                <a:effectLst/>
-                <a:latin typeface="Calibri" panose="020F0502020204030204" pitchFamily="34" charset="0"/>
-                <a:ea typeface="Calibri" panose="020F0502020204030204" pitchFamily="34" charset="0"/>
-                <a:cs typeface="Times New Roman" panose="02020603050405020304" pitchFamily="18" charset="0"/>
-              </a:rPr>
-              <a:t>- GET </a:t>
-            </a:r>
-            <a:r>
-              <a:rPr lang="en-US" sz="1800" kern="100" dirty="0" err="1">
-                <a:effectLst/>
-                <a:latin typeface="Calibri" panose="020F0502020204030204" pitchFamily="34" charset="0"/>
-                <a:ea typeface="Calibri" panose="020F0502020204030204" pitchFamily="34" charset="0"/>
-                <a:cs typeface="Times New Roman" panose="02020603050405020304" pitchFamily="18" charset="0"/>
-              </a:rPr>
-              <a:t>userById</a:t>
-            </a:r>
-            <a:endParaRPr lang="en-US" sz="1800" kern="100" dirty="0">
-              <a:effectLst/>
-              <a:latin typeface="Calibri" panose="020F0502020204030204" pitchFamily="34" charset="0"/>
-              <a:ea typeface="Calibri" panose="020F0502020204030204" pitchFamily="34" charset="0"/>
-              <a:cs typeface="Times New Roman" panose="02020603050405020304" pitchFamily="18" charset="0"/>
-            </a:endParaRPr>
-          </a:p>
-          <a:p>
-            <a:pPr marL="0" marR="0">
-              <a:lnSpc>
-                <a:spcPct val="107000"/>
-              </a:lnSpc>
-              <a:spcBef>
-                <a:spcPts val="0"/>
-              </a:spcBef>
-              <a:spcAft>
-                <a:spcPts val="800"/>
-              </a:spcAft>
-            </a:pPr>
-            <a:r>
-              <a:rPr lang="en-US" kern="100" dirty="0">
-                <a:latin typeface="Calibri" panose="020F0502020204030204" pitchFamily="34" charset="0"/>
-                <a:ea typeface="Calibri" panose="020F0502020204030204" pitchFamily="34" charset="0"/>
-                <a:cs typeface="Times New Roman" panose="02020603050405020304" pitchFamily="18" charset="0"/>
-              </a:rPr>
-              <a:t>- POST </a:t>
-            </a:r>
-            <a:r>
-              <a:rPr lang="en-US" kern="100" dirty="0" err="1">
-                <a:latin typeface="Calibri" panose="020F0502020204030204" pitchFamily="34" charset="0"/>
-                <a:ea typeface="Calibri" panose="020F0502020204030204" pitchFamily="34" charset="0"/>
-                <a:cs typeface="Times New Roman" panose="02020603050405020304" pitchFamily="18" charset="0"/>
-              </a:rPr>
-              <a:t>createUser</a:t>
-            </a:r>
-            <a:endParaRPr lang="en-US" kern="100" dirty="0">
-              <a:latin typeface="Calibri" panose="020F0502020204030204" pitchFamily="34" charset="0"/>
-              <a:ea typeface="Calibri" panose="020F0502020204030204" pitchFamily="34" charset="0"/>
-              <a:cs typeface="Times New Roman" panose="02020603050405020304" pitchFamily="18" charset="0"/>
-            </a:endParaRPr>
-          </a:p>
-          <a:p>
-            <a:pPr marL="0" marR="0">
-              <a:lnSpc>
-                <a:spcPct val="107000"/>
-              </a:lnSpc>
-              <a:spcBef>
-                <a:spcPts val="0"/>
-              </a:spcBef>
-              <a:spcAft>
-                <a:spcPts val="800"/>
-              </a:spcAft>
-            </a:pPr>
-            <a:r>
-              <a:rPr lang="en-US" kern="100" dirty="0">
-                <a:latin typeface="Calibri" panose="020F0502020204030204" pitchFamily="34" charset="0"/>
-                <a:ea typeface="Calibri" panose="020F0502020204030204" pitchFamily="34" charset="0"/>
-                <a:cs typeface="Times New Roman" panose="02020603050405020304" pitchFamily="18" charset="0"/>
-              </a:rPr>
-              <a:t>- REMOVE </a:t>
-            </a:r>
-            <a:r>
-              <a:rPr lang="en-US" kern="100" dirty="0" err="1">
-                <a:latin typeface="Calibri" panose="020F0502020204030204" pitchFamily="34" charset="0"/>
-                <a:ea typeface="Calibri" panose="020F0502020204030204" pitchFamily="34" charset="0"/>
-                <a:cs typeface="Times New Roman" panose="02020603050405020304" pitchFamily="18" charset="0"/>
-              </a:rPr>
-              <a:t>removeUser</a:t>
-            </a:r>
-            <a:endParaRPr lang="en-US" kern="100" dirty="0">
-              <a:latin typeface="Calibri" panose="020F0502020204030204" pitchFamily="34" charset="0"/>
-              <a:ea typeface="Calibri" panose="020F0502020204030204" pitchFamily="34" charset="0"/>
-              <a:cs typeface="Times New Roman" panose="02020603050405020304" pitchFamily="18" charset="0"/>
-            </a:endParaRPr>
-          </a:p>
-        </p:txBody>
-      </p:sp>
-      <p:sp>
-        <p:nvSpPr>
-          <p:cNvPr id="2" name="TextBox 1">
-            <a:extLst>
-              <a:ext uri="{FF2B5EF4-FFF2-40B4-BE49-F238E27FC236}">
-                <a16:creationId xmlns:a16="http://schemas.microsoft.com/office/drawing/2014/main" id="{CB46AF81-95B8-D80D-804A-CADBD595992E}"/>
-              </a:ext>
-            </a:extLst>
-          </p:cNvPr>
-          <p:cNvSpPr txBox="1"/>
+        <p:style>
+          <a:lnRef idx="2">
+            <a:schemeClr val="accent1">
+              <a:shade val="15000"/>
+            </a:schemeClr>
+          </a:lnRef>
+          <a:fillRef idx="1">
+            <a:schemeClr val="accent1"/>
+          </a:fillRef>
+          <a:effectRef idx="0">
+            <a:schemeClr val="accent1"/>
+          </a:effectRef>
+          <a:fontRef idx="minor">
+            <a:schemeClr val="lt1"/>
+          </a:fontRef>
+        </p:style>
+        <p:txBody>
+          <a:bodyPr rtlCol="0" anchor="ctr"/>
+          <a:lstStyle/>
+          <a:p>
+            <a:pPr algn="ctr"/>
+            <a:endParaRPr lang="en-US" dirty="0"/>
+          </a:p>
+        </p:txBody>
+      </p:sp>
+      <p:sp>
+        <p:nvSpPr>
+          <p:cNvPr id="9" name="Rectangle 8">
+            <a:extLst>
+              <a:ext uri="{FF2B5EF4-FFF2-40B4-BE49-F238E27FC236}">
+                <a16:creationId xmlns:a16="http://schemas.microsoft.com/office/drawing/2014/main" id="{F50557A8-8943-F711-C854-1442083C28F3}"/>
+              </a:ext>
+            </a:extLst>
+          </p:cNvPr>
+          <p:cNvSpPr/>
           <p:nvPr/>
         </p:nvSpPr>
         <p:spPr>
           <a:xfrm>
-            <a:off x="275847" y="161432"/>
-            <a:ext cx="11410545" cy="369332"/>
+            <a:off x="2558980" y="1075172"/>
+            <a:ext cx="7074040" cy="2150347"/>
           </a:xfrm>
           <a:prstGeom prst="rect">
             <a:avLst/>
           </a:prstGeom>
           <a:noFill/>
         </p:spPr>
+        <p:style>
+          <a:lnRef idx="2">
+            <a:schemeClr val="accent1">
+              <a:shade val="15000"/>
+            </a:schemeClr>
+          </a:lnRef>
+          <a:fillRef idx="1">
+            <a:schemeClr val="accent1"/>
+          </a:fillRef>
+          <a:effectRef idx="0">
+            <a:schemeClr val="accent1"/>
+          </a:effectRef>
+          <a:fontRef idx="minor">
+            <a:schemeClr val="lt1"/>
+          </a:fontRef>
+        </p:style>
+        <p:txBody>
+          <a:bodyPr rtlCol="0" anchor="ctr"/>
+          <a:lstStyle/>
+          <a:p>
+            <a:pPr algn="ctr"/>
+            <a:endParaRPr lang="en-US" dirty="0"/>
+          </a:p>
+        </p:txBody>
+      </p:sp>
+      <p:sp>
+        <p:nvSpPr>
+          <p:cNvPr id="11" name="Rectangle 10">
+            <a:extLst>
+              <a:ext uri="{FF2B5EF4-FFF2-40B4-BE49-F238E27FC236}">
+                <a16:creationId xmlns:a16="http://schemas.microsoft.com/office/drawing/2014/main" id="{8398570A-12E6-2071-F638-3A35007AEE47}"/>
+              </a:ext>
+            </a:extLst>
+          </p:cNvPr>
+          <p:cNvSpPr/>
+          <p:nvPr/>
+        </p:nvSpPr>
+        <p:spPr>
+          <a:xfrm>
+            <a:off x="2558980" y="3225519"/>
+            <a:ext cx="7074040" cy="2150347"/>
+          </a:xfrm>
+          <a:prstGeom prst="rect">
+            <a:avLst/>
+          </a:prstGeom>
+          <a:noFill/>
+        </p:spPr>
+        <p:style>
+          <a:lnRef idx="2">
+            <a:schemeClr val="accent1">
+              <a:shade val="15000"/>
+            </a:schemeClr>
+          </a:lnRef>
+          <a:fillRef idx="1">
+            <a:schemeClr val="accent1"/>
+          </a:fillRef>
+          <a:effectRef idx="0">
+            <a:schemeClr val="accent1"/>
+          </a:effectRef>
+          <a:fontRef idx="minor">
+            <a:schemeClr val="lt1"/>
+          </a:fontRef>
+        </p:style>
+        <p:txBody>
+          <a:bodyPr rtlCol="0" anchor="ctr"/>
+          <a:lstStyle/>
+          <a:p>
+            <a:pPr algn="ctr"/>
+            <a:endParaRPr lang="en-US" dirty="0"/>
+          </a:p>
+        </p:txBody>
+      </p:sp>
+      <p:sp>
+        <p:nvSpPr>
+          <p:cNvPr id="12" name="Rectangle 11">
+            <a:extLst>
+              <a:ext uri="{FF2B5EF4-FFF2-40B4-BE49-F238E27FC236}">
+                <a16:creationId xmlns:a16="http://schemas.microsoft.com/office/drawing/2014/main" id="{44B90755-68C1-C941-8BE9-5CDDEEAD237C}"/>
+              </a:ext>
+            </a:extLst>
+          </p:cNvPr>
+          <p:cNvSpPr/>
+          <p:nvPr/>
+        </p:nvSpPr>
+        <p:spPr>
+          <a:xfrm>
+            <a:off x="2558980" y="5375866"/>
+            <a:ext cx="7074040" cy="1276143"/>
+          </a:xfrm>
+          <a:prstGeom prst="rect">
+            <a:avLst/>
+          </a:prstGeom>
+          <a:noFill/>
+        </p:spPr>
+        <p:style>
+          <a:lnRef idx="2">
+            <a:schemeClr val="accent1">
+              <a:shade val="15000"/>
+            </a:schemeClr>
+          </a:lnRef>
+          <a:fillRef idx="1">
+            <a:schemeClr val="accent1"/>
+          </a:fillRef>
+          <a:effectRef idx="0">
+            <a:schemeClr val="accent1"/>
+          </a:effectRef>
+          <a:fontRef idx="minor">
+            <a:schemeClr val="lt1"/>
+          </a:fontRef>
+        </p:style>
+        <p:txBody>
+          <a:bodyPr rtlCol="0" anchor="ctr"/>
+          <a:lstStyle/>
+          <a:p>
+            <a:pPr algn="ctr"/>
+            <a:endParaRPr lang="en-US" dirty="0"/>
+          </a:p>
+        </p:txBody>
+      </p:sp>
+      <p:sp>
+        <p:nvSpPr>
+          <p:cNvPr id="15" name="Rectangle 14">
+            <a:extLst>
+              <a:ext uri="{FF2B5EF4-FFF2-40B4-BE49-F238E27FC236}">
+                <a16:creationId xmlns:a16="http://schemas.microsoft.com/office/drawing/2014/main" id="{2F28C8CE-0641-4BDC-3993-118AA2F43F1D}"/>
+              </a:ext>
+            </a:extLst>
+          </p:cNvPr>
+          <p:cNvSpPr/>
+          <p:nvPr/>
+        </p:nvSpPr>
+        <p:spPr>
+          <a:xfrm>
+            <a:off x="242835" y="200966"/>
+            <a:ext cx="11706330" cy="874206"/>
+          </a:xfrm>
+          <a:prstGeom prst="rect">
+            <a:avLst/>
+          </a:prstGeom>
+          <a:noFill/>
+        </p:spPr>
+        <p:style>
+          <a:lnRef idx="2">
+            <a:schemeClr val="accent1">
+              <a:shade val="15000"/>
+            </a:schemeClr>
+          </a:lnRef>
+          <a:fillRef idx="1">
+            <a:schemeClr val="accent1"/>
+          </a:fillRef>
+          <a:effectRef idx="0">
+            <a:schemeClr val="accent1"/>
+          </a:effectRef>
+          <a:fontRef idx="minor">
+            <a:schemeClr val="lt1"/>
+          </a:fontRef>
+        </p:style>
+        <p:txBody>
+          <a:bodyPr rtlCol="0" anchor="ctr"/>
+          <a:lstStyle/>
+          <a:p>
+            <a:pPr algn="ctr"/>
+            <a:r>
+              <a:rPr lang="en-US" dirty="0">
+                <a:solidFill>
+                  <a:schemeClr val="tx1"/>
+                </a:solidFill>
+              </a:rPr>
+              <a:t>Latest Posts	Favorite Posts	</a:t>
+            </a:r>
+            <a:r>
+              <a:rPr lang="en-US" u="sng" dirty="0">
+                <a:solidFill>
+                  <a:schemeClr val="tx1"/>
+                </a:solidFill>
+              </a:rPr>
+              <a:t>Events</a:t>
+            </a:r>
+          </a:p>
+        </p:txBody>
+      </p:sp>
+      <p:sp>
+        <p:nvSpPr>
+          <p:cNvPr id="16" name="Action Button: Go Home 15">
+            <a:hlinkClick r:id="" action="ppaction://hlinkshowjump?jump=firstslide" highlightClick="1"/>
+            <a:extLst>
+              <a:ext uri="{FF2B5EF4-FFF2-40B4-BE49-F238E27FC236}">
+                <a16:creationId xmlns:a16="http://schemas.microsoft.com/office/drawing/2014/main" id="{718E4184-CE0E-7E87-B941-B21B6287DC47}"/>
+              </a:ext>
+            </a:extLst>
+          </p:cNvPr>
+          <p:cNvSpPr/>
+          <p:nvPr/>
+        </p:nvSpPr>
+        <p:spPr>
+          <a:xfrm>
+            <a:off x="385188" y="396280"/>
+            <a:ext cx="619648" cy="506187"/>
+          </a:xfrm>
+          <a:prstGeom prst="actionButtonHome">
+            <a:avLst/>
+          </a:prstGeom>
+        </p:spPr>
+        <p:style>
+          <a:lnRef idx="2">
+            <a:schemeClr val="accent1">
+              <a:shade val="15000"/>
+            </a:schemeClr>
+          </a:lnRef>
+          <a:fillRef idx="1">
+            <a:schemeClr val="accent1"/>
+          </a:fillRef>
+          <a:effectRef idx="0">
+            <a:schemeClr val="accent1"/>
+          </a:effectRef>
+          <a:fontRef idx="minor">
+            <a:schemeClr val="lt1"/>
+          </a:fontRef>
+        </p:style>
+        <p:txBody>
+          <a:bodyPr rtlCol="0" anchor="ctr"/>
+          <a:lstStyle/>
+          <a:p>
+            <a:pPr algn="ctr"/>
+            <a:endParaRPr lang="en-US"/>
+          </a:p>
+        </p:txBody>
+      </p:sp>
+      <p:sp>
+        <p:nvSpPr>
+          <p:cNvPr id="17" name="TextBox 16">
+            <a:extLst>
+              <a:ext uri="{FF2B5EF4-FFF2-40B4-BE49-F238E27FC236}">
+                <a16:creationId xmlns:a16="http://schemas.microsoft.com/office/drawing/2014/main" id="{60FBE9E0-78AB-01C4-4EFD-FD36C0881FF1}"/>
+              </a:ext>
+            </a:extLst>
+          </p:cNvPr>
+          <p:cNvSpPr txBox="1"/>
+          <p:nvPr/>
+        </p:nvSpPr>
+        <p:spPr>
+          <a:xfrm>
+            <a:off x="2659463" y="1131618"/>
+            <a:ext cx="6873073" cy="1477328"/>
+          </a:xfrm>
+          <a:prstGeom prst="rect">
+            <a:avLst/>
+          </a:prstGeom>
+          <a:noFill/>
+        </p:spPr>
         <p:txBody>
           <a:bodyPr wrap="square" rtlCol="0">
             <a:spAutoFit/>
@@ -4420,28 +5021,468 @@
           <a:lstStyle/>
           <a:p>
             <a:r>
-              <a:rPr lang="en-US" sz="1800" dirty="0">
-                <a:effectLst/>
-                <a:latin typeface="Calibri" panose="020F0502020204030204" pitchFamily="34" charset="0"/>
-                <a:ea typeface="Calibri" panose="020F0502020204030204" pitchFamily="34" charset="0"/>
-                <a:cs typeface="Times New Roman" panose="02020603050405020304" pitchFamily="18" charset="0"/>
+              <a:rPr lang="en-US" dirty="0"/>
+              <a:t>Event Name: </a:t>
+            </a:r>
+            <a:r>
+              <a:rPr lang="en-US" u="sng" dirty="0"/>
+              <a:t>_______________________________________________</a:t>
+            </a:r>
+          </a:p>
+          <a:p>
+            <a:r>
+              <a:rPr lang="en-US" dirty="0"/>
+              <a:t>Event Location: </a:t>
+            </a:r>
+          </a:p>
+          <a:p>
+            <a:r>
+              <a:rPr lang="en-US" dirty="0"/>
+              <a:t>Date: </a:t>
+            </a:r>
+            <a:r>
+              <a:rPr lang="en-US" u="sng" dirty="0"/>
+              <a:t> ____________________________________________________ </a:t>
+            </a:r>
+          </a:p>
+          <a:p>
+            <a:r>
+              <a:rPr lang="en-US" dirty="0"/>
+              <a:t>Time: </a:t>
+            </a:r>
+            <a:r>
+              <a:rPr lang="en-US" u="sng" dirty="0"/>
+              <a:t> ____________________________________________________</a:t>
+            </a:r>
+          </a:p>
+          <a:p>
+            <a:r>
+              <a:rPr lang="en-US" dirty="0"/>
+              <a:t>Event Description: </a:t>
+            </a:r>
+          </a:p>
+        </p:txBody>
+      </p:sp>
+      <p:sp>
+        <p:nvSpPr>
+          <p:cNvPr id="18" name="Rectangle 17">
+            <a:extLst>
+              <a:ext uri="{FF2B5EF4-FFF2-40B4-BE49-F238E27FC236}">
+                <a16:creationId xmlns:a16="http://schemas.microsoft.com/office/drawing/2014/main" id="{C12A960D-6241-96E7-3536-4A995046642C}"/>
+              </a:ext>
+            </a:extLst>
+          </p:cNvPr>
+          <p:cNvSpPr/>
+          <p:nvPr/>
+        </p:nvSpPr>
+        <p:spPr>
+          <a:xfrm>
+            <a:off x="2558980" y="2813538"/>
+            <a:ext cx="7074040" cy="411982"/>
+          </a:xfrm>
+          <a:prstGeom prst="rect">
+            <a:avLst/>
+          </a:prstGeom>
+          <a:noFill/>
+          <a:ln>
+            <a:noFill/>
+          </a:ln>
+        </p:spPr>
+        <p:style>
+          <a:lnRef idx="2">
+            <a:schemeClr val="accent1">
+              <a:shade val="15000"/>
+            </a:schemeClr>
+          </a:lnRef>
+          <a:fillRef idx="1">
+            <a:schemeClr val="accent1"/>
+          </a:fillRef>
+          <a:effectRef idx="0">
+            <a:schemeClr val="accent1"/>
+          </a:effectRef>
+          <a:fontRef idx="minor">
+            <a:schemeClr val="lt1"/>
+          </a:fontRef>
+        </p:style>
+        <p:txBody>
+          <a:bodyPr rtlCol="0" anchor="ctr"/>
+          <a:lstStyle/>
+          <a:p>
+            <a:r>
+              <a:rPr lang="en-US" dirty="0">
+                <a:solidFill>
+                  <a:schemeClr val="tx1"/>
+                </a:solidFill>
               </a:rPr>
-              <a:t>Users API</a:t>
-            </a:r>
+              <a:t>			</a:t>
+            </a:r>
+          </a:p>
+        </p:txBody>
+      </p:sp>
+      <p:sp>
+        <p:nvSpPr>
+          <p:cNvPr id="23" name="Rectangle 22">
+            <a:extLst>
+              <a:ext uri="{FF2B5EF4-FFF2-40B4-BE49-F238E27FC236}">
+                <a16:creationId xmlns:a16="http://schemas.microsoft.com/office/drawing/2014/main" id="{36BB1C4E-DA1B-4A1D-01D1-6D5025F59130}"/>
+              </a:ext>
+            </a:extLst>
+          </p:cNvPr>
+          <p:cNvSpPr/>
+          <p:nvPr/>
+        </p:nvSpPr>
+        <p:spPr>
+          <a:xfrm>
+            <a:off x="2558980" y="3225517"/>
+            <a:ext cx="7074040" cy="2150347"/>
+          </a:xfrm>
+          <a:prstGeom prst="rect">
+            <a:avLst/>
+          </a:prstGeom>
+          <a:noFill/>
+        </p:spPr>
+        <p:style>
+          <a:lnRef idx="2">
+            <a:schemeClr val="accent1">
+              <a:shade val="15000"/>
+            </a:schemeClr>
+          </a:lnRef>
+          <a:fillRef idx="1">
+            <a:schemeClr val="accent1"/>
+          </a:fillRef>
+          <a:effectRef idx="0">
+            <a:schemeClr val="accent1"/>
+          </a:effectRef>
+          <a:fontRef idx="minor">
+            <a:schemeClr val="lt1"/>
+          </a:fontRef>
+        </p:style>
+        <p:txBody>
+          <a:bodyPr rtlCol="0" anchor="ctr"/>
+          <a:lstStyle/>
+          <a:p>
+            <a:pPr algn="ctr"/>
             <a:endParaRPr lang="en-US" dirty="0"/>
+          </a:p>
+        </p:txBody>
+      </p:sp>
+      <p:sp>
+        <p:nvSpPr>
+          <p:cNvPr id="28" name="Rectangle: Rounded Corners 27">
+            <a:extLst>
+              <a:ext uri="{FF2B5EF4-FFF2-40B4-BE49-F238E27FC236}">
+                <a16:creationId xmlns:a16="http://schemas.microsoft.com/office/drawing/2014/main" id="{E6782872-2765-53ED-D420-198B741ABA10}"/>
+              </a:ext>
+            </a:extLst>
+          </p:cNvPr>
+          <p:cNvSpPr/>
+          <p:nvPr/>
+        </p:nvSpPr>
+        <p:spPr>
+          <a:xfrm>
+            <a:off x="7409202" y="2869168"/>
+            <a:ext cx="1836011" cy="301527"/>
+          </a:xfrm>
+          <a:prstGeom prst="roundRect">
+            <a:avLst/>
+          </a:prstGeom>
+        </p:spPr>
+        <p:style>
+          <a:lnRef idx="2">
+            <a:schemeClr val="accent1">
+              <a:shade val="15000"/>
+            </a:schemeClr>
+          </a:lnRef>
+          <a:fillRef idx="1">
+            <a:schemeClr val="accent1"/>
+          </a:fillRef>
+          <a:effectRef idx="0">
+            <a:schemeClr val="accent1"/>
+          </a:effectRef>
+          <a:fontRef idx="minor">
+            <a:schemeClr val="lt1"/>
+          </a:fontRef>
+        </p:style>
+        <p:txBody>
+          <a:bodyPr rtlCol="0" anchor="ctr"/>
+          <a:lstStyle/>
+          <a:p>
+            <a:pPr algn="ctr"/>
+            <a:r>
+              <a:rPr lang="en-US" dirty="0"/>
+              <a:t>Create Event</a:t>
+            </a:r>
+          </a:p>
+        </p:txBody>
+      </p:sp>
+      <p:sp>
+        <p:nvSpPr>
+          <p:cNvPr id="2" name="Rectangle: Rounded Corners 1">
+            <a:extLst>
+              <a:ext uri="{FF2B5EF4-FFF2-40B4-BE49-F238E27FC236}">
+                <a16:creationId xmlns:a16="http://schemas.microsoft.com/office/drawing/2014/main" id="{A218763C-8561-7967-EDA7-C0C3213CA3F1}"/>
+              </a:ext>
+            </a:extLst>
+          </p:cNvPr>
+          <p:cNvSpPr/>
+          <p:nvPr/>
+        </p:nvSpPr>
+        <p:spPr>
+          <a:xfrm>
+            <a:off x="10009415" y="439613"/>
+            <a:ext cx="1797398" cy="462854"/>
+          </a:xfrm>
+          <a:prstGeom prst="roundRect">
+            <a:avLst/>
+          </a:prstGeom>
+        </p:spPr>
+        <p:style>
+          <a:lnRef idx="2">
+            <a:schemeClr val="accent1">
+              <a:shade val="15000"/>
+            </a:schemeClr>
+          </a:lnRef>
+          <a:fillRef idx="1">
+            <a:schemeClr val="accent1"/>
+          </a:fillRef>
+          <a:effectRef idx="0">
+            <a:schemeClr val="accent1"/>
+          </a:effectRef>
+          <a:fontRef idx="minor">
+            <a:schemeClr val="lt1"/>
+          </a:fontRef>
+        </p:style>
+        <p:txBody>
+          <a:bodyPr rtlCol="0" anchor="ctr"/>
+          <a:lstStyle/>
+          <a:p>
+            <a:pPr algn="ctr"/>
+            <a:r>
+              <a:rPr lang="en-US" dirty="0"/>
+              <a:t>Account</a:t>
+            </a:r>
+          </a:p>
+        </p:txBody>
+      </p:sp>
+      <p:sp>
+        <p:nvSpPr>
+          <p:cNvPr id="4" name="Rectangle 3">
+            <a:extLst>
+              <a:ext uri="{FF2B5EF4-FFF2-40B4-BE49-F238E27FC236}">
+                <a16:creationId xmlns:a16="http://schemas.microsoft.com/office/drawing/2014/main" id="{DDBAE8F0-E0AC-7756-BA99-86EEF844DE83}"/>
+              </a:ext>
+            </a:extLst>
+          </p:cNvPr>
+          <p:cNvSpPr/>
+          <p:nvPr/>
+        </p:nvSpPr>
+        <p:spPr>
+          <a:xfrm>
+            <a:off x="4252823" y="1482133"/>
+            <a:ext cx="5175849" cy="260403"/>
+          </a:xfrm>
+          <a:prstGeom prst="rect">
+            <a:avLst/>
+          </a:prstGeom>
+          <a:ln>
+            <a:solidFill>
+              <a:schemeClr val="tx1"/>
+            </a:solidFill>
+          </a:ln>
+        </p:spPr>
+        <p:style>
+          <a:lnRef idx="2">
+            <a:schemeClr val="accent6"/>
+          </a:lnRef>
+          <a:fillRef idx="1">
+            <a:schemeClr val="lt1"/>
+          </a:fillRef>
+          <a:effectRef idx="0">
+            <a:schemeClr val="accent6"/>
+          </a:effectRef>
+          <a:fontRef idx="minor">
+            <a:schemeClr val="dk1"/>
+          </a:fontRef>
+        </p:style>
+        <p:txBody>
+          <a:bodyPr rtlCol="0" anchor="ctr"/>
+          <a:lstStyle/>
+          <a:p>
+            <a:pPr algn="ctr"/>
+            <a:r>
+              <a:rPr lang="en-US" dirty="0"/>
+              <a:t>Enter event location</a:t>
+            </a:r>
+          </a:p>
+        </p:txBody>
+      </p:sp>
+      <p:sp>
+        <p:nvSpPr>
+          <p:cNvPr id="5" name="TextBox 4">
+            <a:extLst>
+              <a:ext uri="{FF2B5EF4-FFF2-40B4-BE49-F238E27FC236}">
+                <a16:creationId xmlns:a16="http://schemas.microsoft.com/office/drawing/2014/main" id="{D24076CC-6B2D-7402-FF7E-B5C428E8DFC8}"/>
+              </a:ext>
+            </a:extLst>
+          </p:cNvPr>
+          <p:cNvSpPr txBox="1"/>
+          <p:nvPr/>
+        </p:nvSpPr>
+        <p:spPr>
+          <a:xfrm>
+            <a:off x="2645086" y="3382447"/>
+            <a:ext cx="6873073" cy="2862322"/>
+          </a:xfrm>
+          <a:prstGeom prst="rect">
+            <a:avLst/>
+          </a:prstGeom>
+          <a:noFill/>
+        </p:spPr>
+        <p:txBody>
+          <a:bodyPr wrap="square" rtlCol="0">
+            <a:spAutoFit/>
+          </a:bodyPr>
+          <a:lstStyle/>
+          <a:p>
+            <a:r>
+              <a:rPr lang="en-US" dirty="0"/>
+              <a:t>Event Name: </a:t>
+            </a:r>
+            <a:r>
+              <a:rPr lang="en-US" u="sng" dirty="0"/>
+              <a:t>Party of the Year__________________________________</a:t>
+            </a:r>
+          </a:p>
+          <a:p>
+            <a:r>
+              <a:rPr lang="en-US" dirty="0"/>
+              <a:t>Event Location: 129 Magnolia Ave, Jersey City, NJ 07306</a:t>
+            </a:r>
+          </a:p>
+          <a:p>
+            <a:r>
+              <a:rPr lang="en-US" dirty="0"/>
+              <a:t>Date: </a:t>
+            </a:r>
+            <a:r>
+              <a:rPr lang="en-US" u="sng" dirty="0"/>
+              <a:t> 11-03-2023___________________________________________ </a:t>
+            </a:r>
+          </a:p>
+          <a:p>
+            <a:r>
+              <a:rPr lang="en-US" dirty="0"/>
+              <a:t>Time: </a:t>
+            </a:r>
+            <a:r>
+              <a:rPr lang="en-US" u="sng" dirty="0"/>
+              <a:t> 10:30PM_____________________________________________</a:t>
+            </a:r>
+          </a:p>
+          <a:p>
+            <a:r>
+              <a:rPr lang="en-US" dirty="0"/>
+              <a:t>Event Description: Come join the party of the century in my moms basement to celebrate the 3</a:t>
+            </a:r>
+            <a:r>
+              <a:rPr lang="en-US" baseline="30000" dirty="0"/>
+              <a:t>rd</a:t>
+            </a:r>
+            <a:r>
+              <a:rPr lang="en-US" dirty="0"/>
+              <a:t> of November.</a:t>
+            </a:r>
+          </a:p>
+          <a:p>
+            <a:endParaRPr lang="en-US" dirty="0"/>
+          </a:p>
+          <a:p>
+            <a:r>
+              <a:rPr lang="en-US" dirty="0"/>
+              <a:t>Attending   x    	   </a:t>
+            </a:r>
+          </a:p>
+          <a:p>
+            <a:r>
+              <a:rPr lang="en-US" dirty="0"/>
+              <a:t>Participants:</a:t>
+            </a:r>
+          </a:p>
+          <a:p>
+            <a:r>
+              <a:rPr lang="en-US" dirty="0"/>
+              <a:t>Steve Vazquez</a:t>
+            </a:r>
+          </a:p>
+        </p:txBody>
+      </p:sp>
+      <p:sp>
+        <p:nvSpPr>
+          <p:cNvPr id="10" name="Rectangle 9">
+            <a:extLst>
+              <a:ext uri="{FF2B5EF4-FFF2-40B4-BE49-F238E27FC236}">
+                <a16:creationId xmlns:a16="http://schemas.microsoft.com/office/drawing/2014/main" id="{22CC9112-DBF9-761F-416C-01E76862317A}"/>
+              </a:ext>
+            </a:extLst>
+          </p:cNvPr>
+          <p:cNvSpPr/>
+          <p:nvPr/>
+        </p:nvSpPr>
+        <p:spPr>
+          <a:xfrm>
+            <a:off x="3753681" y="5413024"/>
+            <a:ext cx="163902" cy="172528"/>
+          </a:xfrm>
+          <a:prstGeom prst="rect">
+            <a:avLst/>
+          </a:prstGeom>
+          <a:noFill/>
+          <a:ln>
+            <a:solidFill>
+              <a:schemeClr val="tx1"/>
+            </a:solidFill>
+          </a:ln>
+        </p:spPr>
+        <p:style>
+          <a:lnRef idx="2">
+            <a:schemeClr val="accent1">
+              <a:shade val="15000"/>
+            </a:schemeClr>
+          </a:lnRef>
+          <a:fillRef idx="1">
+            <a:schemeClr val="accent1"/>
+          </a:fillRef>
+          <a:effectRef idx="0">
+            <a:schemeClr val="accent1"/>
+          </a:effectRef>
+          <a:fontRef idx="minor">
+            <a:schemeClr val="lt1"/>
+          </a:fontRef>
+        </p:style>
+        <p:txBody>
+          <a:bodyPr rtlCol="0" anchor="ctr"/>
+          <a:lstStyle/>
+          <a:p>
+            <a:pPr algn="ctr"/>
+            <a:endParaRPr lang="en-US"/>
           </a:p>
         </p:txBody>
       </p:sp>
     </p:spTree>
     <p:extLst>
       <p:ext uri="{BB962C8B-B14F-4D97-AF65-F5344CB8AC3E}">
-        <p14:creationId xmlns:p14="http://schemas.microsoft.com/office/powerpoint/2010/main" val="893954284"/>
+        <p14:creationId xmlns:p14="http://schemas.microsoft.com/office/powerpoint/2010/main" val="4061690776"/>
       </p:ext>
     </p:extLst>
   </p:cSld>
   <p:clrMapOvr>
     <a:masterClrMapping/>
   </p:clrMapOvr>
+  <p:extLst>
+    <p:ext uri="{6950BFC3-D8DA-4A85-94F7-54DA5524770B}">
+      <p188:commentRel xmlns:p188="http://schemas.microsoft.com/office/powerpoint/2018/8/main" r:id="rId2"/>
+    </p:ext>
+  </p:extLst>
 </p:sld>
 </file>
 
@@ -4529,21 +5570,8 @@
                 <a:ea typeface="Calibri" panose="020F0502020204030204" pitchFamily="34" charset="0"/>
                 <a:cs typeface="Times New Roman" panose="02020603050405020304" pitchFamily="18" charset="0"/>
               </a:rPr>
-              <a:t>- GET </a:t>
-            </a:r>
-            <a:r>
-              <a:rPr lang="en-US" kern="100" dirty="0" err="1">
-                <a:latin typeface="Calibri" panose="020F0502020204030204" pitchFamily="34" charset="0"/>
-                <a:ea typeface="Calibri" panose="020F0502020204030204" pitchFamily="34" charset="0"/>
-                <a:cs typeface="Times New Roman" panose="02020603050405020304" pitchFamily="18" charset="0"/>
-              </a:rPr>
-              <a:t>allPosts</a:t>
-            </a:r>
-            <a:endParaRPr lang="en-US" kern="100" dirty="0">
-              <a:latin typeface="Calibri" panose="020F0502020204030204" pitchFamily="34" charset="0"/>
-              <a:ea typeface="Calibri" panose="020F0502020204030204" pitchFamily="34" charset="0"/>
-              <a:cs typeface="Times New Roman" panose="02020603050405020304" pitchFamily="18" charset="0"/>
-            </a:endParaRPr>
+              <a:t>- GET all users</a:t>
+            </a:r>
           </a:p>
           <a:p>
             <a:pPr marL="0" marR="0">
@@ -4573,7 +5601,7 @@
                 <a:ea typeface="Calibri" panose="020F0502020204030204" pitchFamily="34" charset="0"/>
                 <a:cs typeface="Times New Roman" panose="02020603050405020304" pitchFamily="18" charset="0"/>
               </a:rPr>
-              <a:t>postById</a:t>
+              <a:t>userById</a:t>
             </a:r>
             <a:endParaRPr lang="en-US" sz="1800" kern="100" dirty="0">
               <a:effectLst/>
@@ -4608,7 +5636,7 @@
                 <a:ea typeface="Calibri" panose="020F0502020204030204" pitchFamily="34" charset="0"/>
                 <a:cs typeface="Times New Roman" panose="02020603050405020304" pitchFamily="18" charset="0"/>
               </a:rPr>
-              <a:t>createPost</a:t>
+              <a:t>createUser</a:t>
             </a:r>
             <a:endParaRPr lang="en-US" kern="100" dirty="0">
               <a:latin typeface="Calibri" panose="020F0502020204030204" pitchFamily="34" charset="0"/>
@@ -4634,7 +5662,7 @@
                 <a:ea typeface="Calibri" panose="020F0502020204030204" pitchFamily="34" charset="0"/>
                 <a:cs typeface="Times New Roman" panose="02020603050405020304" pitchFamily="18" charset="0"/>
               </a:rPr>
-              <a:t>- DELETE </a:t>
+              <a:t>- REMOVE </a:t>
             </a:r>
             <a:r>
               <a:rPr lang="en-US" kern="100" dirty="0" err="1">
@@ -4642,7 +5670,7 @@
                 <a:ea typeface="Calibri" panose="020F0502020204030204" pitchFamily="34" charset="0"/>
                 <a:cs typeface="Times New Roman" panose="02020603050405020304" pitchFamily="18" charset="0"/>
               </a:rPr>
-              <a:t>removePost</a:t>
+              <a:t>removeUser</a:t>
             </a:r>
             <a:endParaRPr lang="en-US" kern="100" dirty="0">
               <a:latin typeface="Calibri" panose="020F0502020204030204" pitchFamily="34" charset="0"/>
@@ -4687,7 +5715,7 @@
                 <a:ea typeface="Calibri" panose="020F0502020204030204" pitchFamily="34" charset="0"/>
                 <a:cs typeface="Times New Roman" panose="02020603050405020304" pitchFamily="18" charset="0"/>
               </a:rPr>
-              <a:t>Posts API</a:t>
+              <a:t>Users API</a:t>
             </a:r>
             <a:endParaRPr lang="en-US" dirty="0"/>
           </a:p>
@@ -4696,7 +5724,7 @@
     </p:spTree>
     <p:extLst>
       <p:ext uri="{BB962C8B-B14F-4D97-AF65-F5344CB8AC3E}">
-        <p14:creationId xmlns:p14="http://schemas.microsoft.com/office/powerpoint/2010/main" val="2446073456"/>
+        <p14:creationId xmlns:p14="http://schemas.microsoft.com/office/powerpoint/2010/main" val="893954284"/>
       </p:ext>
     </p:extLst>
   </p:cSld>
@@ -4798,6 +5826,267 @@
                 <a:ea typeface="Calibri" panose="020F0502020204030204" pitchFamily="34" charset="0"/>
                 <a:cs typeface="Times New Roman" panose="02020603050405020304" pitchFamily="18" charset="0"/>
               </a:rPr>
+              <a:t>allPosts</a:t>
+            </a:r>
+            <a:endParaRPr lang="en-US" kern="100" dirty="0">
+              <a:latin typeface="Calibri" panose="020F0502020204030204" pitchFamily="34" charset="0"/>
+              <a:ea typeface="Calibri" panose="020F0502020204030204" pitchFamily="34" charset="0"/>
+              <a:cs typeface="Times New Roman" panose="02020603050405020304" pitchFamily="18" charset="0"/>
+            </a:endParaRPr>
+          </a:p>
+          <a:p>
+            <a:pPr marL="0" marR="0">
+              <a:lnSpc>
+                <a:spcPct val="107000"/>
+              </a:lnSpc>
+              <a:spcBef>
+                <a:spcPts val="0"/>
+              </a:spcBef>
+              <a:spcAft>
+                <a:spcPts val="800"/>
+              </a:spcAft>
+            </a:pPr>
+            <a:r>
+              <a:rPr lang="en-US" sz="1800" kern="100" dirty="0">
+                <a:effectLst/>
+                <a:latin typeface="Calibri" panose="020F0502020204030204" pitchFamily="34" charset="0"/>
+                <a:ea typeface="Calibri" panose="020F0502020204030204" pitchFamily="34" charset="0"/>
+                <a:cs typeface="Times New Roman" panose="02020603050405020304" pitchFamily="18" charset="0"/>
+              </a:rPr>
+              <a:t>- GET </a:t>
+            </a:r>
+            <a:r>
+              <a:rPr lang="en-US" sz="1800" kern="100" dirty="0" err="1">
+                <a:effectLst/>
+                <a:latin typeface="Calibri" panose="020F0502020204030204" pitchFamily="34" charset="0"/>
+                <a:ea typeface="Calibri" panose="020F0502020204030204" pitchFamily="34" charset="0"/>
+                <a:cs typeface="Times New Roman" panose="02020603050405020304" pitchFamily="18" charset="0"/>
+              </a:rPr>
+              <a:t>postById</a:t>
+            </a:r>
+            <a:endParaRPr lang="en-US" sz="1800" kern="100" dirty="0">
+              <a:effectLst/>
+              <a:latin typeface="Calibri" panose="020F0502020204030204" pitchFamily="34" charset="0"/>
+              <a:ea typeface="Calibri" panose="020F0502020204030204" pitchFamily="34" charset="0"/>
+              <a:cs typeface="Times New Roman" panose="02020603050405020304" pitchFamily="18" charset="0"/>
+            </a:endParaRPr>
+          </a:p>
+          <a:p>
+            <a:pPr marL="0" marR="0">
+              <a:lnSpc>
+                <a:spcPct val="107000"/>
+              </a:lnSpc>
+              <a:spcBef>
+                <a:spcPts val="0"/>
+              </a:spcBef>
+              <a:spcAft>
+                <a:spcPts val="800"/>
+              </a:spcAft>
+            </a:pPr>
+            <a:r>
+              <a:rPr lang="en-US" kern="100" dirty="0">
+                <a:latin typeface="Calibri" panose="020F0502020204030204" pitchFamily="34" charset="0"/>
+                <a:ea typeface="Calibri" panose="020F0502020204030204" pitchFamily="34" charset="0"/>
+                <a:cs typeface="Times New Roman" panose="02020603050405020304" pitchFamily="18" charset="0"/>
+              </a:rPr>
+              <a:t>- POST </a:t>
+            </a:r>
+            <a:r>
+              <a:rPr lang="en-US" kern="100" dirty="0" err="1">
+                <a:latin typeface="Calibri" panose="020F0502020204030204" pitchFamily="34" charset="0"/>
+                <a:ea typeface="Calibri" panose="020F0502020204030204" pitchFamily="34" charset="0"/>
+                <a:cs typeface="Times New Roman" panose="02020603050405020304" pitchFamily="18" charset="0"/>
+              </a:rPr>
+              <a:t>createPost</a:t>
+            </a:r>
+            <a:endParaRPr lang="en-US" kern="100" dirty="0">
+              <a:latin typeface="Calibri" panose="020F0502020204030204" pitchFamily="34" charset="0"/>
+              <a:ea typeface="Calibri" panose="020F0502020204030204" pitchFamily="34" charset="0"/>
+              <a:cs typeface="Times New Roman" panose="02020603050405020304" pitchFamily="18" charset="0"/>
+            </a:endParaRPr>
+          </a:p>
+          <a:p>
+            <a:pPr marL="0" marR="0">
+              <a:lnSpc>
+                <a:spcPct val="107000"/>
+              </a:lnSpc>
+              <a:spcBef>
+                <a:spcPts val="0"/>
+              </a:spcBef>
+              <a:spcAft>
+                <a:spcPts val="800"/>
+              </a:spcAft>
+            </a:pPr>
+            <a:r>
+              <a:rPr lang="en-US" kern="100" dirty="0">
+                <a:latin typeface="Calibri" panose="020F0502020204030204" pitchFamily="34" charset="0"/>
+                <a:ea typeface="Calibri" panose="020F0502020204030204" pitchFamily="34" charset="0"/>
+                <a:cs typeface="Times New Roman" panose="02020603050405020304" pitchFamily="18" charset="0"/>
+              </a:rPr>
+              <a:t>- DELETE </a:t>
+            </a:r>
+            <a:r>
+              <a:rPr lang="en-US" kern="100" dirty="0" err="1">
+                <a:latin typeface="Calibri" panose="020F0502020204030204" pitchFamily="34" charset="0"/>
+                <a:ea typeface="Calibri" panose="020F0502020204030204" pitchFamily="34" charset="0"/>
+                <a:cs typeface="Times New Roman" panose="02020603050405020304" pitchFamily="18" charset="0"/>
+              </a:rPr>
+              <a:t>removePost</a:t>
+            </a:r>
+            <a:endParaRPr lang="en-US" kern="100" dirty="0">
+              <a:latin typeface="Calibri" panose="020F0502020204030204" pitchFamily="34" charset="0"/>
+              <a:ea typeface="Calibri" panose="020F0502020204030204" pitchFamily="34" charset="0"/>
+              <a:cs typeface="Times New Roman" panose="02020603050405020304" pitchFamily="18" charset="0"/>
+            </a:endParaRPr>
+          </a:p>
+        </p:txBody>
+      </p:sp>
+      <p:sp>
+        <p:nvSpPr>
+          <p:cNvPr id="2" name="TextBox 1">
+            <a:extLst>
+              <a:ext uri="{FF2B5EF4-FFF2-40B4-BE49-F238E27FC236}">
+                <a16:creationId xmlns:a16="http://schemas.microsoft.com/office/drawing/2014/main" id="{CB46AF81-95B8-D80D-804A-CADBD595992E}"/>
+              </a:ext>
+            </a:extLst>
+          </p:cNvPr>
+          <p:cNvSpPr txBox="1"/>
+          <p:nvPr/>
+        </p:nvSpPr>
+        <p:spPr>
+          <a:xfrm>
+            <a:off x="275847" y="161432"/>
+            <a:ext cx="11410545" cy="369332"/>
+          </a:xfrm>
+          <a:prstGeom prst="rect">
+            <a:avLst/>
+          </a:prstGeom>
+          <a:noFill/>
+        </p:spPr>
+        <p:txBody>
+          <a:bodyPr wrap="square" rtlCol="0">
+            <a:spAutoFit/>
+          </a:bodyPr>
+          <a:lstStyle/>
+          <a:p>
+            <a:r>
+              <a:rPr lang="en-US" sz="1800" dirty="0">
+                <a:effectLst/>
+                <a:latin typeface="Calibri" panose="020F0502020204030204" pitchFamily="34" charset="0"/>
+                <a:ea typeface="Calibri" panose="020F0502020204030204" pitchFamily="34" charset="0"/>
+                <a:cs typeface="Times New Roman" panose="02020603050405020304" pitchFamily="18" charset="0"/>
+              </a:rPr>
+              <a:t>Posts API</a:t>
+            </a:r>
+            <a:endParaRPr lang="en-US" dirty="0"/>
+          </a:p>
+        </p:txBody>
+      </p:sp>
+    </p:spTree>
+    <p:extLst>
+      <p:ext uri="{BB962C8B-B14F-4D97-AF65-F5344CB8AC3E}">
+        <p14:creationId xmlns:p14="http://schemas.microsoft.com/office/powerpoint/2010/main" val="2446073456"/>
+      </p:ext>
+    </p:extLst>
+  </p:cSld>
+  <p:clrMapOvr>
+    <a:masterClrMapping/>
+  </p:clrMapOvr>
+</p:sld>
+</file>
+
+<file path=ppt/slides/slide15.xml><?xml version="1.0" encoding="utf-8"?>
+<p:sld xmlns:a="http://schemas.openxmlformats.org/drawingml/2006/main" xmlns:r="http://schemas.openxmlformats.org/officeDocument/2006/relationships" xmlns:p="http://schemas.openxmlformats.org/presentationml/2006/main">
+  <p:cSld>
+    <p:spTree>
+      <p:nvGrpSpPr>
+        <p:cNvPr id="1" name=""/>
+        <p:cNvGrpSpPr/>
+        <p:nvPr/>
+      </p:nvGrpSpPr>
+      <p:grpSpPr>
+        <a:xfrm>
+          <a:off x="0" y="0"/>
+          <a:ext cx="0" cy="0"/>
+          <a:chOff x="0" y="0"/>
+          <a:chExt cx="0" cy="0"/>
+        </a:xfrm>
+      </p:grpSpPr>
+      <p:sp>
+        <p:nvSpPr>
+          <p:cNvPr id="4" name="TextBox 3">
+            <a:extLst>
+              <a:ext uri="{FF2B5EF4-FFF2-40B4-BE49-F238E27FC236}">
+                <a16:creationId xmlns:a16="http://schemas.microsoft.com/office/drawing/2014/main" id="{93042950-E66C-9CF4-A917-488019161FCA}"/>
+              </a:ext>
+            </a:extLst>
+          </p:cNvPr>
+          <p:cNvSpPr txBox="1"/>
+          <p:nvPr/>
+        </p:nvSpPr>
+        <p:spPr>
+          <a:xfrm>
+            <a:off x="275846" y="765589"/>
+            <a:ext cx="11410545" cy="1971374"/>
+          </a:xfrm>
+          <a:prstGeom prst="rect">
+            <a:avLst/>
+          </a:prstGeom>
+          <a:noFill/>
+        </p:spPr>
+        <p:txBody>
+          <a:bodyPr wrap="square" rtlCol="0">
+            <a:spAutoFit/>
+          </a:bodyPr>
+          <a:lstStyle/>
+          <a:p>
+            <a:pPr marL="0" marR="0">
+              <a:lnSpc>
+                <a:spcPct val="107000"/>
+              </a:lnSpc>
+              <a:spcBef>
+                <a:spcPts val="0"/>
+              </a:spcBef>
+              <a:spcAft>
+                <a:spcPts val="800"/>
+              </a:spcAft>
+            </a:pPr>
+            <a:r>
+              <a:rPr lang="en-US" sz="1800" kern="100" dirty="0">
+                <a:effectLst/>
+                <a:latin typeface="Calibri" panose="020F0502020204030204" pitchFamily="34" charset="0"/>
+                <a:ea typeface="Calibri" panose="020F0502020204030204" pitchFamily="34" charset="0"/>
+                <a:cs typeface="Times New Roman" panose="02020603050405020304" pitchFamily="18" charset="0"/>
+              </a:rPr>
+              <a:t>Needs following endpoints:</a:t>
+            </a:r>
+          </a:p>
+          <a:p>
+            <a:pPr marL="0" marR="0">
+              <a:lnSpc>
+                <a:spcPct val="107000"/>
+              </a:lnSpc>
+              <a:spcBef>
+                <a:spcPts val="0"/>
+              </a:spcBef>
+              <a:spcAft>
+                <a:spcPts val="800"/>
+              </a:spcAft>
+            </a:pPr>
+            <a:r>
+              <a:rPr lang="en-US" kern="100" dirty="0">
+                <a:latin typeface="Calibri" panose="020F0502020204030204" pitchFamily="34" charset="0"/>
+                <a:ea typeface="Calibri" panose="020F0502020204030204" pitchFamily="34" charset="0"/>
+                <a:cs typeface="Times New Roman" panose="02020603050405020304" pitchFamily="18" charset="0"/>
+              </a:rPr>
+              <a:t>- GET </a:t>
+            </a:r>
+            <a:r>
+              <a:rPr lang="en-US" kern="100" dirty="0" err="1">
+                <a:latin typeface="Calibri" panose="020F0502020204030204" pitchFamily="34" charset="0"/>
+                <a:ea typeface="Calibri" panose="020F0502020204030204" pitchFamily="34" charset="0"/>
+                <a:cs typeface="Times New Roman" panose="02020603050405020304" pitchFamily="18" charset="0"/>
+              </a:rPr>
               <a:t>allEvents</a:t>
             </a:r>
             <a:endParaRPr lang="en-US" kern="100" dirty="0">
@@ -4972,7 +6261,7 @@
 </p:sld>
 </file>
 
-<file path=ppt/slides/slide15.xml><?xml version="1.0" encoding="utf-8"?>
+<file path=ppt/slides/slide16.xml><?xml version="1.0" encoding="utf-8"?>
 <p:sld xmlns:a="http://schemas.openxmlformats.org/drawingml/2006/main" xmlns:r="http://schemas.openxmlformats.org/officeDocument/2006/relationships" xmlns:p="http://schemas.openxmlformats.org/presentationml/2006/main">
   <p:cSld>
     <p:spTree>
@@ -5239,8 +6528,8 @@
         </p:nvSpPr>
         <p:spPr>
           <a:xfrm>
-            <a:off x="242835" y="3233057"/>
-            <a:ext cx="11706330" cy="3418952"/>
+            <a:off x="242835" y="1078756"/>
+            <a:ext cx="11706330" cy="646331"/>
           </a:xfrm>
           <a:prstGeom prst="rect">
             <a:avLst/>
@@ -5286,8 +6575,8 @@
         </p:nvSpPr>
         <p:spPr>
           <a:xfrm>
-            <a:off x="10009415" y="439613"/>
-            <a:ext cx="1797398" cy="462854"/>
+            <a:off x="3543079" y="3523220"/>
+            <a:ext cx="5274128" cy="923331"/>
           </a:xfrm>
           <a:prstGeom prst="roundRect">
             <a:avLst/>
@@ -5316,7 +6605,7 @@
             <a:pPr algn="ctr"/>
             <a:r>
               <a:rPr lang="en-US" dirty="0"/>
-              <a:t>Login/Sign Up</a:t>
+              <a:t>Login</a:t>
             </a:r>
           </a:p>
         </p:txBody>
@@ -5364,14 +6653,11 @@
           <a:lstStyle/>
           <a:p>
             <a:pPr algn="ctr"/>
-            <a:r>
-              <a:rPr lang="en-US" dirty="0">
-                <a:solidFill>
-                  <a:schemeClr val="tx1"/>
-                </a:solidFill>
-              </a:rPr>
-              <a:t>Latest Posts	Favorite Posts	Events</a:t>
-            </a:r>
+            <a:endParaRPr lang="en-US" dirty="0">
+              <a:solidFill>
+                <a:schemeClr val="tx1"/>
+              </a:solidFill>
+            </a:endParaRPr>
           </a:p>
         </p:txBody>
       </p:sp>
@@ -5436,7 +6722,7 @@
         </p:nvSpPr>
         <p:spPr>
           <a:xfrm>
-            <a:off x="242835" y="3233057"/>
+            <a:off x="242835" y="1141113"/>
             <a:ext cx="11706330" cy="646331"/>
           </a:xfrm>
           <a:prstGeom prst="rect">
@@ -5452,58 +6738,90 @@
           <a:p>
             <a:r>
               <a:rPr lang="en-US" dirty="0"/>
-              <a:t>Welcome to our site! We invite you immerse yourself in the thoughtful pieces curated by artists of all kinds. If you’d like to share your thoughts on pieces you like, share your own pieces, or create open-mic events, please register. </a:t>
-            </a:r>
-          </a:p>
-        </p:txBody>
-      </p:sp>
-      <p:sp>
-        <p:nvSpPr>
-          <p:cNvPr id="2" name="Rectangle 1">
-            <a:extLst>
-              <a:ext uri="{FF2B5EF4-FFF2-40B4-BE49-F238E27FC236}">
-                <a16:creationId xmlns:a16="http://schemas.microsoft.com/office/drawing/2014/main" id="{B11F849D-9552-DFED-72F9-34FE3B79CAA2}"/>
-              </a:ext>
-            </a:extLst>
-          </p:cNvPr>
-          <p:cNvSpPr/>
+              <a:t>Welcome to our site! We invite you immerse yourself in the thoughtful pieces curated by artists of all kinds. If you’d like to view and share your thoughts on pieces you like, share your own pieces, or create open-mic events, please register or login. </a:t>
+            </a:r>
+          </a:p>
+        </p:txBody>
+      </p:sp>
+      <p:sp>
+        <p:nvSpPr>
+          <p:cNvPr id="5" name="TextBox 4">
+            <a:extLst>
+              <a:ext uri="{FF2B5EF4-FFF2-40B4-BE49-F238E27FC236}">
+                <a16:creationId xmlns:a16="http://schemas.microsoft.com/office/drawing/2014/main" id="{474717AD-CE4F-D03C-3A7B-1D8EC78F21DD}"/>
+              </a:ext>
+            </a:extLst>
+          </p:cNvPr>
+          <p:cNvSpPr txBox="1"/>
           <p:nvPr/>
         </p:nvSpPr>
         <p:spPr>
           <a:xfrm>
-            <a:off x="385187" y="1270484"/>
-            <a:ext cx="11421625" cy="1789867"/>
+            <a:off x="783550" y="2241095"/>
+            <a:ext cx="10793186" cy="923330"/>
           </a:xfrm>
           <a:prstGeom prst="rect">
             <a:avLst/>
           </a:prstGeom>
-          <a:solidFill>
-            <a:schemeClr val="accent6">
-              <a:lumMod val="40000"/>
-              <a:lumOff val="60000"/>
-            </a:schemeClr>
-          </a:solidFill>
-          <a:ln>
-            <a:solidFill>
-              <a:schemeClr val="accent6">
-                <a:lumMod val="60000"/>
-                <a:lumOff val="40000"/>
-              </a:schemeClr>
-            </a:solidFill>
-          </a:ln>
+          <a:noFill/>
+        </p:spPr>
+        <p:txBody>
+          <a:bodyPr wrap="square" rtlCol="0">
+            <a:spAutoFit/>
+          </a:bodyPr>
+          <a:lstStyle/>
+          <a:p>
+            <a:r>
+              <a:rPr lang="en-US" dirty="0"/>
+              <a:t>Username :  __________________________________________________________________________________</a:t>
+            </a:r>
+          </a:p>
+          <a:p>
+            <a:endParaRPr lang="en-US" dirty="0"/>
+          </a:p>
+          <a:p>
+            <a:r>
+              <a:rPr lang="en-US" dirty="0"/>
+              <a:t>Password   :  __________________________________________________________________________________</a:t>
+            </a:r>
+          </a:p>
+        </p:txBody>
+      </p:sp>
+      <p:sp>
+        <p:nvSpPr>
+          <p:cNvPr id="6" name="Rectangle: Rounded Corners 5">
+            <a:extLst>
+              <a:ext uri="{FF2B5EF4-FFF2-40B4-BE49-F238E27FC236}">
+                <a16:creationId xmlns:a16="http://schemas.microsoft.com/office/drawing/2014/main" id="{07219D55-E805-DBD6-0895-0F877BBCCFCB}"/>
+              </a:ext>
+            </a:extLst>
+          </p:cNvPr>
+          <p:cNvSpPr/>
+          <p:nvPr/>
+        </p:nvSpPr>
+        <p:spPr>
+          <a:xfrm>
+            <a:off x="3543079" y="4699928"/>
+            <a:ext cx="5274128" cy="923331"/>
+          </a:xfrm>
+          <a:prstGeom prst="roundRect">
+            <a:avLst/>
+          </a:prstGeom>
         </p:spPr>
         <p:style>
           <a:lnRef idx="2">
-            <a:schemeClr val="accent6"/>
+            <a:schemeClr val="accent1">
+              <a:shade val="15000"/>
+            </a:schemeClr>
           </a:lnRef>
           <a:fillRef idx="1">
-            <a:schemeClr val="lt1"/>
+            <a:schemeClr val="accent1"/>
           </a:fillRef>
           <a:effectRef idx="0">
-            <a:schemeClr val="accent6"/>
+            <a:schemeClr val="accent1"/>
           </a:effectRef>
           <a:fontRef idx="minor">
-            <a:schemeClr val="dk1"/>
+            <a:schemeClr val="lt1"/>
           </a:fontRef>
         </p:style>
         <p:txBody>
@@ -5513,7 +6831,7 @@
             <a:pPr algn="ctr"/>
             <a:r>
               <a:rPr lang="en-US" dirty="0"/>
-              <a:t>A Banner Image</a:t>
+              <a:t>Register</a:t>
             </a:r>
           </a:p>
         </p:txBody>
@@ -6036,7 +7354,7 @@
         <p:spPr>
           <a:xfrm>
             <a:off x="275846" y="765589"/>
-            <a:ext cx="11410545" cy="3863558"/>
+            <a:ext cx="11410545" cy="4262514"/>
           </a:xfrm>
           <a:prstGeom prst="rect">
             <a:avLst/>
@@ -6122,12 +7440,33 @@
               </a:rPr>
               <a:t>userId</a:t>
             </a:r>
-            <a:endParaRPr lang="en-US" sz="1800" kern="100" dirty="0">
-              <a:effectLst/>
+            <a:endParaRPr lang="en-US" kern="100" dirty="0">
               <a:latin typeface="Calibri" panose="020F0502020204030204" pitchFamily="34" charset="0"/>
               <a:ea typeface="Calibri" panose="020F0502020204030204" pitchFamily="34" charset="0"/>
               <a:cs typeface="Times New Roman" panose="02020603050405020304" pitchFamily="18" charset="0"/>
             </a:endParaRPr>
+          </a:p>
+          <a:p>
+            <a:pPr marL="0" marR="0">
+              <a:lnSpc>
+                <a:spcPct val="107000"/>
+              </a:lnSpc>
+              <a:spcBef>
+                <a:spcPts val="0"/>
+              </a:spcBef>
+              <a:spcAft>
+                <a:spcPts val="800"/>
+              </a:spcAft>
+            </a:pPr>
+            <a:r>
+              <a:rPr lang="en-US" sz="1800" kern="100" dirty="0">
+                <a:effectLst/>
+                <a:latin typeface="Calibri" panose="020F0502020204030204" pitchFamily="34" charset="0"/>
+                <a:ea typeface="Calibri" panose="020F0502020204030204" pitchFamily="34" charset="0"/>
+                <a:cs typeface="Times New Roman" panose="02020603050405020304" pitchFamily="18" charset="0"/>
+              </a:rPr>
+              <a:t>	- post title</a:t>
+            </a:r>
           </a:p>
           <a:p>
             <a:pPr marL="0" marR="0">
@@ -6614,7 +7953,7 @@
                   <a:schemeClr val="tx1"/>
                 </a:solidFill>
               </a:rPr>
-              <a:t>	Favorite Posts</a:t>
+              <a:t>	Favorite Posts	Events</a:t>
             </a:r>
           </a:p>
         </p:txBody>
@@ -6786,17 +8125,17 @@
                   <a:schemeClr val="tx1"/>
                 </a:solidFill>
               </a:rPr>
-              <a:t>Upvote Count: 4			</a:t>
-            </a:r>
-          </a:p>
-        </p:txBody>
-      </p:sp>
-      <p:sp>
-        <p:nvSpPr>
-          <p:cNvPr id="23" name="Rectangle 22">
-            <a:extLst>
-              <a:ext uri="{FF2B5EF4-FFF2-40B4-BE49-F238E27FC236}">
-                <a16:creationId xmlns:a16="http://schemas.microsoft.com/office/drawing/2014/main" id="{36BB1C4E-DA1B-4A1D-01D1-6D5025F59130}"/>
+              <a:t>            Upvote | Upvote Count: 4			</a:t>
+            </a:r>
+          </a:p>
+        </p:txBody>
+      </p:sp>
+      <p:sp>
+        <p:nvSpPr>
+          <p:cNvPr id="20" name="Rectangle 19">
+            <a:extLst>
+              <a:ext uri="{FF2B5EF4-FFF2-40B4-BE49-F238E27FC236}">
+                <a16:creationId xmlns:a16="http://schemas.microsoft.com/office/drawing/2014/main" id="{E4D0A74E-41DD-4F73-4EB2-C1D35A4EF610}"/>
               </a:ext>
             </a:extLst>
           </p:cNvPr>
@@ -6805,8 +8144,8 @@
         </p:nvSpPr>
         <p:spPr>
           <a:xfrm>
-            <a:off x="2558980" y="3225517"/>
-            <a:ext cx="7074040" cy="2150347"/>
+            <a:off x="2873829" y="2885944"/>
+            <a:ext cx="311498" cy="249142"/>
           </a:xfrm>
           <a:prstGeom prst="rect">
             <a:avLst/>
@@ -6834,85 +8173,16 @@
           <a:lstStyle/>
           <a:p>
             <a:pPr algn="ctr"/>
-            <a:endParaRPr lang="en-US" dirty="0"/>
-          </a:p>
-        </p:txBody>
-      </p:sp>
-      <p:sp>
-        <p:nvSpPr>
-          <p:cNvPr id="24" name="TextBox 23">
-            <a:extLst>
-              <a:ext uri="{FF2B5EF4-FFF2-40B4-BE49-F238E27FC236}">
-                <a16:creationId xmlns:a16="http://schemas.microsoft.com/office/drawing/2014/main" id="{D7A3F2E2-8653-F1D4-742A-25A77EF604A9}"/>
-              </a:ext>
-            </a:extLst>
-          </p:cNvPr>
-          <p:cNvSpPr txBox="1"/>
-          <p:nvPr/>
-        </p:nvSpPr>
-        <p:spPr>
-          <a:xfrm>
-            <a:off x="2659463" y="3281963"/>
-            <a:ext cx="6873073" cy="2031325"/>
-          </a:xfrm>
-          <a:prstGeom prst="rect">
-            <a:avLst/>
-          </a:prstGeom>
-          <a:noFill/>
-        </p:spPr>
-        <p:txBody>
-          <a:bodyPr wrap="square" rtlCol="0">
-            <a:spAutoFit/>
-          </a:bodyPr>
-          <a:lstStyle/>
-          <a:p>
-            <a:r>
-              <a:rPr lang="en-US" dirty="0"/>
-              <a:t>Username: JohnDoe123</a:t>
-            </a:r>
-          </a:p>
-          <a:p>
-            <a:r>
-              <a:rPr lang="en-US" dirty="0" err="1"/>
-              <a:t>UserId</a:t>
-            </a:r>
-            <a:r>
-              <a:rPr lang="en-US" dirty="0"/>
-              <a:t>: 2222-2222-2222-2222</a:t>
-            </a:r>
-          </a:p>
-          <a:p>
-            <a:r>
-              <a:rPr lang="en-US" dirty="0"/>
-              <a:t>Datetime: 11-03-2023 10:30PM</a:t>
-            </a:r>
-          </a:p>
-          <a:p>
-            <a:r>
-              <a:rPr lang="en-US" dirty="0"/>
-              <a:t>Post:</a:t>
-            </a:r>
-          </a:p>
-          <a:p>
-            <a:endParaRPr lang="en-US" dirty="0"/>
-          </a:p>
-          <a:p>
-            <a:r>
-              <a:rPr lang="en-US" dirty="0"/>
-              <a:t>This is another user post </a:t>
-            </a:r>
-          </a:p>
-          <a:p>
-            <a:endParaRPr lang="en-US" dirty="0"/>
-          </a:p>
-        </p:txBody>
-      </p:sp>
-      <p:sp>
-        <p:nvSpPr>
-          <p:cNvPr id="28" name="Rectangle: Rounded Corners 27">
-            <a:extLst>
-              <a:ext uri="{FF2B5EF4-FFF2-40B4-BE49-F238E27FC236}">
-                <a16:creationId xmlns:a16="http://schemas.microsoft.com/office/drawing/2014/main" id="{E6782872-2765-53ED-D420-198B741ABA10}"/>
+            <a:endParaRPr lang="en-US"/>
+          </a:p>
+        </p:txBody>
+      </p:sp>
+      <p:sp>
+        <p:nvSpPr>
+          <p:cNvPr id="21" name="Multiplication Sign 20">
+            <a:extLst>
+              <a:ext uri="{FF2B5EF4-FFF2-40B4-BE49-F238E27FC236}">
+                <a16:creationId xmlns:a16="http://schemas.microsoft.com/office/drawing/2014/main" id="{B32A877A-63F7-1AD9-6474-C65CD5330C83}"/>
               </a:ext>
             </a:extLst>
           </p:cNvPr>
@@ -6921,10 +8191,10 @@
         </p:nvSpPr>
         <p:spPr>
           <a:xfrm>
-            <a:off x="7409202" y="2869168"/>
-            <a:ext cx="1836011" cy="301527"/>
-          </a:xfrm>
-          <a:prstGeom prst="roundRect">
+            <a:off x="2881256" y="2885944"/>
+            <a:ext cx="304071" cy="249142"/>
+          </a:xfrm>
+          <a:prstGeom prst="mathMultiply">
             <a:avLst/>
           </a:prstGeom>
         </p:spPr>
@@ -6949,19 +8219,16 @@
           <a:lstStyle/>
           <a:p>
             <a:pPr algn="ctr"/>
-            <a:r>
-              <a:rPr lang="en-US" dirty="0"/>
-              <a:t>Word Breakdown</a:t>
-            </a:r>
-          </a:p>
-        </p:txBody>
-      </p:sp>
-      <p:sp>
-        <p:nvSpPr>
-          <p:cNvPr id="29" name="Rectangle 28">
-            <a:extLst>
-              <a:ext uri="{FF2B5EF4-FFF2-40B4-BE49-F238E27FC236}">
-                <a16:creationId xmlns:a16="http://schemas.microsoft.com/office/drawing/2014/main" id="{EB320938-F391-D4EB-A60D-9C7670735F34}"/>
+            <a:endParaRPr lang="en-US"/>
+          </a:p>
+        </p:txBody>
+      </p:sp>
+      <p:sp>
+        <p:nvSpPr>
+          <p:cNvPr id="23" name="Rectangle 22">
+            <a:extLst>
+              <a:ext uri="{FF2B5EF4-FFF2-40B4-BE49-F238E27FC236}">
+                <a16:creationId xmlns:a16="http://schemas.microsoft.com/office/drawing/2014/main" id="{36BB1C4E-DA1B-4A1D-01D1-6D5025F59130}"/>
               </a:ext>
             </a:extLst>
           </p:cNvPr>
@@ -6970,16 +8237,13 @@
         </p:nvSpPr>
         <p:spPr>
           <a:xfrm>
-            <a:off x="2558980" y="4963885"/>
-            <a:ext cx="7074040" cy="411982"/>
+            <a:off x="2558980" y="3225517"/>
+            <a:ext cx="7074040" cy="2150347"/>
           </a:xfrm>
           <a:prstGeom prst="rect">
             <a:avLst/>
           </a:prstGeom>
           <a:noFill/>
-          <a:ln>
-            <a:noFill/>
-          </a:ln>
         </p:spPr>
         <p:style>
           <a:lnRef idx="2">
@@ -7001,23 +8265,86 @@
           <a:bodyPr rtlCol="0" anchor="ctr"/>
           <a:lstStyle/>
           <a:p>
-            <a:r>
-              <a:rPr lang="en-US" dirty="0">
-                <a:solidFill>
-                  <a:schemeClr val="tx1"/>
-                </a:solidFill>
-              </a:rPr>
-              <a:t>Upvote Count: 0			</a:t>
-            </a:r>
-          </a:p>
-        </p:txBody>
-      </p:sp>
-      <p:sp>
-        <p:nvSpPr>
-          <p:cNvPr id="32" name="Rectangle: Rounded Corners 31">
-            <a:extLst>
-              <a:ext uri="{FF2B5EF4-FFF2-40B4-BE49-F238E27FC236}">
-                <a16:creationId xmlns:a16="http://schemas.microsoft.com/office/drawing/2014/main" id="{559543E7-7069-05A5-2916-7B6A46C91618}"/>
+            <a:pPr algn="ctr"/>
+            <a:endParaRPr lang="en-US" dirty="0"/>
+          </a:p>
+        </p:txBody>
+      </p:sp>
+      <p:sp>
+        <p:nvSpPr>
+          <p:cNvPr id="24" name="TextBox 23">
+            <a:extLst>
+              <a:ext uri="{FF2B5EF4-FFF2-40B4-BE49-F238E27FC236}">
+                <a16:creationId xmlns:a16="http://schemas.microsoft.com/office/drawing/2014/main" id="{D7A3F2E2-8653-F1D4-742A-25A77EF604A9}"/>
+              </a:ext>
+            </a:extLst>
+          </p:cNvPr>
+          <p:cNvSpPr txBox="1"/>
+          <p:nvPr/>
+        </p:nvSpPr>
+        <p:spPr>
+          <a:xfrm>
+            <a:off x="2659463" y="3281963"/>
+            <a:ext cx="6873073" cy="2031325"/>
+          </a:xfrm>
+          <a:prstGeom prst="rect">
+            <a:avLst/>
+          </a:prstGeom>
+          <a:noFill/>
+        </p:spPr>
+        <p:txBody>
+          <a:bodyPr wrap="square" rtlCol="0">
+            <a:spAutoFit/>
+          </a:bodyPr>
+          <a:lstStyle/>
+          <a:p>
+            <a:r>
+              <a:rPr lang="en-US" dirty="0"/>
+              <a:t>Username: JohnDoe123</a:t>
+            </a:r>
+          </a:p>
+          <a:p>
+            <a:r>
+              <a:rPr lang="en-US" dirty="0" err="1"/>
+              <a:t>UserId</a:t>
+            </a:r>
+            <a:r>
+              <a:rPr lang="en-US" dirty="0"/>
+              <a:t>: 2222-2222-2222-2222</a:t>
+            </a:r>
+          </a:p>
+          <a:p>
+            <a:r>
+              <a:rPr lang="en-US" dirty="0"/>
+              <a:t>Datetime: 11-03-2023 10:30PM</a:t>
+            </a:r>
+          </a:p>
+          <a:p>
+            <a:r>
+              <a:rPr lang="en-US" dirty="0"/>
+              <a:t>Post:</a:t>
+            </a:r>
+          </a:p>
+          <a:p>
+            <a:endParaRPr lang="en-US" dirty="0"/>
+          </a:p>
+          <a:p>
+            <a:r>
+              <a:rPr lang="en-US" dirty="0"/>
+              <a:t>This is another user post </a:t>
+            </a:r>
+          </a:p>
+          <a:p>
+            <a:endParaRPr lang="en-US" dirty="0"/>
+          </a:p>
+        </p:txBody>
+      </p:sp>
+      <p:sp>
+        <p:nvSpPr>
+          <p:cNvPr id="28" name="Rectangle: Rounded Corners 27">
+            <a:extLst>
+              <a:ext uri="{FF2B5EF4-FFF2-40B4-BE49-F238E27FC236}">
+                <a16:creationId xmlns:a16="http://schemas.microsoft.com/office/drawing/2014/main" id="{E6782872-2765-53ED-D420-198B741ABA10}"/>
               </a:ext>
             </a:extLst>
           </p:cNvPr>
@@ -7026,7 +8353,7 @@
         </p:nvSpPr>
         <p:spPr>
           <a:xfrm>
-            <a:off x="7409202" y="5019515"/>
+            <a:off x="7409202" y="2869168"/>
             <a:ext cx="1836011" cy="301527"/>
           </a:xfrm>
           <a:prstGeom prst="roundRect">
@@ -7063,10 +8390,10 @@
       </p:sp>
       <p:sp>
         <p:nvSpPr>
-          <p:cNvPr id="2" name="Rectangle: Rounded Corners 1">
-            <a:extLst>
-              <a:ext uri="{FF2B5EF4-FFF2-40B4-BE49-F238E27FC236}">
-                <a16:creationId xmlns:a16="http://schemas.microsoft.com/office/drawing/2014/main" id="{657CB5EA-E53C-7B6D-B5DB-16035518F694}"/>
+          <p:cNvPr id="29" name="Rectangle 28">
+            <a:extLst>
+              <a:ext uri="{FF2B5EF4-FFF2-40B4-BE49-F238E27FC236}">
+                <a16:creationId xmlns:a16="http://schemas.microsoft.com/office/drawing/2014/main" id="{EB320938-F391-D4EB-A60D-9C7670735F34}"/>
               </a:ext>
             </a:extLst>
           </p:cNvPr>
@@ -7075,12 +8402,16 @@
         </p:nvSpPr>
         <p:spPr>
           <a:xfrm>
-            <a:off x="10009415" y="439613"/>
-            <a:ext cx="1797398" cy="462854"/>
-          </a:xfrm>
-          <a:prstGeom prst="roundRect">
+            <a:off x="2558980" y="4963885"/>
+            <a:ext cx="7074040" cy="411982"/>
+          </a:xfrm>
+          <a:prstGeom prst="rect">
             <a:avLst/>
           </a:prstGeom>
+          <a:noFill/>
+          <a:ln>
+            <a:noFill/>
+          </a:ln>
         </p:spPr>
         <p:style>
           <a:lnRef idx="2">
@@ -7102,10 +8433,207 @@
           <a:bodyPr rtlCol="0" anchor="ctr"/>
           <a:lstStyle/>
           <a:p>
+            <a:r>
+              <a:rPr lang="en-US" dirty="0">
+                <a:solidFill>
+                  <a:schemeClr val="tx1"/>
+                </a:solidFill>
+              </a:rPr>
+              <a:t>            Upvote | Upvote Count: 0			</a:t>
+            </a:r>
+          </a:p>
+        </p:txBody>
+      </p:sp>
+      <p:sp>
+        <p:nvSpPr>
+          <p:cNvPr id="30" name="Rectangle 29">
+            <a:extLst>
+              <a:ext uri="{FF2B5EF4-FFF2-40B4-BE49-F238E27FC236}">
+                <a16:creationId xmlns:a16="http://schemas.microsoft.com/office/drawing/2014/main" id="{C6FC024A-899A-7E32-C4C1-5A9CA31F12D6}"/>
+              </a:ext>
+            </a:extLst>
+          </p:cNvPr>
+          <p:cNvSpPr/>
+          <p:nvPr/>
+        </p:nvSpPr>
+        <p:spPr>
+          <a:xfrm>
+            <a:off x="2873829" y="5036291"/>
+            <a:ext cx="311498" cy="249142"/>
+          </a:xfrm>
+          <a:prstGeom prst="rect">
+            <a:avLst/>
+          </a:prstGeom>
+          <a:noFill/>
+        </p:spPr>
+        <p:style>
+          <a:lnRef idx="2">
+            <a:schemeClr val="accent1">
+              <a:shade val="15000"/>
+            </a:schemeClr>
+          </a:lnRef>
+          <a:fillRef idx="1">
+            <a:schemeClr val="accent1"/>
+          </a:fillRef>
+          <a:effectRef idx="0">
+            <a:schemeClr val="accent1"/>
+          </a:effectRef>
+          <a:fontRef idx="minor">
+            <a:schemeClr val="lt1"/>
+          </a:fontRef>
+        </p:style>
+        <p:txBody>
+          <a:bodyPr rtlCol="0" anchor="ctr"/>
+          <a:lstStyle/>
+          <a:p>
             <a:pPr algn="ctr"/>
+            <a:endParaRPr lang="en-US"/>
+          </a:p>
+        </p:txBody>
+      </p:sp>
+      <p:sp>
+        <p:nvSpPr>
+          <p:cNvPr id="32" name="Rectangle: Rounded Corners 31">
+            <a:extLst>
+              <a:ext uri="{FF2B5EF4-FFF2-40B4-BE49-F238E27FC236}">
+                <a16:creationId xmlns:a16="http://schemas.microsoft.com/office/drawing/2014/main" id="{559543E7-7069-05A5-2916-7B6A46C91618}"/>
+              </a:ext>
+            </a:extLst>
+          </p:cNvPr>
+          <p:cNvSpPr/>
+          <p:nvPr/>
+        </p:nvSpPr>
+        <p:spPr>
+          <a:xfrm>
+            <a:off x="7409202" y="5019515"/>
+            <a:ext cx="1836011" cy="301527"/>
+          </a:xfrm>
+          <a:prstGeom prst="roundRect">
+            <a:avLst/>
+          </a:prstGeom>
+        </p:spPr>
+        <p:style>
+          <a:lnRef idx="2">
+            <a:schemeClr val="accent1">
+              <a:shade val="15000"/>
+            </a:schemeClr>
+          </a:lnRef>
+          <a:fillRef idx="1">
+            <a:schemeClr val="accent1"/>
+          </a:fillRef>
+          <a:effectRef idx="0">
+            <a:schemeClr val="accent1"/>
+          </a:effectRef>
+          <a:fontRef idx="minor">
+            <a:schemeClr val="lt1"/>
+          </a:fontRef>
+        </p:style>
+        <p:txBody>
+          <a:bodyPr rtlCol="0" anchor="ctr"/>
+          <a:lstStyle/>
+          <a:p>
+            <a:pPr algn="ctr"/>
             <a:r>
               <a:rPr lang="en-US" dirty="0"/>
-              <a:t>Login/Sign Up</a:t>
+              <a:t>Word Breakdown</a:t>
+            </a:r>
+          </a:p>
+        </p:txBody>
+      </p:sp>
+      <p:sp>
+        <p:nvSpPr>
+          <p:cNvPr id="2" name="Rectangle: Rounded Corners 1">
+            <a:extLst>
+              <a:ext uri="{FF2B5EF4-FFF2-40B4-BE49-F238E27FC236}">
+                <a16:creationId xmlns:a16="http://schemas.microsoft.com/office/drawing/2014/main" id="{A218763C-8561-7967-EDA7-C0C3213CA3F1}"/>
+              </a:ext>
+            </a:extLst>
+          </p:cNvPr>
+          <p:cNvSpPr/>
+          <p:nvPr/>
+        </p:nvSpPr>
+        <p:spPr>
+          <a:xfrm>
+            <a:off x="10009415" y="439613"/>
+            <a:ext cx="1797398" cy="462854"/>
+          </a:xfrm>
+          <a:prstGeom prst="roundRect">
+            <a:avLst/>
+          </a:prstGeom>
+        </p:spPr>
+        <p:style>
+          <a:lnRef idx="2">
+            <a:schemeClr val="accent1">
+              <a:shade val="15000"/>
+            </a:schemeClr>
+          </a:lnRef>
+          <a:fillRef idx="1">
+            <a:schemeClr val="accent1"/>
+          </a:fillRef>
+          <a:effectRef idx="0">
+            <a:schemeClr val="accent1"/>
+          </a:effectRef>
+          <a:fontRef idx="minor">
+            <a:schemeClr val="lt1"/>
+          </a:fontRef>
+        </p:style>
+        <p:txBody>
+          <a:bodyPr rtlCol="0" anchor="ctr"/>
+          <a:lstStyle/>
+          <a:p>
+            <a:pPr algn="ctr"/>
+            <a:r>
+              <a:rPr lang="en-US" dirty="0"/>
+              <a:t>Account</a:t>
+            </a:r>
+          </a:p>
+        </p:txBody>
+      </p:sp>
+      <p:sp>
+        <p:nvSpPr>
+          <p:cNvPr id="6" name="Rectangle: Rounded Corners 5">
+            <a:extLst>
+              <a:ext uri="{FF2B5EF4-FFF2-40B4-BE49-F238E27FC236}">
+                <a16:creationId xmlns:a16="http://schemas.microsoft.com/office/drawing/2014/main" id="{CBB532D6-AEFD-E4B2-B191-4CF7BEABA130}"/>
+              </a:ext>
+            </a:extLst>
+          </p:cNvPr>
+          <p:cNvSpPr/>
+          <p:nvPr/>
+        </p:nvSpPr>
+        <p:spPr>
+          <a:xfrm>
+            <a:off x="1531621" y="437337"/>
+            <a:ext cx="1797398" cy="462854"/>
+          </a:xfrm>
+          <a:prstGeom prst="roundRect">
+            <a:avLst/>
+          </a:prstGeom>
+        </p:spPr>
+        <p:style>
+          <a:lnRef idx="2">
+            <a:schemeClr val="accent1">
+              <a:shade val="15000"/>
+            </a:schemeClr>
+          </a:lnRef>
+          <a:fillRef idx="1">
+            <a:schemeClr val="accent1"/>
+          </a:fillRef>
+          <a:effectRef idx="0">
+            <a:schemeClr val="accent1"/>
+          </a:effectRef>
+          <a:fontRef idx="minor">
+            <a:schemeClr val="lt1"/>
+          </a:fontRef>
+        </p:style>
+        <p:txBody>
+          <a:bodyPr rtlCol="0" anchor="ctr"/>
+          <a:lstStyle/>
+          <a:p>
+            <a:pPr algn="ctr"/>
+            <a:r>
+              <a:rPr lang="en-US" dirty="0"/>
+              <a:t>Create Post</a:t>
             </a:r>
           </a:p>
         </p:txBody>
@@ -7113,13 +8641,18 @@
     </p:spTree>
     <p:extLst>
       <p:ext uri="{BB962C8B-B14F-4D97-AF65-F5344CB8AC3E}">
-        <p14:creationId xmlns:p14="http://schemas.microsoft.com/office/powerpoint/2010/main" val="2390560905"/>
+        <p14:creationId xmlns:p14="http://schemas.microsoft.com/office/powerpoint/2010/main" val="2881041793"/>
       </p:ext>
     </p:extLst>
   </p:cSld>
   <p:clrMapOvr>
     <a:masterClrMapping/>
   </p:clrMapOvr>
+  <p:extLst>
+    <p:ext uri="{6950BFC3-D8DA-4A85-94F7-54DA5524770B}">
+      <p188:commentRel xmlns:p188="http://schemas.microsoft.com/office/powerpoint/2018/8/main" r:id="rId2"/>
+    </p:ext>
+  </p:extLst>
 </p:sld>
 </file>
 
@@ -7249,7 +8782,7 @@
         <p:spPr>
           <a:xfrm>
             <a:off x="2558980" y="3225519"/>
-            <a:ext cx="7074040" cy="2150347"/>
+            <a:ext cx="7074040" cy="3426490"/>
           </a:xfrm>
           <a:prstGeom prst="rect">
             <a:avLst/>
@@ -7283,10 +8816,10 @@
       </p:sp>
       <p:sp>
         <p:nvSpPr>
-          <p:cNvPr id="12" name="Rectangle 11">
-            <a:extLst>
-              <a:ext uri="{FF2B5EF4-FFF2-40B4-BE49-F238E27FC236}">
-                <a16:creationId xmlns:a16="http://schemas.microsoft.com/office/drawing/2014/main" id="{44B90755-68C1-C941-8BE9-5CDDEEAD237C}"/>
+          <p:cNvPr id="15" name="Rectangle 14">
+            <a:extLst>
+              <a:ext uri="{FF2B5EF4-FFF2-40B4-BE49-F238E27FC236}">
+                <a16:creationId xmlns:a16="http://schemas.microsoft.com/office/drawing/2014/main" id="{2F28C8CE-0641-4BDC-3993-118AA2F43F1D}"/>
               </a:ext>
             </a:extLst>
           </p:cNvPr>
@@ -7295,8 +8828,8 @@
         </p:nvSpPr>
         <p:spPr>
           <a:xfrm>
-            <a:off x="2558980" y="5375866"/>
-            <a:ext cx="7074040" cy="1276143"/>
+            <a:off x="242835" y="200966"/>
+            <a:ext cx="11706330" cy="874206"/>
           </a:xfrm>
           <a:prstGeom prst="rect">
             <a:avLst/>
@@ -7324,16 +8857,32 @@
           <a:lstStyle/>
           <a:p>
             <a:pPr algn="ctr"/>
-            <a:endParaRPr lang="en-US" dirty="0"/>
-          </a:p>
-        </p:txBody>
-      </p:sp>
-      <p:sp>
-        <p:nvSpPr>
-          <p:cNvPr id="15" name="Rectangle 14">
-            <a:extLst>
-              <a:ext uri="{FF2B5EF4-FFF2-40B4-BE49-F238E27FC236}">
-                <a16:creationId xmlns:a16="http://schemas.microsoft.com/office/drawing/2014/main" id="{2F28C8CE-0641-4BDC-3993-118AA2F43F1D}"/>
+            <a:r>
+              <a:rPr lang="en-US" u="sng" dirty="0">
+                <a:solidFill>
+                  <a:schemeClr val="tx1"/>
+                </a:solidFill>
+              </a:rPr>
+              <a:t>Latest Posts</a:t>
+            </a:r>
+            <a:r>
+              <a:rPr lang="en-US" dirty="0">
+                <a:solidFill>
+                  <a:schemeClr val="tx1"/>
+                </a:solidFill>
+              </a:rPr>
+              <a:t>	Favorite Posts	Events</a:t>
+            </a:r>
+          </a:p>
+        </p:txBody>
+      </p:sp>
+      <p:sp>
+        <p:nvSpPr>
+          <p:cNvPr id="16" name="Action Button: Go Home 15">
+            <a:hlinkClick r:id="" action="ppaction://hlinkshowjump?jump=firstslide" highlightClick="1"/>
+            <a:extLst>
+              <a:ext uri="{FF2B5EF4-FFF2-40B4-BE49-F238E27FC236}">
+                <a16:creationId xmlns:a16="http://schemas.microsoft.com/office/drawing/2014/main" id="{718E4184-CE0E-7E87-B941-B21B6287DC47}"/>
               </a:ext>
             </a:extLst>
           </p:cNvPr>
@@ -7342,13 +8891,12 @@
         </p:nvSpPr>
         <p:spPr>
           <a:xfrm>
-            <a:off x="242835" y="200966"/>
-            <a:ext cx="11706330" cy="874206"/>
-          </a:xfrm>
-          <a:prstGeom prst="rect">
+            <a:off x="385188" y="396280"/>
+            <a:ext cx="619648" cy="506187"/>
+          </a:xfrm>
+          <a:prstGeom prst="actionButtonHome">
             <a:avLst/>
           </a:prstGeom>
-          <a:noFill/>
         </p:spPr>
         <p:style>
           <a:lnRef idx="2">
@@ -7371,32 +8919,66 @@
           <a:lstStyle/>
           <a:p>
             <a:pPr algn="ctr"/>
-            <a:r>
-              <a:rPr lang="en-US" u="sng" dirty="0">
-                <a:solidFill>
-                  <a:schemeClr val="tx1"/>
-                </a:solidFill>
-              </a:rPr>
-              <a:t>Latest Posts</a:t>
-            </a:r>
-            <a:r>
-              <a:rPr lang="en-US" dirty="0">
-                <a:solidFill>
-                  <a:schemeClr val="tx1"/>
-                </a:solidFill>
-              </a:rPr>
-              <a:t>	Favorite Posts	Events</a:t>
-            </a:r>
-          </a:p>
-        </p:txBody>
-      </p:sp>
-      <p:sp>
-        <p:nvSpPr>
-          <p:cNvPr id="16" name="Action Button: Go Home 15">
-            <a:hlinkClick r:id="" action="ppaction://hlinkshowjump?jump=firstslide" highlightClick="1"/>
-            <a:extLst>
-              <a:ext uri="{FF2B5EF4-FFF2-40B4-BE49-F238E27FC236}">
-                <a16:creationId xmlns:a16="http://schemas.microsoft.com/office/drawing/2014/main" id="{718E4184-CE0E-7E87-B941-B21B6287DC47}"/>
+            <a:endParaRPr lang="en-US"/>
+          </a:p>
+        </p:txBody>
+      </p:sp>
+      <p:sp>
+        <p:nvSpPr>
+          <p:cNvPr id="17" name="TextBox 16">
+            <a:extLst>
+              <a:ext uri="{FF2B5EF4-FFF2-40B4-BE49-F238E27FC236}">
+                <a16:creationId xmlns:a16="http://schemas.microsoft.com/office/drawing/2014/main" id="{60FBE9E0-78AB-01C4-4EFD-FD36C0881FF1}"/>
+              </a:ext>
+            </a:extLst>
+          </p:cNvPr>
+          <p:cNvSpPr txBox="1"/>
+          <p:nvPr/>
+        </p:nvSpPr>
+        <p:spPr>
+          <a:xfrm>
+            <a:off x="2659463" y="1131618"/>
+            <a:ext cx="6873073" cy="1477328"/>
+          </a:xfrm>
+          <a:prstGeom prst="rect">
+            <a:avLst/>
+          </a:prstGeom>
+          <a:noFill/>
+        </p:spPr>
+        <p:txBody>
+          <a:bodyPr wrap="square" rtlCol="0">
+            <a:spAutoFit/>
+          </a:bodyPr>
+          <a:lstStyle/>
+          <a:p>
+            <a:r>
+              <a:rPr lang="en-US" dirty="0"/>
+              <a:t>Post Title: __________________________________________________</a:t>
+            </a:r>
+          </a:p>
+          <a:p>
+            <a:r>
+              <a:rPr lang="en-US" dirty="0"/>
+              <a:t>Post Content:</a:t>
+            </a:r>
+          </a:p>
+          <a:p>
+            <a:endParaRPr lang="en-US" dirty="0"/>
+          </a:p>
+          <a:p>
+            <a:endParaRPr lang="en-US" dirty="0"/>
+          </a:p>
+          <a:p>
+            <a:endParaRPr lang="en-US" dirty="0"/>
+          </a:p>
+        </p:txBody>
+      </p:sp>
+      <p:sp>
+        <p:nvSpPr>
+          <p:cNvPr id="23" name="Rectangle 22">
+            <a:extLst>
+              <a:ext uri="{FF2B5EF4-FFF2-40B4-BE49-F238E27FC236}">
+                <a16:creationId xmlns:a16="http://schemas.microsoft.com/office/drawing/2014/main" id="{36BB1C4E-DA1B-4A1D-01D1-6D5025F59130}"/>
               </a:ext>
             </a:extLst>
           </p:cNvPr>
@@ -7405,12 +8987,13 @@
         </p:nvSpPr>
         <p:spPr>
           <a:xfrm>
-            <a:off x="385188" y="396280"/>
-            <a:ext cx="619648" cy="506187"/>
-          </a:xfrm>
-          <a:prstGeom prst="actionButtonHome">
+            <a:off x="2558980" y="3225517"/>
+            <a:ext cx="7074040" cy="3426492"/>
+          </a:xfrm>
+          <a:prstGeom prst="rect">
             <a:avLst/>
           </a:prstGeom>
+          <a:noFill/>
         </p:spPr>
         <p:style>
           <a:lnRef idx="2">
@@ -7433,16 +9016,16 @@
           <a:lstStyle/>
           <a:p>
             <a:pPr algn="ctr"/>
-            <a:endParaRPr lang="en-US"/>
-          </a:p>
-        </p:txBody>
-      </p:sp>
-      <p:sp>
-        <p:nvSpPr>
-          <p:cNvPr id="17" name="TextBox 16">
-            <a:extLst>
-              <a:ext uri="{FF2B5EF4-FFF2-40B4-BE49-F238E27FC236}">
-                <a16:creationId xmlns:a16="http://schemas.microsoft.com/office/drawing/2014/main" id="{60FBE9E0-78AB-01C4-4EFD-FD36C0881FF1}"/>
+            <a:endParaRPr lang="en-US" dirty="0"/>
+          </a:p>
+        </p:txBody>
+      </p:sp>
+      <p:sp>
+        <p:nvSpPr>
+          <p:cNvPr id="24" name="TextBox 23">
+            <a:extLst>
+              <a:ext uri="{FF2B5EF4-FFF2-40B4-BE49-F238E27FC236}">
+                <a16:creationId xmlns:a16="http://schemas.microsoft.com/office/drawing/2014/main" id="{D7A3F2E2-8653-F1D4-742A-25A77EF604A9}"/>
               </a:ext>
             </a:extLst>
           </p:cNvPr>
@@ -7451,8 +9034,8 @@
         </p:nvSpPr>
         <p:spPr>
           <a:xfrm>
-            <a:off x="2659463" y="1131618"/>
-            <a:ext cx="6873073" cy="2031325"/>
+            <a:off x="2659463" y="3281963"/>
+            <a:ext cx="6873073" cy="2862322"/>
           </a:xfrm>
           <a:prstGeom prst="rect">
             <a:avLst/>
@@ -7467,7 +9050,7 @@
           <a:p>
             <a:r>
               <a:rPr lang="en-US" dirty="0"/>
-              <a:t>Username: SteveVaz123</a:t>
+              <a:t>Username: JohnDoe123</a:t>
             </a:r>
           </a:p>
           <a:p>
@@ -7477,7 +9060,7 @@
             </a:r>
             <a:r>
               <a:rPr lang="en-US" dirty="0"/>
-              <a:t>: 1111-1111-1111-1111</a:t>
+              <a:t>: 2222-2222-2222-2222</a:t>
             </a:r>
           </a:p>
           <a:p>
@@ -7489,6 +9072,12 @@
           <a:p>
             <a:r>
               <a:rPr lang="en-US" dirty="0"/>
+              <a:t>Post Title: Poem</a:t>
+            </a:r>
+          </a:p>
+          <a:p>
+            <a:r>
+              <a:rPr lang="en-US" dirty="0"/>
               <a:t>Post:</a:t>
             </a:r>
           </a:p>
@@ -7498,7 +9087,19 @@
           <a:p>
             <a:r>
               <a:rPr lang="en-US" dirty="0"/>
-              <a:t>This is a user post </a:t>
+              <a:t>Roses are red</a:t>
+            </a:r>
+          </a:p>
+          <a:p>
+            <a:r>
+              <a:rPr lang="en-US" dirty="0"/>
+              <a:t>Violets are blue</a:t>
+            </a:r>
+          </a:p>
+          <a:p>
+            <a:r>
+              <a:rPr lang="en-US" dirty="0"/>
+              <a:t>This is a poem</a:t>
             </a:r>
           </a:p>
           <a:p>
@@ -7508,10 +9109,10 @@
       </p:sp>
       <p:sp>
         <p:nvSpPr>
-          <p:cNvPr id="18" name="Rectangle 17">
-            <a:extLst>
-              <a:ext uri="{FF2B5EF4-FFF2-40B4-BE49-F238E27FC236}">
-                <a16:creationId xmlns:a16="http://schemas.microsoft.com/office/drawing/2014/main" id="{C12A960D-6241-96E7-3536-4A995046642C}"/>
+          <p:cNvPr id="28" name="Rectangle: Rounded Corners 27">
+            <a:extLst>
+              <a:ext uri="{FF2B5EF4-FFF2-40B4-BE49-F238E27FC236}">
+                <a16:creationId xmlns:a16="http://schemas.microsoft.com/office/drawing/2014/main" id="{E6782872-2765-53ED-D420-198B741ABA10}"/>
               </a:ext>
             </a:extLst>
           </p:cNvPr>
@@ -7520,16 +9121,12 @@
         </p:nvSpPr>
         <p:spPr>
           <a:xfrm>
-            <a:off x="2558980" y="2813538"/>
-            <a:ext cx="7074040" cy="411982"/>
-          </a:xfrm>
-          <a:prstGeom prst="rect">
+            <a:off x="7696524" y="2873979"/>
+            <a:ext cx="1836011" cy="301527"/>
+          </a:xfrm>
+          <a:prstGeom prst="roundRect">
             <a:avLst/>
           </a:prstGeom>
-          <a:noFill/>
-          <a:ln>
-            <a:noFill/>
-          </a:ln>
         </p:spPr>
         <p:style>
           <a:lnRef idx="2">
@@ -7551,23 +9148,20 @@
           <a:bodyPr rtlCol="0" anchor="ctr"/>
           <a:lstStyle/>
           <a:p>
-            <a:r>
-              <a:rPr lang="en-US" dirty="0">
-                <a:solidFill>
-                  <a:schemeClr val="tx1"/>
-                </a:solidFill>
-              </a:rPr>
-              <a:t>            Upvote | Upvote Count: 4			</a:t>
-            </a:r>
-          </a:p>
-        </p:txBody>
-      </p:sp>
-      <p:sp>
-        <p:nvSpPr>
-          <p:cNvPr id="20" name="Rectangle 19">
-            <a:extLst>
-              <a:ext uri="{FF2B5EF4-FFF2-40B4-BE49-F238E27FC236}">
-                <a16:creationId xmlns:a16="http://schemas.microsoft.com/office/drawing/2014/main" id="{E4D0A74E-41DD-4F73-4EB2-C1D35A4EF610}"/>
+            <a:pPr algn="ctr"/>
+            <a:r>
+              <a:rPr lang="en-US" dirty="0"/>
+              <a:t>Submit Post</a:t>
+            </a:r>
+          </a:p>
+        </p:txBody>
+      </p:sp>
+      <p:sp>
+        <p:nvSpPr>
+          <p:cNvPr id="29" name="Rectangle 28">
+            <a:extLst>
+              <a:ext uri="{FF2B5EF4-FFF2-40B4-BE49-F238E27FC236}">
+                <a16:creationId xmlns:a16="http://schemas.microsoft.com/office/drawing/2014/main" id="{EB320938-F391-D4EB-A60D-9C7670735F34}"/>
               </a:ext>
             </a:extLst>
           </p:cNvPr>
@@ -7576,13 +9170,16 @@
         </p:nvSpPr>
         <p:spPr>
           <a:xfrm>
-            <a:off x="2873829" y="2885944"/>
-            <a:ext cx="311498" cy="249142"/>
+            <a:off x="2558980" y="6240027"/>
+            <a:ext cx="7074040" cy="411982"/>
           </a:xfrm>
           <a:prstGeom prst="rect">
             <a:avLst/>
           </a:prstGeom>
           <a:noFill/>
+          <a:ln>
+            <a:noFill/>
+          </a:ln>
         </p:spPr>
         <p:style>
           <a:lnRef idx="2">
@@ -7604,17 +9201,23 @@
           <a:bodyPr rtlCol="0" anchor="ctr"/>
           <a:lstStyle/>
           <a:p>
-            <a:pPr algn="ctr"/>
-            <a:endParaRPr lang="en-US"/>
-          </a:p>
-        </p:txBody>
-      </p:sp>
-      <p:sp>
-        <p:nvSpPr>
-          <p:cNvPr id="21" name="Multiplication Sign 20">
-            <a:extLst>
-              <a:ext uri="{FF2B5EF4-FFF2-40B4-BE49-F238E27FC236}">
-                <a16:creationId xmlns:a16="http://schemas.microsoft.com/office/drawing/2014/main" id="{B32A877A-63F7-1AD9-6474-C65CD5330C83}"/>
+            <a:r>
+              <a:rPr lang="en-US" dirty="0">
+                <a:solidFill>
+                  <a:schemeClr val="tx1"/>
+                </a:solidFill>
+              </a:rPr>
+              <a:t>            Upvote | Upvote Count: 0			</a:t>
+            </a:r>
+          </a:p>
+        </p:txBody>
+      </p:sp>
+      <p:sp>
+        <p:nvSpPr>
+          <p:cNvPr id="30" name="Rectangle 29">
+            <a:extLst>
+              <a:ext uri="{FF2B5EF4-FFF2-40B4-BE49-F238E27FC236}">
+                <a16:creationId xmlns:a16="http://schemas.microsoft.com/office/drawing/2014/main" id="{C6FC024A-899A-7E32-C4C1-5A9CA31F12D6}"/>
               </a:ext>
             </a:extLst>
           </p:cNvPr>
@@ -7623,12 +9226,13 @@
         </p:nvSpPr>
         <p:spPr>
           <a:xfrm>
-            <a:off x="2881256" y="2885944"/>
-            <a:ext cx="304071" cy="249142"/>
-          </a:xfrm>
-          <a:prstGeom prst="mathMultiply">
+            <a:off x="2863669" y="6326307"/>
+            <a:ext cx="311498" cy="249142"/>
+          </a:xfrm>
+          <a:prstGeom prst="rect">
             <a:avLst/>
           </a:prstGeom>
+          <a:noFill/>
         </p:spPr>
         <p:style>
           <a:lnRef idx="2">
@@ -7657,10 +9261,10 @@
       </p:sp>
       <p:sp>
         <p:nvSpPr>
-          <p:cNvPr id="23" name="Rectangle 22">
-            <a:extLst>
-              <a:ext uri="{FF2B5EF4-FFF2-40B4-BE49-F238E27FC236}">
-                <a16:creationId xmlns:a16="http://schemas.microsoft.com/office/drawing/2014/main" id="{36BB1C4E-DA1B-4A1D-01D1-6D5025F59130}"/>
+          <p:cNvPr id="32" name="Rectangle: Rounded Corners 31">
+            <a:extLst>
+              <a:ext uri="{FF2B5EF4-FFF2-40B4-BE49-F238E27FC236}">
+                <a16:creationId xmlns:a16="http://schemas.microsoft.com/office/drawing/2014/main" id="{559543E7-7069-05A5-2916-7B6A46C91618}"/>
               </a:ext>
             </a:extLst>
           </p:cNvPr>
@@ -7669,13 +9273,12 @@
         </p:nvSpPr>
         <p:spPr>
           <a:xfrm>
-            <a:off x="2558980" y="3225517"/>
-            <a:ext cx="7074040" cy="2150347"/>
-          </a:xfrm>
-          <a:prstGeom prst="rect">
+            <a:off x="7696525" y="6295254"/>
+            <a:ext cx="1836011" cy="301527"/>
+          </a:xfrm>
+          <a:prstGeom prst="roundRect">
             <a:avLst/>
           </a:prstGeom>
-          <a:noFill/>
         </p:spPr>
         <p:style>
           <a:lnRef idx="2">
@@ -7698,85 +9301,19 @@
           <a:lstStyle/>
           <a:p>
             <a:pPr algn="ctr"/>
-            <a:endParaRPr lang="en-US" dirty="0"/>
-          </a:p>
-        </p:txBody>
-      </p:sp>
-      <p:sp>
-        <p:nvSpPr>
-          <p:cNvPr id="24" name="TextBox 23">
-            <a:extLst>
-              <a:ext uri="{FF2B5EF4-FFF2-40B4-BE49-F238E27FC236}">
-                <a16:creationId xmlns:a16="http://schemas.microsoft.com/office/drawing/2014/main" id="{D7A3F2E2-8653-F1D4-742A-25A77EF604A9}"/>
-              </a:ext>
-            </a:extLst>
-          </p:cNvPr>
-          <p:cNvSpPr txBox="1"/>
-          <p:nvPr/>
-        </p:nvSpPr>
-        <p:spPr>
-          <a:xfrm>
-            <a:off x="2659463" y="3281963"/>
-            <a:ext cx="6873073" cy="2031325"/>
-          </a:xfrm>
-          <a:prstGeom prst="rect">
-            <a:avLst/>
-          </a:prstGeom>
-          <a:noFill/>
-        </p:spPr>
-        <p:txBody>
-          <a:bodyPr wrap="square" rtlCol="0">
-            <a:spAutoFit/>
-          </a:bodyPr>
-          <a:lstStyle/>
-          <a:p>
             <a:r>
               <a:rPr lang="en-US" dirty="0"/>
-              <a:t>Username: JohnDoe123</a:t>
-            </a:r>
-          </a:p>
-          <a:p>
-            <a:r>
-              <a:rPr lang="en-US" dirty="0" err="1"/>
-              <a:t>UserId</a:t>
-            </a:r>
-            <a:r>
-              <a:rPr lang="en-US" dirty="0"/>
-              <a:t>: 2222-2222-2222-2222</a:t>
-            </a:r>
-          </a:p>
-          <a:p>
-            <a:r>
-              <a:rPr lang="en-US" dirty="0"/>
-              <a:t>Datetime: 11-03-2023 10:30PM</a:t>
-            </a:r>
-          </a:p>
-          <a:p>
-            <a:r>
-              <a:rPr lang="en-US" dirty="0"/>
-              <a:t>Post:</a:t>
-            </a:r>
-          </a:p>
-          <a:p>
-            <a:endParaRPr lang="en-US" dirty="0"/>
-          </a:p>
-          <a:p>
-            <a:r>
-              <a:rPr lang="en-US" dirty="0"/>
-              <a:t>This is another user post </a:t>
-            </a:r>
-          </a:p>
-          <a:p>
-            <a:endParaRPr lang="en-US" dirty="0"/>
-          </a:p>
-        </p:txBody>
-      </p:sp>
-      <p:sp>
-        <p:nvSpPr>
-          <p:cNvPr id="28" name="Rectangle: Rounded Corners 27">
-            <a:extLst>
-              <a:ext uri="{FF2B5EF4-FFF2-40B4-BE49-F238E27FC236}">
-                <a16:creationId xmlns:a16="http://schemas.microsoft.com/office/drawing/2014/main" id="{E6782872-2765-53ED-D420-198B741ABA10}"/>
+              <a:t>Word Breakdown</a:t>
+            </a:r>
+          </a:p>
+        </p:txBody>
+      </p:sp>
+      <p:sp>
+        <p:nvSpPr>
+          <p:cNvPr id="2" name="Rectangle: Rounded Corners 1">
+            <a:extLst>
+              <a:ext uri="{FF2B5EF4-FFF2-40B4-BE49-F238E27FC236}">
+                <a16:creationId xmlns:a16="http://schemas.microsoft.com/office/drawing/2014/main" id="{A218763C-8561-7967-EDA7-C0C3213CA3F1}"/>
               </a:ext>
             </a:extLst>
           </p:cNvPr>
@@ -7785,8 +9322,8 @@
         </p:nvSpPr>
         <p:spPr>
           <a:xfrm>
-            <a:off x="7409202" y="2869168"/>
-            <a:ext cx="1836011" cy="301527"/>
+            <a:off x="10009415" y="439613"/>
+            <a:ext cx="1797398" cy="462854"/>
           </a:xfrm>
           <a:prstGeom prst="roundRect">
             <a:avLst/>
@@ -7815,17 +9352,17 @@
             <a:pPr algn="ctr"/>
             <a:r>
               <a:rPr lang="en-US" dirty="0"/>
-              <a:t>Word Breakdown</a:t>
-            </a:r>
-          </a:p>
-        </p:txBody>
-      </p:sp>
-      <p:sp>
-        <p:nvSpPr>
-          <p:cNvPr id="29" name="Rectangle 28">
-            <a:extLst>
-              <a:ext uri="{FF2B5EF4-FFF2-40B4-BE49-F238E27FC236}">
-                <a16:creationId xmlns:a16="http://schemas.microsoft.com/office/drawing/2014/main" id="{EB320938-F391-D4EB-A60D-9C7670735F34}"/>
+              <a:t>Account</a:t>
+            </a:r>
+          </a:p>
+        </p:txBody>
+      </p:sp>
+      <p:sp>
+        <p:nvSpPr>
+          <p:cNvPr id="6" name="Rectangle: Rounded Corners 5">
+            <a:extLst>
+              <a:ext uri="{FF2B5EF4-FFF2-40B4-BE49-F238E27FC236}">
+                <a16:creationId xmlns:a16="http://schemas.microsoft.com/office/drawing/2014/main" id="{CBB532D6-AEFD-E4B2-B191-4CF7BEABA130}"/>
               </a:ext>
             </a:extLst>
           </p:cNvPr>
@@ -7834,16 +9371,12 @@
         </p:nvSpPr>
         <p:spPr>
           <a:xfrm>
-            <a:off x="2558980" y="4963885"/>
-            <a:ext cx="7074040" cy="411982"/>
-          </a:xfrm>
-          <a:prstGeom prst="rect">
+            <a:off x="1531621" y="437337"/>
+            <a:ext cx="1797398" cy="462854"/>
+          </a:xfrm>
+          <a:prstGeom prst="roundRect">
             <a:avLst/>
           </a:prstGeom>
-          <a:noFill/>
-          <a:ln>
-            <a:noFill/>
-          </a:ln>
         </p:spPr>
         <p:style>
           <a:lnRef idx="2">
@@ -7865,158 +9398,10 @@
           <a:bodyPr rtlCol="0" anchor="ctr"/>
           <a:lstStyle/>
           <a:p>
-            <a:r>
-              <a:rPr lang="en-US" dirty="0">
-                <a:solidFill>
-                  <a:schemeClr val="tx1"/>
-                </a:solidFill>
-              </a:rPr>
-              <a:t>            Upvote | Upvote Count: 0			</a:t>
-            </a:r>
-          </a:p>
-        </p:txBody>
-      </p:sp>
-      <p:sp>
-        <p:nvSpPr>
-          <p:cNvPr id="30" name="Rectangle 29">
-            <a:extLst>
-              <a:ext uri="{FF2B5EF4-FFF2-40B4-BE49-F238E27FC236}">
-                <a16:creationId xmlns:a16="http://schemas.microsoft.com/office/drawing/2014/main" id="{C6FC024A-899A-7E32-C4C1-5A9CA31F12D6}"/>
-              </a:ext>
-            </a:extLst>
-          </p:cNvPr>
-          <p:cNvSpPr/>
-          <p:nvPr/>
-        </p:nvSpPr>
-        <p:spPr>
-          <a:xfrm>
-            <a:off x="2873829" y="5036291"/>
-            <a:ext cx="311498" cy="249142"/>
-          </a:xfrm>
-          <a:prstGeom prst="rect">
-            <a:avLst/>
-          </a:prstGeom>
-          <a:noFill/>
-        </p:spPr>
-        <p:style>
-          <a:lnRef idx="2">
-            <a:schemeClr val="accent1">
-              <a:shade val="15000"/>
-            </a:schemeClr>
-          </a:lnRef>
-          <a:fillRef idx="1">
-            <a:schemeClr val="accent1"/>
-          </a:fillRef>
-          <a:effectRef idx="0">
-            <a:schemeClr val="accent1"/>
-          </a:effectRef>
-          <a:fontRef idx="minor">
-            <a:schemeClr val="lt1"/>
-          </a:fontRef>
-        </p:style>
-        <p:txBody>
-          <a:bodyPr rtlCol="0" anchor="ctr"/>
-          <a:lstStyle/>
-          <a:p>
             <a:pPr algn="ctr"/>
-            <a:endParaRPr lang="en-US"/>
-          </a:p>
-        </p:txBody>
-      </p:sp>
-      <p:sp>
-        <p:nvSpPr>
-          <p:cNvPr id="32" name="Rectangle: Rounded Corners 31">
-            <a:extLst>
-              <a:ext uri="{FF2B5EF4-FFF2-40B4-BE49-F238E27FC236}">
-                <a16:creationId xmlns:a16="http://schemas.microsoft.com/office/drawing/2014/main" id="{559543E7-7069-05A5-2916-7B6A46C91618}"/>
-              </a:ext>
-            </a:extLst>
-          </p:cNvPr>
-          <p:cNvSpPr/>
-          <p:nvPr/>
-        </p:nvSpPr>
-        <p:spPr>
-          <a:xfrm>
-            <a:off x="7409202" y="5019515"/>
-            <a:ext cx="1836011" cy="301527"/>
-          </a:xfrm>
-          <a:prstGeom prst="roundRect">
-            <a:avLst/>
-          </a:prstGeom>
-        </p:spPr>
-        <p:style>
-          <a:lnRef idx="2">
-            <a:schemeClr val="accent1">
-              <a:shade val="15000"/>
-            </a:schemeClr>
-          </a:lnRef>
-          <a:fillRef idx="1">
-            <a:schemeClr val="accent1"/>
-          </a:fillRef>
-          <a:effectRef idx="0">
-            <a:schemeClr val="accent1"/>
-          </a:effectRef>
-          <a:fontRef idx="minor">
-            <a:schemeClr val="lt1"/>
-          </a:fontRef>
-        </p:style>
-        <p:txBody>
-          <a:bodyPr rtlCol="0" anchor="ctr"/>
-          <a:lstStyle/>
-          <a:p>
-            <a:pPr algn="ctr"/>
             <a:r>
               <a:rPr lang="en-US" dirty="0"/>
-              <a:t>Word Breakdown</a:t>
-            </a:r>
-          </a:p>
-        </p:txBody>
-      </p:sp>
-      <p:sp>
-        <p:nvSpPr>
-          <p:cNvPr id="2" name="Rectangle: Rounded Corners 1">
-            <a:extLst>
-              <a:ext uri="{FF2B5EF4-FFF2-40B4-BE49-F238E27FC236}">
-                <a16:creationId xmlns:a16="http://schemas.microsoft.com/office/drawing/2014/main" id="{A218763C-8561-7967-EDA7-C0C3213CA3F1}"/>
-              </a:ext>
-            </a:extLst>
-          </p:cNvPr>
-          <p:cNvSpPr/>
-          <p:nvPr/>
-        </p:nvSpPr>
-        <p:spPr>
-          <a:xfrm>
-            <a:off x="10009415" y="439613"/>
-            <a:ext cx="1797398" cy="462854"/>
-          </a:xfrm>
-          <a:prstGeom prst="roundRect">
-            <a:avLst/>
-          </a:prstGeom>
-        </p:spPr>
-        <p:style>
-          <a:lnRef idx="2">
-            <a:schemeClr val="accent1">
-              <a:shade val="15000"/>
-            </a:schemeClr>
-          </a:lnRef>
-          <a:fillRef idx="1">
-            <a:schemeClr val="accent1"/>
-          </a:fillRef>
-          <a:effectRef idx="0">
-            <a:schemeClr val="accent1"/>
-          </a:effectRef>
-          <a:fontRef idx="minor">
-            <a:schemeClr val="lt1"/>
-          </a:fontRef>
-        </p:style>
-        <p:txBody>
-          <a:bodyPr rtlCol="0" anchor="ctr"/>
-          <a:lstStyle/>
-          <a:p>
-            <a:pPr algn="ctr"/>
-            <a:r>
-              <a:rPr lang="en-US" dirty="0"/>
-              <a:t>Account</a:t>
+              <a:t>Create Post</a:t>
             </a:r>
           </a:p>
         </p:txBody>
@@ -8024,7 +9409,7 @@
     </p:spTree>
     <p:extLst>
       <p:ext uri="{BB962C8B-B14F-4D97-AF65-F5344CB8AC3E}">
-        <p14:creationId xmlns:p14="http://schemas.microsoft.com/office/powerpoint/2010/main" val="2881041793"/>
+        <p14:creationId xmlns:p14="http://schemas.microsoft.com/office/powerpoint/2010/main" val="1364512580"/>
       </p:ext>
     </p:extLst>
   </p:cSld>
@@ -8759,4 +10144,299 @@
     </a:ext>
   </a:extLst>
 </a:theme>
+</file>
+
+<file path=ppt/theme/theme2.xml><?xml version="1.0" encoding="utf-8"?>
+<a:theme xmlns:a="http://schemas.openxmlformats.org/drawingml/2006/main" name="Office Theme">
+  <a:themeElements>
+    <a:clrScheme name="Office">
+      <a:dk1>
+        <a:sysClr val="windowText" lastClr="000000"/>
+      </a:dk1>
+      <a:lt1>
+        <a:sysClr val="window" lastClr="FFFFFF"/>
+      </a:lt1>
+      <a:dk2>
+        <a:srgbClr val="44546A"/>
+      </a:dk2>
+      <a:lt2>
+        <a:srgbClr val="E7E6E6"/>
+      </a:lt2>
+      <a:accent1>
+        <a:srgbClr val="4472C4"/>
+      </a:accent1>
+      <a:accent2>
+        <a:srgbClr val="ED7D31"/>
+      </a:accent2>
+      <a:accent3>
+        <a:srgbClr val="A5A5A5"/>
+      </a:accent3>
+      <a:accent4>
+        <a:srgbClr val="FFC000"/>
+      </a:accent4>
+      <a:accent5>
+        <a:srgbClr val="5B9BD5"/>
+      </a:accent5>
+      <a:accent6>
+        <a:srgbClr val="70AD47"/>
+      </a:accent6>
+      <a:hlink>
+        <a:srgbClr val="0563C1"/>
+      </a:hlink>
+      <a:folHlink>
+        <a:srgbClr val="954F72"/>
+      </a:folHlink>
+    </a:clrScheme>
+    <a:fontScheme name="Office">
+      <a:majorFont>
+        <a:latin typeface="Calibri Light" panose="020F0302020204030204"/>
+        <a:ea typeface=""/>
+        <a:cs typeface=""/>
+        <a:font script="Jpan" typeface="游ゴシック Light"/>
+        <a:font script="Hang" typeface="맑은 고딕"/>
+        <a:font script="Hans" typeface="等线 Light"/>
+        <a:font script="Hant" typeface="新細明體"/>
+        <a:font script="Arab" typeface="Times New Roman"/>
+        <a:font script="Hebr" typeface="Times New Roman"/>
+        <a:font script="Thai" typeface="Angsana New"/>
+        <a:font script="Ethi" typeface="Nyala"/>
+        <a:font script="Beng" typeface="Vrinda"/>
+        <a:font script="Gujr" typeface="Shruti"/>
+        <a:font script="Khmr" typeface="MoolBoran"/>
+        <a:font script="Knda" typeface="Tunga"/>
+        <a:font script="Guru" typeface="Raavi"/>
+        <a:font script="Cans" typeface="Euphemia"/>
+        <a:font script="Cher" typeface="Plantagenet Cherokee"/>
+        <a:font script="Yiii" typeface="Microsoft Yi Baiti"/>
+        <a:font script="Tibt" typeface="Microsoft Himalaya"/>
+        <a:font script="Thaa" typeface="MV Boli"/>
+        <a:font script="Deva" typeface="Mangal"/>
+        <a:font script="Telu" typeface="Gautami"/>
+        <a:font script="Taml" typeface="Latha"/>
+        <a:font script="Syrc" typeface="Estrangelo Edessa"/>
+        <a:font script="Orya" typeface="Kalinga"/>
+        <a:font script="Mlym" typeface="Kartika"/>
+        <a:font script="Laoo" typeface="DokChampa"/>
+        <a:font script="Sinh" typeface="Iskoola Pota"/>
+        <a:font script="Mong" typeface="Mongolian Baiti"/>
+        <a:font script="Viet" typeface="Times New Roman"/>
+        <a:font script="Uigh" typeface="Microsoft Uighur"/>
+        <a:font script="Geor" typeface="Sylfaen"/>
+        <a:font script="Armn" typeface="Arial"/>
+        <a:font script="Bugi" typeface="Leelawadee UI"/>
+        <a:font script="Bopo" typeface="Microsoft JhengHei"/>
+        <a:font script="Java" typeface="Javanese Text"/>
+        <a:font script="Lisu" typeface="Segoe UI"/>
+        <a:font script="Mymr" typeface="Myanmar Text"/>
+        <a:font script="Nkoo" typeface="Ebrima"/>
+        <a:font script="Olck" typeface="Nirmala UI"/>
+        <a:font script="Osma" typeface="Ebrima"/>
+        <a:font script="Phag" typeface="Phagspa"/>
+        <a:font script="Syrn" typeface="Estrangelo Edessa"/>
+        <a:font script="Syrj" typeface="Estrangelo Edessa"/>
+        <a:font script="Syre" typeface="Estrangelo Edessa"/>
+        <a:font script="Sora" typeface="Nirmala UI"/>
+        <a:font script="Tale" typeface="Microsoft Tai Le"/>
+        <a:font script="Talu" typeface="Microsoft New Tai Lue"/>
+        <a:font script="Tfng" typeface="Ebrima"/>
+      </a:majorFont>
+      <a:minorFont>
+        <a:latin typeface="Calibri" panose="020F0502020204030204"/>
+        <a:ea typeface=""/>
+        <a:cs typeface=""/>
+        <a:font script="Jpan" typeface="游ゴシック"/>
+        <a:font script="Hang" typeface="맑은 고딕"/>
+        <a:font script="Hans" typeface="等线"/>
+        <a:font script="Hant" typeface="新細明體"/>
+        <a:font script="Arab" typeface="Arial"/>
+        <a:font script="Hebr" typeface="Arial"/>
+        <a:font script="Thai" typeface="Cordia New"/>
+        <a:font script="Ethi" typeface="Nyala"/>
+        <a:font script="Beng" typeface="Vrinda"/>
+        <a:font script="Gujr" typeface="Shruti"/>
+        <a:font script="Khmr" typeface="DaunPenh"/>
+        <a:font script="Knda" typeface="Tunga"/>
+        <a:font script="Guru" typeface="Raavi"/>
+        <a:font script="Cans" typeface="Euphemia"/>
+        <a:font script="Cher" typeface="Plantagenet Cherokee"/>
+        <a:font script="Yiii" typeface="Microsoft Yi Baiti"/>
+        <a:font script="Tibt" typeface="Microsoft Himalaya"/>
+        <a:font script="Thaa" typeface="MV Boli"/>
+        <a:font script="Deva" typeface="Mangal"/>
+        <a:font script="Telu" typeface="Gautami"/>
+        <a:font script="Taml" typeface="Latha"/>
+        <a:font script="Syrc" typeface="Estrangelo Edessa"/>
+        <a:font script="Orya" typeface="Kalinga"/>
+        <a:font script="Mlym" typeface="Kartika"/>
+        <a:font script="Laoo" typeface="DokChampa"/>
+        <a:font script="Sinh" typeface="Iskoola Pota"/>
+        <a:font script="Mong" typeface="Mongolian Baiti"/>
+        <a:font script="Viet" typeface="Arial"/>
+        <a:font script="Uigh" typeface="Microsoft Uighur"/>
+        <a:font script="Geor" typeface="Sylfaen"/>
+        <a:font script="Armn" typeface="Arial"/>
+        <a:font script="Bugi" typeface="Leelawadee UI"/>
+        <a:font script="Bopo" typeface="Microsoft JhengHei"/>
+        <a:font script="Java" typeface="Javanese Text"/>
+        <a:font script="Lisu" typeface="Segoe UI"/>
+        <a:font script="Mymr" typeface="Myanmar Text"/>
+        <a:font script="Nkoo" typeface="Ebrima"/>
+        <a:font script="Olck" typeface="Nirmala UI"/>
+        <a:font script="Osma" typeface="Ebrima"/>
+        <a:font script="Phag" typeface="Phagspa"/>
+        <a:font script="Syrn" typeface="Estrangelo Edessa"/>
+        <a:font script="Syrj" typeface="Estrangelo Edessa"/>
+        <a:font script="Syre" typeface="Estrangelo Edessa"/>
+        <a:font script="Sora" typeface="Nirmala UI"/>
+        <a:font script="Tale" typeface="Microsoft Tai Le"/>
+        <a:font script="Talu" typeface="Microsoft New Tai Lue"/>
+        <a:font script="Tfng" typeface="Ebrima"/>
+      </a:minorFont>
+    </a:fontScheme>
+    <a:fmtScheme name="Office">
+      <a:fillStyleLst>
+        <a:solidFill>
+          <a:schemeClr val="phClr"/>
+        </a:solidFill>
+        <a:gradFill rotWithShape="1">
+          <a:gsLst>
+            <a:gs pos="0">
+              <a:schemeClr val="phClr">
+                <a:lumMod val="110000"/>
+                <a:satMod val="105000"/>
+                <a:tint val="67000"/>
+              </a:schemeClr>
+            </a:gs>
+            <a:gs pos="50000">
+              <a:schemeClr val="phClr">
+                <a:lumMod val="105000"/>
+                <a:satMod val="103000"/>
+                <a:tint val="73000"/>
+              </a:schemeClr>
+            </a:gs>
+            <a:gs pos="100000">
+              <a:schemeClr val="phClr">
+                <a:lumMod val="105000"/>
+                <a:satMod val="109000"/>
+                <a:tint val="81000"/>
+              </a:schemeClr>
+            </a:gs>
+          </a:gsLst>
+          <a:lin ang="5400000" scaled="0"/>
+        </a:gradFill>
+        <a:gradFill rotWithShape="1">
+          <a:gsLst>
+            <a:gs pos="0">
+              <a:schemeClr val="phClr">
+                <a:satMod val="103000"/>
+                <a:lumMod val="102000"/>
+                <a:tint val="94000"/>
+              </a:schemeClr>
+            </a:gs>
+            <a:gs pos="50000">
+              <a:schemeClr val="phClr">
+                <a:satMod val="110000"/>
+                <a:lumMod val="100000"/>
+                <a:shade val="100000"/>
+              </a:schemeClr>
+            </a:gs>
+            <a:gs pos="100000">
+              <a:schemeClr val="phClr">
+                <a:lumMod val="99000"/>
+                <a:satMod val="120000"/>
+                <a:shade val="78000"/>
+              </a:schemeClr>
+            </a:gs>
+          </a:gsLst>
+          <a:lin ang="5400000" scaled="0"/>
+        </a:gradFill>
+      </a:fillStyleLst>
+      <a:lnStyleLst>
+        <a:ln w="6350" cap="flat" cmpd="sng" algn="ctr">
+          <a:solidFill>
+            <a:schemeClr val="phClr"/>
+          </a:solidFill>
+          <a:prstDash val="solid"/>
+          <a:miter lim="800000"/>
+        </a:ln>
+        <a:ln w="12700" cap="flat" cmpd="sng" algn="ctr">
+          <a:solidFill>
+            <a:schemeClr val="phClr"/>
+          </a:solidFill>
+          <a:prstDash val="solid"/>
+          <a:miter lim="800000"/>
+        </a:ln>
+        <a:ln w="19050" cap="flat" cmpd="sng" algn="ctr">
+          <a:solidFill>
+            <a:schemeClr val="phClr"/>
+          </a:solidFill>
+          <a:prstDash val="solid"/>
+          <a:miter lim="800000"/>
+        </a:ln>
+      </a:lnStyleLst>
+      <a:effectStyleLst>
+        <a:effectStyle>
+          <a:effectLst/>
+        </a:effectStyle>
+        <a:effectStyle>
+          <a:effectLst/>
+        </a:effectStyle>
+        <a:effectStyle>
+          <a:effectLst>
+            <a:outerShdw blurRad="57150" dist="19050" dir="5400000" algn="ctr" rotWithShape="0">
+              <a:srgbClr val="000000">
+                <a:alpha val="63000"/>
+              </a:srgbClr>
+            </a:outerShdw>
+          </a:effectLst>
+        </a:effectStyle>
+      </a:effectStyleLst>
+      <a:bgFillStyleLst>
+        <a:solidFill>
+          <a:schemeClr val="phClr"/>
+        </a:solidFill>
+        <a:solidFill>
+          <a:schemeClr val="phClr">
+            <a:tint val="95000"/>
+            <a:satMod val="170000"/>
+          </a:schemeClr>
+        </a:solidFill>
+        <a:gradFill rotWithShape="1">
+          <a:gsLst>
+            <a:gs pos="0">
+              <a:schemeClr val="phClr">
+                <a:tint val="93000"/>
+                <a:satMod val="150000"/>
+                <a:shade val="98000"/>
+                <a:lumMod val="102000"/>
+              </a:schemeClr>
+            </a:gs>
+            <a:gs pos="50000">
+              <a:schemeClr val="phClr">
+                <a:tint val="98000"/>
+                <a:satMod val="130000"/>
+                <a:shade val="90000"/>
+                <a:lumMod val="103000"/>
+              </a:schemeClr>
+            </a:gs>
+            <a:gs pos="100000">
+              <a:schemeClr val="phClr">
+                <a:shade val="63000"/>
+                <a:satMod val="120000"/>
+              </a:schemeClr>
+            </a:gs>
+          </a:gsLst>
+          <a:lin ang="5400000" scaled="0"/>
+        </a:gradFill>
+      </a:bgFillStyleLst>
+    </a:fmtScheme>
+  </a:themeElements>
+  <a:objectDefaults/>
+  <a:extraClrSchemeLst/>
+  <a:extLst>
+    <a:ext uri="{05A4C25C-085E-4340-85A3-A5531E510DB2}">
+      <thm15:themeFamily xmlns:thm15="http://schemas.microsoft.com/office/thememl/2012/main" name="Office Theme" id="{62F939B6-93AF-4DB8-9C6B-D6C7DFDC589F}" vid="{4A3C46E8-61CC-4603-A589-7422A47A8E4A}"/>
+    </a:ext>
+  </a:extLst>
+</a:theme>
 </file>
</xml_diff>

<commit_message>
adding old documents. adding database proposal.
</commit_message>
<xml_diff>
--- a/Documents/final_project_planning.pptx
+++ b/Documents/final_project_planning.pptx
@@ -306,7 +306,7 @@
           <a:p>
             <a:fld id="{149ECEB6-B347-42A2-AFA6-6834FA678A79}" type="datetimeFigureOut">
               <a:rPr lang="en-US" smtClean="0"/>
-              <a:t>11/7/2023</a:t>
+              <a:t>11/13/2023</a:t>
             </a:fld>
             <a:endParaRPr lang="en-US"/>
           </a:p>
@@ -804,7 +804,7 @@
           <a:p>
             <a:fld id="{9F87B9EB-8124-4FED-A4DC-BE4B0CC78498}" type="datetimeFigureOut">
               <a:rPr lang="en-US" smtClean="0"/>
-              <a:t>11/7/2023</a:t>
+              <a:t>11/13/2023</a:t>
             </a:fld>
             <a:endParaRPr lang="en-US"/>
           </a:p>
@@ -1002,7 +1002,7 @@
           <a:p>
             <a:fld id="{9F87B9EB-8124-4FED-A4DC-BE4B0CC78498}" type="datetimeFigureOut">
               <a:rPr lang="en-US" smtClean="0"/>
-              <a:t>11/7/2023</a:t>
+              <a:t>11/13/2023</a:t>
             </a:fld>
             <a:endParaRPr lang="en-US"/>
           </a:p>
@@ -1210,7 +1210,7 @@
           <a:p>
             <a:fld id="{9F87B9EB-8124-4FED-A4DC-BE4B0CC78498}" type="datetimeFigureOut">
               <a:rPr lang="en-US" smtClean="0"/>
-              <a:t>11/7/2023</a:t>
+              <a:t>11/13/2023</a:t>
             </a:fld>
             <a:endParaRPr lang="en-US"/>
           </a:p>
@@ -1408,7 +1408,7 @@
           <a:p>
             <a:fld id="{9F87B9EB-8124-4FED-A4DC-BE4B0CC78498}" type="datetimeFigureOut">
               <a:rPr lang="en-US" smtClean="0"/>
-              <a:t>11/7/2023</a:t>
+              <a:t>11/13/2023</a:t>
             </a:fld>
             <a:endParaRPr lang="en-US"/>
           </a:p>
@@ -1683,7 +1683,7 @@
           <a:p>
             <a:fld id="{9F87B9EB-8124-4FED-A4DC-BE4B0CC78498}" type="datetimeFigureOut">
               <a:rPr lang="en-US" smtClean="0"/>
-              <a:t>11/7/2023</a:t>
+              <a:t>11/13/2023</a:t>
             </a:fld>
             <a:endParaRPr lang="en-US"/>
           </a:p>
@@ -1948,7 +1948,7 @@
           <a:p>
             <a:fld id="{9F87B9EB-8124-4FED-A4DC-BE4B0CC78498}" type="datetimeFigureOut">
               <a:rPr lang="en-US" smtClean="0"/>
-              <a:t>11/7/2023</a:t>
+              <a:t>11/13/2023</a:t>
             </a:fld>
             <a:endParaRPr lang="en-US"/>
           </a:p>
@@ -2360,7 +2360,7 @@
           <a:p>
             <a:fld id="{9F87B9EB-8124-4FED-A4DC-BE4B0CC78498}" type="datetimeFigureOut">
               <a:rPr lang="en-US" smtClean="0"/>
-              <a:t>11/7/2023</a:t>
+              <a:t>11/13/2023</a:t>
             </a:fld>
             <a:endParaRPr lang="en-US"/>
           </a:p>
@@ -2501,7 +2501,7 @@
           <a:p>
             <a:fld id="{9F87B9EB-8124-4FED-A4DC-BE4B0CC78498}" type="datetimeFigureOut">
               <a:rPr lang="en-US" smtClean="0"/>
-              <a:t>11/7/2023</a:t>
+              <a:t>11/13/2023</a:t>
             </a:fld>
             <a:endParaRPr lang="en-US"/>
           </a:p>
@@ -2614,7 +2614,7 @@
           <a:p>
             <a:fld id="{9F87B9EB-8124-4FED-A4DC-BE4B0CC78498}" type="datetimeFigureOut">
               <a:rPr lang="en-US" smtClean="0"/>
-              <a:t>11/7/2023</a:t>
+              <a:t>11/13/2023</a:t>
             </a:fld>
             <a:endParaRPr lang="en-US"/>
           </a:p>
@@ -2925,7 +2925,7 @@
           <a:p>
             <a:fld id="{9F87B9EB-8124-4FED-A4DC-BE4B0CC78498}" type="datetimeFigureOut">
               <a:rPr lang="en-US" smtClean="0"/>
-              <a:t>11/7/2023</a:t>
+              <a:t>11/13/2023</a:t>
             </a:fld>
             <a:endParaRPr lang="en-US"/>
           </a:p>
@@ -3213,7 +3213,7 @@
           <a:p>
             <a:fld id="{9F87B9EB-8124-4FED-A4DC-BE4B0CC78498}" type="datetimeFigureOut">
               <a:rPr lang="en-US" smtClean="0"/>
-              <a:t>11/7/2023</a:t>
+              <a:t>11/13/2023</a:t>
             </a:fld>
             <a:endParaRPr lang="en-US"/>
           </a:p>
@@ -3454,7 +3454,7 @@
           <a:p>
             <a:fld id="{9F87B9EB-8124-4FED-A4DC-BE4B0CC78498}" type="datetimeFigureOut">
               <a:rPr lang="en-US" smtClean="0"/>
-              <a:t>11/7/2023</a:t>
+              <a:t>11/13/2023</a:t>
             </a:fld>
             <a:endParaRPr lang="en-US"/>
           </a:p>
@@ -9402,6 +9402,41 @@
             <a:r>
               <a:rPr lang="en-US" dirty="0"/>
               <a:t>Create Post</a:t>
+            </a:r>
+          </a:p>
+        </p:txBody>
+      </p:sp>
+      <p:sp>
+        <p:nvSpPr>
+          <p:cNvPr id="5" name="TextBox 4">
+            <a:extLst>
+              <a:ext uri="{FF2B5EF4-FFF2-40B4-BE49-F238E27FC236}">
+                <a16:creationId xmlns:a16="http://schemas.microsoft.com/office/drawing/2014/main" id="{FCA057FF-CCDF-B4F3-E50F-C42E9A12876A}"/>
+              </a:ext>
+            </a:extLst>
+          </p:cNvPr>
+          <p:cNvSpPr txBox="1"/>
+          <p:nvPr/>
+        </p:nvSpPr>
+        <p:spPr>
+          <a:xfrm>
+            <a:off x="1220561" y="-1717712"/>
+            <a:ext cx="6098720" cy="1200329"/>
+          </a:xfrm>
+          <a:prstGeom prst="rect">
+            <a:avLst/>
+          </a:prstGeom>
+          <a:noFill/>
+        </p:spPr>
+        <p:txBody>
+          <a:bodyPr wrap="square">
+            <a:spAutoFit/>
+          </a:bodyPr>
+          <a:lstStyle/>
+          <a:p>
+            <a:r>
+              <a:rPr lang="en-US" dirty="0"/>
+              <a:t>https://krishnakishorev.medium.com/storing-images-in-mongodb-using-nodejs-b7515145328c#:~:text=There%20are%20three%20ways%20to,using%20Binarydata%20(%20bindata%20)%20type.</a:t>
             </a:r>
           </a:p>
         </p:txBody>

</xml_diff>

<commit_message>
updated story board planning to what makes sense in my head. - Added correct mapping to site.css
</commit_message>
<xml_diff>
--- a/Documents/final_project_planning.pptx
+++ b/Documents/final_project_planning.pptx
@@ -329,7 +329,7 @@
           <a:p>
             <a:fld id="{149ECEB6-B347-42A2-AFA6-6834FA678A79}" type="datetimeFigureOut">
               <a:rPr lang="en-US" smtClean="0"/>
-              <a:t>11/21/2023</a:t>
+              <a:t>12/9/2023</a:t>
             </a:fld>
             <a:endParaRPr lang="en-US"/>
           </a:p>
@@ -995,7 +995,7 @@
           <a:p>
             <a:fld id="{9F87B9EB-8124-4FED-A4DC-BE4B0CC78498}" type="datetimeFigureOut">
               <a:rPr lang="en-US" smtClean="0"/>
-              <a:t>11/21/2023</a:t>
+              <a:t>12/9/2023</a:t>
             </a:fld>
             <a:endParaRPr lang="en-US"/>
           </a:p>
@@ -1193,7 +1193,7 @@
           <a:p>
             <a:fld id="{9F87B9EB-8124-4FED-A4DC-BE4B0CC78498}" type="datetimeFigureOut">
               <a:rPr lang="en-US" smtClean="0"/>
-              <a:t>11/21/2023</a:t>
+              <a:t>12/9/2023</a:t>
             </a:fld>
             <a:endParaRPr lang="en-US"/>
           </a:p>
@@ -1401,7 +1401,7 @@
           <a:p>
             <a:fld id="{9F87B9EB-8124-4FED-A4DC-BE4B0CC78498}" type="datetimeFigureOut">
               <a:rPr lang="en-US" smtClean="0"/>
-              <a:t>11/21/2023</a:t>
+              <a:t>12/9/2023</a:t>
             </a:fld>
             <a:endParaRPr lang="en-US"/>
           </a:p>
@@ -1599,7 +1599,7 @@
           <a:p>
             <a:fld id="{9F87B9EB-8124-4FED-A4DC-BE4B0CC78498}" type="datetimeFigureOut">
               <a:rPr lang="en-US" smtClean="0"/>
-              <a:t>11/21/2023</a:t>
+              <a:t>12/9/2023</a:t>
             </a:fld>
             <a:endParaRPr lang="en-US"/>
           </a:p>
@@ -1874,7 +1874,7 @@
           <a:p>
             <a:fld id="{9F87B9EB-8124-4FED-A4DC-BE4B0CC78498}" type="datetimeFigureOut">
               <a:rPr lang="en-US" smtClean="0"/>
-              <a:t>11/21/2023</a:t>
+              <a:t>12/9/2023</a:t>
             </a:fld>
             <a:endParaRPr lang="en-US"/>
           </a:p>
@@ -2139,7 +2139,7 @@
           <a:p>
             <a:fld id="{9F87B9EB-8124-4FED-A4DC-BE4B0CC78498}" type="datetimeFigureOut">
               <a:rPr lang="en-US" smtClean="0"/>
-              <a:t>11/21/2023</a:t>
+              <a:t>12/9/2023</a:t>
             </a:fld>
             <a:endParaRPr lang="en-US"/>
           </a:p>
@@ -2551,7 +2551,7 @@
           <a:p>
             <a:fld id="{9F87B9EB-8124-4FED-A4DC-BE4B0CC78498}" type="datetimeFigureOut">
               <a:rPr lang="en-US" smtClean="0"/>
-              <a:t>11/21/2023</a:t>
+              <a:t>12/9/2023</a:t>
             </a:fld>
             <a:endParaRPr lang="en-US"/>
           </a:p>
@@ -2692,7 +2692,7 @@
           <a:p>
             <a:fld id="{9F87B9EB-8124-4FED-A4DC-BE4B0CC78498}" type="datetimeFigureOut">
               <a:rPr lang="en-US" smtClean="0"/>
-              <a:t>11/21/2023</a:t>
+              <a:t>12/9/2023</a:t>
             </a:fld>
             <a:endParaRPr lang="en-US"/>
           </a:p>
@@ -2805,7 +2805,7 @@
           <a:p>
             <a:fld id="{9F87B9EB-8124-4FED-A4DC-BE4B0CC78498}" type="datetimeFigureOut">
               <a:rPr lang="en-US" smtClean="0"/>
-              <a:t>11/21/2023</a:t>
+              <a:t>12/9/2023</a:t>
             </a:fld>
             <a:endParaRPr lang="en-US"/>
           </a:p>
@@ -3116,7 +3116,7 @@
           <a:p>
             <a:fld id="{9F87B9EB-8124-4FED-A4DC-BE4B0CC78498}" type="datetimeFigureOut">
               <a:rPr lang="en-US" smtClean="0"/>
-              <a:t>11/21/2023</a:t>
+              <a:t>12/9/2023</a:t>
             </a:fld>
             <a:endParaRPr lang="en-US"/>
           </a:p>
@@ -3404,7 +3404,7 @@
           <a:p>
             <a:fld id="{9F87B9EB-8124-4FED-A4DC-BE4B0CC78498}" type="datetimeFigureOut">
               <a:rPr lang="en-US" smtClean="0"/>
-              <a:t>11/21/2023</a:t>
+              <a:t>12/9/2023</a:t>
             </a:fld>
             <a:endParaRPr lang="en-US"/>
           </a:p>
@@ -3645,7 +3645,7 @@
           <a:p>
             <a:fld id="{9F87B9EB-8124-4FED-A4DC-BE4B0CC78498}" type="datetimeFigureOut">
               <a:rPr lang="en-US" smtClean="0"/>
-              <a:t>11/21/2023</a:t>
+              <a:t>12/9/2023</a:t>
             </a:fld>
             <a:endParaRPr lang="en-US"/>
           </a:p>
@@ -9463,8 +9463,13 @@
           <a:p>
             <a:r>
               <a:rPr lang="en-US" dirty="0"/>
-              <a:t>Post:</a:t>
-            </a:r>
+              <a:t>Post</a:t>
+            </a:r>
+            <a:r>
+              <a:rPr lang="en-US"/>
+              <a:t>:  THIS IS A USER POST TITLE</a:t>
+            </a:r>
+            <a:endParaRPr lang="en-US" dirty="0"/>
           </a:p>
           <a:p>
             <a:endParaRPr lang="en-US" dirty="0"/>

</xml_diff>